<commit_message>
feat: added video 3 and video4
</commit_message>
<xml_diff>
--- a/assets/get-ready.pptx
+++ b/assets/get-ready.pptx
@@ -5,19 +5,18 @@
     <p:sldMasterId id="2147483732" r:id="rId1"/>
   </p:sldMasterIdLst>
   <p:notesMasterIdLst>
-    <p:notesMasterId r:id="rId12"/>
+    <p:notesMasterId r:id="rId11"/>
   </p:notesMasterIdLst>
   <p:sldIdLst>
     <p:sldId id="263" r:id="rId2"/>
     <p:sldId id="269" r:id="rId3"/>
     <p:sldId id="270" r:id="rId4"/>
     <p:sldId id="271" r:id="rId5"/>
-    <p:sldId id="272" r:id="rId6"/>
-    <p:sldId id="266" r:id="rId7"/>
-    <p:sldId id="268" r:id="rId8"/>
-    <p:sldId id="267" r:id="rId9"/>
-    <p:sldId id="265" r:id="rId10"/>
-    <p:sldId id="264" r:id="rId11"/>
+    <p:sldId id="266" r:id="rId6"/>
+    <p:sldId id="267" r:id="rId7"/>
+    <p:sldId id="264" r:id="rId8"/>
+    <p:sldId id="274" r:id="rId9"/>
+    <p:sldId id="273" r:id="rId10"/>
   </p:sldIdLst>
   <p:sldSz cx="10285413" cy="18288000"/>
   <p:notesSz cx="6858000" cy="9144000"/>
@@ -119,7 +118,7 @@
   <p:extLst>
     <p:ext uri="{EFAFB233-063F-42B5-8137-9DF3F51BA10A}">
       <p15:sldGuideLst xmlns:p15="http://schemas.microsoft.com/office/powerpoint/2012/main">
-        <p15:guide id="1" orient="horz" pos="5783" userDrawn="1">
+        <p15:guide id="1" orient="horz" pos="5737" userDrawn="1">
           <p15:clr>
             <a:srgbClr val="A4A3A4"/>
           </p15:clr>
@@ -141,106 +140,24 @@
 </p188:authorLst>
 </file>
 
-<file path=ppt/comments/modernComment_10B_FD59A657.xml><?xml version="1.0" encoding="utf-8"?>
+<file path=ppt/comments/modernComment_108_91EF180C.xml><?xml version="1.0" encoding="utf-8"?>
 <p188:cmLst xmlns:a="http://schemas.openxmlformats.org/drawingml/2006/main" xmlns:r="http://schemas.openxmlformats.org/officeDocument/2006/relationships" xmlns:p188="http://schemas.microsoft.com/office/powerpoint/2018/8/main">
-  <p188:cm id="{E2C00A1B-EAAD-6F49-84C7-E0D05052ABDD}" authorId="{8860045D-B334-310D-0A4E-9E20AA0B149E}" created="2025-12-27T19:00:57.614">
+  <p188:cm id="{6AD75071-EA32-894B-B2B6-3BC5D06D2C1C}" authorId="{8860045D-B334-310D-0A4E-9E20AA0B149E}" created="2025-12-30T17:22:03.982">
     <pc:sldMkLst xmlns:pc="http://schemas.microsoft.com/office/powerpoint/2013/main/command">
       <pc:docMk/>
-      <pc:sldMk cId="4250510935" sldId="267"/>
+      <pc:sldMk cId="2448365580" sldId="264"/>
     </pc:sldMkLst>
-    <p188:replyLst>
-      <p188:reply id="{AFAC3828-0E48-A346-A0D8-2033E380BEE5}" authorId="{8860045D-B334-310D-0A4E-9E20AA0B149E}" created="2025-12-27T19:01:30.755">
-        <p188:txBody>
-          <a:bodyPr/>
-          <a:lstStyle/>
-          <a:p>
-            <a:r>
-              <a:rPr lang="en-DE"/>
-              <a:t>Youtube:
-</a:t>
-            </a:r>
-          </a:p>
-        </p188:txBody>
-      </p188:reply>
-      <p188:reply id="{FED1BFF5-5EFE-B74F-84B0-86DF5C9191A5}" authorId="{8860045D-B334-310D-0A4E-9E20AA0B149E}" created="2025-12-27T19:01:41.968">
-        <p188:txBody>
-          <a:bodyPr/>
-          <a:lstStyle/>
-          <a:p>
-            <a:r>
-              <a:rPr lang="en-DE"/>
-              <a:t>Instagram:
-</a:t>
-            </a:r>
-          </a:p>
-        </p188:txBody>
-      </p188:reply>
-      <p188:reply id="{B049D6EA-8AFA-3D4B-88E1-CC993722A6EB}" authorId="{8860045D-B334-310D-0A4E-9E20AA0B149E}" created="2025-12-28T08:53:40.110">
-        <p188:txBody>
-          <a:bodyPr/>
-          <a:lstStyle/>
-          <a:p>
-            <a:r>
-              <a:rPr lang="en-DE"/>
-              <a:t>Caption: Stop using If-Else in Python!🐍🛑
-Use the .get() method in Python dictionaries to write cleaner, more readable, and optimized code.
-Did you know this trick? Let me know in the comments! 👇
-#python #cleancode #programming #coding #softwareengineering
-</a:t>
-            </a:r>
-          </a:p>
-        </p188:txBody>
-      </p188:reply>
-      <p188:reply id="{8F763E0F-201F-B24F-8B53-A0E2B0711B89}" authorId="{8860045D-B334-310D-0A4E-9E20AA0B149E}" created="2025-12-28T09:33:12.477">
-        <p188:txBody>
-          <a:bodyPr/>
-          <a:lstStyle/>
-          <a:p>
-            <a:r>
-              <a:rPr lang="en-DE"/>
-              <a:t>Tags: 
-1- Python India
-2- Python USA</a:t>
-            </a:r>
-          </a:p>
-        </p188:txBody>
-      </p188:reply>
-      <p188:reply id="{289E78DF-5A10-CF47-B08D-C45590EFC091}" authorId="{8860045D-B334-310D-0A4E-9E20AA0B149E}" created="2025-12-28T09:35:00.249">
-        <p188:txBody>
-          <a:bodyPr/>
-          <a:lstStyle/>
-          <a:p>
-            <a:r>
-              <a:rPr lang="en-DE"/>
-              <a:t>Title: Stop If-Else in Python! 🐍 #python #cleancode #programming #shorts #usa #india
-Description: Learn how to use .get() in dictionaries to write cleaner code. Best for Python developers!</a:t>
-            </a:r>
-          </a:p>
-        </p188:txBody>
-      </p188:reply>
-      <p188:reply id="{9706027F-C909-104F-9766-A86E56EB2CFA}" authorId="{8860045D-B334-310D-0A4E-9E20AA0B149E}" created="2025-12-28T13:20:44.688">
-        <p188:txBody>
-          <a:bodyPr/>
-          <a:lstStyle/>
-          <a:p>
-            <a:r>
-              <a:rPr lang="en-DE"/>
-              <a:t>#python programmieren
-#informatik</a:t>
-            </a:r>
-          </a:p>
-        </p188:txBody>
-      </p188:reply>
-    </p188:replyLst>
     <p188:txBody>
       <a:bodyPr/>
       <a:lstStyle/>
       <a:p>
         <a:r>
           <a:rPr lang="en-DE"/>
-          <a:t>TikTok:
-"Are you team If-Else or team .get()? 👇"
-#coding #germany #programming #pythontips</a:t>
+          <a:t>TikTok
+Are you still using loops for this? 🤦‍♂️ Learn the senior-level trick for sequence slicing in Python! 🐍✨
+🚀 Pythonic Way = Cleaner + Faster.
+Tag a dev who needs to see this! 👇
+#Python #Coding #Programmer #SoftwareDeveloper #TechTips #CodeWithEbrahim #LearnPython</a:t>
         </a:r>
       </a:p>
     </p188:txBody>
@@ -707,7 +624,7 @@
               <a:rPr lang="en-GB" dirty="0" err="1"/>
               <a:t>comprehensions.py</a:t>
             </a:r>
-            <a:endParaRPr lang="en-GB"/>
+            <a:endParaRPr lang="en-GB" dirty="0"/>
           </a:p>
           <a:p>
             <a:endParaRPr lang="en-GB" dirty="0"/>
@@ -737,7 +654,7 @@
           <a:p>
             <a:fld id="{B46D1A58-C582-AC49-9010-037E894CD422}" type="slidenum">
               <a:rPr lang="en-DE" smtClean="0"/>
-              <a:t>6</a:t>
+              <a:t>5</a:t>
             </a:fld>
             <a:endParaRPr lang="en-DE"/>
           </a:p>
@@ -757,114 +674,6 @@
 </file>
 
 <file path=ppt/notesSlides/notesSlide2.xml><?xml version="1.0" encoding="utf-8"?>
-<p:notes xmlns:a="http://schemas.openxmlformats.org/drawingml/2006/main" xmlns:r="http://schemas.openxmlformats.org/officeDocument/2006/relationships" xmlns:p="http://schemas.openxmlformats.org/presentationml/2006/main">
-  <p:cSld>
-    <p:spTree>
-      <p:nvGrpSpPr>
-        <p:cNvPr id="1" name="">
-          <a:extLst>
-            <a:ext uri="{FF2B5EF4-FFF2-40B4-BE49-F238E27FC236}">
-              <a16:creationId xmlns:a16="http://schemas.microsoft.com/office/drawing/2014/main" id="{02BF3512-DFFE-6F54-462B-515C9F5EF9BE}"/>
-            </a:ext>
-          </a:extLst>
-        </p:cNvPr>
-        <p:cNvGrpSpPr/>
-        <p:nvPr/>
-      </p:nvGrpSpPr>
-      <p:grpSpPr>
-        <a:xfrm>
-          <a:off x="0" y="0"/>
-          <a:ext cx="0" cy="0"/>
-          <a:chOff x="0" y="0"/>
-          <a:chExt cx="0" cy="0"/>
-        </a:xfrm>
-      </p:grpSpPr>
-      <p:sp>
-        <p:nvSpPr>
-          <p:cNvPr id="2" name="Slide Image Placeholder 1">
-            <a:extLst>
-              <a:ext uri="{FF2B5EF4-FFF2-40B4-BE49-F238E27FC236}">
-                <a16:creationId xmlns:a16="http://schemas.microsoft.com/office/drawing/2014/main" id="{1D454EE2-378B-9503-CE89-56EC58C531EB}"/>
-              </a:ext>
-            </a:extLst>
-          </p:cNvPr>
-          <p:cNvSpPr>
-            <a:spLocks noGrp="1" noRot="1" noChangeAspect="1"/>
-          </p:cNvSpPr>
-          <p:nvPr>
-            <p:ph type="sldImg"/>
-          </p:nvPr>
-        </p:nvSpPr>
-        <p:spPr/>
-      </p:sp>
-      <p:sp>
-        <p:nvSpPr>
-          <p:cNvPr id="3" name="Notes Placeholder 2">
-            <a:extLst>
-              <a:ext uri="{FF2B5EF4-FFF2-40B4-BE49-F238E27FC236}">
-                <a16:creationId xmlns:a16="http://schemas.microsoft.com/office/drawing/2014/main" id="{1F205FDC-1362-433B-E981-FF9E7596A99B}"/>
-              </a:ext>
-            </a:extLst>
-          </p:cNvPr>
-          <p:cNvSpPr>
-            <a:spLocks noGrp="1"/>
-          </p:cNvSpPr>
-          <p:nvPr>
-            <p:ph type="body" idx="1"/>
-          </p:nvPr>
-        </p:nvSpPr>
-        <p:spPr/>
-        <p:txBody>
-          <a:bodyPr/>
-          <a:lstStyle/>
-          <a:p>
-            <a:endParaRPr lang="en-DE" dirty="0"/>
-          </a:p>
-        </p:txBody>
-      </p:sp>
-      <p:sp>
-        <p:nvSpPr>
-          <p:cNvPr id="4" name="Slide Number Placeholder 3">
-            <a:extLst>
-              <a:ext uri="{FF2B5EF4-FFF2-40B4-BE49-F238E27FC236}">
-                <a16:creationId xmlns:a16="http://schemas.microsoft.com/office/drawing/2014/main" id="{A1B35C36-FE9D-8AC7-2875-34ACED800ECE}"/>
-              </a:ext>
-            </a:extLst>
-          </p:cNvPr>
-          <p:cNvSpPr>
-            <a:spLocks noGrp="1"/>
-          </p:cNvSpPr>
-          <p:nvPr>
-            <p:ph type="sldNum" sz="quarter" idx="5"/>
-          </p:nvPr>
-        </p:nvSpPr>
-        <p:spPr/>
-        <p:txBody>
-          <a:bodyPr/>
-          <a:lstStyle/>
-          <a:p>
-            <a:fld id="{B46D1A58-C582-AC49-9010-037E894CD422}" type="slidenum">
-              <a:rPr lang="en-DE" smtClean="0"/>
-              <a:t>7</a:t>
-            </a:fld>
-            <a:endParaRPr lang="en-DE"/>
-          </a:p>
-        </p:txBody>
-      </p:sp>
-    </p:spTree>
-    <p:extLst>
-      <p:ext uri="{BB962C8B-B14F-4D97-AF65-F5344CB8AC3E}">
-        <p14:creationId xmlns:p14="http://schemas.microsoft.com/office/powerpoint/2010/main" val="811905215"/>
-      </p:ext>
-    </p:extLst>
-  </p:cSld>
-  <p:clrMapOvr>
-    <a:masterClrMapping/>
-  </p:clrMapOvr>
-</p:notes>
-</file>
-
-<file path=ppt/notesSlides/notesSlide3.xml><?xml version="1.0" encoding="utf-8"?>
 <p:notes xmlns:a="http://schemas.openxmlformats.org/drawingml/2006/main" xmlns:r="http://schemas.openxmlformats.org/officeDocument/2006/relationships" xmlns:p="http://schemas.openxmlformats.org/presentationml/2006/main">
   <p:cSld>
     <p:spTree>
@@ -926,6 +735,19 @@
           <a:bodyPr/>
           <a:lstStyle/>
           <a:p>
+            <a:r>
+              <a:rPr lang="en-DE" dirty="0"/>
+              <a:t>Video 3</a:t>
+            </a:r>
+            <a:br>
+              <a:rPr lang="en-DE" dirty="0"/>
+            </a:br>
+            <a:r>
+              <a:rPr lang="en-DE" dirty="0"/>
+              <a:t>published on 29.12.2025</a:t>
+            </a:r>
+          </a:p>
+          <a:p>
             <a:endParaRPr lang="en-DE" dirty="0"/>
           </a:p>
         </p:txBody>
@@ -953,7 +775,7 @@
           <a:p>
             <a:fld id="{B46D1A58-C582-AC49-9010-037E894CD422}" type="slidenum">
               <a:rPr lang="en-DE" smtClean="0"/>
-              <a:t>8</a:t>
+              <a:t>6</a:t>
             </a:fld>
             <a:endParaRPr lang="en-DE"/>
           </a:p>
@@ -972,7 +794,7 @@
 </p:notes>
 </file>
 
-<file path=ppt/notesSlides/notesSlide4.xml><?xml version="1.0" encoding="utf-8"?>
+<file path=ppt/notesSlides/notesSlide3.xml><?xml version="1.0" encoding="utf-8"?>
 <p:notes xmlns:a="http://schemas.openxmlformats.org/drawingml/2006/main" xmlns:r="http://schemas.openxmlformats.org/officeDocument/2006/relationships" xmlns:p="http://schemas.openxmlformats.org/presentationml/2006/main">
   <p:cSld>
     <p:spTree>
@@ -1016,6 +838,27 @@
           <a:bodyPr/>
           <a:lstStyle/>
           <a:p>
+            <a:r>
+              <a:rPr lang="en-DE" dirty="0"/>
+              <a:t>Video 4</a:t>
+            </a:r>
+            <a:br>
+              <a:rPr lang="en-DE" dirty="0"/>
+            </a:br>
+            <a:r>
+              <a:rPr lang="en-DE" dirty="0"/>
+              <a:t>Published on 31.12.2025</a:t>
+            </a:r>
+          </a:p>
+          <a:p>
+            <a:r>
+              <a:rPr lang="en-GB" dirty="0"/>
+              <a:t>R</a:t>
+            </a:r>
+            <a:r>
+              <a:rPr lang="en-DE"/>
+              <a:t>elated files: </a:t>
+            </a:r>
             <a:endParaRPr lang="en-DE" dirty="0"/>
           </a:p>
         </p:txBody>
@@ -1037,7 +880,7 @@
           <a:p>
             <a:fld id="{B46D1A58-C582-AC49-9010-037E894CD422}" type="slidenum">
               <a:rPr lang="en-DE" smtClean="0"/>
-              <a:t>9</a:t>
+              <a:t>7</a:t>
             </a:fld>
             <a:endParaRPr lang="en-DE"/>
           </a:p>
@@ -1046,7 +889,7 @@
     </p:spTree>
     <p:extLst>
       <p:ext uri="{BB962C8B-B14F-4D97-AF65-F5344CB8AC3E}">
-        <p14:creationId xmlns:p14="http://schemas.microsoft.com/office/powerpoint/2010/main" val="522483398"/>
+        <p14:creationId xmlns:p14="http://schemas.microsoft.com/office/powerpoint/2010/main" val="1485623404"/>
       </p:ext>
     </p:extLst>
   </p:cSld>
@@ -4102,42 +3945,6 @@
 </p:sld>
 </file>
 
-<file path=ppt/slides/slide10.xml><?xml version="1.0" encoding="utf-8"?>
-<p:sld xmlns:a="http://schemas.openxmlformats.org/drawingml/2006/main" xmlns:r="http://schemas.openxmlformats.org/officeDocument/2006/relationships" xmlns:p="http://schemas.openxmlformats.org/presentationml/2006/main">
-  <p:cSld>
-    <p:spTree>
-      <p:nvGrpSpPr>
-        <p:cNvPr id="1" name="">
-          <a:extLst>
-            <a:ext uri="{FF2B5EF4-FFF2-40B4-BE49-F238E27FC236}">
-              <a16:creationId xmlns:a16="http://schemas.microsoft.com/office/drawing/2014/main" id="{AEC0FC5C-9A1B-2F88-F479-50424DDDDE7F}"/>
-            </a:ext>
-          </a:extLst>
-        </p:cNvPr>
-        <p:cNvGrpSpPr/>
-        <p:nvPr/>
-      </p:nvGrpSpPr>
-      <p:grpSpPr>
-        <a:xfrm>
-          <a:off x="0" y="0"/>
-          <a:ext cx="0" cy="0"/>
-          <a:chOff x="0" y="0"/>
-          <a:chExt cx="0" cy="0"/>
-        </a:xfrm>
-      </p:grpSpPr>
-    </p:spTree>
-    <p:extLst>
-      <p:ext uri="{BB962C8B-B14F-4D97-AF65-F5344CB8AC3E}">
-        <p14:creationId xmlns:p14="http://schemas.microsoft.com/office/powerpoint/2010/main" val="2448365580"/>
-      </p:ext>
-    </p:extLst>
-  </p:cSld>
-  <p:clrMapOvr>
-    <a:masterClrMapping/>
-  </p:clrMapOvr>
-</p:sld>
-</file>
-
 <file path=ppt/slides/slide2.xml><?xml version="1.0" encoding="utf-8"?>
 <p:sld xmlns:a="http://schemas.openxmlformats.org/drawingml/2006/main" xmlns:r="http://schemas.openxmlformats.org/officeDocument/2006/relationships" xmlns:p="http://schemas.openxmlformats.org/presentationml/2006/main">
   <p:cSld>
@@ -4249,42 +4056,6 @@
 <file path=ppt/slides/slide5.xml><?xml version="1.0" encoding="utf-8"?>
 <p:sld xmlns:a="http://schemas.openxmlformats.org/drawingml/2006/main" xmlns:r="http://schemas.openxmlformats.org/officeDocument/2006/relationships" xmlns:p="http://schemas.openxmlformats.org/presentationml/2006/main">
   <p:cSld>
-    <p:spTree>
-      <p:nvGrpSpPr>
-        <p:cNvPr id="1" name="">
-          <a:extLst>
-            <a:ext uri="{FF2B5EF4-FFF2-40B4-BE49-F238E27FC236}">
-              <a16:creationId xmlns:a16="http://schemas.microsoft.com/office/drawing/2014/main" id="{F756E8BB-9836-C499-3C0F-C6B3B139A5DA}"/>
-            </a:ext>
-          </a:extLst>
-        </p:cNvPr>
-        <p:cNvGrpSpPr/>
-        <p:nvPr/>
-      </p:nvGrpSpPr>
-      <p:grpSpPr>
-        <a:xfrm>
-          <a:off x="0" y="0"/>
-          <a:ext cx="0" cy="0"/>
-          <a:chOff x="0" y="0"/>
-          <a:chExt cx="0" cy="0"/>
-        </a:xfrm>
-      </p:grpSpPr>
-    </p:spTree>
-    <p:extLst>
-      <p:ext uri="{BB962C8B-B14F-4D97-AF65-F5344CB8AC3E}">
-        <p14:creationId xmlns:p14="http://schemas.microsoft.com/office/powerpoint/2010/main" val="1058232679"/>
-      </p:ext>
-    </p:extLst>
-  </p:cSld>
-  <p:clrMapOvr>
-    <a:masterClrMapping/>
-  </p:clrMapOvr>
-</p:sld>
-</file>
-
-<file path=ppt/slides/slide6.xml><?xml version="1.0" encoding="utf-8"?>
-<p:sld xmlns:a="http://schemas.openxmlformats.org/drawingml/2006/main" xmlns:r="http://schemas.openxmlformats.org/officeDocument/2006/relationships" xmlns:p="http://schemas.openxmlformats.org/presentationml/2006/main">
-  <p:cSld>
     <p:bg>
       <p:bgPr>
         <a:solidFill>
@@ -4822,141 +4593,7 @@
 </p:sld>
 </file>
 
-<file path=ppt/slides/slide7.xml><?xml version="1.0" encoding="utf-8"?>
-<p:sld xmlns:a="http://schemas.openxmlformats.org/drawingml/2006/main" xmlns:r="http://schemas.openxmlformats.org/officeDocument/2006/relationships" xmlns:p="http://schemas.openxmlformats.org/presentationml/2006/main">
-  <p:cSld>
-    <p:spTree>
-      <p:nvGrpSpPr>
-        <p:cNvPr id="1" name="">
-          <a:extLst>
-            <a:ext uri="{FF2B5EF4-FFF2-40B4-BE49-F238E27FC236}">
-              <a16:creationId xmlns:a16="http://schemas.microsoft.com/office/drawing/2014/main" id="{9FBF0F6B-38BC-BDE8-3851-46668EE8FD9F}"/>
-            </a:ext>
-          </a:extLst>
-        </p:cNvPr>
-        <p:cNvGrpSpPr/>
-        <p:nvPr/>
-      </p:nvGrpSpPr>
-      <p:grpSpPr>
-        <a:xfrm>
-          <a:off x="0" y="0"/>
-          <a:ext cx="0" cy="0"/>
-          <a:chOff x="0" y="0"/>
-          <a:chExt cx="0" cy="0"/>
-        </a:xfrm>
-      </p:grpSpPr>
-      <p:sp>
-        <p:nvSpPr>
-          <p:cNvPr id="2" name="TextBox 1">
-            <a:extLst>
-              <a:ext uri="{FF2B5EF4-FFF2-40B4-BE49-F238E27FC236}">
-                <a16:creationId xmlns:a16="http://schemas.microsoft.com/office/drawing/2014/main" id="{3E4D1237-BAFC-5312-87E3-2A84A0BAD721}"/>
-              </a:ext>
-            </a:extLst>
-          </p:cNvPr>
-          <p:cNvSpPr txBox="1"/>
-          <p:nvPr/>
-        </p:nvSpPr>
-        <p:spPr>
-          <a:xfrm>
-            <a:off x="604058" y="580044"/>
-            <a:ext cx="5847113" cy="1569660"/>
-          </a:xfrm>
-          <a:prstGeom prst="rect">
-            <a:avLst/>
-          </a:prstGeom>
-          <a:noFill/>
-        </p:spPr>
-        <p:txBody>
-          <a:bodyPr wrap="none" rtlCol="0">
-            <a:spAutoFit/>
-          </a:bodyPr>
-          <a:lstStyle/>
-          <a:p>
-            <a:r>
-              <a:rPr lang="en-DE" sz="3200" dirty="0"/>
-              <a:t>Video 3</a:t>
-            </a:r>
-          </a:p>
-          <a:p>
-            <a:r>
-              <a:rPr lang="en-DE" sz="3200" dirty="0"/>
-              <a:t>Topic: avoid if-Else for dictionaries</a:t>
-            </a:r>
-          </a:p>
-          <a:p>
-            <a:r>
-              <a:rPr lang="en-DE" sz="3200" dirty="0"/>
-              <a:t>File Name: </a:t>
-            </a:r>
-          </a:p>
-        </p:txBody>
-      </p:sp>
-      <p:sp>
-        <p:nvSpPr>
-          <p:cNvPr id="4" name="Right Brace 3">
-            <a:extLst>
-              <a:ext uri="{FF2B5EF4-FFF2-40B4-BE49-F238E27FC236}">
-                <a16:creationId xmlns:a16="http://schemas.microsoft.com/office/drawing/2014/main" id="{D3EF3452-406C-C767-6B3F-856E6822349E}"/>
-              </a:ext>
-            </a:extLst>
-          </p:cNvPr>
-          <p:cNvSpPr/>
-          <p:nvPr/>
-        </p:nvSpPr>
-        <p:spPr>
-          <a:xfrm>
-            <a:off x="5514109" y="4350327"/>
-            <a:ext cx="937062" cy="4045528"/>
-          </a:xfrm>
-          <a:prstGeom prst="rightBrace">
-            <a:avLst/>
-          </a:prstGeom>
-          <a:ln w="31750">
-            <a:solidFill>
-              <a:schemeClr val="tx1"/>
-            </a:solidFill>
-            <a:headEnd type="none"/>
-            <a:tailEnd type="arrow" w="lg" len="lg"/>
-          </a:ln>
-        </p:spPr>
-        <p:style>
-          <a:lnRef idx="1">
-            <a:schemeClr val="accent1"/>
-          </a:lnRef>
-          <a:fillRef idx="0">
-            <a:schemeClr val="accent1"/>
-          </a:fillRef>
-          <a:effectRef idx="0">
-            <a:schemeClr val="accent1"/>
-          </a:effectRef>
-          <a:fontRef idx="minor">
-            <a:schemeClr val="tx1"/>
-          </a:fontRef>
-        </p:style>
-        <p:txBody>
-          <a:bodyPr rtlCol="0" anchor="ctr"/>
-          <a:lstStyle/>
-          <a:p>
-            <a:pPr marL="0" algn="ctr" defTabSz="457200" rtl="1" eaLnBrk="1" latinLnBrk="0" hangingPunct="1"/>
-            <a:endParaRPr lang="en-DE"/>
-          </a:p>
-        </p:txBody>
-      </p:sp>
-    </p:spTree>
-    <p:extLst>
-      <p:ext uri="{BB962C8B-B14F-4D97-AF65-F5344CB8AC3E}">
-        <p14:creationId xmlns:p14="http://schemas.microsoft.com/office/powerpoint/2010/main" val="4150051786"/>
-      </p:ext>
-    </p:extLst>
-  </p:cSld>
-  <p:clrMapOvr>
-    <a:masterClrMapping/>
-  </p:clrMapOvr>
-</p:sld>
-</file>
-
-<file path=ppt/slides/slide8.xml><?xml version="1.0" encoding="utf-8"?>
+<file path=ppt/slides/slide6.xml><?xml version="1.0" encoding="utf-8"?>
 <p:sld xmlns:a="http://schemas.openxmlformats.org/drawingml/2006/main" xmlns:r="http://schemas.openxmlformats.org/officeDocument/2006/relationships" xmlns:p="http://schemas.openxmlformats.org/presentationml/2006/main">
   <p:cSld>
     <p:bg>
@@ -5267,7 +4904,7 @@
             <p:nvPr/>
           </p:nvPicPr>
           <p:blipFill rotWithShape="1">
-            <a:blip r:embed="rId4"/>
+            <a:blip r:embed="rId3"/>
             <a:srcRect l="22460" t="31855" r="15333" b="19954"/>
             <a:stretch>
               <a:fillRect/>
@@ -5298,10 +4935,10 @@
             <p:nvPr/>
           </p:nvPicPr>
           <p:blipFill>
-            <a:blip r:embed="rId5">
+            <a:blip r:embed="rId4">
               <a:extLst>
                 <a:ext uri="{96DAC541-7B7A-43D3-8B79-37D633B846F1}">
-                  <asvg:svgBlip xmlns:asvg="http://schemas.microsoft.com/office/drawing/2016/SVG/main" r:embed="rId6"/>
+                  <asvg:svgBlip xmlns:asvg="http://schemas.microsoft.com/office/drawing/2016/SVG/main" r:embed="rId5"/>
                 </a:ext>
               </a:extLst>
             </a:blip>
@@ -5514,7 +5151,7 @@
             <p:nvPr/>
           </p:nvPicPr>
           <p:blipFill rotWithShape="1">
-            <a:blip r:embed="rId7"/>
+            <a:blip r:embed="rId6"/>
             <a:srcRect l="14206" t="34999" r="11348" b="26848"/>
             <a:stretch>
               <a:fillRect/>
@@ -5545,10 +5182,10 @@
             <p:nvPr/>
           </p:nvPicPr>
           <p:blipFill>
-            <a:blip r:embed="rId8">
+            <a:blip r:embed="rId7">
               <a:extLst>
                 <a:ext uri="{96DAC541-7B7A-43D3-8B79-37D633B846F1}">
-                  <asvg:svgBlip xmlns:asvg="http://schemas.microsoft.com/office/drawing/2016/SVG/main" r:embed="rId9"/>
+                  <asvg:svgBlip xmlns:asvg="http://schemas.microsoft.com/office/drawing/2016/SVG/main" r:embed="rId8"/>
                 </a:ext>
               </a:extLst>
             </a:blip>
@@ -5577,23 +5214,27 @@
   <p:clrMapOvr>
     <a:masterClrMapping/>
   </p:clrMapOvr>
-  <p:extLst>
-    <p:ext uri="{6950BFC3-D8DA-4A85-94F7-54DA5524770B}">
-      <p188:commentRel xmlns:p188="http://schemas.microsoft.com/office/powerpoint/2018/8/main" r:id="rId3"/>
-    </p:ext>
-  </p:extLst>
 </p:sld>
 </file>
 
-<file path=ppt/slides/slide9.xml><?xml version="1.0" encoding="utf-8"?>
+<file path=ppt/slides/slide7.xml><?xml version="1.0" encoding="utf-8"?>
 <p:sld xmlns:a="http://schemas.openxmlformats.org/drawingml/2006/main" xmlns:r="http://schemas.openxmlformats.org/officeDocument/2006/relationships" xmlns:p="http://schemas.openxmlformats.org/presentationml/2006/main">
   <p:cSld>
+    <p:bg>
+      <p:bgPr>
+        <a:blipFill>
+          <a:blip r:embed="rId4"/>
+          <a:tile tx="0" ty="0" sx="100000" sy="100000" flip="none" algn="tl"/>
+        </a:blipFill>
+        <a:effectLst/>
+      </p:bgPr>
+    </p:bg>
     <p:spTree>
       <p:nvGrpSpPr>
         <p:cNvPr id="1" name="">
           <a:extLst>
             <a:ext uri="{FF2B5EF4-FFF2-40B4-BE49-F238E27FC236}">
-              <a16:creationId xmlns:a16="http://schemas.microsoft.com/office/drawing/2014/main" id="{70D59A75-6B00-3E4D-E486-02DDE6B1F35B}"/>
+              <a16:creationId xmlns:a16="http://schemas.microsoft.com/office/drawing/2014/main" id="{AEC0FC5C-9A1B-2F88-F479-50424DDDDE7F}"/>
             </a:ext>
           </a:extLst>
         </p:cNvPr>
@@ -5608,10 +5249,1003 @@
           <a:chExt cx="0" cy="0"/>
         </a:xfrm>
       </p:grpSpPr>
+      <p:pic>
+        <p:nvPicPr>
+          <p:cNvPr id="7" name="Picture 6">
+            <a:extLst>
+              <a:ext uri="{FF2B5EF4-FFF2-40B4-BE49-F238E27FC236}">
+                <a16:creationId xmlns:a16="http://schemas.microsoft.com/office/drawing/2014/main" id="{6AC545B3-CE47-A03F-6421-E8C90CB6ADF2}"/>
+              </a:ext>
+            </a:extLst>
+          </p:cNvPr>
+          <p:cNvPicPr>
+            <a:picLocks noChangeAspect="1"/>
+          </p:cNvPicPr>
+          <p:nvPr/>
+        </p:nvPicPr>
+        <p:blipFill rotWithShape="1">
+          <a:blip r:embed="rId5"/>
+          <a:srcRect l="17427" t="28769" r="11619" b="14751"/>
+          <a:stretch>
+            <a:fillRect/>
+          </a:stretch>
+        </p:blipFill>
+        <p:spPr>
+          <a:xfrm>
+            <a:off x="-42917" y="4451710"/>
+            <a:ext cx="10328330" cy="5375564"/>
+          </a:xfrm>
+          <a:prstGeom prst="rect">
+            <a:avLst/>
+          </a:prstGeom>
+        </p:spPr>
+      </p:pic>
+      <p:pic>
+        <p:nvPicPr>
+          <p:cNvPr id="12" name="Picture 11">
+            <a:extLst>
+              <a:ext uri="{FF2B5EF4-FFF2-40B4-BE49-F238E27FC236}">
+                <a16:creationId xmlns:a16="http://schemas.microsoft.com/office/drawing/2014/main" id="{8A0871C5-641B-5244-5AA7-5C85A833803D}"/>
+              </a:ext>
+            </a:extLst>
+          </p:cNvPr>
+          <p:cNvPicPr>
+            <a:picLocks noChangeAspect="1"/>
+          </p:cNvPicPr>
+          <p:nvPr/>
+        </p:nvPicPr>
+        <p:blipFill rotWithShape="1">
+          <a:blip r:embed="rId6"/>
+          <a:srcRect l="16551" t="33107" r="11373" b="19724"/>
+          <a:stretch>
+            <a:fillRect/>
+          </a:stretch>
+        </p:blipFill>
+        <p:spPr>
+          <a:xfrm>
+            <a:off x="-42918" y="11822323"/>
+            <a:ext cx="10328400" cy="4207867"/>
+          </a:xfrm>
+          <a:prstGeom prst="rect">
+            <a:avLst/>
+          </a:prstGeom>
+        </p:spPr>
+      </p:pic>
+      <p:sp>
+        <p:nvSpPr>
+          <p:cNvPr id="14" name="TextBox 13">
+            <a:extLst>
+              <a:ext uri="{FF2B5EF4-FFF2-40B4-BE49-F238E27FC236}">
+                <a16:creationId xmlns:a16="http://schemas.microsoft.com/office/drawing/2014/main" id="{EFB95669-C168-4572-DD10-024C3E650E04}"/>
+              </a:ext>
+            </a:extLst>
+          </p:cNvPr>
+          <p:cNvSpPr txBox="1"/>
+          <p:nvPr/>
+        </p:nvSpPr>
+        <p:spPr>
+          <a:xfrm>
+            <a:off x="2170229" y="1745204"/>
+            <a:ext cx="5944954" cy="923330"/>
+          </a:xfrm>
+          <a:prstGeom prst="rect">
+            <a:avLst/>
+          </a:prstGeom>
+          <a:noFill/>
+        </p:spPr>
+        <p:txBody>
+          <a:bodyPr wrap="square" rtlCol="0">
+            <a:spAutoFit/>
+          </a:bodyPr>
+          <a:lstStyle/>
+          <a:p>
+            <a:pPr algn="ctr"/>
+            <a:r>
+              <a:rPr lang="en-GB" sz="5400" b="1" dirty="0">
+                <a:ln/>
+                <a:latin typeface="+mj-lt"/>
+              </a:rPr>
+              <a:t>@</a:t>
+            </a:r>
+            <a:r>
+              <a:rPr lang="en-GB" sz="5400" b="1" dirty="0" err="1">
+                <a:ln/>
+                <a:latin typeface="+mj-lt"/>
+              </a:rPr>
+              <a:t>CodeWithEbrahim</a:t>
+            </a:r>
+            <a:endParaRPr lang="en-GB" sz="5400" b="1" dirty="0">
+              <a:ln/>
+              <a:latin typeface="+mj-lt"/>
+            </a:endParaRPr>
+          </a:p>
+        </p:txBody>
+      </p:sp>
+      <p:grpSp>
+        <p:nvGrpSpPr>
+          <p:cNvPr id="25" name="Group 24">
+            <a:extLst>
+              <a:ext uri="{FF2B5EF4-FFF2-40B4-BE49-F238E27FC236}">
+                <a16:creationId xmlns:a16="http://schemas.microsoft.com/office/drawing/2014/main" id="{6883BD0B-E8B4-948F-DE6D-863A162CA9C1}"/>
+              </a:ext>
+            </a:extLst>
+          </p:cNvPr>
+          <p:cNvGrpSpPr/>
+          <p:nvPr/>
+        </p:nvGrpSpPr>
+        <p:grpSpPr>
+          <a:xfrm>
+            <a:off x="4153139" y="492745"/>
+            <a:ext cx="1979135" cy="925200"/>
+            <a:chOff x="4315976" y="15244200"/>
+            <a:chExt cx="1979135" cy="925200"/>
+          </a:xfrm>
+        </p:grpSpPr>
+        <p:pic>
+          <p:nvPicPr>
+            <p:cNvPr id="22" name="Picture 21">
+              <a:extLst>
+                <a:ext uri="{FF2B5EF4-FFF2-40B4-BE49-F238E27FC236}">
+                  <a16:creationId xmlns:a16="http://schemas.microsoft.com/office/drawing/2014/main" id="{6D52AB9E-4D60-D0FB-656A-3E8AD099E56B}"/>
+                </a:ext>
+              </a:extLst>
+            </p:cNvPr>
+            <p:cNvPicPr>
+              <a:picLocks noChangeAspect="1"/>
+            </p:cNvPicPr>
+            <p:nvPr/>
+          </p:nvPicPr>
+          <p:blipFill>
+            <a:blip r:embed="rId7"/>
+            <a:stretch>
+              <a:fillRect/>
+            </a:stretch>
+          </p:blipFill>
+          <p:spPr>
+            <a:xfrm>
+              <a:off x="5369911" y="15244200"/>
+              <a:ext cx="925200" cy="925200"/>
+            </a:xfrm>
+            <a:prstGeom prst="rect">
+              <a:avLst/>
+            </a:prstGeom>
+          </p:spPr>
+        </p:pic>
+        <p:pic>
+          <p:nvPicPr>
+            <p:cNvPr id="24" name="Picture 23">
+              <a:extLst>
+                <a:ext uri="{FF2B5EF4-FFF2-40B4-BE49-F238E27FC236}">
+                  <a16:creationId xmlns:a16="http://schemas.microsoft.com/office/drawing/2014/main" id="{948D8E68-472C-127B-8D50-6ABFB3203F9D}"/>
+                </a:ext>
+              </a:extLst>
+            </p:cNvPr>
+            <p:cNvPicPr>
+              <a:picLocks noChangeAspect="1"/>
+            </p:cNvPicPr>
+            <p:nvPr/>
+          </p:nvPicPr>
+          <p:blipFill>
+            <a:blip r:embed="rId8"/>
+            <a:stretch>
+              <a:fillRect/>
+            </a:stretch>
+          </p:blipFill>
+          <p:spPr>
+            <a:xfrm>
+              <a:off x="4315976" y="15244200"/>
+              <a:ext cx="925200" cy="925200"/>
+            </a:xfrm>
+            <a:prstGeom prst="rect">
+              <a:avLst/>
+            </a:prstGeom>
+          </p:spPr>
+        </p:pic>
+      </p:grpSp>
+      <p:sp>
+        <p:nvSpPr>
+          <p:cNvPr id="16" name="Rectangle 15">
+            <a:extLst>
+              <a:ext uri="{FF2B5EF4-FFF2-40B4-BE49-F238E27FC236}">
+                <a16:creationId xmlns:a16="http://schemas.microsoft.com/office/drawing/2014/main" id="{2408F8D5-CBEF-DB53-71DD-415C735FFEF0}"/>
+              </a:ext>
+            </a:extLst>
+          </p:cNvPr>
+          <p:cNvSpPr/>
+          <p:nvPr/>
+        </p:nvSpPr>
+        <p:spPr>
+          <a:xfrm>
+            <a:off x="2532857" y="2871992"/>
+            <a:ext cx="5219698" cy="1569660"/>
+          </a:xfrm>
+          <a:prstGeom prst="rect">
+            <a:avLst/>
+          </a:prstGeom>
+          <a:noFill/>
+        </p:spPr>
+        <p:txBody>
+          <a:bodyPr wrap="none" lIns="91440" tIns="45720" rIns="91440" bIns="45720">
+            <a:spAutoFit/>
+          </a:bodyPr>
+          <a:lstStyle/>
+          <a:p>
+            <a:pPr algn="ctr"/>
+            <a:r>
+              <a:rPr lang="en-GB" sz="9600" b="1" dirty="0">
+                <a:ln w="6600">
+                  <a:solidFill>
+                    <a:schemeClr val="accent2"/>
+                  </a:solidFill>
+                  <a:prstDash val="solid"/>
+                </a:ln>
+                <a:solidFill>
+                  <a:srgbClr val="FFFFFF"/>
+                </a:solidFill>
+                <a:effectLst>
+                  <a:outerShdw dist="38100" dir="2700000" algn="tl" rotWithShape="0">
+                    <a:schemeClr val="accent2"/>
+                  </a:outerShdw>
+                </a:effectLst>
+                <a:latin typeface="Patrick Hand" pitchFamily="2" charset="77"/>
+              </a:rPr>
+              <a:t>Legacy Way</a:t>
+            </a:r>
+          </a:p>
+        </p:txBody>
+      </p:sp>
+      <p:sp>
+        <p:nvSpPr>
+          <p:cNvPr id="17" name="Rectangle 16">
+            <a:extLst>
+              <a:ext uri="{FF2B5EF4-FFF2-40B4-BE49-F238E27FC236}">
+                <a16:creationId xmlns:a16="http://schemas.microsoft.com/office/drawing/2014/main" id="{E70E9936-7110-450A-9576-39615EF11B30}"/>
+              </a:ext>
+            </a:extLst>
+          </p:cNvPr>
+          <p:cNvSpPr/>
+          <p:nvPr/>
+        </p:nvSpPr>
+        <p:spPr>
+          <a:xfrm>
+            <a:off x="2090428" y="10228754"/>
+            <a:ext cx="6104556" cy="1569660"/>
+          </a:xfrm>
+          <a:prstGeom prst="rect">
+            <a:avLst/>
+          </a:prstGeom>
+          <a:noFill/>
+        </p:spPr>
+        <p:txBody>
+          <a:bodyPr wrap="none" lIns="91440" tIns="45720" rIns="91440" bIns="45720">
+            <a:spAutoFit/>
+          </a:bodyPr>
+          <a:lstStyle/>
+          <a:p>
+            <a:pPr algn="ctr"/>
+            <a:r>
+              <a:rPr lang="en-GB" sz="9600" dirty="0">
+                <a:ln w="0"/>
+                <a:solidFill>
+                  <a:srgbClr val="002060"/>
+                </a:solidFill>
+                <a:effectLst>
+                  <a:outerShdw blurRad="38100" dist="19050" dir="2700000" algn="tl" rotWithShape="0">
+                    <a:schemeClr val="dk1">
+                      <a:alpha val="40000"/>
+                    </a:schemeClr>
+                  </a:outerShdw>
+                </a:effectLst>
+                <a:latin typeface="Patrick Hand" pitchFamily="2" charset="77"/>
+              </a:rPr>
+              <a:t>Pythonic Way</a:t>
+            </a:r>
+          </a:p>
+        </p:txBody>
+      </p:sp>
+      <p:sp>
+        <p:nvSpPr>
+          <p:cNvPr id="18" name="Curved Right Arrow 17">
+            <a:extLst>
+              <a:ext uri="{FF2B5EF4-FFF2-40B4-BE49-F238E27FC236}">
+                <a16:creationId xmlns:a16="http://schemas.microsoft.com/office/drawing/2014/main" id="{E6FC7DB3-67EC-D839-66A1-97F35ACCD311}"/>
+              </a:ext>
+            </a:extLst>
+          </p:cNvPr>
+          <p:cNvSpPr/>
+          <p:nvPr/>
+        </p:nvSpPr>
+        <p:spPr>
+          <a:xfrm>
+            <a:off x="2" y="7426033"/>
+            <a:ext cx="1136071" cy="5375565"/>
+          </a:xfrm>
+          <a:prstGeom prst="curvedRightArrow">
+            <a:avLst/>
+          </a:prstGeom>
+          <a:solidFill>
+            <a:srgbClr val="FFFF00"/>
+          </a:solidFill>
+          <a:ln w="31750">
+            <a:solidFill>
+              <a:schemeClr val="accent1">
+                <a:shade val="15000"/>
+              </a:schemeClr>
+            </a:solidFill>
+          </a:ln>
+        </p:spPr>
+        <p:style>
+          <a:lnRef idx="2">
+            <a:schemeClr val="accent1">
+              <a:shade val="15000"/>
+            </a:schemeClr>
+          </a:lnRef>
+          <a:fillRef idx="1">
+            <a:schemeClr val="accent1"/>
+          </a:fillRef>
+          <a:effectRef idx="0">
+            <a:schemeClr val="accent1"/>
+          </a:effectRef>
+          <a:fontRef idx="minor">
+            <a:schemeClr val="lt1"/>
+          </a:fontRef>
+        </p:style>
+        <p:txBody>
+          <a:bodyPr rtlCol="0" anchor="ctr"/>
+          <a:lstStyle/>
+          <a:p>
+            <a:pPr marL="0" algn="ctr" defTabSz="457200" rtl="0" eaLnBrk="1" latinLnBrk="0" hangingPunct="1"/>
+            <a:endParaRPr lang="en-DE" dirty="0">
+              <a:solidFill>
+                <a:schemeClr val="tx1"/>
+              </a:solidFill>
+              <a:latin typeface="Patrick Hand" pitchFamily="2" charset="77"/>
+            </a:endParaRPr>
+          </a:p>
+        </p:txBody>
+      </p:sp>
+      <p:pic>
+        <p:nvPicPr>
+          <p:cNvPr id="20" name="Picture 19">
+            <a:extLst>
+              <a:ext uri="{FF2B5EF4-FFF2-40B4-BE49-F238E27FC236}">
+                <a16:creationId xmlns:a16="http://schemas.microsoft.com/office/drawing/2014/main" id="{B53D7D60-AD8E-40FA-06A8-4988EB02BFC1}"/>
+              </a:ext>
+            </a:extLst>
+          </p:cNvPr>
+          <p:cNvPicPr>
+            <a:picLocks noChangeAspect="1"/>
+          </p:cNvPicPr>
+          <p:nvPr/>
+        </p:nvPicPr>
+        <p:blipFill>
+          <a:blip r:embed="rId9"/>
+          <a:stretch>
+            <a:fillRect/>
+          </a:stretch>
+        </p:blipFill>
+        <p:spPr>
+          <a:xfrm>
+            <a:off x="9139119" y="4534837"/>
+            <a:ext cx="1063167" cy="1063167"/>
+          </a:xfrm>
+          <a:prstGeom prst="rect">
+            <a:avLst/>
+          </a:prstGeom>
+        </p:spPr>
+      </p:pic>
+      <p:pic>
+        <p:nvPicPr>
+          <p:cNvPr id="26" name="Picture 25">
+            <a:extLst>
+              <a:ext uri="{FF2B5EF4-FFF2-40B4-BE49-F238E27FC236}">
+                <a16:creationId xmlns:a16="http://schemas.microsoft.com/office/drawing/2014/main" id="{F8B3358B-03D9-F7B7-FBFC-221E87B77F12}"/>
+              </a:ext>
+            </a:extLst>
+          </p:cNvPr>
+          <p:cNvPicPr>
+            <a:picLocks noChangeAspect="1"/>
+          </p:cNvPicPr>
+          <p:nvPr/>
+        </p:nvPicPr>
+        <p:blipFill>
+          <a:blip r:embed="rId9"/>
+          <a:stretch>
+            <a:fillRect/>
+          </a:stretch>
+        </p:blipFill>
+        <p:spPr>
+          <a:xfrm>
+            <a:off x="9031467" y="11933159"/>
+            <a:ext cx="1063167" cy="1063167"/>
+          </a:xfrm>
+          <a:prstGeom prst="rect">
+            <a:avLst/>
+          </a:prstGeom>
+        </p:spPr>
+      </p:pic>
     </p:spTree>
     <p:extLst>
       <p:ext uri="{BB962C8B-B14F-4D97-AF65-F5344CB8AC3E}">
-        <p14:creationId xmlns:p14="http://schemas.microsoft.com/office/powerpoint/2010/main" val="539301653"/>
+        <p14:creationId xmlns:p14="http://schemas.microsoft.com/office/powerpoint/2010/main" val="2448365580"/>
+      </p:ext>
+    </p:extLst>
+  </p:cSld>
+  <p:clrMapOvr>
+    <a:masterClrMapping/>
+  </p:clrMapOvr>
+  <p:extLst>
+    <p:ext uri="{6950BFC3-D8DA-4A85-94F7-54DA5524770B}">
+      <p188:commentRel xmlns:p188="http://schemas.microsoft.com/office/powerpoint/2018/8/main" r:id="rId3"/>
+    </p:ext>
+  </p:extLst>
+</p:sld>
+</file>
+
+<file path=ppt/slides/slide8.xml><?xml version="1.0" encoding="utf-8"?>
+<p:sld xmlns:a="http://schemas.openxmlformats.org/drawingml/2006/main" xmlns:r="http://schemas.openxmlformats.org/officeDocument/2006/relationships" xmlns:p="http://schemas.openxmlformats.org/presentationml/2006/main">
+  <p:cSld>
+    <p:bg>
+      <p:bgPr>
+        <a:blipFill>
+          <a:blip r:embed="rId2"/>
+          <a:tile tx="0" ty="0" sx="100000" sy="100000" flip="none" algn="tl"/>
+        </a:blipFill>
+        <a:effectLst/>
+      </p:bgPr>
+    </p:bg>
+    <p:spTree>
+      <p:nvGrpSpPr>
+        <p:cNvPr id="1" name="">
+          <a:extLst>
+            <a:ext uri="{FF2B5EF4-FFF2-40B4-BE49-F238E27FC236}">
+              <a16:creationId xmlns:a16="http://schemas.microsoft.com/office/drawing/2014/main" id="{B810988C-393A-23A2-9DF5-C9402B5BC58A}"/>
+            </a:ext>
+          </a:extLst>
+        </p:cNvPr>
+        <p:cNvGrpSpPr/>
+        <p:nvPr/>
+      </p:nvGrpSpPr>
+      <p:grpSpPr>
+        <a:xfrm>
+          <a:off x="0" y="0"/>
+          <a:ext cx="0" cy="0"/>
+          <a:chOff x="0" y="0"/>
+          <a:chExt cx="0" cy="0"/>
+        </a:xfrm>
+      </p:grpSpPr>
+      <p:sp>
+        <p:nvSpPr>
+          <p:cNvPr id="14" name="TextBox 13">
+            <a:extLst>
+              <a:ext uri="{FF2B5EF4-FFF2-40B4-BE49-F238E27FC236}">
+                <a16:creationId xmlns:a16="http://schemas.microsoft.com/office/drawing/2014/main" id="{0C94C1A1-69EB-E6EC-D3BA-027C6D90EB82}"/>
+              </a:ext>
+            </a:extLst>
+          </p:cNvPr>
+          <p:cNvSpPr txBox="1"/>
+          <p:nvPr/>
+        </p:nvSpPr>
+        <p:spPr>
+          <a:xfrm>
+            <a:off x="2170229" y="1745204"/>
+            <a:ext cx="5944954" cy="923330"/>
+          </a:xfrm>
+          <a:prstGeom prst="rect">
+            <a:avLst/>
+          </a:prstGeom>
+          <a:noFill/>
+        </p:spPr>
+        <p:txBody>
+          <a:bodyPr wrap="square" rtlCol="0">
+            <a:spAutoFit/>
+          </a:bodyPr>
+          <a:lstStyle/>
+          <a:p>
+            <a:pPr algn="ctr"/>
+            <a:r>
+              <a:rPr lang="en-GB" sz="5400" b="1" dirty="0">
+                <a:ln/>
+                <a:latin typeface="+mj-lt"/>
+              </a:rPr>
+              <a:t>@</a:t>
+            </a:r>
+            <a:r>
+              <a:rPr lang="en-GB" sz="5400" b="1" dirty="0" err="1">
+                <a:ln/>
+                <a:latin typeface="+mj-lt"/>
+              </a:rPr>
+              <a:t>CodeWithEbrahim</a:t>
+            </a:r>
+            <a:endParaRPr lang="en-GB" sz="5400" b="1" dirty="0">
+              <a:ln/>
+              <a:latin typeface="+mj-lt"/>
+            </a:endParaRPr>
+          </a:p>
+        </p:txBody>
+      </p:sp>
+      <p:grpSp>
+        <p:nvGrpSpPr>
+          <p:cNvPr id="25" name="Group 24">
+            <a:extLst>
+              <a:ext uri="{FF2B5EF4-FFF2-40B4-BE49-F238E27FC236}">
+                <a16:creationId xmlns:a16="http://schemas.microsoft.com/office/drawing/2014/main" id="{1D4EDCFD-B4CE-5F3E-8F52-3E9F9E32C756}"/>
+              </a:ext>
+            </a:extLst>
+          </p:cNvPr>
+          <p:cNvGrpSpPr/>
+          <p:nvPr/>
+        </p:nvGrpSpPr>
+        <p:grpSpPr>
+          <a:xfrm>
+            <a:off x="4153139" y="492745"/>
+            <a:ext cx="1979135" cy="925200"/>
+            <a:chOff x="4315976" y="15244200"/>
+            <a:chExt cx="1979135" cy="925200"/>
+          </a:xfrm>
+        </p:grpSpPr>
+        <p:pic>
+          <p:nvPicPr>
+            <p:cNvPr id="22" name="Picture 21">
+              <a:extLst>
+                <a:ext uri="{FF2B5EF4-FFF2-40B4-BE49-F238E27FC236}">
+                  <a16:creationId xmlns:a16="http://schemas.microsoft.com/office/drawing/2014/main" id="{C4E5CD8C-9467-E9B0-9A00-E872AB9F5519}"/>
+                </a:ext>
+              </a:extLst>
+            </p:cNvPr>
+            <p:cNvPicPr>
+              <a:picLocks noChangeAspect="1"/>
+            </p:cNvPicPr>
+            <p:nvPr/>
+          </p:nvPicPr>
+          <p:blipFill>
+            <a:blip r:embed="rId3"/>
+            <a:stretch>
+              <a:fillRect/>
+            </a:stretch>
+          </p:blipFill>
+          <p:spPr>
+            <a:xfrm>
+              <a:off x="5369911" y="15244200"/>
+              <a:ext cx="925200" cy="925200"/>
+            </a:xfrm>
+            <a:prstGeom prst="rect">
+              <a:avLst/>
+            </a:prstGeom>
+          </p:spPr>
+        </p:pic>
+        <p:pic>
+          <p:nvPicPr>
+            <p:cNvPr id="24" name="Picture 23">
+              <a:extLst>
+                <a:ext uri="{FF2B5EF4-FFF2-40B4-BE49-F238E27FC236}">
+                  <a16:creationId xmlns:a16="http://schemas.microsoft.com/office/drawing/2014/main" id="{3ED81F4E-8FE1-91C6-D491-DF069C1F3BC9}"/>
+                </a:ext>
+              </a:extLst>
+            </p:cNvPr>
+            <p:cNvPicPr>
+              <a:picLocks noChangeAspect="1"/>
+            </p:cNvPicPr>
+            <p:nvPr/>
+          </p:nvPicPr>
+          <p:blipFill>
+            <a:blip r:embed="rId4"/>
+            <a:stretch>
+              <a:fillRect/>
+            </a:stretch>
+          </p:blipFill>
+          <p:spPr>
+            <a:xfrm>
+              <a:off x="4315976" y="15244200"/>
+              <a:ext cx="925200" cy="925200"/>
+            </a:xfrm>
+            <a:prstGeom prst="rect">
+              <a:avLst/>
+            </a:prstGeom>
+          </p:spPr>
+        </p:pic>
+      </p:grpSp>
+      <p:pic>
+        <p:nvPicPr>
+          <p:cNvPr id="20" name="Picture 19">
+            <a:extLst>
+              <a:ext uri="{FF2B5EF4-FFF2-40B4-BE49-F238E27FC236}">
+                <a16:creationId xmlns:a16="http://schemas.microsoft.com/office/drawing/2014/main" id="{23AC5CE5-04A1-B6FD-83C8-F82209A884CA}"/>
+              </a:ext>
+            </a:extLst>
+          </p:cNvPr>
+          <p:cNvPicPr>
+            <a:picLocks noChangeAspect="1"/>
+          </p:cNvPicPr>
+          <p:nvPr/>
+        </p:nvPicPr>
+        <p:blipFill>
+          <a:blip r:embed="rId5"/>
+          <a:stretch>
+            <a:fillRect/>
+          </a:stretch>
+        </p:blipFill>
+        <p:spPr>
+          <a:xfrm>
+            <a:off x="9114594" y="10519995"/>
+            <a:ext cx="1063167" cy="1063167"/>
+          </a:xfrm>
+          <a:prstGeom prst="rect">
+            <a:avLst/>
+          </a:prstGeom>
+        </p:spPr>
+      </p:pic>
+      <p:sp>
+        <p:nvSpPr>
+          <p:cNvPr id="10" name="TextBox 9">
+            <a:extLst>
+              <a:ext uri="{FF2B5EF4-FFF2-40B4-BE49-F238E27FC236}">
+                <a16:creationId xmlns:a16="http://schemas.microsoft.com/office/drawing/2014/main" id="{06F44863-C29F-FCE4-E7E0-B9ABB8B5D9B5}"/>
+              </a:ext>
+            </a:extLst>
+          </p:cNvPr>
+          <p:cNvSpPr txBox="1"/>
+          <p:nvPr/>
+        </p:nvSpPr>
+        <p:spPr>
+          <a:xfrm>
+            <a:off x="0" y="3590249"/>
+            <a:ext cx="5141912" cy="1323439"/>
+          </a:xfrm>
+          <a:prstGeom prst="rect">
+            <a:avLst/>
+          </a:prstGeom>
+          <a:noFill/>
+        </p:spPr>
+        <p:txBody>
+          <a:bodyPr wrap="square" rtlCol="0">
+            <a:spAutoFit/>
+          </a:bodyPr>
+          <a:lstStyle/>
+          <a:p>
+            <a:r>
+              <a:rPr lang="en-DE" sz="8000" b="1" dirty="0">
+                <a:ln w="22225">
+                  <a:solidFill>
+                    <a:schemeClr val="accent2"/>
+                  </a:solidFill>
+                  <a:prstDash val="solid"/>
+                </a:ln>
+                <a:solidFill>
+                  <a:schemeClr val="accent2">
+                    <a:lumMod val="40000"/>
+                    <a:lumOff val="60000"/>
+                  </a:schemeClr>
+                </a:solidFill>
+                <a:latin typeface="Patrick Hand" pitchFamily="2" charset="77"/>
+              </a:rPr>
+              <a:t>Normal Way</a:t>
+            </a:r>
+          </a:p>
+        </p:txBody>
+      </p:sp>
+      <p:pic>
+        <p:nvPicPr>
+          <p:cNvPr id="3" name="Picture 2">
+            <a:extLst>
+              <a:ext uri="{FF2B5EF4-FFF2-40B4-BE49-F238E27FC236}">
+                <a16:creationId xmlns:a16="http://schemas.microsoft.com/office/drawing/2014/main" id="{F58FC581-0BD0-5A6A-A485-3A1B1BC64D90}"/>
+              </a:ext>
+            </a:extLst>
+          </p:cNvPr>
+          <p:cNvPicPr>
+            <a:picLocks noChangeAspect="1"/>
+          </p:cNvPicPr>
+          <p:nvPr/>
+        </p:nvPicPr>
+        <p:blipFill rotWithShape="1">
+          <a:blip r:embed="rId6"/>
+          <a:srcRect l="30671" t="35066" r="18959" b="19538"/>
+          <a:stretch>
+            <a:fillRect/>
+          </a:stretch>
+        </p:blipFill>
+        <p:spPr>
+          <a:xfrm>
+            <a:off x="5141913" y="5832762"/>
+            <a:ext cx="5151989" cy="5860474"/>
+          </a:xfrm>
+          <a:prstGeom prst="rect">
+            <a:avLst/>
+          </a:prstGeom>
+          <a:ln>
+            <a:noFill/>
+          </a:ln>
+        </p:spPr>
+      </p:pic>
+      <p:pic>
+        <p:nvPicPr>
+          <p:cNvPr id="4" name="Picture 3">
+            <a:extLst>
+              <a:ext uri="{FF2B5EF4-FFF2-40B4-BE49-F238E27FC236}">
+                <a16:creationId xmlns:a16="http://schemas.microsoft.com/office/drawing/2014/main" id="{B943DB44-0373-2D09-5ACB-BE5BD55F24B6}"/>
+              </a:ext>
+            </a:extLst>
+          </p:cNvPr>
+          <p:cNvPicPr>
+            <a:picLocks noChangeAspect="1"/>
+          </p:cNvPicPr>
+          <p:nvPr/>
+        </p:nvPicPr>
+        <p:blipFill rotWithShape="1">
+          <a:blip r:embed="rId7"/>
+          <a:srcRect l="30716" t="34385" r="19230" b="18534"/>
+          <a:stretch>
+            <a:fillRect/>
+          </a:stretch>
+        </p:blipFill>
+        <p:spPr>
+          <a:xfrm>
+            <a:off x="-1" y="5832762"/>
+            <a:ext cx="5141913" cy="5860474"/>
+          </a:xfrm>
+          <a:prstGeom prst="rect">
+            <a:avLst/>
+          </a:prstGeom>
+        </p:spPr>
+      </p:pic>
+      <p:sp>
+        <p:nvSpPr>
+          <p:cNvPr id="11" name="TextBox 10">
+            <a:extLst>
+              <a:ext uri="{FF2B5EF4-FFF2-40B4-BE49-F238E27FC236}">
+                <a16:creationId xmlns:a16="http://schemas.microsoft.com/office/drawing/2014/main" id="{43668048-DB41-672C-2A26-164430233908}"/>
+              </a:ext>
+            </a:extLst>
+          </p:cNvPr>
+          <p:cNvSpPr txBox="1"/>
+          <p:nvPr/>
+        </p:nvSpPr>
+        <p:spPr>
+          <a:xfrm>
+            <a:off x="5151990" y="3590249"/>
+            <a:ext cx="5141912" cy="1323439"/>
+          </a:xfrm>
+          <a:prstGeom prst="rect">
+            <a:avLst/>
+          </a:prstGeom>
+          <a:noFill/>
+        </p:spPr>
+        <p:txBody>
+          <a:bodyPr wrap="square" rtlCol="0">
+            <a:spAutoFit/>
+          </a:bodyPr>
+          <a:lstStyle/>
+          <a:p>
+            <a:pPr algn="r"/>
+            <a:r>
+              <a:rPr lang="en-DE" sz="8000" b="1" dirty="0">
+                <a:ln w="13462">
+                  <a:solidFill>
+                    <a:schemeClr val="bg1"/>
+                  </a:solidFill>
+                  <a:prstDash val="solid"/>
+                </a:ln>
+                <a:solidFill>
+                  <a:schemeClr val="tx1">
+                    <a:lumMod val="85000"/>
+                    <a:lumOff val="15000"/>
+                  </a:schemeClr>
+                </a:solidFill>
+                <a:effectLst>
+                  <a:outerShdw dist="38100" dir="2700000" algn="bl" rotWithShape="0">
+                    <a:schemeClr val="accent5"/>
+                  </a:outerShdw>
+                </a:effectLst>
+                <a:latin typeface="Patrick Hand" pitchFamily="2" charset="77"/>
+              </a:rPr>
+              <a:t>Pythonic Way</a:t>
+            </a:r>
+          </a:p>
+        </p:txBody>
+      </p:sp>
+      <p:sp>
+        <p:nvSpPr>
+          <p:cNvPr id="21" name="Down Arrow 20">
+            <a:extLst>
+              <a:ext uri="{FF2B5EF4-FFF2-40B4-BE49-F238E27FC236}">
+                <a16:creationId xmlns:a16="http://schemas.microsoft.com/office/drawing/2014/main" id="{A0E326E4-6752-ABE3-79D4-5CDE4020AD5E}"/>
+              </a:ext>
+            </a:extLst>
+          </p:cNvPr>
+          <p:cNvSpPr/>
+          <p:nvPr/>
+        </p:nvSpPr>
+        <p:spPr>
+          <a:xfrm>
+            <a:off x="2052340" y="4978368"/>
+            <a:ext cx="720000" cy="1323439"/>
+          </a:xfrm>
+          <a:prstGeom prst="downArrow">
+            <a:avLst/>
+          </a:prstGeom>
+          <a:solidFill>
+            <a:srgbClr val="FFFF00"/>
+          </a:solidFill>
+          <a:ln w="31750">
+            <a:solidFill>
+              <a:srgbClr val="C00000"/>
+            </a:solidFill>
+          </a:ln>
+        </p:spPr>
+        <p:style>
+          <a:lnRef idx="2">
+            <a:schemeClr val="accent1">
+              <a:shade val="15000"/>
+            </a:schemeClr>
+          </a:lnRef>
+          <a:fillRef idx="1">
+            <a:schemeClr val="accent1"/>
+          </a:fillRef>
+          <a:effectRef idx="0">
+            <a:schemeClr val="accent1"/>
+          </a:effectRef>
+          <a:fontRef idx="minor">
+            <a:schemeClr val="lt1"/>
+          </a:fontRef>
+        </p:style>
+        <p:txBody>
+          <a:bodyPr rtlCol="0" anchor="ctr"/>
+          <a:lstStyle/>
+          <a:p>
+            <a:pPr marL="0" algn="ctr" defTabSz="457200" rtl="0" eaLnBrk="1" latinLnBrk="0" hangingPunct="1"/>
+            <a:endParaRPr lang="en-DE" dirty="0">
+              <a:latin typeface="Patrick Hand" pitchFamily="2" charset="77"/>
+            </a:endParaRPr>
+          </a:p>
+        </p:txBody>
+      </p:sp>
+      <p:sp>
+        <p:nvSpPr>
+          <p:cNvPr id="27" name="Down Arrow 26">
+            <a:extLst>
+              <a:ext uri="{FF2B5EF4-FFF2-40B4-BE49-F238E27FC236}">
+                <a16:creationId xmlns:a16="http://schemas.microsoft.com/office/drawing/2014/main" id="{F383A996-922C-DA85-9D37-6CC58FCBA2FF}"/>
+              </a:ext>
+            </a:extLst>
+          </p:cNvPr>
+          <p:cNvSpPr/>
+          <p:nvPr/>
+        </p:nvSpPr>
+        <p:spPr>
+          <a:xfrm>
+            <a:off x="7513073" y="4978368"/>
+            <a:ext cx="720000" cy="1323439"/>
+          </a:xfrm>
+          <a:prstGeom prst="downArrow">
+            <a:avLst/>
+          </a:prstGeom>
+          <a:solidFill>
+            <a:srgbClr val="FFFF00"/>
+          </a:solidFill>
+          <a:ln w="31750">
+            <a:solidFill>
+              <a:srgbClr val="C00000"/>
+            </a:solidFill>
+          </a:ln>
+        </p:spPr>
+        <p:style>
+          <a:lnRef idx="2">
+            <a:schemeClr val="accent1">
+              <a:shade val="15000"/>
+            </a:schemeClr>
+          </a:lnRef>
+          <a:fillRef idx="1">
+            <a:schemeClr val="accent1"/>
+          </a:fillRef>
+          <a:effectRef idx="0">
+            <a:schemeClr val="accent1"/>
+          </a:effectRef>
+          <a:fontRef idx="minor">
+            <a:schemeClr val="lt1"/>
+          </a:fontRef>
+        </p:style>
+        <p:txBody>
+          <a:bodyPr rtlCol="0" anchor="ctr"/>
+          <a:lstStyle/>
+          <a:p>
+            <a:pPr marL="0" algn="ctr" defTabSz="457200" rtl="0" eaLnBrk="1" latinLnBrk="0" hangingPunct="1"/>
+            <a:endParaRPr lang="en-DE" dirty="0">
+              <a:latin typeface="Patrick Hand" pitchFamily="2" charset="77"/>
+            </a:endParaRPr>
+          </a:p>
+        </p:txBody>
+      </p:sp>
+      <p:sp>
+        <p:nvSpPr>
+          <p:cNvPr id="5" name="Right Arrow 4">
+            <a:extLst>
+              <a:ext uri="{FF2B5EF4-FFF2-40B4-BE49-F238E27FC236}">
+                <a16:creationId xmlns:a16="http://schemas.microsoft.com/office/drawing/2014/main" id="{B644678F-DD43-F00C-B900-A7B1E39CFE71}"/>
+              </a:ext>
+            </a:extLst>
+          </p:cNvPr>
+          <p:cNvSpPr/>
+          <p:nvPr/>
+        </p:nvSpPr>
+        <p:spPr>
+          <a:xfrm>
+            <a:off x="4350325" y="7947287"/>
+            <a:ext cx="1321200" cy="720000"/>
+          </a:xfrm>
+          <a:prstGeom prst="rightArrow">
+            <a:avLst/>
+          </a:prstGeom>
+          <a:solidFill>
+            <a:srgbClr val="FFFF00"/>
+          </a:solidFill>
+          <a:ln w="31750">
+            <a:solidFill>
+              <a:srgbClr val="C00000"/>
+            </a:solidFill>
+          </a:ln>
+        </p:spPr>
+        <p:style>
+          <a:lnRef idx="2">
+            <a:schemeClr val="accent1">
+              <a:shade val="15000"/>
+            </a:schemeClr>
+          </a:lnRef>
+          <a:fillRef idx="1">
+            <a:schemeClr val="accent1"/>
+          </a:fillRef>
+          <a:effectRef idx="0">
+            <a:schemeClr val="accent1"/>
+          </a:effectRef>
+          <a:fontRef idx="minor">
+            <a:schemeClr val="lt1"/>
+          </a:fontRef>
+        </p:style>
+        <p:txBody>
+          <a:bodyPr rtlCol="0" anchor="ctr"/>
+          <a:lstStyle/>
+          <a:p>
+            <a:pPr marL="0" algn="ctr" defTabSz="457200" rtl="0" eaLnBrk="1" latinLnBrk="0" hangingPunct="1"/>
+            <a:endParaRPr lang="en-DE" dirty="0">
+              <a:latin typeface="Patrick Hand" pitchFamily="2" charset="77"/>
+            </a:endParaRPr>
+          </a:p>
+        </p:txBody>
+      </p:sp>
+    </p:spTree>
+    <p:extLst>
+      <p:ext uri="{BB962C8B-B14F-4D97-AF65-F5344CB8AC3E}">
+        <p14:creationId xmlns:p14="http://schemas.microsoft.com/office/powerpoint/2010/main" val="128280910"/>
+      </p:ext>
+    </p:extLst>
+  </p:cSld>
+  <p:clrMapOvr>
+    <a:masterClrMapping/>
+  </p:clrMapOvr>
+</p:sld>
+</file>
+
+<file path=ppt/slides/slide9.xml><?xml version="1.0" encoding="utf-8"?>
+<p:sld xmlns:a="http://schemas.openxmlformats.org/drawingml/2006/main" xmlns:r="http://schemas.openxmlformats.org/officeDocument/2006/relationships" xmlns:p="http://schemas.openxmlformats.org/presentationml/2006/main">
+  <p:cSld>
+    <p:spTree>
+      <p:nvGrpSpPr>
+        <p:cNvPr id="1" name=""/>
+        <p:cNvGrpSpPr/>
+        <p:nvPr/>
+      </p:nvGrpSpPr>
+      <p:grpSpPr>
+        <a:xfrm>
+          <a:off x="0" y="0"/>
+          <a:ext cx="0" cy="0"/>
+          <a:chOff x="0" y="0"/>
+          <a:chExt cx="0" cy="0"/>
+        </a:xfrm>
+      </p:grpSpPr>
+    </p:spTree>
+    <p:extLst>
+      <p:ext uri="{BB962C8B-B14F-4D97-AF65-F5344CB8AC3E}">
+        <p14:creationId xmlns:p14="http://schemas.microsoft.com/office/powerpoint/2010/main" val="1230972794"/>
       </p:ext>
     </p:extLst>
   </p:cSld>

</xml_diff>

<commit_message>
feat: refactored the structure of project+added two videos
</commit_message>
<xml_diff>
--- a/assets/get-ready.pptx
+++ b/assets/get-ready.pptx
@@ -5,18 +5,17 @@
     <p:sldMasterId id="2147483732" r:id="rId1"/>
   </p:sldMasterIdLst>
   <p:notesMasterIdLst>
-    <p:notesMasterId r:id="rId11"/>
+    <p:notesMasterId r:id="rId10"/>
   </p:notesMasterIdLst>
   <p:sldIdLst>
     <p:sldId id="263" r:id="rId2"/>
-    <p:sldId id="269" r:id="rId3"/>
-    <p:sldId id="270" r:id="rId4"/>
-    <p:sldId id="271" r:id="rId5"/>
-    <p:sldId id="266" r:id="rId6"/>
-    <p:sldId id="267" r:id="rId7"/>
-    <p:sldId id="264" r:id="rId8"/>
-    <p:sldId id="274" r:id="rId9"/>
-    <p:sldId id="273" r:id="rId10"/>
+    <p:sldId id="271" r:id="rId3"/>
+    <p:sldId id="266" r:id="rId4"/>
+    <p:sldId id="267" r:id="rId5"/>
+    <p:sldId id="264" r:id="rId6"/>
+    <p:sldId id="274" r:id="rId7"/>
+    <p:sldId id="275" r:id="rId8"/>
+    <p:sldId id="273" r:id="rId9"/>
   </p:sldIdLst>
   <p:sldSz cx="10285413" cy="18288000"/>
   <p:notesSz cx="6858000" cy="9144000"/>
@@ -123,7 +122,7 @@
             <a:srgbClr val="A4A3A4"/>
           </p15:clr>
         </p15:guide>
-        <p15:guide id="2" pos="3239" userDrawn="1">
+        <p15:guide id="2" pos="3240" userDrawn="1">
           <p15:clr>
             <a:srgbClr val="A4A3A4"/>
           </p15:clr>
@@ -140,24 +139,54 @@
 </p188:authorLst>
 </file>
 
-<file path=ppt/comments/modernComment_108_91EF180C.xml><?xml version="1.0" encoding="utf-8"?>
+<file path=ppt/comments/modernComment_111_495F277A.xml><?xml version="1.0" encoding="utf-8"?>
 <p188:cmLst xmlns:a="http://schemas.openxmlformats.org/drawingml/2006/main" xmlns:r="http://schemas.openxmlformats.org/officeDocument/2006/relationships" xmlns:p188="http://schemas.microsoft.com/office/powerpoint/2018/8/main">
-  <p188:cm id="{6AD75071-EA32-894B-B2B6-3BC5D06D2C1C}" authorId="{8860045D-B334-310D-0A4E-9E20AA0B149E}" created="2025-12-30T17:22:03.982">
+  <p188:cm id="{D9AA41E5-7F1A-814B-A122-E04A052682B1}" authorId="{8860045D-B334-310D-0A4E-9E20AA0B149E}" created="2025-12-31T15:40:41.497">
     <pc:sldMkLst xmlns:pc="http://schemas.microsoft.com/office/powerpoint/2013/main/command">
       <pc:docMk/>
-      <pc:sldMk cId="2448365580" sldId="264"/>
+      <pc:sldMk cId="1230972794" sldId="273"/>
     </pc:sldMkLst>
+    <p188:replyLst>
+      <p188:reply id="{C9715592-8908-484F-890E-9064472D8F44}" authorId="{8860045D-B334-310D-0A4E-9E20AA0B149E}" created="2025-12-31T15:41:01.364">
+        <p188:txBody>
+          <a:bodyPr/>
+          <a:lstStyle/>
+          <a:p>
+            <a:r>
+              <a:rPr lang="en-DE"/>
+              <a:t>TikTok
+Caption:
+2026 is the year of Clean Code! 🐍✨
+Stop repeating yourself and start using the Walrus Operator :=. It’s faster, shorter, and much more professional. 🚀
+Which Python feature do you want to master this year? Let me know below! 👇
+#CodeWithEbrahim #PythonTips #TechTok #Coding2026 #Programmer #LearnPython #SoftwareDev
+</a:t>
+            </a:r>
+          </a:p>
+        </p188:txBody>
+      </p188:reply>
+    </p188:replyLst>
     <p188:txBody>
       <a:bodyPr/>
       <a:lstStyle/>
       <a:p>
         <a:r>
           <a:rPr lang="en-DE"/>
-          <a:t>TikTok
-Are you still using loops for this? 🤦‍♂️ Learn the senior-level trick for sequence slicing in Python! 🐍✨
-🚀 Pythonic Way = Cleaner + Faster.
-Tag a dev who needs to see this! 👇
-#Python #Coding #Programmer #SoftwareDeveloper #TechTips #CodeWithEbrahim #LearnPython</a:t>
+          <a:t>YouTube Shorts
+Title Options:
+Level Up Your Python in 2026! 🐍🦭
+The Only Python Operator You Need This Year!
+Master the Walrus Operator in 60 Seconds 🔥
+Python Tips 2026: Write Faster, Cleaner Code
+Description:
+Happy 2026! 🚀 Let's start the year by mastering one of Python's most powerful tools: The Walrus Operator (:=).
+In this video, we see why Senior Developers prefer "Assignment Expressions" over traditional variable assignments.
+💡 Why use Walrus?
+Reduces code repetition.
+Assignments happen inside the expression.
+Makes your if and while loops incredibly clean.
+✅ Follow @CodeWithEbrahim for a year full of coding excellence!
+#Python2026 #WalrusOperator #CleanCode #ProgrammingTips #SoftwareEngineer #CodingLife #PythonTutorial</a:t>
         </a:r>
       </a:p>
     </p188:txBody>
@@ -654,7 +683,7 @@
           <a:p>
             <a:fld id="{B46D1A58-C582-AC49-9010-037E894CD422}" type="slidenum">
               <a:rPr lang="en-DE" smtClean="0"/>
-              <a:t>5</a:t>
+              <a:t>3</a:t>
             </a:fld>
             <a:endParaRPr lang="en-DE"/>
           </a:p>
@@ -775,7 +804,7 @@
           <a:p>
             <a:fld id="{B46D1A58-C582-AC49-9010-037E894CD422}" type="slidenum">
               <a:rPr lang="en-DE" smtClean="0"/>
-              <a:t>6</a:t>
+              <a:t>4</a:t>
             </a:fld>
             <a:endParaRPr lang="en-DE"/>
           </a:p>
@@ -856,10 +885,9 @@
               <a:t>R</a:t>
             </a:r>
             <a:r>
-              <a:rPr lang="en-DE"/>
+              <a:rPr lang="en-DE" dirty="0"/>
               <a:t>elated files: </a:t>
             </a:r>
-            <a:endParaRPr lang="en-DE" dirty="0"/>
           </a:p>
         </p:txBody>
       </p:sp>
@@ -880,7 +908,7 @@
           <a:p>
             <a:fld id="{B46D1A58-C582-AC49-9010-037E894CD422}" type="slidenum">
               <a:rPr lang="en-DE" smtClean="0"/>
-              <a:t>7</a:t>
+              <a:t>5</a:t>
             </a:fld>
             <a:endParaRPr lang="en-DE"/>
           </a:p>
@@ -890,6 +918,192 @@
     <p:extLst>
       <p:ext uri="{BB962C8B-B14F-4D97-AF65-F5344CB8AC3E}">
         <p14:creationId xmlns:p14="http://schemas.microsoft.com/office/powerpoint/2010/main" val="1485623404"/>
+      </p:ext>
+    </p:extLst>
+  </p:cSld>
+  <p:clrMapOvr>
+    <a:masterClrMapping/>
+  </p:clrMapOvr>
+</p:notes>
+</file>
+
+<file path=ppt/notesSlides/notesSlide4.xml><?xml version="1.0" encoding="utf-8"?>
+<p:notes xmlns:a="http://schemas.openxmlformats.org/drawingml/2006/main" xmlns:r="http://schemas.openxmlformats.org/officeDocument/2006/relationships" xmlns:p="http://schemas.openxmlformats.org/presentationml/2006/main">
+  <p:cSld>
+    <p:spTree>
+      <p:nvGrpSpPr>
+        <p:cNvPr id="1" name=""/>
+        <p:cNvGrpSpPr/>
+        <p:nvPr/>
+      </p:nvGrpSpPr>
+      <p:grpSpPr>
+        <a:xfrm>
+          <a:off x="0" y="0"/>
+          <a:ext cx="0" cy="0"/>
+          <a:chOff x="0" y="0"/>
+          <a:chExt cx="0" cy="0"/>
+        </a:xfrm>
+      </p:grpSpPr>
+      <p:sp>
+        <p:nvSpPr>
+          <p:cNvPr id="2" name="Slide Image Placeholder 1"/>
+          <p:cNvSpPr>
+            <a:spLocks noGrp="1" noRot="1" noChangeAspect="1"/>
+          </p:cNvSpPr>
+          <p:nvPr>
+            <p:ph type="sldImg"/>
+          </p:nvPr>
+        </p:nvSpPr>
+        <p:spPr/>
+      </p:sp>
+      <p:sp>
+        <p:nvSpPr>
+          <p:cNvPr id="3" name="Notes Placeholder 2"/>
+          <p:cNvSpPr>
+            <a:spLocks noGrp="1"/>
+          </p:cNvSpPr>
+          <p:nvPr>
+            <p:ph type="body" idx="1"/>
+          </p:nvPr>
+        </p:nvSpPr>
+        <p:spPr/>
+        <p:txBody>
+          <a:bodyPr/>
+          <a:lstStyle/>
+          <a:p>
+            <a:r>
+              <a:rPr lang="en-DE" dirty="0"/>
+              <a:t>Video 5</a:t>
+            </a:r>
+          </a:p>
+          <a:p>
+            <a:r>
+              <a:rPr lang="en-DE" dirty="0"/>
+              <a:t>Title: Swap Variables</a:t>
+            </a:r>
+          </a:p>
+        </p:txBody>
+      </p:sp>
+      <p:sp>
+        <p:nvSpPr>
+          <p:cNvPr id="4" name="Slide Number Placeholder 3"/>
+          <p:cNvSpPr>
+            <a:spLocks noGrp="1"/>
+          </p:cNvSpPr>
+          <p:nvPr>
+            <p:ph type="sldNum" sz="quarter" idx="5"/>
+          </p:nvPr>
+        </p:nvSpPr>
+        <p:spPr/>
+        <p:txBody>
+          <a:bodyPr/>
+          <a:lstStyle/>
+          <a:p>
+            <a:fld id="{B46D1A58-C582-AC49-9010-037E894CD422}" type="slidenum">
+              <a:rPr lang="en-DE" smtClean="0"/>
+              <a:t>6</a:t>
+            </a:fld>
+            <a:endParaRPr lang="en-DE"/>
+          </a:p>
+        </p:txBody>
+      </p:sp>
+    </p:spTree>
+    <p:extLst>
+      <p:ext uri="{BB962C8B-B14F-4D97-AF65-F5344CB8AC3E}">
+        <p14:creationId xmlns:p14="http://schemas.microsoft.com/office/powerpoint/2010/main" val="576375281"/>
+      </p:ext>
+    </p:extLst>
+  </p:cSld>
+  <p:clrMapOvr>
+    <a:masterClrMapping/>
+  </p:clrMapOvr>
+</p:notes>
+</file>
+
+<file path=ppt/notesSlides/notesSlide5.xml><?xml version="1.0" encoding="utf-8"?>
+<p:notes xmlns:a="http://schemas.openxmlformats.org/drawingml/2006/main" xmlns:r="http://schemas.openxmlformats.org/officeDocument/2006/relationships" xmlns:p="http://schemas.openxmlformats.org/presentationml/2006/main">
+  <p:cSld>
+    <p:spTree>
+      <p:nvGrpSpPr>
+        <p:cNvPr id="1" name=""/>
+        <p:cNvGrpSpPr/>
+        <p:nvPr/>
+      </p:nvGrpSpPr>
+      <p:grpSpPr>
+        <a:xfrm>
+          <a:off x="0" y="0"/>
+          <a:ext cx="0" cy="0"/>
+          <a:chOff x="0" y="0"/>
+          <a:chExt cx="0" cy="0"/>
+        </a:xfrm>
+      </p:grpSpPr>
+      <p:sp>
+        <p:nvSpPr>
+          <p:cNvPr id="2" name="Slide Image Placeholder 1"/>
+          <p:cNvSpPr>
+            <a:spLocks noGrp="1" noRot="1" noChangeAspect="1"/>
+          </p:cNvSpPr>
+          <p:nvPr>
+            <p:ph type="sldImg"/>
+          </p:nvPr>
+        </p:nvSpPr>
+        <p:spPr/>
+      </p:sp>
+      <p:sp>
+        <p:nvSpPr>
+          <p:cNvPr id="3" name="Notes Placeholder 2"/>
+          <p:cNvSpPr>
+            <a:spLocks noGrp="1"/>
+          </p:cNvSpPr>
+          <p:nvPr>
+            <p:ph type="body" idx="1"/>
+          </p:nvPr>
+        </p:nvSpPr>
+        <p:spPr/>
+        <p:txBody>
+          <a:bodyPr/>
+          <a:lstStyle/>
+          <a:p>
+            <a:r>
+              <a:rPr lang="en-DE" dirty="0"/>
+              <a:t>Video 6</a:t>
+            </a:r>
+          </a:p>
+          <a:p>
+            <a:r>
+              <a:rPr lang="en-DE" dirty="0"/>
+              <a:t>Title: enumerate</a:t>
+            </a:r>
+          </a:p>
+        </p:txBody>
+      </p:sp>
+      <p:sp>
+        <p:nvSpPr>
+          <p:cNvPr id="4" name="Slide Number Placeholder 3"/>
+          <p:cNvSpPr>
+            <a:spLocks noGrp="1"/>
+          </p:cNvSpPr>
+          <p:nvPr>
+            <p:ph type="sldNum" sz="quarter" idx="5"/>
+          </p:nvPr>
+        </p:nvSpPr>
+        <p:spPr/>
+        <p:txBody>
+          <a:bodyPr/>
+          <a:lstStyle/>
+          <a:p>
+            <a:fld id="{B46D1A58-C582-AC49-9010-037E894CD422}" type="slidenum">
+              <a:rPr lang="en-DE" smtClean="0"/>
+              <a:t>7</a:t>
+            </a:fld>
+            <a:endParaRPr lang="en-DE"/>
+          </a:p>
+        </p:txBody>
+      </p:sp>
+    </p:spTree>
+    <p:extLst>
+      <p:ext uri="{BB962C8B-B14F-4D97-AF65-F5344CB8AC3E}">
+        <p14:creationId xmlns:p14="http://schemas.microsoft.com/office/powerpoint/2010/main" val="4123593181"/>
       </p:ext>
     </p:extLst>
   </p:cSld>
@@ -3953,78 +4167,6 @@
         <p:cNvPr id="1" name="">
           <a:extLst>
             <a:ext uri="{FF2B5EF4-FFF2-40B4-BE49-F238E27FC236}">
-              <a16:creationId xmlns:a16="http://schemas.microsoft.com/office/drawing/2014/main" id="{85AC05BC-0533-796C-D3DC-9ED8DA97B788}"/>
-            </a:ext>
-          </a:extLst>
-        </p:cNvPr>
-        <p:cNvGrpSpPr/>
-        <p:nvPr/>
-      </p:nvGrpSpPr>
-      <p:grpSpPr>
-        <a:xfrm>
-          <a:off x="0" y="0"/>
-          <a:ext cx="0" cy="0"/>
-          <a:chOff x="0" y="0"/>
-          <a:chExt cx="0" cy="0"/>
-        </a:xfrm>
-      </p:grpSpPr>
-    </p:spTree>
-    <p:extLst>
-      <p:ext uri="{BB962C8B-B14F-4D97-AF65-F5344CB8AC3E}">
-        <p14:creationId xmlns:p14="http://schemas.microsoft.com/office/powerpoint/2010/main" val="1621981674"/>
-      </p:ext>
-    </p:extLst>
-  </p:cSld>
-  <p:clrMapOvr>
-    <a:masterClrMapping/>
-  </p:clrMapOvr>
-</p:sld>
-</file>
-
-<file path=ppt/slides/slide3.xml><?xml version="1.0" encoding="utf-8"?>
-<p:sld xmlns:a="http://schemas.openxmlformats.org/drawingml/2006/main" xmlns:r="http://schemas.openxmlformats.org/officeDocument/2006/relationships" xmlns:p="http://schemas.openxmlformats.org/presentationml/2006/main">
-  <p:cSld>
-    <p:spTree>
-      <p:nvGrpSpPr>
-        <p:cNvPr id="1" name="">
-          <a:extLst>
-            <a:ext uri="{FF2B5EF4-FFF2-40B4-BE49-F238E27FC236}">
-              <a16:creationId xmlns:a16="http://schemas.microsoft.com/office/drawing/2014/main" id="{16038E8A-F345-474F-746A-8BFA648CB9D7}"/>
-            </a:ext>
-          </a:extLst>
-        </p:cNvPr>
-        <p:cNvGrpSpPr/>
-        <p:nvPr/>
-      </p:nvGrpSpPr>
-      <p:grpSpPr>
-        <a:xfrm>
-          <a:off x="0" y="0"/>
-          <a:ext cx="0" cy="0"/>
-          <a:chOff x="0" y="0"/>
-          <a:chExt cx="0" cy="0"/>
-        </a:xfrm>
-      </p:grpSpPr>
-    </p:spTree>
-    <p:extLst>
-      <p:ext uri="{BB962C8B-B14F-4D97-AF65-F5344CB8AC3E}">
-        <p14:creationId xmlns:p14="http://schemas.microsoft.com/office/powerpoint/2010/main" val="3301705831"/>
-      </p:ext>
-    </p:extLst>
-  </p:cSld>
-  <p:clrMapOvr>
-    <a:masterClrMapping/>
-  </p:clrMapOvr>
-</p:sld>
-</file>
-
-<file path=ppt/slides/slide4.xml><?xml version="1.0" encoding="utf-8"?>
-<p:sld xmlns:a="http://schemas.openxmlformats.org/drawingml/2006/main" xmlns:r="http://schemas.openxmlformats.org/officeDocument/2006/relationships" xmlns:p="http://schemas.openxmlformats.org/presentationml/2006/main">
-  <p:cSld>
-    <p:spTree>
-      <p:nvGrpSpPr>
-        <p:cNvPr id="1" name="">
-          <a:extLst>
-            <a:ext uri="{FF2B5EF4-FFF2-40B4-BE49-F238E27FC236}">
               <a16:creationId xmlns:a16="http://schemas.microsoft.com/office/drawing/2014/main" id="{2BE011F1-40B2-354A-AEA3-0367EC08A885}"/>
             </a:ext>
           </a:extLst>
@@ -4040,6 +4182,131 @@
           <a:chExt cx="0" cy="0"/>
         </a:xfrm>
       </p:grpSpPr>
+      <p:sp>
+        <p:nvSpPr>
+          <p:cNvPr id="3" name="Rectangle 2">
+            <a:extLst>
+              <a:ext uri="{FF2B5EF4-FFF2-40B4-BE49-F238E27FC236}">
+                <a16:creationId xmlns:a16="http://schemas.microsoft.com/office/drawing/2014/main" id="{00A99E81-3FE3-5F86-D43D-9940369508F5}"/>
+              </a:ext>
+            </a:extLst>
+          </p:cNvPr>
+          <p:cNvSpPr/>
+          <p:nvPr/>
+        </p:nvSpPr>
+        <p:spPr>
+          <a:xfrm>
+            <a:off x="2739710" y="8682335"/>
+            <a:ext cx="4805996" cy="1754326"/>
+          </a:xfrm>
+          <a:prstGeom prst="rect">
+            <a:avLst/>
+          </a:prstGeom>
+          <a:noFill/>
+        </p:spPr>
+        <p:txBody>
+          <a:bodyPr wrap="none" lIns="91440" tIns="45720" rIns="91440" bIns="45720">
+            <a:spAutoFit/>
+          </a:bodyPr>
+          <a:lstStyle/>
+          <a:p>
+            <a:pPr algn="ctr"/>
+            <a:r>
+              <a:rPr lang="en-US" sz="5400" b="1" cap="none" spc="0" dirty="0">
+                <a:ln w="12700">
+                  <a:solidFill>
+                    <a:schemeClr val="accent3">
+                      <a:lumMod val="50000"/>
+                    </a:schemeClr>
+                  </a:solidFill>
+                  <a:prstDash val="solid"/>
+                </a:ln>
+                <a:pattFill prst="narHorz">
+                  <a:fgClr>
+                    <a:schemeClr val="accent3"/>
+                  </a:fgClr>
+                  <a:bgClr>
+                    <a:schemeClr val="accent3">
+                      <a:lumMod val="40000"/>
+                      <a:lumOff val="60000"/>
+                    </a:schemeClr>
+                  </a:bgClr>
+                </a:pattFill>
+                <a:effectLst>
+                  <a:innerShdw blurRad="177800">
+                    <a:schemeClr val="accent3">
+                      <a:lumMod val="50000"/>
+                    </a:schemeClr>
+                  </a:innerShdw>
+                </a:effectLst>
+              </a:rPr>
+              <a:t>Video 1 </a:t>
+            </a:r>
+          </a:p>
+          <a:p>
+            <a:pPr algn="ctr"/>
+            <a:r>
+              <a:rPr lang="en-US" sz="5400" b="1" cap="none" spc="0" dirty="0">
+                <a:ln w="12700">
+                  <a:solidFill>
+                    <a:schemeClr val="accent3">
+                      <a:lumMod val="50000"/>
+                    </a:schemeClr>
+                  </a:solidFill>
+                  <a:prstDash val="solid"/>
+                </a:ln>
+                <a:pattFill prst="narHorz">
+                  <a:fgClr>
+                    <a:schemeClr val="accent3"/>
+                  </a:fgClr>
+                  <a:bgClr>
+                    <a:schemeClr val="accent3">
+                      <a:lumMod val="40000"/>
+                      <a:lumOff val="60000"/>
+                    </a:schemeClr>
+                  </a:bgClr>
+                </a:pattFill>
+                <a:effectLst>
+                  <a:innerShdw blurRad="177800">
+                    <a:schemeClr val="accent3">
+                      <a:lumMod val="50000"/>
+                    </a:schemeClr>
+                  </a:innerShdw>
+                </a:effectLst>
+              </a:rPr>
+              <a:t>Print arguments</a:t>
+            </a:r>
+            <a:endParaRPr lang="en-DE" sz="5400" b="1" cap="none" spc="0" dirty="0">
+              <a:ln w="12700">
+                <a:solidFill>
+                  <a:schemeClr val="accent3">
+                    <a:lumMod val="50000"/>
+                  </a:schemeClr>
+                </a:solidFill>
+                <a:prstDash val="solid"/>
+              </a:ln>
+              <a:pattFill prst="narHorz">
+                <a:fgClr>
+                  <a:schemeClr val="accent3"/>
+                </a:fgClr>
+                <a:bgClr>
+                  <a:schemeClr val="accent3">
+                    <a:lumMod val="40000"/>
+                    <a:lumOff val="60000"/>
+                  </a:schemeClr>
+                </a:bgClr>
+              </a:pattFill>
+              <a:effectLst>
+                <a:innerShdw blurRad="177800">
+                  <a:schemeClr val="accent3">
+                    <a:lumMod val="50000"/>
+                  </a:schemeClr>
+                </a:innerShdw>
+              </a:effectLst>
+            </a:endParaRPr>
+          </a:p>
+        </p:txBody>
+      </p:sp>
     </p:spTree>
     <p:extLst>
       <p:ext uri="{BB962C8B-B14F-4D97-AF65-F5344CB8AC3E}">
@@ -4053,7 +4320,7 @@
 </p:sld>
 </file>
 
-<file path=ppt/slides/slide5.xml><?xml version="1.0" encoding="utf-8"?>
+<file path=ppt/slides/slide3.xml><?xml version="1.0" encoding="utf-8"?>
 <p:sld xmlns:a="http://schemas.openxmlformats.org/drawingml/2006/main" xmlns:r="http://schemas.openxmlformats.org/officeDocument/2006/relationships" xmlns:p="http://schemas.openxmlformats.org/presentationml/2006/main">
   <p:cSld>
     <p:bg>
@@ -4593,7 +4860,7 @@
 </p:sld>
 </file>
 
-<file path=ppt/slides/slide6.xml><?xml version="1.0" encoding="utf-8"?>
+<file path=ppt/slides/slide4.xml><?xml version="1.0" encoding="utf-8"?>
 <p:sld xmlns:a="http://schemas.openxmlformats.org/drawingml/2006/main" xmlns:r="http://schemas.openxmlformats.org/officeDocument/2006/relationships" xmlns:p="http://schemas.openxmlformats.org/presentationml/2006/main">
   <p:cSld>
     <p:bg>
@@ -5217,13 +5484,13 @@
 </p:sld>
 </file>
 
-<file path=ppt/slides/slide7.xml><?xml version="1.0" encoding="utf-8"?>
+<file path=ppt/slides/slide5.xml><?xml version="1.0" encoding="utf-8"?>
 <p:sld xmlns:a="http://schemas.openxmlformats.org/drawingml/2006/main" xmlns:r="http://schemas.openxmlformats.org/officeDocument/2006/relationships" xmlns:p="http://schemas.openxmlformats.org/presentationml/2006/main">
   <p:cSld>
     <p:bg>
       <p:bgPr>
         <a:blipFill>
-          <a:blip r:embed="rId4"/>
+          <a:blip r:embed="rId3"/>
           <a:tile tx="0" ty="0" sx="100000" sy="100000" flip="none" algn="tl"/>
         </a:blipFill>
         <a:effectLst/>
@@ -5264,7 +5531,7 @@
           <p:nvPr/>
         </p:nvPicPr>
         <p:blipFill rotWithShape="1">
-          <a:blip r:embed="rId5"/>
+          <a:blip r:embed="rId4"/>
           <a:srcRect l="17427" t="28769" r="11619" b="14751"/>
           <a:stretch>
             <a:fillRect/>
@@ -5295,7 +5562,7 @@
           <p:nvPr/>
         </p:nvPicPr>
         <p:blipFill rotWithShape="1">
-          <a:blip r:embed="rId6"/>
+          <a:blip r:embed="rId5"/>
           <a:srcRect l="16551" t="33107" r="11373" b="19724"/>
           <a:stretch>
             <a:fillRect/>
@@ -5396,7 +5663,7 @@
             <p:nvPr/>
           </p:nvPicPr>
           <p:blipFill>
-            <a:blip r:embed="rId7"/>
+            <a:blip r:embed="rId6"/>
             <a:stretch>
               <a:fillRect/>
             </a:stretch>
@@ -5426,7 +5693,7 @@
             <p:nvPr/>
           </p:nvPicPr>
           <p:blipFill>
-            <a:blip r:embed="rId8"/>
+            <a:blip r:embed="rId7"/>
             <a:stretch>
               <a:fillRect/>
             </a:stretch>
@@ -5619,7 +5886,7 @@
           <p:nvPr/>
         </p:nvPicPr>
         <p:blipFill>
-          <a:blip r:embed="rId9"/>
+          <a:blip r:embed="rId8"/>
           <a:stretch>
             <a:fillRect/>
           </a:stretch>
@@ -5649,7 +5916,7 @@
           <p:nvPr/>
         </p:nvPicPr>
         <p:blipFill>
-          <a:blip r:embed="rId9"/>
+          <a:blip r:embed="rId8"/>
           <a:stretch>
             <a:fillRect/>
           </a:stretch>
@@ -5674,21 +5941,16 @@
   <p:clrMapOvr>
     <a:masterClrMapping/>
   </p:clrMapOvr>
-  <p:extLst>
-    <p:ext uri="{6950BFC3-D8DA-4A85-94F7-54DA5524770B}">
-      <p188:commentRel xmlns:p188="http://schemas.microsoft.com/office/powerpoint/2018/8/main" r:id="rId3"/>
-    </p:ext>
-  </p:extLst>
 </p:sld>
 </file>
 
-<file path=ppt/slides/slide8.xml><?xml version="1.0" encoding="utf-8"?>
+<file path=ppt/slides/slide6.xml><?xml version="1.0" encoding="utf-8"?>
 <p:sld xmlns:a="http://schemas.openxmlformats.org/drawingml/2006/main" xmlns:r="http://schemas.openxmlformats.org/officeDocument/2006/relationships" xmlns:p="http://schemas.openxmlformats.org/presentationml/2006/main">
   <p:cSld>
     <p:bg>
       <p:bgPr>
         <a:blipFill>
-          <a:blip r:embed="rId2"/>
+          <a:blip r:embed="rId3"/>
           <a:tile tx="0" ty="0" sx="100000" sy="100000" flip="none" algn="tl"/>
         </a:blipFill>
         <a:effectLst/>
@@ -5799,7 +6061,7 @@
             <p:nvPr/>
           </p:nvPicPr>
           <p:blipFill>
-            <a:blip r:embed="rId3"/>
+            <a:blip r:embed="rId4"/>
             <a:stretch>
               <a:fillRect/>
             </a:stretch>
@@ -5829,7 +6091,7 @@
             <p:nvPr/>
           </p:nvPicPr>
           <p:blipFill>
-            <a:blip r:embed="rId4"/>
+            <a:blip r:embed="rId5"/>
             <a:stretch>
               <a:fillRect/>
             </a:stretch>
@@ -5860,7 +6122,7 @@
           <p:nvPr/>
         </p:nvPicPr>
         <p:blipFill>
-          <a:blip r:embed="rId5"/>
+          <a:blip r:embed="rId6"/>
           <a:stretch>
             <a:fillRect/>
           </a:stretch>
@@ -5939,7 +6201,7 @@
           <p:nvPr/>
         </p:nvPicPr>
         <p:blipFill rotWithShape="1">
-          <a:blip r:embed="rId6"/>
+          <a:blip r:embed="rId7"/>
           <a:srcRect l="30671" t="35066" r="18959" b="19538"/>
           <a:stretch>
             <a:fillRect/>
@@ -5973,7 +6235,7 @@
           <p:nvPr/>
         </p:nvPicPr>
         <p:blipFill rotWithShape="1">
-          <a:blip r:embed="rId7"/>
+          <a:blip r:embed="rId8"/>
           <a:srcRect l="30716" t="34385" r="19230" b="18534"/>
           <a:stretch>
             <a:fillRect/>
@@ -6225,9 +6487,530 @@
 </p:sld>
 </file>
 
-<file path=ppt/slides/slide9.xml><?xml version="1.0" encoding="utf-8"?>
+<file path=ppt/slides/slide7.xml><?xml version="1.0" encoding="utf-8"?>
 <p:sld xmlns:a="http://schemas.openxmlformats.org/drawingml/2006/main" xmlns:r="http://schemas.openxmlformats.org/officeDocument/2006/relationships" xmlns:p="http://schemas.openxmlformats.org/presentationml/2006/main">
   <p:cSld>
+    <p:bg>
+      <p:bgPr>
+        <a:pattFill prst="lgGrid">
+          <a:fgClr>
+            <a:schemeClr val="bg1"/>
+          </a:fgClr>
+          <a:bgClr>
+            <a:schemeClr val="bg2"/>
+          </a:bgClr>
+        </a:pattFill>
+        <a:effectLst/>
+      </p:bgPr>
+    </p:bg>
+    <p:spTree>
+      <p:nvGrpSpPr>
+        <p:cNvPr id="1" name="">
+          <a:extLst>
+            <a:ext uri="{FF2B5EF4-FFF2-40B4-BE49-F238E27FC236}">
+              <a16:creationId xmlns:a16="http://schemas.microsoft.com/office/drawing/2014/main" id="{2B73ACF6-9F08-4584-E579-88E998157749}"/>
+            </a:ext>
+          </a:extLst>
+        </p:cNvPr>
+        <p:cNvGrpSpPr/>
+        <p:nvPr/>
+      </p:nvGrpSpPr>
+      <p:grpSpPr>
+        <a:xfrm>
+          <a:off x="0" y="0"/>
+          <a:ext cx="0" cy="0"/>
+          <a:chOff x="0" y="0"/>
+          <a:chExt cx="0" cy="0"/>
+        </a:xfrm>
+      </p:grpSpPr>
+      <p:sp>
+        <p:nvSpPr>
+          <p:cNvPr id="14" name="TextBox 13">
+            <a:extLst>
+              <a:ext uri="{FF2B5EF4-FFF2-40B4-BE49-F238E27FC236}">
+                <a16:creationId xmlns:a16="http://schemas.microsoft.com/office/drawing/2014/main" id="{3AF0F1A9-05DC-137D-4BCF-5553C2CAA58B}"/>
+              </a:ext>
+            </a:extLst>
+          </p:cNvPr>
+          <p:cNvSpPr txBox="1"/>
+          <p:nvPr/>
+        </p:nvSpPr>
+        <p:spPr>
+          <a:xfrm>
+            <a:off x="2170229" y="1745204"/>
+            <a:ext cx="5944954" cy="923330"/>
+          </a:xfrm>
+          <a:prstGeom prst="rect">
+            <a:avLst/>
+          </a:prstGeom>
+          <a:noFill/>
+        </p:spPr>
+        <p:txBody>
+          <a:bodyPr wrap="square" rtlCol="0">
+            <a:spAutoFit/>
+          </a:bodyPr>
+          <a:lstStyle/>
+          <a:p>
+            <a:pPr algn="ctr"/>
+            <a:r>
+              <a:rPr lang="en-GB" sz="5400" b="1" dirty="0">
+                <a:ln/>
+                <a:latin typeface="+mj-lt"/>
+              </a:rPr>
+              <a:t>@</a:t>
+            </a:r>
+            <a:r>
+              <a:rPr lang="en-GB" sz="5400" b="1" dirty="0" err="1">
+                <a:ln/>
+                <a:latin typeface="+mj-lt"/>
+              </a:rPr>
+              <a:t>CodeWithEbrahim</a:t>
+            </a:r>
+            <a:endParaRPr lang="en-GB" sz="5400" b="1" dirty="0">
+              <a:ln/>
+              <a:latin typeface="+mj-lt"/>
+            </a:endParaRPr>
+          </a:p>
+        </p:txBody>
+      </p:sp>
+      <p:grpSp>
+        <p:nvGrpSpPr>
+          <p:cNvPr id="25" name="Group 24">
+            <a:extLst>
+              <a:ext uri="{FF2B5EF4-FFF2-40B4-BE49-F238E27FC236}">
+                <a16:creationId xmlns:a16="http://schemas.microsoft.com/office/drawing/2014/main" id="{8B36CFE6-A506-32C2-D82C-D9CFA49A35B8}"/>
+              </a:ext>
+            </a:extLst>
+          </p:cNvPr>
+          <p:cNvGrpSpPr/>
+          <p:nvPr/>
+        </p:nvGrpSpPr>
+        <p:grpSpPr>
+          <a:xfrm>
+            <a:off x="4153139" y="492745"/>
+            <a:ext cx="1979135" cy="925200"/>
+            <a:chOff x="4315976" y="15244200"/>
+            <a:chExt cx="1979135" cy="925200"/>
+          </a:xfrm>
+        </p:grpSpPr>
+        <p:pic>
+          <p:nvPicPr>
+            <p:cNvPr id="22" name="Picture 21">
+              <a:extLst>
+                <a:ext uri="{FF2B5EF4-FFF2-40B4-BE49-F238E27FC236}">
+                  <a16:creationId xmlns:a16="http://schemas.microsoft.com/office/drawing/2014/main" id="{367077B8-EBC3-CC2C-6491-5C0D45B42B6C}"/>
+                </a:ext>
+              </a:extLst>
+            </p:cNvPr>
+            <p:cNvPicPr>
+              <a:picLocks noChangeAspect="1"/>
+            </p:cNvPicPr>
+            <p:nvPr/>
+          </p:nvPicPr>
+          <p:blipFill>
+            <a:blip r:embed="rId3"/>
+            <a:stretch>
+              <a:fillRect/>
+            </a:stretch>
+          </p:blipFill>
+          <p:spPr>
+            <a:xfrm>
+              <a:off x="5369911" y="15244200"/>
+              <a:ext cx="925200" cy="925200"/>
+            </a:xfrm>
+            <a:prstGeom prst="rect">
+              <a:avLst/>
+            </a:prstGeom>
+          </p:spPr>
+        </p:pic>
+        <p:pic>
+          <p:nvPicPr>
+            <p:cNvPr id="24" name="Picture 23">
+              <a:extLst>
+                <a:ext uri="{FF2B5EF4-FFF2-40B4-BE49-F238E27FC236}">
+                  <a16:creationId xmlns:a16="http://schemas.microsoft.com/office/drawing/2014/main" id="{45917954-65FF-A571-2710-6A1DE5EE48B5}"/>
+                </a:ext>
+              </a:extLst>
+            </p:cNvPr>
+            <p:cNvPicPr>
+              <a:picLocks noChangeAspect="1"/>
+            </p:cNvPicPr>
+            <p:nvPr/>
+          </p:nvPicPr>
+          <p:blipFill>
+            <a:blip r:embed="rId4"/>
+            <a:stretch>
+              <a:fillRect/>
+            </a:stretch>
+          </p:blipFill>
+          <p:spPr>
+            <a:xfrm>
+              <a:off x="4315976" y="15244200"/>
+              <a:ext cx="925200" cy="925200"/>
+            </a:xfrm>
+            <a:prstGeom prst="rect">
+              <a:avLst/>
+            </a:prstGeom>
+          </p:spPr>
+        </p:pic>
+      </p:grpSp>
+      <p:sp>
+        <p:nvSpPr>
+          <p:cNvPr id="10" name="TextBox 9">
+            <a:extLst>
+              <a:ext uri="{FF2B5EF4-FFF2-40B4-BE49-F238E27FC236}">
+                <a16:creationId xmlns:a16="http://schemas.microsoft.com/office/drawing/2014/main" id="{405E72F4-E39E-8FAD-652F-B4C2D2EE8911}"/>
+              </a:ext>
+            </a:extLst>
+          </p:cNvPr>
+          <p:cNvSpPr txBox="1"/>
+          <p:nvPr/>
+        </p:nvSpPr>
+        <p:spPr>
+          <a:xfrm>
+            <a:off x="336388" y="3210690"/>
+            <a:ext cx="9611203" cy="923330"/>
+          </a:xfrm>
+          <a:prstGeom prst="rect">
+            <a:avLst/>
+          </a:prstGeom>
+          <a:solidFill>
+            <a:schemeClr val="accent2"/>
+          </a:solidFill>
+          <a:ln>
+            <a:noFill/>
+          </a:ln>
+        </p:spPr>
+        <p:style>
+          <a:lnRef idx="0">
+            <a:scrgbClr r="0" g="0" b="0"/>
+          </a:lnRef>
+          <a:fillRef idx="0">
+            <a:scrgbClr r="0" g="0" b="0"/>
+          </a:fillRef>
+          <a:effectRef idx="0">
+            <a:scrgbClr r="0" g="0" b="0"/>
+          </a:effectRef>
+          <a:fontRef idx="minor">
+            <a:schemeClr val="lt1"/>
+          </a:fontRef>
+        </p:style>
+        <p:txBody>
+          <a:bodyPr wrap="square" rtlCol="0">
+            <a:spAutoFit/>
+          </a:bodyPr>
+          <a:lstStyle/>
+          <a:p>
+            <a:pPr algn="ctr"/>
+            <a:r>
+              <a:rPr lang="en-US" sz="5400" dirty="0">
+                <a:ln w="0"/>
+                <a:solidFill>
+                  <a:schemeClr val="accent1"/>
+                </a:solidFill>
+                <a:effectLst>
+                  <a:outerShdw blurRad="38100" dist="25400" dir="5400000" algn="ctr" rotWithShape="0">
+                    <a:srgbClr val="6E747A">
+                      <a:alpha val="43000"/>
+                    </a:srgbClr>
+                  </a:outerShdw>
+                </a:effectLst>
+                <a:latin typeface="Patrick Hand" pitchFamily="2" charset="77"/>
+              </a:rPr>
+              <a:t>List</a:t>
+            </a:r>
+            <a:r>
+              <a:rPr lang="en-DE" sz="5400" dirty="0">
+                <a:ln w="0"/>
+                <a:solidFill>
+                  <a:schemeClr val="accent1"/>
+                </a:solidFill>
+                <a:effectLst>
+                  <a:outerShdw blurRad="38100" dist="25400" dir="5400000" algn="ctr" rotWithShape="0">
+                    <a:srgbClr val="6E747A">
+                      <a:alpha val="43000"/>
+                    </a:srgbClr>
+                  </a:outerShdw>
+                </a:effectLst>
+                <a:latin typeface="Patrick Hand" pitchFamily="2" charset="77"/>
+              </a:rPr>
+              <a:t> Index based</a:t>
+            </a:r>
+          </a:p>
+        </p:txBody>
+      </p:sp>
+      <p:sp>
+        <p:nvSpPr>
+          <p:cNvPr id="11" name="TextBox 10">
+            <a:extLst>
+              <a:ext uri="{FF2B5EF4-FFF2-40B4-BE49-F238E27FC236}">
+                <a16:creationId xmlns:a16="http://schemas.microsoft.com/office/drawing/2014/main" id="{3A73C1D9-D9C0-F838-3FED-6DC134F0D204}"/>
+              </a:ext>
+            </a:extLst>
+          </p:cNvPr>
+          <p:cNvSpPr txBox="1">
+            <a:spLocks/>
+          </p:cNvSpPr>
+          <p:nvPr/>
+        </p:nvSpPr>
+        <p:spPr>
+          <a:xfrm>
+            <a:off x="336388" y="8876708"/>
+            <a:ext cx="9609769" cy="2303126"/>
+          </a:xfrm>
+          <a:prstGeom prst="rect">
+            <a:avLst/>
+          </a:prstGeom>
+          <a:ln/>
+        </p:spPr>
+        <p:style>
+          <a:lnRef idx="1">
+            <a:schemeClr val="accent6"/>
+          </a:lnRef>
+          <a:fillRef idx="3">
+            <a:schemeClr val="accent6"/>
+          </a:fillRef>
+          <a:effectRef idx="2">
+            <a:schemeClr val="accent6"/>
+          </a:effectRef>
+          <a:fontRef idx="minor">
+            <a:schemeClr val="lt1"/>
+          </a:fontRef>
+        </p:style>
+        <p:txBody>
+          <a:bodyPr wrap="square" rtlCol="0" anchor="ctr">
+            <a:noAutofit/>
+          </a:bodyPr>
+          <a:lstStyle/>
+          <a:p>
+            <a:pPr algn="ctr"/>
+            <a:r>
+              <a:rPr lang="en-GB" sz="5400" b="1" dirty="0">
+                <a:ln w="13462">
+                  <a:solidFill>
+                    <a:schemeClr val="bg1"/>
+                  </a:solidFill>
+                  <a:prstDash val="solid"/>
+                </a:ln>
+                <a:solidFill>
+                  <a:schemeClr val="tx1"/>
+                </a:solidFill>
+                <a:effectLst>
+                  <a:outerShdw dist="38100" dir="2700000" algn="bl" rotWithShape="0">
+                    <a:schemeClr val="accent5"/>
+                  </a:outerShdw>
+                </a:effectLst>
+                <a:latin typeface="Patrick Hand" pitchFamily="2" charset="77"/>
+              </a:rPr>
+              <a:t>M</a:t>
+            </a:r>
+            <a:r>
+              <a:rPr lang="en-DE" sz="5400" b="1" dirty="0">
+                <a:ln w="13462">
+                  <a:solidFill>
+                    <a:schemeClr val="bg1"/>
+                  </a:solidFill>
+                  <a:prstDash val="solid"/>
+                </a:ln>
+                <a:solidFill>
+                  <a:schemeClr val="tx1"/>
+                </a:solidFill>
+                <a:effectLst>
+                  <a:outerShdw dist="38100" dir="2700000" algn="bl" rotWithShape="0">
+                    <a:schemeClr val="accent5"/>
+                  </a:outerShdw>
+                </a:effectLst>
+                <a:latin typeface="Patrick Hand" pitchFamily="2" charset="77"/>
+              </a:rPr>
+              <a:t>ore readable and prevents “IndexError” bugs</a:t>
+            </a:r>
+          </a:p>
+        </p:txBody>
+      </p:sp>
+      <p:pic>
+        <p:nvPicPr>
+          <p:cNvPr id="2" name="Picture 1">
+            <a:extLst>
+              <a:ext uri="{FF2B5EF4-FFF2-40B4-BE49-F238E27FC236}">
+                <a16:creationId xmlns:a16="http://schemas.microsoft.com/office/drawing/2014/main" id="{1C53E3FC-8572-55A5-8B29-A4E703BE9911}"/>
+              </a:ext>
+            </a:extLst>
+          </p:cNvPr>
+          <p:cNvPicPr>
+            <a:picLocks noChangeAspect="1"/>
+          </p:cNvPicPr>
+          <p:nvPr/>
+        </p:nvPicPr>
+        <p:blipFill rotWithShape="1">
+          <a:blip r:embed="rId5"/>
+          <a:srcRect l="19320" t="33139" r="12833" b="18458"/>
+          <a:stretch>
+            <a:fillRect/>
+          </a:stretch>
+        </p:blipFill>
+        <p:spPr>
+          <a:xfrm>
+            <a:off x="337823" y="4198000"/>
+            <a:ext cx="9609769" cy="4609564"/>
+          </a:xfrm>
+          <a:prstGeom prst="rect">
+            <a:avLst/>
+          </a:prstGeom>
+        </p:spPr>
+      </p:pic>
+      <p:pic>
+        <p:nvPicPr>
+          <p:cNvPr id="6" name="Picture 5">
+            <a:extLst>
+              <a:ext uri="{FF2B5EF4-FFF2-40B4-BE49-F238E27FC236}">
+                <a16:creationId xmlns:a16="http://schemas.microsoft.com/office/drawing/2014/main" id="{D3BFD0B6-4AF1-C224-E230-00E04AF21B82}"/>
+              </a:ext>
+            </a:extLst>
+          </p:cNvPr>
+          <p:cNvPicPr>
+            <a:picLocks noChangeAspect="1"/>
+          </p:cNvPicPr>
+          <p:nvPr/>
+        </p:nvPicPr>
+        <p:blipFill rotWithShape="1">
+          <a:blip r:embed="rId6"/>
+          <a:srcRect l="17225" t="32654" r="10336" b="17009"/>
+          <a:stretch>
+            <a:fillRect/>
+          </a:stretch>
+        </p:blipFill>
+        <p:spPr>
+          <a:xfrm>
+            <a:off x="337822" y="11259625"/>
+            <a:ext cx="9611203" cy="4000500"/>
+          </a:xfrm>
+          <a:prstGeom prst="rect">
+            <a:avLst/>
+          </a:prstGeom>
+        </p:spPr>
+      </p:pic>
+      <p:pic>
+        <p:nvPicPr>
+          <p:cNvPr id="8" name="Picture 7">
+            <a:extLst>
+              <a:ext uri="{FF2B5EF4-FFF2-40B4-BE49-F238E27FC236}">
+                <a16:creationId xmlns:a16="http://schemas.microsoft.com/office/drawing/2014/main" id="{DBB0DAB2-598A-C4B1-C3A9-530FCFC98BF1}"/>
+              </a:ext>
+            </a:extLst>
+          </p:cNvPr>
+          <p:cNvPicPr>
+            <a:picLocks noChangeAspect="1"/>
+          </p:cNvPicPr>
+          <p:nvPr/>
+        </p:nvPicPr>
+        <p:blipFill>
+          <a:blip r:embed="rId7"/>
+          <a:stretch>
+            <a:fillRect/>
+          </a:stretch>
+        </p:blipFill>
+        <p:spPr>
+          <a:xfrm>
+            <a:off x="8754557" y="14070664"/>
+            <a:ext cx="1063167" cy="1063167"/>
+          </a:xfrm>
+          <a:prstGeom prst="rect">
+            <a:avLst/>
+          </a:prstGeom>
+        </p:spPr>
+      </p:pic>
+      <p:sp>
+        <p:nvSpPr>
+          <p:cNvPr id="7" name="Curved Left Arrow 6">
+            <a:extLst>
+              <a:ext uri="{FF2B5EF4-FFF2-40B4-BE49-F238E27FC236}">
+                <a16:creationId xmlns:a16="http://schemas.microsoft.com/office/drawing/2014/main" id="{4F4EEE06-704E-18C9-AB2B-8C23A4B5BAC1}"/>
+              </a:ext>
+            </a:extLst>
+          </p:cNvPr>
+          <p:cNvSpPr/>
+          <p:nvPr/>
+        </p:nvSpPr>
+        <p:spPr>
+          <a:xfrm>
+            <a:off x="8372281" y="6021236"/>
+            <a:ext cx="1518251" cy="6452559"/>
+          </a:xfrm>
+          <a:prstGeom prst="curvedLeftArrow">
+            <a:avLst/>
+          </a:prstGeom>
+          <a:solidFill>
+            <a:srgbClr val="FFFF00"/>
+          </a:solidFill>
+          <a:ln w="31750">
+            <a:solidFill>
+              <a:schemeClr val="accent1">
+                <a:shade val="15000"/>
+              </a:schemeClr>
+            </a:solidFill>
+          </a:ln>
+        </p:spPr>
+        <p:style>
+          <a:lnRef idx="2">
+            <a:schemeClr val="accent1">
+              <a:shade val="15000"/>
+            </a:schemeClr>
+          </a:lnRef>
+          <a:fillRef idx="1">
+            <a:schemeClr val="accent1"/>
+          </a:fillRef>
+          <a:effectRef idx="0">
+            <a:schemeClr val="accent1"/>
+          </a:effectRef>
+          <a:fontRef idx="minor">
+            <a:schemeClr val="lt1"/>
+          </a:fontRef>
+        </p:style>
+        <p:txBody>
+          <a:bodyPr rtlCol="0" anchor="ctr"/>
+          <a:lstStyle/>
+          <a:p>
+            <a:pPr marL="0" algn="ctr" defTabSz="457200" rtl="0" eaLnBrk="1" latinLnBrk="0" hangingPunct="1"/>
+            <a:endParaRPr lang="en-DE" dirty="0">
+              <a:solidFill>
+                <a:schemeClr val="tx1"/>
+              </a:solidFill>
+              <a:latin typeface="Patrick Hand" pitchFamily="2" charset="77"/>
+            </a:endParaRPr>
+          </a:p>
+        </p:txBody>
+      </p:sp>
+    </p:spTree>
+    <p:extLst>
+      <p:ext uri="{BB962C8B-B14F-4D97-AF65-F5344CB8AC3E}">
+        <p14:creationId xmlns:p14="http://schemas.microsoft.com/office/powerpoint/2010/main" val="2385386647"/>
+      </p:ext>
+    </p:extLst>
+  </p:cSld>
+  <p:clrMapOvr>
+    <a:masterClrMapping/>
+  </p:clrMapOvr>
+</p:sld>
+</file>
+
+<file path=ppt/slides/slide8.xml><?xml version="1.0" encoding="utf-8"?>
+<p:sld xmlns:a="http://schemas.openxmlformats.org/drawingml/2006/main" xmlns:r="http://schemas.openxmlformats.org/officeDocument/2006/relationships" xmlns:p="http://schemas.openxmlformats.org/presentationml/2006/main">
+  <p:cSld>
+    <p:bg>
+      <p:bgPr>
+        <a:pattFill prst="divot">
+          <a:fgClr>
+            <a:schemeClr val="bg1">
+              <a:lumMod val="75000"/>
+            </a:schemeClr>
+          </a:fgClr>
+          <a:bgClr>
+            <a:schemeClr val="bg1"/>
+          </a:bgClr>
+        </a:pattFill>
+        <a:effectLst/>
+      </p:bgPr>
+    </p:bg>
     <p:spTree>
       <p:nvGrpSpPr>
         <p:cNvPr id="1" name=""/>
@@ -6242,6 +7025,744 @@
           <a:chExt cx="0" cy="0"/>
         </a:xfrm>
       </p:grpSpPr>
+      <p:sp>
+        <p:nvSpPr>
+          <p:cNvPr id="8" name="TextBox 7">
+            <a:extLst>
+              <a:ext uri="{FF2B5EF4-FFF2-40B4-BE49-F238E27FC236}">
+                <a16:creationId xmlns:a16="http://schemas.microsoft.com/office/drawing/2014/main" id="{C8345EEA-8E33-AB34-6647-7D730998D0D4}"/>
+              </a:ext>
+            </a:extLst>
+          </p:cNvPr>
+          <p:cNvSpPr txBox="1"/>
+          <p:nvPr/>
+        </p:nvSpPr>
+        <p:spPr>
+          <a:xfrm>
+            <a:off x="2170229" y="1745204"/>
+            <a:ext cx="5944954" cy="923330"/>
+          </a:xfrm>
+          <a:prstGeom prst="rect">
+            <a:avLst/>
+          </a:prstGeom>
+          <a:noFill/>
+        </p:spPr>
+        <p:txBody>
+          <a:bodyPr wrap="square" rtlCol="0">
+            <a:spAutoFit/>
+          </a:bodyPr>
+          <a:lstStyle/>
+          <a:p>
+            <a:pPr algn="ctr"/>
+            <a:r>
+              <a:rPr lang="en-GB" sz="5400" b="1" dirty="0">
+                <a:ln/>
+                <a:latin typeface="+mj-lt"/>
+              </a:rPr>
+              <a:t>@</a:t>
+            </a:r>
+            <a:r>
+              <a:rPr lang="en-GB" sz="5400" b="1" dirty="0" err="1">
+                <a:ln/>
+                <a:latin typeface="+mj-lt"/>
+              </a:rPr>
+              <a:t>CodeWithEbrahim</a:t>
+            </a:r>
+            <a:endParaRPr lang="en-GB" sz="5400" b="1" dirty="0">
+              <a:ln/>
+              <a:latin typeface="+mj-lt"/>
+            </a:endParaRPr>
+          </a:p>
+        </p:txBody>
+      </p:sp>
+      <p:grpSp>
+        <p:nvGrpSpPr>
+          <p:cNvPr id="9" name="Group 8">
+            <a:extLst>
+              <a:ext uri="{FF2B5EF4-FFF2-40B4-BE49-F238E27FC236}">
+                <a16:creationId xmlns:a16="http://schemas.microsoft.com/office/drawing/2014/main" id="{C85A97EE-04CF-BB70-7A4E-EF65A741970A}"/>
+              </a:ext>
+            </a:extLst>
+          </p:cNvPr>
+          <p:cNvGrpSpPr/>
+          <p:nvPr/>
+        </p:nvGrpSpPr>
+        <p:grpSpPr>
+          <a:xfrm>
+            <a:off x="4153139" y="492745"/>
+            <a:ext cx="1979135" cy="925200"/>
+            <a:chOff x="4315976" y="15244200"/>
+            <a:chExt cx="1979135" cy="925200"/>
+          </a:xfrm>
+        </p:grpSpPr>
+        <p:pic>
+          <p:nvPicPr>
+            <p:cNvPr id="10" name="Picture 9">
+              <a:extLst>
+                <a:ext uri="{FF2B5EF4-FFF2-40B4-BE49-F238E27FC236}">
+                  <a16:creationId xmlns:a16="http://schemas.microsoft.com/office/drawing/2014/main" id="{EB62F72E-F833-B62D-AAA3-2D9858B82C3F}"/>
+                </a:ext>
+              </a:extLst>
+            </p:cNvPr>
+            <p:cNvPicPr>
+              <a:picLocks noChangeAspect="1"/>
+            </p:cNvPicPr>
+            <p:nvPr/>
+          </p:nvPicPr>
+          <p:blipFill>
+            <a:blip r:embed="rId3"/>
+            <a:stretch>
+              <a:fillRect/>
+            </a:stretch>
+          </p:blipFill>
+          <p:spPr>
+            <a:xfrm>
+              <a:off x="5369911" y="15244200"/>
+              <a:ext cx="925200" cy="925200"/>
+            </a:xfrm>
+            <a:prstGeom prst="rect">
+              <a:avLst/>
+            </a:prstGeom>
+          </p:spPr>
+        </p:pic>
+        <p:pic>
+          <p:nvPicPr>
+            <p:cNvPr id="11" name="Picture 10">
+              <a:extLst>
+                <a:ext uri="{FF2B5EF4-FFF2-40B4-BE49-F238E27FC236}">
+                  <a16:creationId xmlns:a16="http://schemas.microsoft.com/office/drawing/2014/main" id="{76C95DEE-C89F-14EA-3FD5-BE2B7A6C37B6}"/>
+                </a:ext>
+              </a:extLst>
+            </p:cNvPr>
+            <p:cNvPicPr>
+              <a:picLocks noChangeAspect="1"/>
+            </p:cNvPicPr>
+            <p:nvPr/>
+          </p:nvPicPr>
+          <p:blipFill>
+            <a:blip r:embed="rId4"/>
+            <a:stretch>
+              <a:fillRect/>
+            </a:stretch>
+          </p:blipFill>
+          <p:spPr>
+            <a:xfrm>
+              <a:off x="4315976" y="15244200"/>
+              <a:ext cx="925200" cy="925200"/>
+            </a:xfrm>
+            <a:prstGeom prst="rect">
+              <a:avLst/>
+            </a:prstGeom>
+          </p:spPr>
+        </p:pic>
+      </p:grpSp>
+      <p:grpSp>
+        <p:nvGrpSpPr>
+          <p:cNvPr id="104" name="Group 103">
+            <a:extLst>
+              <a:ext uri="{FF2B5EF4-FFF2-40B4-BE49-F238E27FC236}">
+                <a16:creationId xmlns:a16="http://schemas.microsoft.com/office/drawing/2014/main" id="{68936CF2-EFE7-0A56-5F22-A1457CF2CB86}"/>
+              </a:ext>
+            </a:extLst>
+          </p:cNvPr>
+          <p:cNvGrpSpPr/>
+          <p:nvPr/>
+        </p:nvGrpSpPr>
+        <p:grpSpPr>
+          <a:xfrm>
+            <a:off x="297365" y="4382219"/>
+            <a:ext cx="9690682" cy="4278703"/>
+            <a:chOff x="232998" y="4382219"/>
+            <a:chExt cx="9690682" cy="4278703"/>
+          </a:xfrm>
+        </p:grpSpPr>
+        <p:pic>
+          <p:nvPicPr>
+            <p:cNvPr id="70" name="Picture 69">
+              <a:extLst>
+                <a:ext uri="{FF2B5EF4-FFF2-40B4-BE49-F238E27FC236}">
+                  <a16:creationId xmlns:a16="http://schemas.microsoft.com/office/drawing/2014/main" id="{66BDBF16-7324-C359-13EB-C05F2D62C06C}"/>
+                </a:ext>
+              </a:extLst>
+            </p:cNvPr>
+            <p:cNvPicPr>
+              <a:picLocks noChangeAspect="1"/>
+            </p:cNvPicPr>
+            <p:nvPr/>
+          </p:nvPicPr>
+          <p:blipFill rotWithShape="1">
+            <a:blip r:embed="rId5"/>
+            <a:srcRect l="18433" t="32757" r="11268" b="18316"/>
+            <a:stretch>
+              <a:fillRect/>
+            </a:stretch>
+          </p:blipFill>
+          <p:spPr>
+            <a:xfrm>
+              <a:off x="232998" y="4382219"/>
+              <a:ext cx="9690682" cy="4278703"/>
+            </a:xfrm>
+            <a:prstGeom prst="rect">
+              <a:avLst/>
+            </a:prstGeom>
+          </p:spPr>
+        </p:pic>
+        <p:pic>
+          <p:nvPicPr>
+            <p:cNvPr id="86" name="Graphic 85" descr="Close with solid fill">
+              <a:extLst>
+                <a:ext uri="{FF2B5EF4-FFF2-40B4-BE49-F238E27FC236}">
+                  <a16:creationId xmlns:a16="http://schemas.microsoft.com/office/drawing/2014/main" id="{6ED8EA4F-3558-5DA3-7EBB-C7E095FB2976}"/>
+                </a:ext>
+              </a:extLst>
+            </p:cNvPr>
+            <p:cNvPicPr>
+              <a:picLocks noChangeAspect="1"/>
+            </p:cNvPicPr>
+            <p:nvPr/>
+          </p:nvPicPr>
+          <p:blipFill>
+            <a:blip r:embed="rId6">
+              <a:extLst>
+                <a:ext uri="{96DAC541-7B7A-43D3-8B79-37D633B846F1}">
+                  <asvg:svgBlip xmlns:asvg="http://schemas.microsoft.com/office/drawing/2016/SVG/main" r:embed="rId7"/>
+                </a:ext>
+              </a:extLst>
+            </a:blip>
+            <a:stretch>
+              <a:fillRect/>
+            </a:stretch>
+          </p:blipFill>
+          <p:spPr>
+            <a:xfrm>
+              <a:off x="8869700" y="4707196"/>
+              <a:ext cx="914400" cy="914400"/>
+            </a:xfrm>
+            <a:prstGeom prst="rect">
+              <a:avLst/>
+            </a:prstGeom>
+          </p:spPr>
+        </p:pic>
+        <p:cxnSp>
+          <p:nvCxnSpPr>
+            <p:cNvPr id="98" name="Straight Arrow Connector 97">
+              <a:extLst>
+                <a:ext uri="{FF2B5EF4-FFF2-40B4-BE49-F238E27FC236}">
+                  <a16:creationId xmlns:a16="http://schemas.microsoft.com/office/drawing/2014/main" id="{91BE2148-5B99-92E2-A86C-A2ED92CA6938}"/>
+                </a:ext>
+              </a:extLst>
+            </p:cNvPr>
+            <p:cNvCxnSpPr>
+              <a:cxnSpLocks/>
+            </p:cNvCxnSpPr>
+            <p:nvPr/>
+          </p:nvCxnSpPr>
+          <p:spPr>
+            <a:xfrm>
+              <a:off x="5382883" y="5164396"/>
+              <a:ext cx="3486817" cy="0"/>
+            </a:xfrm>
+            <a:prstGeom prst="straightConnector1">
+              <a:avLst/>
+            </a:prstGeom>
+            <a:ln w="31750">
+              <a:solidFill>
+                <a:srgbClr val="FF0000"/>
+              </a:solidFill>
+              <a:headEnd type="none" w="lg" len="lg"/>
+              <a:tailEnd type="arrow" w="lg" len="lg"/>
+            </a:ln>
+          </p:spPr>
+          <p:style>
+            <a:lnRef idx="1">
+              <a:schemeClr val="accent1"/>
+            </a:lnRef>
+            <a:fillRef idx="0">
+              <a:schemeClr val="accent1"/>
+            </a:fillRef>
+            <a:effectRef idx="0">
+              <a:schemeClr val="accent1"/>
+            </a:effectRef>
+            <a:fontRef idx="minor">
+              <a:schemeClr val="tx1"/>
+            </a:fontRef>
+          </p:style>
+        </p:cxnSp>
+      </p:grpSp>
+      <p:grpSp>
+        <p:nvGrpSpPr>
+          <p:cNvPr id="105" name="Group 104">
+            <a:extLst>
+              <a:ext uri="{FF2B5EF4-FFF2-40B4-BE49-F238E27FC236}">
+                <a16:creationId xmlns:a16="http://schemas.microsoft.com/office/drawing/2014/main" id="{FEEA5A16-A8AD-2CD6-D0B9-9E6047E39071}"/>
+              </a:ext>
+            </a:extLst>
+          </p:cNvPr>
+          <p:cNvGrpSpPr/>
+          <p:nvPr/>
+        </p:nvGrpSpPr>
+        <p:grpSpPr>
+          <a:xfrm>
+            <a:off x="297365" y="8971470"/>
+            <a:ext cx="9690682" cy="4278701"/>
+            <a:chOff x="232998" y="8971470"/>
+            <a:chExt cx="9690682" cy="4278701"/>
+          </a:xfrm>
+        </p:grpSpPr>
+        <p:pic>
+          <p:nvPicPr>
+            <p:cNvPr id="83" name="Picture 82">
+              <a:extLst>
+                <a:ext uri="{FF2B5EF4-FFF2-40B4-BE49-F238E27FC236}">
+                  <a16:creationId xmlns:a16="http://schemas.microsoft.com/office/drawing/2014/main" id="{B90F781D-CFEE-8ED8-F94E-C48D737E1DFA}"/>
+                </a:ext>
+              </a:extLst>
+            </p:cNvPr>
+            <p:cNvPicPr>
+              <a:picLocks noChangeAspect="1"/>
+            </p:cNvPicPr>
+            <p:nvPr/>
+          </p:nvPicPr>
+          <p:blipFill rotWithShape="1">
+            <a:blip r:embed="rId8"/>
+            <a:srcRect l="18284" t="32749" r="11433" b="18336"/>
+            <a:stretch>
+              <a:fillRect/>
+            </a:stretch>
+          </p:blipFill>
+          <p:spPr>
+            <a:xfrm>
+              <a:off x="232998" y="8971470"/>
+              <a:ext cx="9690682" cy="4278701"/>
+            </a:xfrm>
+            <a:prstGeom prst="rect">
+              <a:avLst/>
+            </a:prstGeom>
+          </p:spPr>
+        </p:pic>
+        <p:pic>
+          <p:nvPicPr>
+            <p:cNvPr id="84" name="Picture 83">
+              <a:extLst>
+                <a:ext uri="{FF2B5EF4-FFF2-40B4-BE49-F238E27FC236}">
+                  <a16:creationId xmlns:a16="http://schemas.microsoft.com/office/drawing/2014/main" id="{C14DD266-0237-70CE-24DF-8074AAEEFD8D}"/>
+                </a:ext>
+              </a:extLst>
+            </p:cNvPr>
+            <p:cNvPicPr>
+              <a:picLocks noChangeAspect="1"/>
+            </p:cNvPicPr>
+            <p:nvPr/>
+          </p:nvPicPr>
+          <p:blipFill>
+            <a:blip r:embed="rId9"/>
+            <a:stretch>
+              <a:fillRect/>
+            </a:stretch>
+          </p:blipFill>
+          <p:spPr>
+            <a:xfrm>
+              <a:off x="289677" y="12117992"/>
+              <a:ext cx="1063167" cy="1063167"/>
+            </a:xfrm>
+            <a:prstGeom prst="rect">
+              <a:avLst/>
+            </a:prstGeom>
+          </p:spPr>
+        </p:pic>
+        <p:pic>
+          <p:nvPicPr>
+            <p:cNvPr id="88" name="Graphic 87" descr="Checkbox Ticked with solid fill">
+              <a:extLst>
+                <a:ext uri="{FF2B5EF4-FFF2-40B4-BE49-F238E27FC236}">
+                  <a16:creationId xmlns:a16="http://schemas.microsoft.com/office/drawing/2014/main" id="{B2AC9583-C2C6-6C42-BCA2-5941DBEC6666}"/>
+                </a:ext>
+              </a:extLst>
+            </p:cNvPr>
+            <p:cNvPicPr>
+              <a:picLocks noChangeAspect="1"/>
+            </p:cNvPicPr>
+            <p:nvPr/>
+          </p:nvPicPr>
+          <p:blipFill>
+            <a:blip r:embed="rId10">
+              <a:extLst>
+                <a:ext uri="{96DAC541-7B7A-43D3-8B79-37D633B846F1}">
+                  <asvg:svgBlip xmlns:asvg="http://schemas.microsoft.com/office/drawing/2016/SVG/main" r:embed="rId11"/>
+                </a:ext>
+              </a:extLst>
+            </a:blip>
+            <a:stretch>
+              <a:fillRect/>
+            </a:stretch>
+          </p:blipFill>
+          <p:spPr>
+            <a:xfrm>
+              <a:off x="8869700" y="9947674"/>
+              <a:ext cx="914400" cy="914400"/>
+            </a:xfrm>
+            <a:prstGeom prst="rect">
+              <a:avLst/>
+            </a:prstGeom>
+          </p:spPr>
+        </p:pic>
+        <p:cxnSp>
+          <p:nvCxnSpPr>
+            <p:cNvPr id="101" name="Straight Arrow Connector 100">
+              <a:extLst>
+                <a:ext uri="{FF2B5EF4-FFF2-40B4-BE49-F238E27FC236}">
+                  <a16:creationId xmlns:a16="http://schemas.microsoft.com/office/drawing/2014/main" id="{5DE6B61C-48DF-C505-4BB6-1D08B15C9133}"/>
+                </a:ext>
+              </a:extLst>
+            </p:cNvPr>
+            <p:cNvCxnSpPr>
+              <a:cxnSpLocks/>
+            </p:cNvCxnSpPr>
+            <p:nvPr/>
+          </p:nvCxnSpPr>
+          <p:spPr>
+            <a:xfrm>
+              <a:off x="6763109" y="10404874"/>
+              <a:ext cx="2258991" cy="18758"/>
+            </a:xfrm>
+            <a:prstGeom prst="straightConnector1">
+              <a:avLst/>
+            </a:prstGeom>
+            <a:ln w="31750">
+              <a:solidFill>
+                <a:srgbClr val="00B050"/>
+              </a:solidFill>
+              <a:headEnd type="none" w="lg" len="lg"/>
+              <a:tailEnd type="arrow" w="lg" len="lg"/>
+            </a:ln>
+          </p:spPr>
+          <p:style>
+            <a:lnRef idx="1">
+              <a:schemeClr val="accent1"/>
+            </a:lnRef>
+            <a:fillRef idx="0">
+              <a:schemeClr val="accent1"/>
+            </a:fillRef>
+            <a:effectRef idx="0">
+              <a:schemeClr val="accent1"/>
+            </a:effectRef>
+            <a:fontRef idx="minor">
+              <a:schemeClr val="tx1"/>
+            </a:fontRef>
+          </p:style>
+        </p:cxnSp>
+      </p:grpSp>
+      <p:sp>
+        <p:nvSpPr>
+          <p:cNvPr id="103" name="TextBox 102">
+            <a:extLst>
+              <a:ext uri="{FF2B5EF4-FFF2-40B4-BE49-F238E27FC236}">
+                <a16:creationId xmlns:a16="http://schemas.microsoft.com/office/drawing/2014/main" id="{FEF617D9-122A-AA15-1A86-D9BAE09F0F58}"/>
+              </a:ext>
+            </a:extLst>
+          </p:cNvPr>
+          <p:cNvSpPr txBox="1"/>
+          <p:nvPr/>
+        </p:nvSpPr>
+        <p:spPr>
+          <a:xfrm>
+            <a:off x="739898" y="3160241"/>
+            <a:ext cx="8805616" cy="830997"/>
+          </a:xfrm>
+          <a:prstGeom prst="rect">
+            <a:avLst/>
+          </a:prstGeom>
+          <a:noFill/>
+        </p:spPr>
+        <p:txBody>
+          <a:bodyPr wrap="none" rtlCol="0">
+            <a:spAutoFit/>
+          </a:bodyPr>
+          <a:lstStyle/>
+          <a:p>
+            <a:r>
+              <a:rPr lang="en-DE" sz="4800" b="1" i="1" dirty="0">
+                <a:ln w="13462">
+                  <a:solidFill>
+                    <a:schemeClr val="bg1"/>
+                  </a:solidFill>
+                  <a:prstDash val="solid"/>
+                </a:ln>
+                <a:solidFill>
+                  <a:schemeClr val="tx1">
+                    <a:lumMod val="85000"/>
+                    <a:lumOff val="15000"/>
+                  </a:schemeClr>
+                </a:solidFill>
+                <a:effectLst>
+                  <a:outerShdw dist="38100" dir="2700000" algn="bl" rotWithShape="0">
+                    <a:schemeClr val="accent5"/>
+                  </a:outerShdw>
+                </a:effectLst>
+                <a:latin typeface="Patrick Hand" pitchFamily="2" charset="77"/>
+              </a:rPr>
+              <a:t>Use </a:t>
+            </a:r>
+            <a:r>
+              <a:rPr lang="en-DE" sz="4800" b="1" i="1" u="sng" dirty="0">
+                <a:ln w="13462">
+                  <a:solidFill>
+                    <a:schemeClr val="bg1"/>
+                  </a:solidFill>
+                  <a:prstDash val="solid"/>
+                </a:ln>
+                <a:solidFill>
+                  <a:schemeClr val="tx1">
+                    <a:lumMod val="85000"/>
+                    <a:lumOff val="15000"/>
+                  </a:schemeClr>
+                </a:solidFill>
+                <a:effectLst>
+                  <a:outerShdw dist="38100" dir="2700000" algn="bl" rotWithShape="0">
+                    <a:schemeClr val="accent5"/>
+                  </a:outerShdw>
+                </a:effectLst>
+                <a:latin typeface="Patrick Hand" pitchFamily="2" charset="77"/>
+              </a:rPr>
+              <a:t>Walrus</a:t>
+            </a:r>
+            <a:r>
+              <a:rPr lang="en-DE" sz="4800" b="1" i="1" dirty="0">
+                <a:ln w="13462">
+                  <a:solidFill>
+                    <a:schemeClr val="bg1"/>
+                  </a:solidFill>
+                  <a:prstDash val="solid"/>
+                </a:ln>
+                <a:solidFill>
+                  <a:schemeClr val="tx1">
+                    <a:lumMod val="85000"/>
+                    <a:lumOff val="15000"/>
+                  </a:schemeClr>
+                </a:solidFill>
+                <a:effectLst>
+                  <a:outerShdw dist="38100" dir="2700000" algn="bl" rotWithShape="0">
+                    <a:schemeClr val="accent5"/>
+                  </a:outerShdw>
+                </a:effectLst>
+                <a:latin typeface="Patrick Hand" pitchFamily="2" charset="77"/>
+              </a:rPr>
+              <a:t> Operator</a:t>
+            </a:r>
+            <a:r>
+              <a:rPr lang="en-US" sz="4800" b="1" i="1" dirty="0">
+                <a:ln w="13462">
+                  <a:solidFill>
+                    <a:schemeClr val="bg1"/>
+                  </a:solidFill>
+                  <a:prstDash val="solid"/>
+                </a:ln>
+                <a:solidFill>
+                  <a:schemeClr val="tx1">
+                    <a:lumMod val="85000"/>
+                    <a:lumOff val="15000"/>
+                  </a:schemeClr>
+                </a:solidFill>
+                <a:effectLst>
+                  <a:outerShdw dist="38100" dir="2700000" algn="bl" rotWithShape="0">
+                    <a:schemeClr val="accent5"/>
+                  </a:outerShdw>
+                </a:effectLst>
+                <a:latin typeface="Patrick Hand" pitchFamily="2" charset="77"/>
+              </a:rPr>
+              <a:t>(:=) in your codes</a:t>
+            </a:r>
+            <a:endParaRPr lang="en-DE" sz="4800" b="1" i="1" dirty="0">
+              <a:ln w="13462">
+                <a:solidFill>
+                  <a:schemeClr val="bg1"/>
+                </a:solidFill>
+                <a:prstDash val="solid"/>
+              </a:ln>
+              <a:solidFill>
+                <a:schemeClr val="tx1">
+                  <a:lumMod val="85000"/>
+                  <a:lumOff val="15000"/>
+                </a:schemeClr>
+              </a:solidFill>
+              <a:effectLst>
+                <a:outerShdw dist="38100" dir="2700000" algn="bl" rotWithShape="0">
+                  <a:schemeClr val="accent5"/>
+                </a:outerShdw>
+              </a:effectLst>
+              <a:latin typeface="Patrick Hand" pitchFamily="2" charset="77"/>
+            </a:endParaRPr>
+          </a:p>
+        </p:txBody>
+      </p:sp>
+      <p:sp>
+        <p:nvSpPr>
+          <p:cNvPr id="112" name="Curved Right Arrow 111">
+            <a:extLst>
+              <a:ext uri="{FF2B5EF4-FFF2-40B4-BE49-F238E27FC236}">
+                <a16:creationId xmlns:a16="http://schemas.microsoft.com/office/drawing/2014/main" id="{7A5F38A8-0653-BF91-CCDD-59BAEA1A169F}"/>
+              </a:ext>
+            </a:extLst>
+          </p:cNvPr>
+          <p:cNvSpPr/>
+          <p:nvPr/>
+        </p:nvSpPr>
+        <p:spPr>
+          <a:xfrm>
+            <a:off x="436946" y="4054420"/>
+            <a:ext cx="1223200" cy="6211012"/>
+          </a:xfrm>
+          <a:prstGeom prst="curvedRightArrow">
+            <a:avLst/>
+          </a:prstGeom>
+          <a:solidFill>
+            <a:srgbClr val="FFC000"/>
+          </a:solidFill>
+          <a:ln w="31750">
+            <a:solidFill>
+              <a:schemeClr val="accent4"/>
+            </a:solidFill>
+          </a:ln>
+        </p:spPr>
+        <p:style>
+          <a:lnRef idx="2">
+            <a:schemeClr val="accent1">
+              <a:shade val="15000"/>
+            </a:schemeClr>
+          </a:lnRef>
+          <a:fillRef idx="1">
+            <a:schemeClr val="accent1"/>
+          </a:fillRef>
+          <a:effectRef idx="0">
+            <a:schemeClr val="accent1"/>
+          </a:effectRef>
+          <a:fontRef idx="minor">
+            <a:schemeClr val="lt1"/>
+          </a:fontRef>
+        </p:style>
+        <p:txBody>
+          <a:bodyPr rtlCol="0" anchor="ctr"/>
+          <a:lstStyle/>
+          <a:p>
+            <a:pPr marL="0" algn="ctr" defTabSz="457200" rtl="0" eaLnBrk="1" latinLnBrk="0" hangingPunct="1"/>
+            <a:endParaRPr lang="en-DE" dirty="0">
+              <a:solidFill>
+                <a:schemeClr val="tx1"/>
+              </a:solidFill>
+              <a:latin typeface="Patrick Hand" pitchFamily="2" charset="77"/>
+            </a:endParaRPr>
+          </a:p>
+        </p:txBody>
+      </p:sp>
+      <p:sp>
+        <p:nvSpPr>
+          <p:cNvPr id="113" name="TextBox 112">
+            <a:extLst>
+              <a:ext uri="{FF2B5EF4-FFF2-40B4-BE49-F238E27FC236}">
+                <a16:creationId xmlns:a16="http://schemas.microsoft.com/office/drawing/2014/main" id="{C955F01A-DD86-3AD9-6B7B-91D5259CC29E}"/>
+              </a:ext>
+            </a:extLst>
+          </p:cNvPr>
+          <p:cNvSpPr txBox="1"/>
+          <p:nvPr/>
+        </p:nvSpPr>
+        <p:spPr>
+          <a:xfrm>
+            <a:off x="2928799" y="8965638"/>
+            <a:ext cx="4427815" cy="830997"/>
+          </a:xfrm>
+          <a:prstGeom prst="rect">
+            <a:avLst/>
+          </a:prstGeom>
+          <a:ln/>
+        </p:spPr>
+        <p:style>
+          <a:lnRef idx="2">
+            <a:schemeClr val="accent6">
+              <a:shade val="15000"/>
+            </a:schemeClr>
+          </a:lnRef>
+          <a:fillRef idx="1">
+            <a:schemeClr val="accent6"/>
+          </a:fillRef>
+          <a:effectRef idx="0">
+            <a:schemeClr val="accent6"/>
+          </a:effectRef>
+          <a:fontRef idx="minor">
+            <a:schemeClr val="lt1"/>
+          </a:fontRef>
+        </p:style>
+        <p:txBody>
+          <a:bodyPr wrap="none" rtlCol="0">
+            <a:spAutoFit/>
+          </a:bodyPr>
+          <a:lstStyle/>
+          <a:p>
+            <a:pPr marL="0" algn="l" defTabSz="457200" rtl="0" eaLnBrk="1" latinLnBrk="0" hangingPunct="1"/>
+            <a:r>
+              <a:rPr lang="en-US" sz="4800" b="1" dirty="0">
+                <a:ln w="12700" cmpd="sng">
+                  <a:solidFill>
+                    <a:schemeClr val="accent4"/>
+                  </a:solidFill>
+                  <a:prstDash val="solid"/>
+                </a:ln>
+                <a:gradFill>
+                  <a:gsLst>
+                    <a:gs pos="0">
+                      <a:schemeClr val="accent4"/>
+                    </a:gs>
+                    <a:gs pos="4000">
+                      <a:schemeClr val="accent4">
+                        <a:lumMod val="60000"/>
+                        <a:lumOff val="40000"/>
+                      </a:schemeClr>
+                    </a:gs>
+                    <a:gs pos="87000">
+                      <a:schemeClr val="accent4">
+                        <a:lumMod val="20000"/>
+                        <a:lumOff val="80000"/>
+                      </a:schemeClr>
+                    </a:gs>
+                  </a:gsLst>
+                  <a:lin ang="5400000"/>
+                </a:gradFill>
+                <a:latin typeface="Patrick Hand" pitchFamily="2" charset="77"/>
+              </a:rPr>
+              <a:t>Concise &amp; Readable</a:t>
+            </a:r>
+            <a:endParaRPr lang="en-DE" sz="4800" b="1" dirty="0">
+              <a:ln w="12700" cmpd="sng">
+                <a:solidFill>
+                  <a:schemeClr val="accent4"/>
+                </a:solidFill>
+                <a:prstDash val="solid"/>
+              </a:ln>
+              <a:gradFill>
+                <a:gsLst>
+                  <a:gs pos="0">
+                    <a:schemeClr val="accent4"/>
+                  </a:gs>
+                  <a:gs pos="4000">
+                    <a:schemeClr val="accent4">
+                      <a:lumMod val="60000"/>
+                      <a:lumOff val="40000"/>
+                    </a:schemeClr>
+                  </a:gs>
+                  <a:gs pos="87000">
+                    <a:schemeClr val="accent4">
+                      <a:lumMod val="20000"/>
+                      <a:lumOff val="80000"/>
+                    </a:schemeClr>
+                  </a:gs>
+                </a:gsLst>
+                <a:lin ang="5400000"/>
+              </a:gradFill>
+              <a:latin typeface="Patrick Hand" pitchFamily="2" charset="77"/>
+            </a:endParaRPr>
+          </a:p>
+        </p:txBody>
+      </p:sp>
     </p:spTree>
     <p:extLst>
       <p:ext uri="{BB962C8B-B14F-4D97-AF65-F5344CB8AC3E}">
@@ -6252,6 +7773,11 @@
   <p:clrMapOvr>
     <a:masterClrMapping/>
   </p:clrMapOvr>
+  <p:extLst>
+    <p:ext uri="{6950BFC3-D8DA-4A85-94F7-54DA5524770B}">
+      <p188:commentRel xmlns:p188="http://schemas.microsoft.com/office/powerpoint/2018/8/main" r:id="rId2"/>
+    </p:ext>
+  </p:extLst>
 </p:sld>
 </file>
 

</xml_diff>

<commit_message>
feat: changed folder structure+added latest videos until 011
</commit_message>
<xml_diff>
--- a/assets/get-ready.pptx
+++ b/assets/get-ready.pptx
@@ -5,7 +5,7 @@
     <p:sldMasterId id="2147483732" r:id="rId1"/>
   </p:sldMasterIdLst>
   <p:notesMasterIdLst>
-    <p:notesMasterId r:id="rId10"/>
+    <p:notesMasterId r:id="rId22"/>
   </p:notesMasterIdLst>
   <p:sldIdLst>
     <p:sldId id="263" r:id="rId2"/>
@@ -16,6 +16,18 @@
     <p:sldId id="274" r:id="rId7"/>
     <p:sldId id="275" r:id="rId8"/>
     <p:sldId id="273" r:id="rId9"/>
+    <p:sldId id="276" r:id="rId10"/>
+    <p:sldId id="277" r:id="rId11"/>
+    <p:sldId id="278" r:id="rId12"/>
+    <p:sldId id="279" r:id="rId13"/>
+    <p:sldId id="280" r:id="rId14"/>
+    <p:sldId id="281" r:id="rId15"/>
+    <p:sldId id="282" r:id="rId16"/>
+    <p:sldId id="283" r:id="rId17"/>
+    <p:sldId id="284" r:id="rId18"/>
+    <p:sldId id="285" r:id="rId19"/>
+    <p:sldId id="286" r:id="rId20"/>
+    <p:sldId id="287" r:id="rId21"/>
   </p:sldIdLst>
   <p:sldSz cx="10285413" cy="18288000"/>
   <p:notesSz cx="6858000" cy="9144000"/>
@@ -194,6 +206,97 @@
 </p188:cmLst>
 </file>
 
+<file path=ppt/comments/modernComment_114_90382018.xml><?xml version="1.0" encoding="utf-8"?>
+<p188:cmLst xmlns:a="http://schemas.openxmlformats.org/drawingml/2006/main" xmlns:r="http://schemas.openxmlformats.org/officeDocument/2006/relationships" xmlns:p188="http://schemas.microsoft.com/office/powerpoint/2018/8/main">
+  <p188:cm id="{4120432F-D95B-134A-AF1F-F641BC3F7A95}" authorId="{8860045D-B334-310D-0A4E-9E20AA0B149E}" created="2026-01-02T10:15:01.565">
+    <pc:sldMkLst xmlns:pc="http://schemas.microsoft.com/office/powerpoint/2013/main/command">
+      <pc:docMk/>
+      <pc:sldMk cId="2419597336" sldId="276"/>
+    </pc:sldMkLst>
+    <p188:txBody>
+      <a:bodyPr/>
+      <a:lstStyle/>
+      <a:p>
+        <a:r>
+          <a:rPr lang="en-DE"/>
+          <a:t>TikTok:
+Stop guessing if your code works! 🧪 Writing your first test with Pytest is the fastest way to level up. 🚀
+#Python #Coding #SoftwareEngineering #Pytest #USA #Germany #Deutschland #Programming #TechTips #CodeWithEbrahim</a:t>
+        </a:r>
+      </a:p>
+    </p188:txBody>
+  </p188:cm>
+</p188:cmLst>
+</file>
+
+<file path=ppt/comments/modernComment_115_9CE3D27C.xml><?xml version="1.0" encoding="utf-8"?>
+<p188:cmLst xmlns:a="http://schemas.openxmlformats.org/drawingml/2006/main" xmlns:r="http://schemas.openxmlformats.org/officeDocument/2006/relationships" xmlns:p188="http://schemas.microsoft.com/office/powerpoint/2018/8/main">
+  <p188:cm id="{E64800C0-A8FD-7049-8721-DDFAF8DB46DE}" authorId="{8860045D-B334-310D-0A4E-9E20AA0B149E}" created="2026-01-02T13:54:15.909">
+    <pc:sldMkLst xmlns:pc="http://schemas.microsoft.com/office/powerpoint/2013/main/command">
+      <pc:docMk/>
+      <pc:sldMk cId="2632176252" sldId="277"/>
+    </pc:sldMkLst>
+    <p188:txBody>
+      <a:bodyPr/>
+      <a:lstStyle/>
+      <a:p>
+        <a:r>
+          <a:rPr lang="en-DE"/>
+          <a:t>tiktok
+Stop using print() to handle bad data! 🛑 
+Using raise makes your code professional and prevents silent crashes. 🐍🔥
+#Python #CodingTips #SoftwareEngineering #USA #Germany #Deutschland #Backend #Programming #LearnToCode #CodeWithEbrahim</a:t>
+        </a:r>
+      </a:p>
+    </p188:txBody>
+  </p188:cm>
+</p188:cmLst>
+</file>
+
+<file path=ppt/comments/modernComment_116_9D718DED.xml><?xml version="1.0" encoding="utf-8"?>
+<p188:cmLst xmlns:a="http://schemas.openxmlformats.org/drawingml/2006/main" xmlns:r="http://schemas.openxmlformats.org/officeDocument/2006/relationships" xmlns:p188="http://schemas.microsoft.com/office/powerpoint/2018/8/main">
+  <p188:cm id="{4624A432-E714-704A-91D8-E4A8019E62C5}" authorId="{8860045D-B334-310D-0A4E-9E20AA0B149E}" created="2026-01-02T21:09:18.585">
+    <pc:sldMkLst xmlns:pc="http://schemas.microsoft.com/office/powerpoint/2013/main/command">
+      <pc:docMk/>
+      <pc:sldMk cId="2641464813" sldId="278"/>
+    </pc:sldMkLst>
+    <p188:txBody>
+      <a:bodyPr/>
+      <a:lstStyle/>
+      <a:p>
+        <a:r>
+          <a:rPr lang="en-DE"/>
+          <a:t>Subscribe for more Clean Code tips!
+</a:t>
+        </a:r>
+      </a:p>
+    </p188:txBody>
+  </p188:cm>
+  <p188:cm id="{BD450650-0826-3F40-866F-BB5FA42A6E60}" authorId="{8860045D-B334-310D-0A4E-9E20AA0B149E}" created="2026-01-03T02:36:43.451">
+    <pc:sldMkLst xmlns:pc="http://schemas.microsoft.com/office/powerpoint/2013/main/command">
+      <pc:docMk/>
+      <pc:sldMk cId="2641464813" sldId="278"/>
+    </pc:sldMkLst>
+    <p188:txBody>
+      <a:bodyPr/>
+      <a:lstStyle/>
+      <a:p>
+        <a:r>
+          <a:rPr lang="en-DE"/>
+          <a:t>Youtube
+Ever wondered what those double underscores (Dunders) actually do in Python? 🐍
+1️⃣ name: Tells you if the script is running directly or being imported.
+2️⃣ file: Gives you the exact location of your script on your computer. 
+3️⃣ package: Helps you understand where your module lives in a project.
+🇺🇸 Level up your Python skills! 🇩🇪 Python-Variablen einfach erklärt!
+#Python #CodingTips #Backend #SoftwareEngineering #Germany #USA #Deutschland #Programming #CodeWithEbrahim</a:t>
+        </a:r>
+      </a:p>
+    </p188:txBody>
+  </p188:cm>
+</p188:cmLst>
+</file>
+
 <file path=ppt/notesMasters/notesMaster1.xml><?xml version="1.0" encoding="utf-8"?>
 <p:notesMaster xmlns:a="http://schemas.openxmlformats.org/drawingml/2006/main" xmlns:r="http://schemas.openxmlformats.org/officeDocument/2006/relationships" xmlns:p="http://schemas.openxmlformats.org/presentationml/2006/main">
   <p:cSld>
@@ -1657,7 +1760,7 @@
 </file>
 
 <file path=ppt/slideLayouts/slideLayout2.xml><?xml version="1.0" encoding="utf-8"?>
-<p:sldLayout xmlns:a="http://schemas.openxmlformats.org/drawingml/2006/main" xmlns:r="http://schemas.openxmlformats.org/officeDocument/2006/relationships" xmlns:p="http://schemas.openxmlformats.org/presentationml/2006/main" type="obj" preserve="1">
+<p:sldLayout xmlns:a="http://schemas.openxmlformats.org/drawingml/2006/main" xmlns:r="http://schemas.openxmlformats.org/officeDocument/2006/relationships" xmlns:p="http://schemas.openxmlformats.org/presentationml/2006/main" preserve="1" userDrawn="1">
   <p:cSld name="Title and Content">
     <p:spTree>
       <p:nvGrpSpPr>
@@ -1675,7 +1778,229 @@
       </p:grpSpPr>
       <p:sp>
         <p:nvSpPr>
-          <p:cNvPr id="2" name="Title 1"/>
+          <p:cNvPr id="7" name="TextBox 6">
+            <a:extLst>
+              <a:ext uri="{FF2B5EF4-FFF2-40B4-BE49-F238E27FC236}">
+                <a16:creationId xmlns:a16="http://schemas.microsoft.com/office/drawing/2014/main" id="{582B4725-F1EC-C0BF-28F1-5FBD00F89475}"/>
+              </a:ext>
+            </a:extLst>
+          </p:cNvPr>
+          <p:cNvSpPr txBox="1"/>
+          <p:nvPr userDrawn="1"/>
+        </p:nvSpPr>
+        <p:spPr>
+          <a:xfrm>
+            <a:off x="2170229" y="1538168"/>
+            <a:ext cx="5944954" cy="923330"/>
+          </a:xfrm>
+          <a:prstGeom prst="rect">
+            <a:avLst/>
+          </a:prstGeom>
+          <a:noFill/>
+        </p:spPr>
+        <p:txBody>
+          <a:bodyPr wrap="square" rtlCol="0">
+            <a:spAutoFit/>
+          </a:bodyPr>
+          <a:lstStyle/>
+          <a:p>
+            <a:pPr algn="ctr"/>
+            <a:r>
+              <a:rPr lang="en-GB" sz="5400" b="1" dirty="0">
+                <a:ln/>
+                <a:latin typeface="+mj-lt"/>
+              </a:rPr>
+              <a:t>@</a:t>
+            </a:r>
+            <a:r>
+              <a:rPr lang="en-GB" sz="5400" b="1" dirty="0" err="1">
+                <a:ln/>
+                <a:latin typeface="+mj-lt"/>
+              </a:rPr>
+              <a:t>CodeWithEbrahim</a:t>
+            </a:r>
+            <a:endParaRPr lang="en-GB" sz="5400" b="1" dirty="0">
+              <a:ln/>
+              <a:latin typeface="+mj-lt"/>
+            </a:endParaRPr>
+          </a:p>
+        </p:txBody>
+      </p:sp>
+      <p:grpSp>
+        <p:nvGrpSpPr>
+          <p:cNvPr id="8" name="Group 7">
+            <a:extLst>
+              <a:ext uri="{FF2B5EF4-FFF2-40B4-BE49-F238E27FC236}">
+                <a16:creationId xmlns:a16="http://schemas.microsoft.com/office/drawing/2014/main" id="{58E2B3C5-12FB-9052-C5A5-A819EAF27AC1}"/>
+              </a:ext>
+            </a:extLst>
+          </p:cNvPr>
+          <p:cNvGrpSpPr/>
+          <p:nvPr userDrawn="1"/>
+        </p:nvGrpSpPr>
+        <p:grpSpPr>
+          <a:xfrm>
+            <a:off x="4153139" y="285709"/>
+            <a:ext cx="1979135" cy="925200"/>
+            <a:chOff x="4315976" y="15244200"/>
+            <a:chExt cx="1979135" cy="925200"/>
+          </a:xfrm>
+        </p:grpSpPr>
+        <p:pic>
+          <p:nvPicPr>
+            <p:cNvPr id="9" name="Picture 8">
+              <a:extLst>
+                <a:ext uri="{FF2B5EF4-FFF2-40B4-BE49-F238E27FC236}">
+                  <a16:creationId xmlns:a16="http://schemas.microsoft.com/office/drawing/2014/main" id="{34524E7D-1D75-8F90-E72A-A01BE2ADDFE0}"/>
+                </a:ext>
+              </a:extLst>
+            </p:cNvPr>
+            <p:cNvPicPr>
+              <a:picLocks noChangeAspect="1"/>
+            </p:cNvPicPr>
+            <p:nvPr/>
+          </p:nvPicPr>
+          <p:blipFill>
+            <a:blip r:embed="rId2"/>
+            <a:stretch>
+              <a:fillRect/>
+            </a:stretch>
+          </p:blipFill>
+          <p:spPr>
+            <a:xfrm>
+              <a:off x="5369911" y="15244200"/>
+              <a:ext cx="925200" cy="925200"/>
+            </a:xfrm>
+            <a:prstGeom prst="rect">
+              <a:avLst/>
+            </a:prstGeom>
+          </p:spPr>
+        </p:pic>
+        <p:pic>
+          <p:nvPicPr>
+            <p:cNvPr id="10" name="Picture 9">
+              <a:extLst>
+                <a:ext uri="{FF2B5EF4-FFF2-40B4-BE49-F238E27FC236}">
+                  <a16:creationId xmlns:a16="http://schemas.microsoft.com/office/drawing/2014/main" id="{A3FF6CE8-F094-62A9-F577-CE8ADDA4349A}"/>
+                </a:ext>
+              </a:extLst>
+            </p:cNvPr>
+            <p:cNvPicPr>
+              <a:picLocks noChangeAspect="1"/>
+            </p:cNvPicPr>
+            <p:nvPr/>
+          </p:nvPicPr>
+          <p:blipFill>
+            <a:blip r:embed="rId3"/>
+            <a:stretch>
+              <a:fillRect/>
+            </a:stretch>
+          </p:blipFill>
+          <p:spPr>
+            <a:xfrm>
+              <a:off x="4315976" y="15244200"/>
+              <a:ext cx="925200" cy="925200"/>
+            </a:xfrm>
+            <a:prstGeom prst="rect">
+              <a:avLst/>
+            </a:prstGeom>
+          </p:spPr>
+        </p:pic>
+      </p:grpSp>
+      <p:sp>
+        <p:nvSpPr>
+          <p:cNvPr id="12" name="Date Placeholder 11">
+            <a:extLst>
+              <a:ext uri="{FF2B5EF4-FFF2-40B4-BE49-F238E27FC236}">
+                <a16:creationId xmlns:a16="http://schemas.microsoft.com/office/drawing/2014/main" id="{B184EB1F-481A-B6D2-1817-1F871BD06A73}"/>
+              </a:ext>
+            </a:extLst>
+          </p:cNvPr>
+          <p:cNvSpPr>
+            <a:spLocks noGrp="1"/>
+          </p:cNvSpPr>
+          <p:nvPr>
+            <p:ph type="dt" sz="half" idx="10"/>
+          </p:nvPr>
+        </p:nvSpPr>
+        <p:spPr/>
+        <p:txBody>
+          <a:bodyPr/>
+          <a:lstStyle/>
+          <a:p>
+            <a:fld id="{48A87A34-81AB-432B-8DAE-1953F412C126}" type="datetimeFigureOut">
+              <a:rPr lang="en-US" smtClean="0"/>
+              <a:pPr/>
+              <a:t>1/3/26</a:t>
+            </a:fld>
+            <a:endParaRPr lang="en-US" dirty="0"/>
+          </a:p>
+        </p:txBody>
+      </p:sp>
+      <p:sp>
+        <p:nvSpPr>
+          <p:cNvPr id="13" name="Footer Placeholder 12">
+            <a:extLst>
+              <a:ext uri="{FF2B5EF4-FFF2-40B4-BE49-F238E27FC236}">
+                <a16:creationId xmlns:a16="http://schemas.microsoft.com/office/drawing/2014/main" id="{B97F9027-CC07-7360-7ADD-A8D8CE9A1E52}"/>
+              </a:ext>
+            </a:extLst>
+          </p:cNvPr>
+          <p:cNvSpPr>
+            <a:spLocks noGrp="1"/>
+          </p:cNvSpPr>
+          <p:nvPr>
+            <p:ph type="ftr" sz="quarter" idx="11"/>
+          </p:nvPr>
+        </p:nvSpPr>
+        <p:spPr/>
+        <p:txBody>
+          <a:bodyPr/>
+          <a:lstStyle/>
+          <a:p>
+            <a:endParaRPr lang="en-US" dirty="0"/>
+          </a:p>
+        </p:txBody>
+      </p:sp>
+      <p:sp>
+        <p:nvSpPr>
+          <p:cNvPr id="14" name="Slide Number Placeholder 13">
+            <a:extLst>
+              <a:ext uri="{FF2B5EF4-FFF2-40B4-BE49-F238E27FC236}">
+                <a16:creationId xmlns:a16="http://schemas.microsoft.com/office/drawing/2014/main" id="{025924C7-C2EA-D319-9523-271865881EE9}"/>
+              </a:ext>
+            </a:extLst>
+          </p:cNvPr>
+          <p:cNvSpPr>
+            <a:spLocks noGrp="1"/>
+          </p:cNvSpPr>
+          <p:nvPr>
+            <p:ph type="sldNum" sz="quarter" idx="12"/>
+          </p:nvPr>
+        </p:nvSpPr>
+        <p:spPr/>
+        <p:txBody>
+          <a:bodyPr/>
+          <a:lstStyle/>
+          <a:p>
+            <a:fld id="{6D22F896-40B5-4ADD-8801-0D06FADFA095}" type="slidenum">
+              <a:rPr lang="en-US" smtClean="0"/>
+              <a:pPr/>
+              <a:t>‹#›</a:t>
+            </a:fld>
+            <a:endParaRPr lang="en-US" dirty="0"/>
+          </a:p>
+        </p:txBody>
+      </p:sp>
+      <p:sp>
+        <p:nvSpPr>
+          <p:cNvPr id="15" name="Title 14">
+            <a:extLst>
+              <a:ext uri="{FF2B5EF4-FFF2-40B4-BE49-F238E27FC236}">
+                <a16:creationId xmlns:a16="http://schemas.microsoft.com/office/drawing/2014/main" id="{42277F46-4348-5215-811D-6AD5B4DDAF29}"/>
+              </a:ext>
+            </a:extLst>
+          </p:cNvPr>
           <p:cNvSpPr>
             <a:spLocks noGrp="1"/>
           </p:cNvSpPr>
@@ -1692,124 +2017,7 @@
               <a:rPr lang="en-GB"/>
               <a:t>Click to edit Master title style</a:t>
             </a:r>
-            <a:endParaRPr lang="en-US" dirty="0"/>
-          </a:p>
-        </p:txBody>
-      </p:sp>
-      <p:sp>
-        <p:nvSpPr>
-          <p:cNvPr id="3" name="Content Placeholder 2"/>
-          <p:cNvSpPr>
-            <a:spLocks noGrp="1"/>
-          </p:cNvSpPr>
-          <p:nvPr>
-            <p:ph idx="1"/>
-          </p:nvPr>
-        </p:nvSpPr>
-        <p:spPr/>
-        <p:txBody>
-          <a:bodyPr/>
-          <a:lstStyle/>
-          <a:p>
-            <a:pPr lvl="0"/>
-            <a:r>
-              <a:rPr lang="en-GB"/>
-              <a:t>Click to edit Master text styles</a:t>
-            </a:r>
-          </a:p>
-          <a:p>
-            <a:pPr lvl="1"/>
-            <a:r>
-              <a:rPr lang="en-GB"/>
-              <a:t>Second level</a:t>
-            </a:r>
-          </a:p>
-          <a:p>
-            <a:pPr lvl="2"/>
-            <a:r>
-              <a:rPr lang="en-GB"/>
-              <a:t>Third level</a:t>
-            </a:r>
-          </a:p>
-          <a:p>
-            <a:pPr lvl="3"/>
-            <a:r>
-              <a:rPr lang="en-GB"/>
-              <a:t>Fourth level</a:t>
-            </a:r>
-          </a:p>
-          <a:p>
-            <a:pPr lvl="4"/>
-            <a:r>
-              <a:rPr lang="en-GB"/>
-              <a:t>Fifth level</a:t>
-            </a:r>
-            <a:endParaRPr lang="en-US" dirty="0"/>
-          </a:p>
-        </p:txBody>
-      </p:sp>
-      <p:sp>
-        <p:nvSpPr>
-          <p:cNvPr id="4" name="Date Placeholder 3"/>
-          <p:cNvSpPr>
-            <a:spLocks noGrp="1"/>
-          </p:cNvSpPr>
-          <p:nvPr>
-            <p:ph type="dt" sz="half" idx="10"/>
-          </p:nvPr>
-        </p:nvSpPr>
-        <p:spPr/>
-        <p:txBody>
-          <a:bodyPr/>
-          <a:lstStyle/>
-          <a:p>
-            <a:fld id="{48A87A34-81AB-432B-8DAE-1953F412C126}" type="datetimeFigureOut">
-              <a:rPr lang="en-US" smtClean="0"/>
-              <a:t>12/28/25</a:t>
-            </a:fld>
-            <a:endParaRPr lang="en-US" dirty="0"/>
-          </a:p>
-        </p:txBody>
-      </p:sp>
-      <p:sp>
-        <p:nvSpPr>
-          <p:cNvPr id="5" name="Footer Placeholder 4"/>
-          <p:cNvSpPr>
-            <a:spLocks noGrp="1"/>
-          </p:cNvSpPr>
-          <p:nvPr>
-            <p:ph type="ftr" sz="quarter" idx="11"/>
-          </p:nvPr>
-        </p:nvSpPr>
-        <p:spPr/>
-        <p:txBody>
-          <a:bodyPr/>
-          <a:lstStyle/>
-          <a:p>
-            <a:endParaRPr lang="en-US" dirty="0"/>
-          </a:p>
-        </p:txBody>
-      </p:sp>
-      <p:sp>
-        <p:nvSpPr>
-          <p:cNvPr id="6" name="Slide Number Placeholder 5"/>
-          <p:cNvSpPr>
-            <a:spLocks noGrp="1"/>
-          </p:cNvSpPr>
-          <p:nvPr>
-            <p:ph type="sldNum" sz="quarter" idx="12"/>
-          </p:nvPr>
-        </p:nvSpPr>
-        <p:spPr/>
-        <p:txBody>
-          <a:bodyPr/>
-          <a:lstStyle/>
-          <a:p>
-            <a:fld id="{6D22F896-40B5-4ADD-8801-0D06FADFA095}" type="slidenum">
-              <a:rPr lang="en-US" smtClean="0"/>
-              <a:t>‹#›</a:t>
-            </a:fld>
-            <a:endParaRPr lang="en-US" dirty="0"/>
+            <a:endParaRPr lang="en-DE"/>
           </a:p>
         </p:txBody>
       </p:sp>
@@ -1823,6 +2031,22 @@
   <p:clrMapOvr>
     <a:masterClrMapping/>
   </p:clrMapOvr>
+  <p:extLst>
+    <p:ext uri="{DCECCB84-F9BA-43D5-87BE-67443E8EF086}">
+      <p15:sldGuideLst xmlns:p15="http://schemas.microsoft.com/office/powerpoint/2012/main">
+        <p15:guide id="1" orient="horz" pos="5760" userDrawn="1">
+          <p15:clr>
+            <a:srgbClr val="FBAE40"/>
+          </p15:clr>
+        </p15:guide>
+        <p15:guide id="2" pos="3239" userDrawn="1">
+          <p15:clr>
+            <a:srgbClr val="FBAE40"/>
+          </p15:clr>
+        </p15:guide>
+      </p15:sldGuideLst>
+    </p:ext>
+  </p:extLst>
 </p:sldLayout>
 </file>
 
@@ -4052,8 +4276,8 @@
         </p:nvSpPr>
         <p:spPr>
           <a:xfrm>
-            <a:off x="0" y="304800"/>
-            <a:ext cx="10285413" cy="9694962"/>
+            <a:off x="414066" y="2702943"/>
+            <a:ext cx="9647058" cy="9694962"/>
           </a:xfrm>
           <a:prstGeom prst="rect">
             <a:avLst/>
@@ -4150,6 +4374,2096 @@
     <p:extLst>
       <p:ext uri="{BB962C8B-B14F-4D97-AF65-F5344CB8AC3E}">
         <p14:creationId xmlns:p14="http://schemas.microsoft.com/office/powerpoint/2010/main" val="2439709730"/>
+      </p:ext>
+    </p:extLst>
+  </p:cSld>
+  <p:clrMapOvr>
+    <a:masterClrMapping/>
+  </p:clrMapOvr>
+</p:sld>
+</file>
+
+<file path=ppt/slides/slide10.xml><?xml version="1.0" encoding="utf-8"?>
+<p:sld xmlns:a="http://schemas.openxmlformats.org/drawingml/2006/main" xmlns:r="http://schemas.openxmlformats.org/officeDocument/2006/relationships" xmlns:p="http://schemas.openxmlformats.org/presentationml/2006/main">
+  <p:cSld>
+    <p:bg>
+      <p:bgPr>
+        <a:pattFill prst="pct5">
+          <a:fgClr>
+            <a:schemeClr val="accent2"/>
+          </a:fgClr>
+          <a:bgClr>
+            <a:schemeClr val="bg1"/>
+          </a:bgClr>
+        </a:pattFill>
+        <a:effectLst/>
+      </p:bgPr>
+    </p:bg>
+    <p:spTree>
+      <p:nvGrpSpPr>
+        <p:cNvPr id="1" name=""/>
+        <p:cNvGrpSpPr/>
+        <p:nvPr/>
+      </p:nvGrpSpPr>
+      <p:grpSpPr>
+        <a:xfrm>
+          <a:off x="0" y="0"/>
+          <a:ext cx="0" cy="0"/>
+          <a:chOff x="0" y="0"/>
+          <a:chExt cx="0" cy="0"/>
+        </a:xfrm>
+      </p:grpSpPr>
+      <p:grpSp>
+        <p:nvGrpSpPr>
+          <p:cNvPr id="38" name="Group 37">
+            <a:extLst>
+              <a:ext uri="{FF2B5EF4-FFF2-40B4-BE49-F238E27FC236}">
+                <a16:creationId xmlns:a16="http://schemas.microsoft.com/office/drawing/2014/main" id="{C989A062-81D4-7FA9-5D3B-97D7C84260BF}"/>
+              </a:ext>
+            </a:extLst>
+          </p:cNvPr>
+          <p:cNvGrpSpPr/>
+          <p:nvPr/>
+        </p:nvGrpSpPr>
+        <p:grpSpPr>
+          <a:xfrm>
+            <a:off x="192450" y="4313208"/>
+            <a:ext cx="9900512" cy="5656922"/>
+            <a:chOff x="155122" y="4313208"/>
+            <a:chExt cx="9900512" cy="5656922"/>
+          </a:xfrm>
+        </p:grpSpPr>
+        <p:pic>
+          <p:nvPicPr>
+            <p:cNvPr id="27" name="Picture 26">
+              <a:extLst>
+                <a:ext uri="{FF2B5EF4-FFF2-40B4-BE49-F238E27FC236}">
+                  <a16:creationId xmlns:a16="http://schemas.microsoft.com/office/drawing/2014/main" id="{5755EB69-8332-046F-562A-CD322CED908E}"/>
+                </a:ext>
+              </a:extLst>
+            </p:cNvPr>
+            <p:cNvPicPr>
+              <a:picLocks noChangeAspect="1"/>
+            </p:cNvPicPr>
+            <p:nvPr/>
+          </p:nvPicPr>
+          <p:blipFill rotWithShape="1">
+            <a:blip r:embed="rId3"/>
+            <a:srcRect l="15798" t="24886" r="9749" b="14308"/>
+            <a:stretch>
+              <a:fillRect/>
+            </a:stretch>
+          </p:blipFill>
+          <p:spPr>
+            <a:xfrm>
+              <a:off x="155276" y="4313208"/>
+              <a:ext cx="9900358" cy="5656922"/>
+            </a:xfrm>
+            <a:prstGeom prst="rect">
+              <a:avLst/>
+            </a:prstGeom>
+          </p:spPr>
+        </p:pic>
+        <p:pic>
+          <p:nvPicPr>
+            <p:cNvPr id="28" name="Picture 27">
+              <a:extLst>
+                <a:ext uri="{FF2B5EF4-FFF2-40B4-BE49-F238E27FC236}">
+                  <a16:creationId xmlns:a16="http://schemas.microsoft.com/office/drawing/2014/main" id="{E405CAD7-F4B0-7F74-1DFC-8CF2E970C000}"/>
+                </a:ext>
+              </a:extLst>
+            </p:cNvPr>
+            <p:cNvPicPr>
+              <a:picLocks noChangeAspect="1"/>
+            </p:cNvPicPr>
+            <p:nvPr/>
+          </p:nvPicPr>
+          <p:blipFill>
+            <a:blip r:embed="rId4"/>
+            <a:stretch>
+              <a:fillRect/>
+            </a:stretch>
+          </p:blipFill>
+          <p:spPr>
+            <a:xfrm>
+              <a:off x="8919562" y="8805718"/>
+              <a:ext cx="1063167" cy="1063167"/>
+            </a:xfrm>
+            <a:prstGeom prst="rect">
+              <a:avLst/>
+            </a:prstGeom>
+          </p:spPr>
+        </p:pic>
+        <p:pic>
+          <p:nvPicPr>
+            <p:cNvPr id="29" name="Graphic 28" descr="Shield Tick with solid fill">
+              <a:extLst>
+                <a:ext uri="{FF2B5EF4-FFF2-40B4-BE49-F238E27FC236}">
+                  <a16:creationId xmlns:a16="http://schemas.microsoft.com/office/drawing/2014/main" id="{0CCABDA1-4CCF-B503-8099-FFC57C1D9531}"/>
+                </a:ext>
+              </a:extLst>
+            </p:cNvPr>
+            <p:cNvPicPr>
+              <a:picLocks noChangeAspect="1"/>
+            </p:cNvPicPr>
+            <p:nvPr/>
+          </p:nvPicPr>
+          <p:blipFill>
+            <a:blip r:embed="rId5">
+              <a:extLst>
+                <a:ext uri="{96DAC541-7B7A-43D3-8B79-37D633B846F1}">
+                  <asvg:svgBlip xmlns:asvg="http://schemas.microsoft.com/office/drawing/2016/SVG/main" r:embed="rId6"/>
+                </a:ext>
+              </a:extLst>
+            </a:blip>
+            <a:stretch>
+              <a:fillRect/>
+            </a:stretch>
+          </p:blipFill>
+          <p:spPr>
+            <a:xfrm>
+              <a:off x="6132274" y="6762284"/>
+              <a:ext cx="914400" cy="914400"/>
+            </a:xfrm>
+            <a:prstGeom prst="rect">
+              <a:avLst/>
+            </a:prstGeom>
+          </p:spPr>
+        </p:pic>
+        <p:pic>
+          <p:nvPicPr>
+            <p:cNvPr id="30" name="Graphic 29" descr="Close with solid fill">
+              <a:extLst>
+                <a:ext uri="{FF2B5EF4-FFF2-40B4-BE49-F238E27FC236}">
+                  <a16:creationId xmlns:a16="http://schemas.microsoft.com/office/drawing/2014/main" id="{14362FE8-9002-3D9A-71C4-9C9B4C882117}"/>
+                </a:ext>
+              </a:extLst>
+            </p:cNvPr>
+            <p:cNvPicPr>
+              <a:picLocks noChangeAspect="1"/>
+            </p:cNvPicPr>
+            <p:nvPr/>
+          </p:nvPicPr>
+          <p:blipFill>
+            <a:blip r:embed="rId7">
+              <a:extLst>
+                <a:ext uri="{96DAC541-7B7A-43D3-8B79-37D633B846F1}">
+                  <asvg:svgBlip xmlns:asvg="http://schemas.microsoft.com/office/drawing/2016/SVG/main" r:embed="rId8"/>
+                </a:ext>
+              </a:extLst>
+            </a:blip>
+            <a:stretch>
+              <a:fillRect/>
+            </a:stretch>
+          </p:blipFill>
+          <p:spPr>
+            <a:xfrm>
+              <a:off x="6132274" y="4549278"/>
+              <a:ext cx="914400" cy="914400"/>
+            </a:xfrm>
+            <a:prstGeom prst="rect">
+              <a:avLst/>
+            </a:prstGeom>
+          </p:spPr>
+        </p:pic>
+        <p:cxnSp>
+          <p:nvCxnSpPr>
+            <p:cNvPr id="31" name="Straight Connector 30">
+              <a:extLst>
+                <a:ext uri="{FF2B5EF4-FFF2-40B4-BE49-F238E27FC236}">
+                  <a16:creationId xmlns:a16="http://schemas.microsoft.com/office/drawing/2014/main" id="{E3F613E7-6697-4EC0-8464-6D3C267DD305}"/>
+                </a:ext>
+              </a:extLst>
+            </p:cNvPr>
+            <p:cNvCxnSpPr>
+              <a:cxnSpLocks/>
+            </p:cNvCxnSpPr>
+            <p:nvPr/>
+          </p:nvCxnSpPr>
+          <p:spPr>
+            <a:xfrm>
+              <a:off x="155122" y="8693061"/>
+              <a:ext cx="9883259" cy="0"/>
+            </a:xfrm>
+            <a:prstGeom prst="line">
+              <a:avLst/>
+            </a:prstGeom>
+            <a:ln w="41275">
+              <a:solidFill>
+                <a:schemeClr val="bg1"/>
+              </a:solidFill>
+              <a:headEnd type="none"/>
+              <a:tailEnd type="none" w="lg" len="lg"/>
+            </a:ln>
+          </p:spPr>
+          <p:style>
+            <a:lnRef idx="1">
+              <a:schemeClr val="accent1"/>
+            </a:lnRef>
+            <a:fillRef idx="0">
+              <a:schemeClr val="accent1"/>
+            </a:fillRef>
+            <a:effectRef idx="0">
+              <a:schemeClr val="accent1"/>
+            </a:effectRef>
+            <a:fontRef idx="minor">
+              <a:schemeClr val="tx1"/>
+            </a:fontRef>
+          </p:style>
+        </p:cxnSp>
+        <p:cxnSp>
+          <p:nvCxnSpPr>
+            <p:cNvPr id="33" name="Straight Connector 32">
+              <a:extLst>
+                <a:ext uri="{FF2B5EF4-FFF2-40B4-BE49-F238E27FC236}">
+                  <a16:creationId xmlns:a16="http://schemas.microsoft.com/office/drawing/2014/main" id="{51B4CE6B-B7C7-47AA-F8CD-6C0FAC4DA742}"/>
+                </a:ext>
+              </a:extLst>
+            </p:cNvPr>
+            <p:cNvCxnSpPr>
+              <a:cxnSpLocks/>
+            </p:cNvCxnSpPr>
+            <p:nvPr/>
+          </p:nvCxnSpPr>
+          <p:spPr>
+            <a:xfrm>
+              <a:off x="169498" y="6550836"/>
+              <a:ext cx="9883259" cy="0"/>
+            </a:xfrm>
+            <a:prstGeom prst="line">
+              <a:avLst/>
+            </a:prstGeom>
+            <a:ln w="41275">
+              <a:solidFill>
+                <a:schemeClr val="bg1"/>
+              </a:solidFill>
+              <a:headEnd type="none"/>
+              <a:tailEnd type="none" w="lg" len="lg"/>
+            </a:ln>
+          </p:spPr>
+          <p:style>
+            <a:lnRef idx="1">
+              <a:schemeClr val="accent1"/>
+            </a:lnRef>
+            <a:fillRef idx="0">
+              <a:schemeClr val="accent1"/>
+            </a:fillRef>
+            <a:effectRef idx="0">
+              <a:schemeClr val="accent1"/>
+            </a:effectRef>
+            <a:fontRef idx="minor">
+              <a:schemeClr val="tx1"/>
+            </a:fontRef>
+          </p:style>
+        </p:cxnSp>
+      </p:grpSp>
+      <p:sp>
+        <p:nvSpPr>
+          <p:cNvPr id="34" name="TextBox 33">
+            <a:extLst>
+              <a:ext uri="{FF2B5EF4-FFF2-40B4-BE49-F238E27FC236}">
+                <a16:creationId xmlns:a16="http://schemas.microsoft.com/office/drawing/2014/main" id="{F7F61470-5978-9741-C789-354D64372206}"/>
+              </a:ext>
+            </a:extLst>
+          </p:cNvPr>
+          <p:cNvSpPr txBox="1"/>
+          <p:nvPr/>
+        </p:nvSpPr>
+        <p:spPr>
+          <a:xfrm>
+            <a:off x="229149" y="3442094"/>
+            <a:ext cx="9827115" cy="769441"/>
+          </a:xfrm>
+          <a:prstGeom prst="rect">
+            <a:avLst/>
+          </a:prstGeom>
+          <a:ln/>
+        </p:spPr>
+        <p:style>
+          <a:lnRef idx="1">
+            <a:schemeClr val="accent6"/>
+          </a:lnRef>
+          <a:fillRef idx="2">
+            <a:schemeClr val="accent6"/>
+          </a:fillRef>
+          <a:effectRef idx="1">
+            <a:schemeClr val="accent6"/>
+          </a:effectRef>
+          <a:fontRef idx="minor">
+            <a:schemeClr val="dk1"/>
+          </a:fontRef>
+        </p:style>
+        <p:txBody>
+          <a:bodyPr wrap="square" rtlCol="0">
+            <a:spAutoFit/>
+          </a:bodyPr>
+          <a:lstStyle/>
+          <a:p>
+            <a:pPr algn="ctr"/>
+            <a:r>
+              <a:rPr lang="en-GB" sz="4400" dirty="0"/>
+              <a:t>Print is for YOU, Raise is for your CODE!</a:t>
+            </a:r>
+            <a:endParaRPr lang="en-DE" sz="4400" dirty="0">
+              <a:solidFill>
+                <a:srgbClr val="002060"/>
+              </a:solidFill>
+              <a:latin typeface="Patrick Hand" pitchFamily="2" charset="77"/>
+            </a:endParaRPr>
+          </a:p>
+        </p:txBody>
+      </p:sp>
+      <p:pic>
+        <p:nvPicPr>
+          <p:cNvPr id="36" name="Picture 35">
+            <a:extLst>
+              <a:ext uri="{FF2B5EF4-FFF2-40B4-BE49-F238E27FC236}">
+                <a16:creationId xmlns:a16="http://schemas.microsoft.com/office/drawing/2014/main" id="{66BE1470-D54F-6F8F-1C68-D491E457AF5A}"/>
+              </a:ext>
+            </a:extLst>
+          </p:cNvPr>
+          <p:cNvPicPr>
+            <a:picLocks noChangeAspect="1"/>
+          </p:cNvPicPr>
+          <p:nvPr/>
+        </p:nvPicPr>
+        <p:blipFill>
+          <a:blip r:embed="rId9"/>
+          <a:stretch>
+            <a:fillRect/>
+          </a:stretch>
+        </p:blipFill>
+        <p:spPr>
+          <a:xfrm>
+            <a:off x="190906" y="10757495"/>
+            <a:ext cx="9903600" cy="1722364"/>
+          </a:xfrm>
+          <a:prstGeom prst="rect">
+            <a:avLst/>
+          </a:prstGeom>
+        </p:spPr>
+      </p:pic>
+      <p:sp>
+        <p:nvSpPr>
+          <p:cNvPr id="37" name="TextBox 36">
+            <a:extLst>
+              <a:ext uri="{FF2B5EF4-FFF2-40B4-BE49-F238E27FC236}">
+                <a16:creationId xmlns:a16="http://schemas.microsoft.com/office/drawing/2014/main" id="{525B6729-E387-A933-1E10-01ACD25E6653}"/>
+              </a:ext>
+            </a:extLst>
+          </p:cNvPr>
+          <p:cNvSpPr txBox="1"/>
+          <p:nvPr/>
+        </p:nvSpPr>
+        <p:spPr>
+          <a:xfrm>
+            <a:off x="183193" y="10081029"/>
+            <a:ext cx="9827115" cy="646331"/>
+          </a:xfrm>
+          <a:prstGeom prst="rect">
+            <a:avLst/>
+          </a:prstGeom>
+          <a:noFill/>
+          <a:ln>
+            <a:noFill/>
+          </a:ln>
+        </p:spPr>
+        <p:style>
+          <a:lnRef idx="0">
+            <a:scrgbClr r="0" g="0" b="0"/>
+          </a:lnRef>
+          <a:fillRef idx="0">
+            <a:scrgbClr r="0" g="0" b="0"/>
+          </a:fillRef>
+          <a:effectRef idx="0">
+            <a:scrgbClr r="0" g="0" b="0"/>
+          </a:effectRef>
+          <a:fontRef idx="minor">
+            <a:schemeClr val="dk1"/>
+          </a:fontRef>
+        </p:style>
+        <p:txBody>
+          <a:bodyPr wrap="square" rtlCol="0">
+            <a:spAutoFit/>
+          </a:bodyPr>
+          <a:lstStyle/>
+          <a:p>
+            <a:r>
+              <a:rPr lang="en-DE" sz="3600" dirty="0">
+                <a:solidFill>
+                  <a:schemeClr val="tx1"/>
+                </a:solidFill>
+                <a:latin typeface="Patrick Hand" pitchFamily="2" charset="77"/>
+              </a:rPr>
+              <a:t>Output</a:t>
+            </a:r>
+          </a:p>
+        </p:txBody>
+      </p:sp>
+    </p:spTree>
+    <p:extLst>
+      <p:ext uri="{BB962C8B-B14F-4D97-AF65-F5344CB8AC3E}">
+        <p14:creationId xmlns:p14="http://schemas.microsoft.com/office/powerpoint/2010/main" val="2632176252"/>
+      </p:ext>
+    </p:extLst>
+  </p:cSld>
+  <p:clrMapOvr>
+    <a:masterClrMapping/>
+  </p:clrMapOvr>
+  <p:extLst>
+    <p:ext uri="{6950BFC3-D8DA-4A85-94F7-54DA5524770B}">
+      <p188:commentRel xmlns:p188="http://schemas.microsoft.com/office/powerpoint/2018/8/main" r:id="rId2"/>
+    </p:ext>
+  </p:extLst>
+</p:sld>
+</file>
+
+<file path=ppt/slides/slide11.xml><?xml version="1.0" encoding="utf-8"?>
+<p:sld xmlns:a="http://schemas.openxmlformats.org/drawingml/2006/main" xmlns:r="http://schemas.openxmlformats.org/officeDocument/2006/relationships" xmlns:p="http://schemas.openxmlformats.org/presentationml/2006/main">
+  <p:cSld>
+    <p:bg>
+      <p:bgPr>
+        <a:pattFill prst="smConfetti">
+          <a:fgClr>
+            <a:schemeClr val="accent2"/>
+          </a:fgClr>
+          <a:bgClr>
+            <a:schemeClr val="bg1"/>
+          </a:bgClr>
+        </a:pattFill>
+        <a:effectLst/>
+      </p:bgPr>
+    </p:bg>
+    <p:spTree>
+      <p:nvGrpSpPr>
+        <p:cNvPr id="1" name=""/>
+        <p:cNvGrpSpPr/>
+        <p:nvPr/>
+      </p:nvGrpSpPr>
+      <p:grpSpPr>
+        <a:xfrm>
+          <a:off x="0" y="0"/>
+          <a:ext cx="0" cy="0"/>
+          <a:chOff x="0" y="0"/>
+          <a:chExt cx="0" cy="0"/>
+        </a:xfrm>
+      </p:grpSpPr>
+      <p:sp>
+        <p:nvSpPr>
+          <p:cNvPr id="5" name="TextBox 4">
+            <a:extLst>
+              <a:ext uri="{FF2B5EF4-FFF2-40B4-BE49-F238E27FC236}">
+                <a16:creationId xmlns:a16="http://schemas.microsoft.com/office/drawing/2014/main" id="{BA5D077D-CD3B-2596-C167-87FF71AC3F96}"/>
+              </a:ext>
+            </a:extLst>
+          </p:cNvPr>
+          <p:cNvSpPr txBox="1"/>
+          <p:nvPr/>
+        </p:nvSpPr>
+        <p:spPr>
+          <a:xfrm>
+            <a:off x="2170229" y="1538168"/>
+            <a:ext cx="5944954" cy="923330"/>
+          </a:xfrm>
+          <a:prstGeom prst="rect">
+            <a:avLst/>
+          </a:prstGeom>
+          <a:noFill/>
+        </p:spPr>
+        <p:txBody>
+          <a:bodyPr wrap="square" rtlCol="0">
+            <a:spAutoFit/>
+          </a:bodyPr>
+          <a:lstStyle/>
+          <a:p>
+            <a:pPr algn="ctr"/>
+            <a:r>
+              <a:rPr lang="en-GB" sz="5400" b="1" dirty="0">
+                <a:ln/>
+                <a:latin typeface="+mj-lt"/>
+              </a:rPr>
+              <a:t>@</a:t>
+            </a:r>
+            <a:r>
+              <a:rPr lang="en-GB" sz="5400" b="1" dirty="0" err="1">
+                <a:ln/>
+                <a:latin typeface="+mj-lt"/>
+              </a:rPr>
+              <a:t>CodeWithEbrahim</a:t>
+            </a:r>
+            <a:endParaRPr lang="en-GB" sz="5400" b="1" dirty="0">
+              <a:ln/>
+              <a:latin typeface="+mj-lt"/>
+            </a:endParaRPr>
+          </a:p>
+        </p:txBody>
+      </p:sp>
+      <p:grpSp>
+        <p:nvGrpSpPr>
+          <p:cNvPr id="6" name="Group 5">
+            <a:extLst>
+              <a:ext uri="{FF2B5EF4-FFF2-40B4-BE49-F238E27FC236}">
+                <a16:creationId xmlns:a16="http://schemas.microsoft.com/office/drawing/2014/main" id="{70DC9F19-7314-279A-182A-2FAC4145BABA}"/>
+              </a:ext>
+            </a:extLst>
+          </p:cNvPr>
+          <p:cNvGrpSpPr/>
+          <p:nvPr/>
+        </p:nvGrpSpPr>
+        <p:grpSpPr>
+          <a:xfrm>
+            <a:off x="4153139" y="285709"/>
+            <a:ext cx="1979135" cy="925200"/>
+            <a:chOff x="4315976" y="15244200"/>
+            <a:chExt cx="1979135" cy="925200"/>
+          </a:xfrm>
+        </p:grpSpPr>
+        <p:pic>
+          <p:nvPicPr>
+            <p:cNvPr id="7" name="Picture 6">
+              <a:extLst>
+                <a:ext uri="{FF2B5EF4-FFF2-40B4-BE49-F238E27FC236}">
+                  <a16:creationId xmlns:a16="http://schemas.microsoft.com/office/drawing/2014/main" id="{2F1D7D9B-24E8-EF51-6F2B-6644446DAA31}"/>
+                </a:ext>
+              </a:extLst>
+            </p:cNvPr>
+            <p:cNvPicPr>
+              <a:picLocks noChangeAspect="1"/>
+            </p:cNvPicPr>
+            <p:nvPr/>
+          </p:nvPicPr>
+          <p:blipFill>
+            <a:blip r:embed="rId3"/>
+            <a:stretch>
+              <a:fillRect/>
+            </a:stretch>
+          </p:blipFill>
+          <p:spPr>
+            <a:xfrm>
+              <a:off x="5369911" y="15244200"/>
+              <a:ext cx="925200" cy="925200"/>
+            </a:xfrm>
+            <a:prstGeom prst="rect">
+              <a:avLst/>
+            </a:prstGeom>
+          </p:spPr>
+        </p:pic>
+        <p:pic>
+          <p:nvPicPr>
+            <p:cNvPr id="8" name="Picture 7">
+              <a:extLst>
+                <a:ext uri="{FF2B5EF4-FFF2-40B4-BE49-F238E27FC236}">
+                  <a16:creationId xmlns:a16="http://schemas.microsoft.com/office/drawing/2014/main" id="{DC14211A-2572-ACC1-2CBC-A47458A5B4A6}"/>
+                </a:ext>
+              </a:extLst>
+            </p:cNvPr>
+            <p:cNvPicPr>
+              <a:picLocks noChangeAspect="1"/>
+            </p:cNvPicPr>
+            <p:nvPr/>
+          </p:nvPicPr>
+          <p:blipFill>
+            <a:blip r:embed="rId4"/>
+            <a:stretch>
+              <a:fillRect/>
+            </a:stretch>
+          </p:blipFill>
+          <p:spPr>
+            <a:xfrm>
+              <a:off x="4315976" y="15244200"/>
+              <a:ext cx="925200" cy="925200"/>
+            </a:xfrm>
+            <a:prstGeom prst="rect">
+              <a:avLst/>
+            </a:prstGeom>
+          </p:spPr>
+        </p:pic>
+      </p:grpSp>
+      <p:sp>
+        <p:nvSpPr>
+          <p:cNvPr id="9" name="Right Arrow 8">
+            <a:extLst>
+              <a:ext uri="{FF2B5EF4-FFF2-40B4-BE49-F238E27FC236}">
+                <a16:creationId xmlns:a16="http://schemas.microsoft.com/office/drawing/2014/main" id="{6D1AAAEE-0C0E-C465-D0BA-EF033B7257D6}"/>
+              </a:ext>
+            </a:extLst>
+          </p:cNvPr>
+          <p:cNvSpPr/>
+          <p:nvPr/>
+        </p:nvSpPr>
+        <p:spPr>
+          <a:xfrm>
+            <a:off x="2895857" y="11520905"/>
+            <a:ext cx="1639019" cy="293298"/>
+          </a:xfrm>
+          <a:prstGeom prst="rightArrow">
+            <a:avLst/>
+          </a:prstGeom>
+          <a:solidFill>
+            <a:srgbClr val="FF0000"/>
+          </a:solidFill>
+          <a:ln w="31750">
+            <a:solidFill>
+              <a:schemeClr val="accent1">
+                <a:shade val="15000"/>
+              </a:schemeClr>
+            </a:solidFill>
+          </a:ln>
+        </p:spPr>
+        <p:style>
+          <a:lnRef idx="2">
+            <a:schemeClr val="accent1">
+              <a:shade val="15000"/>
+            </a:schemeClr>
+          </a:lnRef>
+          <a:fillRef idx="1">
+            <a:schemeClr val="accent1"/>
+          </a:fillRef>
+          <a:effectRef idx="0">
+            <a:schemeClr val="accent1"/>
+          </a:effectRef>
+          <a:fontRef idx="minor">
+            <a:schemeClr val="lt1"/>
+          </a:fontRef>
+        </p:style>
+        <p:txBody>
+          <a:bodyPr rtlCol="0" anchor="ctr"/>
+          <a:lstStyle/>
+          <a:p>
+            <a:pPr marL="0" algn="ctr" defTabSz="457200" rtl="0" eaLnBrk="1" latinLnBrk="0" hangingPunct="1"/>
+            <a:endParaRPr lang="en-DE" b="1" dirty="0">
+              <a:ln w="22225">
+                <a:solidFill>
+                  <a:schemeClr val="accent2"/>
+                </a:solidFill>
+                <a:prstDash val="solid"/>
+              </a:ln>
+              <a:solidFill>
+                <a:srgbClr val="C00000"/>
+              </a:solidFill>
+              <a:latin typeface="Patrick Hand" pitchFamily="2" charset="77"/>
+            </a:endParaRPr>
+          </a:p>
+        </p:txBody>
+      </p:sp>
+      <p:sp>
+        <p:nvSpPr>
+          <p:cNvPr id="11" name="TextBox 10">
+            <a:extLst>
+              <a:ext uri="{FF2B5EF4-FFF2-40B4-BE49-F238E27FC236}">
+                <a16:creationId xmlns:a16="http://schemas.microsoft.com/office/drawing/2014/main" id="{E832EE6B-9F95-6B10-FE37-021FF9EB4ECA}"/>
+              </a:ext>
+            </a:extLst>
+          </p:cNvPr>
+          <p:cNvSpPr txBox="1"/>
+          <p:nvPr/>
+        </p:nvSpPr>
+        <p:spPr>
+          <a:xfrm>
+            <a:off x="276045" y="11313869"/>
+            <a:ext cx="2124299" cy="646331"/>
+          </a:xfrm>
+          <a:prstGeom prst="rect">
+            <a:avLst/>
+          </a:prstGeom>
+          <a:noFill/>
+        </p:spPr>
+        <p:txBody>
+          <a:bodyPr wrap="none" rtlCol="0">
+            <a:spAutoFit/>
+          </a:bodyPr>
+          <a:lstStyle/>
+          <a:p>
+            <a:r>
+              <a:rPr lang="en-DE" sz="3600" dirty="0">
+                <a:latin typeface="Patrick Hand" pitchFamily="2" charset="77"/>
+              </a:rPr>
+              <a:t>__name__</a:t>
+            </a:r>
+          </a:p>
+        </p:txBody>
+      </p:sp>
+      <p:sp>
+        <p:nvSpPr>
+          <p:cNvPr id="12" name="TextBox 11">
+            <a:extLst>
+              <a:ext uri="{FF2B5EF4-FFF2-40B4-BE49-F238E27FC236}">
+                <a16:creationId xmlns:a16="http://schemas.microsoft.com/office/drawing/2014/main" id="{CACCF012-097C-7EA9-8F50-D5B87AEF56C9}"/>
+              </a:ext>
+            </a:extLst>
+          </p:cNvPr>
+          <p:cNvSpPr txBox="1"/>
+          <p:nvPr/>
+        </p:nvSpPr>
+        <p:spPr>
+          <a:xfrm>
+            <a:off x="5138462" y="11313869"/>
+            <a:ext cx="4588115" cy="646331"/>
+          </a:xfrm>
+          <a:prstGeom prst="rect">
+            <a:avLst/>
+          </a:prstGeom>
+          <a:noFill/>
+        </p:spPr>
+        <p:txBody>
+          <a:bodyPr wrap="none" rtlCol="0">
+            <a:spAutoFit/>
+          </a:bodyPr>
+          <a:lstStyle/>
+          <a:p>
+            <a:r>
+              <a:rPr lang="en-DE" sz="3600" b="1" dirty="0">
+                <a:ln w="0"/>
+                <a:solidFill>
+                  <a:schemeClr val="accent1"/>
+                </a:solidFill>
+                <a:effectLst>
+                  <a:outerShdw blurRad="38100" dist="25400" dir="5400000" algn="ctr" rotWithShape="0">
+                    <a:srgbClr val="6E747A">
+                      <a:alpha val="43000"/>
+                    </a:srgbClr>
+                  </a:outerShdw>
+                </a:effectLst>
+                <a:latin typeface="Patrick Hand" pitchFamily="2" charset="77"/>
+              </a:rPr>
+              <a:t>__main__ </a:t>
+            </a:r>
+            <a:r>
+              <a:rPr lang="en-DE" sz="3600" dirty="0">
+                <a:latin typeface="Patrick Hand" pitchFamily="2" charset="77"/>
+              </a:rPr>
+              <a:t>or </a:t>
+            </a:r>
+            <a:r>
+              <a:rPr lang="en-GB" sz="3600" b="1" dirty="0" err="1">
+                <a:ln w="0"/>
+                <a:solidFill>
+                  <a:schemeClr val="accent1"/>
+                </a:solidFill>
+                <a:effectLst>
+                  <a:outerShdw blurRad="38100" dist="25400" dir="5400000" algn="ctr" rotWithShape="0">
+                    <a:srgbClr val="6E747A">
+                      <a:alpha val="43000"/>
+                    </a:srgbClr>
+                  </a:outerShdw>
+                </a:effectLst>
+                <a:latin typeface="Patrick Hand" pitchFamily="2" charset="77"/>
+              </a:rPr>
+              <a:t>magic_vars</a:t>
+            </a:r>
+            <a:endParaRPr lang="en-DE" sz="3600" b="1" dirty="0">
+              <a:latin typeface="Patrick Hand" pitchFamily="2" charset="77"/>
+            </a:endParaRPr>
+          </a:p>
+        </p:txBody>
+      </p:sp>
+      <p:sp>
+        <p:nvSpPr>
+          <p:cNvPr id="13" name="Right Arrow 12">
+            <a:extLst>
+              <a:ext uri="{FF2B5EF4-FFF2-40B4-BE49-F238E27FC236}">
+                <a16:creationId xmlns:a16="http://schemas.microsoft.com/office/drawing/2014/main" id="{D53344C2-B640-EC0B-B3FE-09DBE822B2C8}"/>
+              </a:ext>
+            </a:extLst>
+          </p:cNvPr>
+          <p:cNvSpPr/>
+          <p:nvPr/>
+        </p:nvSpPr>
+        <p:spPr>
+          <a:xfrm>
+            <a:off x="2895857" y="12277158"/>
+            <a:ext cx="1639019" cy="293298"/>
+          </a:xfrm>
+          <a:prstGeom prst="rightArrow">
+            <a:avLst/>
+          </a:prstGeom>
+          <a:solidFill>
+            <a:srgbClr val="FF0000"/>
+          </a:solidFill>
+          <a:ln w="31750">
+            <a:solidFill>
+              <a:schemeClr val="accent1">
+                <a:shade val="15000"/>
+              </a:schemeClr>
+            </a:solidFill>
+          </a:ln>
+        </p:spPr>
+        <p:style>
+          <a:lnRef idx="2">
+            <a:schemeClr val="accent1">
+              <a:shade val="15000"/>
+            </a:schemeClr>
+          </a:lnRef>
+          <a:fillRef idx="1">
+            <a:schemeClr val="accent1"/>
+          </a:fillRef>
+          <a:effectRef idx="0">
+            <a:schemeClr val="accent1"/>
+          </a:effectRef>
+          <a:fontRef idx="minor">
+            <a:schemeClr val="lt1"/>
+          </a:fontRef>
+        </p:style>
+        <p:txBody>
+          <a:bodyPr rtlCol="0" anchor="ctr"/>
+          <a:lstStyle/>
+          <a:p>
+            <a:pPr marL="0" algn="ctr" defTabSz="457200" rtl="0" eaLnBrk="1" latinLnBrk="0" hangingPunct="1"/>
+            <a:endParaRPr lang="en-DE" b="1" dirty="0">
+              <a:ln w="22225">
+                <a:solidFill>
+                  <a:schemeClr val="accent2"/>
+                </a:solidFill>
+                <a:prstDash val="solid"/>
+              </a:ln>
+              <a:solidFill>
+                <a:srgbClr val="C00000"/>
+              </a:solidFill>
+              <a:latin typeface="Patrick Hand" pitchFamily="2" charset="77"/>
+            </a:endParaRPr>
+          </a:p>
+        </p:txBody>
+      </p:sp>
+      <p:sp>
+        <p:nvSpPr>
+          <p:cNvPr id="14" name="TextBox 13">
+            <a:extLst>
+              <a:ext uri="{FF2B5EF4-FFF2-40B4-BE49-F238E27FC236}">
+                <a16:creationId xmlns:a16="http://schemas.microsoft.com/office/drawing/2014/main" id="{E4AC7F21-4968-CAF2-B4FB-989227F10953}"/>
+              </a:ext>
+            </a:extLst>
+          </p:cNvPr>
+          <p:cNvSpPr txBox="1"/>
+          <p:nvPr/>
+        </p:nvSpPr>
+        <p:spPr>
+          <a:xfrm>
+            <a:off x="290421" y="12070122"/>
+            <a:ext cx="1813317" cy="646331"/>
+          </a:xfrm>
+          <a:prstGeom prst="rect">
+            <a:avLst/>
+          </a:prstGeom>
+          <a:noFill/>
+        </p:spPr>
+        <p:txBody>
+          <a:bodyPr wrap="none" rtlCol="0">
+            <a:spAutoFit/>
+          </a:bodyPr>
+          <a:lstStyle/>
+          <a:p>
+            <a:r>
+              <a:rPr lang="en-DE" sz="3600" dirty="0">
+                <a:latin typeface="Patrick Hand" pitchFamily="2" charset="77"/>
+              </a:rPr>
+              <a:t>__file__</a:t>
+            </a:r>
+          </a:p>
+        </p:txBody>
+      </p:sp>
+      <p:sp>
+        <p:nvSpPr>
+          <p:cNvPr id="15" name="TextBox 14">
+            <a:extLst>
+              <a:ext uri="{FF2B5EF4-FFF2-40B4-BE49-F238E27FC236}">
+                <a16:creationId xmlns:a16="http://schemas.microsoft.com/office/drawing/2014/main" id="{ABFB4053-217A-72C1-4F57-F783C3DD66BC}"/>
+              </a:ext>
+            </a:extLst>
+          </p:cNvPr>
+          <p:cNvSpPr txBox="1"/>
+          <p:nvPr/>
+        </p:nvSpPr>
+        <p:spPr>
+          <a:xfrm>
+            <a:off x="5152838" y="12070122"/>
+            <a:ext cx="3611886" cy="646331"/>
+          </a:xfrm>
+          <a:prstGeom prst="rect">
+            <a:avLst/>
+          </a:prstGeom>
+          <a:noFill/>
+        </p:spPr>
+        <p:txBody>
+          <a:bodyPr wrap="none" rtlCol="0">
+            <a:spAutoFit/>
+          </a:bodyPr>
+          <a:lstStyle/>
+          <a:p>
+            <a:r>
+              <a:rPr lang="en-GB" sz="3600" b="1" dirty="0">
+                <a:ln w="0"/>
+                <a:solidFill>
+                  <a:schemeClr val="accent1"/>
+                </a:solidFill>
+                <a:effectLst>
+                  <a:outerShdw blurRad="38100" dist="25400" dir="5400000" algn="ctr" rotWithShape="0">
+                    <a:srgbClr val="6E747A">
+                      <a:alpha val="43000"/>
+                    </a:srgbClr>
+                  </a:outerShdw>
+                </a:effectLst>
+                <a:latin typeface="Patrick Hand" pitchFamily="2" charset="77"/>
+              </a:rPr>
+              <a:t>/app/</a:t>
+            </a:r>
+            <a:r>
+              <a:rPr lang="en-GB" sz="3600" b="1" dirty="0" err="1">
+                <a:ln w="0"/>
+                <a:solidFill>
+                  <a:schemeClr val="accent1"/>
+                </a:solidFill>
+                <a:effectLst>
+                  <a:outerShdw blurRad="38100" dist="25400" dir="5400000" algn="ctr" rotWithShape="0">
+                    <a:srgbClr val="6E747A">
+                      <a:alpha val="43000"/>
+                    </a:srgbClr>
+                  </a:outerShdw>
+                </a:effectLst>
+                <a:latin typeface="Patrick Hand" pitchFamily="2" charset="77"/>
+              </a:rPr>
+              <a:t>magic_vars.py</a:t>
+            </a:r>
+            <a:endParaRPr lang="en-DE" sz="3600" b="1" dirty="0">
+              <a:ln w="0"/>
+              <a:solidFill>
+                <a:schemeClr val="accent1"/>
+              </a:solidFill>
+              <a:effectLst>
+                <a:outerShdw blurRad="38100" dist="25400" dir="5400000" algn="ctr" rotWithShape="0">
+                  <a:srgbClr val="6E747A">
+                    <a:alpha val="43000"/>
+                  </a:srgbClr>
+                </a:outerShdw>
+              </a:effectLst>
+              <a:latin typeface="Patrick Hand" pitchFamily="2" charset="77"/>
+            </a:endParaRPr>
+          </a:p>
+        </p:txBody>
+      </p:sp>
+      <p:sp>
+        <p:nvSpPr>
+          <p:cNvPr id="16" name="Right Arrow 15">
+            <a:extLst>
+              <a:ext uri="{FF2B5EF4-FFF2-40B4-BE49-F238E27FC236}">
+                <a16:creationId xmlns:a16="http://schemas.microsoft.com/office/drawing/2014/main" id="{ED996F69-B416-701A-0D10-21A8520837B2}"/>
+              </a:ext>
+            </a:extLst>
+          </p:cNvPr>
+          <p:cNvSpPr/>
+          <p:nvPr/>
+        </p:nvSpPr>
+        <p:spPr>
+          <a:xfrm>
+            <a:off x="2895857" y="13126533"/>
+            <a:ext cx="1639019" cy="293298"/>
+          </a:xfrm>
+          <a:prstGeom prst="rightArrow">
+            <a:avLst/>
+          </a:prstGeom>
+          <a:solidFill>
+            <a:srgbClr val="FF0000"/>
+          </a:solidFill>
+          <a:ln w="31750">
+            <a:solidFill>
+              <a:schemeClr val="accent1">
+                <a:shade val="15000"/>
+              </a:schemeClr>
+            </a:solidFill>
+          </a:ln>
+        </p:spPr>
+        <p:style>
+          <a:lnRef idx="2">
+            <a:schemeClr val="accent1">
+              <a:shade val="15000"/>
+            </a:schemeClr>
+          </a:lnRef>
+          <a:fillRef idx="1">
+            <a:schemeClr val="accent1"/>
+          </a:fillRef>
+          <a:effectRef idx="0">
+            <a:schemeClr val="accent1"/>
+          </a:effectRef>
+          <a:fontRef idx="minor">
+            <a:schemeClr val="lt1"/>
+          </a:fontRef>
+        </p:style>
+        <p:txBody>
+          <a:bodyPr rtlCol="0" anchor="ctr"/>
+          <a:lstStyle/>
+          <a:p>
+            <a:pPr marL="0" algn="ctr" defTabSz="457200" rtl="0" eaLnBrk="1" latinLnBrk="0" hangingPunct="1"/>
+            <a:endParaRPr lang="en-DE" b="1" dirty="0">
+              <a:ln w="22225">
+                <a:solidFill>
+                  <a:schemeClr val="accent2"/>
+                </a:solidFill>
+                <a:prstDash val="solid"/>
+              </a:ln>
+              <a:solidFill>
+                <a:srgbClr val="C00000"/>
+              </a:solidFill>
+              <a:latin typeface="Patrick Hand" pitchFamily="2" charset="77"/>
+            </a:endParaRPr>
+          </a:p>
+        </p:txBody>
+      </p:sp>
+      <p:sp>
+        <p:nvSpPr>
+          <p:cNvPr id="17" name="TextBox 16">
+            <a:extLst>
+              <a:ext uri="{FF2B5EF4-FFF2-40B4-BE49-F238E27FC236}">
+                <a16:creationId xmlns:a16="http://schemas.microsoft.com/office/drawing/2014/main" id="{440BFD03-FFCD-BB92-8561-2492420B1B39}"/>
+              </a:ext>
+            </a:extLst>
+          </p:cNvPr>
+          <p:cNvSpPr txBox="1"/>
+          <p:nvPr/>
+        </p:nvSpPr>
+        <p:spPr>
+          <a:xfrm>
+            <a:off x="290421" y="12919497"/>
+            <a:ext cx="2557110" cy="646331"/>
+          </a:xfrm>
+          <a:prstGeom prst="rect">
+            <a:avLst/>
+          </a:prstGeom>
+          <a:noFill/>
+        </p:spPr>
+        <p:txBody>
+          <a:bodyPr wrap="none" rtlCol="0">
+            <a:spAutoFit/>
+          </a:bodyPr>
+          <a:lstStyle/>
+          <a:p>
+            <a:r>
+              <a:rPr lang="en-DE" sz="3600" dirty="0">
+                <a:latin typeface="Patrick Hand" pitchFamily="2" charset="77"/>
+              </a:rPr>
+              <a:t>__package__</a:t>
+            </a:r>
+          </a:p>
+        </p:txBody>
+      </p:sp>
+      <p:sp>
+        <p:nvSpPr>
+          <p:cNvPr id="18" name="TextBox 17">
+            <a:extLst>
+              <a:ext uri="{FF2B5EF4-FFF2-40B4-BE49-F238E27FC236}">
+                <a16:creationId xmlns:a16="http://schemas.microsoft.com/office/drawing/2014/main" id="{CA14FB69-C7B0-8E6F-30FF-6B27547214AD}"/>
+              </a:ext>
+            </a:extLst>
+          </p:cNvPr>
+          <p:cNvSpPr txBox="1"/>
+          <p:nvPr/>
+        </p:nvSpPr>
+        <p:spPr>
+          <a:xfrm>
+            <a:off x="5152838" y="12919497"/>
+            <a:ext cx="4355680" cy="646331"/>
+          </a:xfrm>
+          <a:prstGeom prst="rect">
+            <a:avLst/>
+          </a:prstGeom>
+          <a:noFill/>
+        </p:spPr>
+        <p:txBody>
+          <a:bodyPr wrap="none" rtlCol="0">
+            <a:spAutoFit/>
+          </a:bodyPr>
+          <a:lstStyle/>
+          <a:p>
+            <a:r>
+              <a:rPr lang="en-US" sz="3600" b="1" dirty="0">
+                <a:ln w="0"/>
+                <a:solidFill>
+                  <a:schemeClr val="accent1"/>
+                </a:solidFill>
+                <a:effectLst>
+                  <a:outerShdw blurRad="38100" dist="25400" dir="5400000" algn="ctr" rotWithShape="0">
+                    <a:srgbClr val="6E747A">
+                      <a:alpha val="43000"/>
+                    </a:srgbClr>
+                  </a:outerShdw>
+                </a:effectLst>
+                <a:latin typeface="Patrick Hand" pitchFamily="2" charset="77"/>
+              </a:rPr>
+              <a:t>None</a:t>
+            </a:r>
+            <a:r>
+              <a:rPr lang="en-US" sz="3600" dirty="0">
+                <a:latin typeface="Patrick Hand" pitchFamily="2" charset="77"/>
+              </a:rPr>
+              <a:t> or </a:t>
+            </a:r>
+            <a:r>
+              <a:rPr lang="en-US" sz="3600" b="1" dirty="0">
+                <a:ln w="0"/>
+                <a:solidFill>
+                  <a:schemeClr val="accent1"/>
+                </a:solidFill>
+                <a:effectLst>
+                  <a:outerShdw blurRad="38100" dist="25400" dir="5400000" algn="ctr" rotWithShape="0">
+                    <a:srgbClr val="6E747A">
+                      <a:alpha val="43000"/>
+                    </a:srgbClr>
+                  </a:outerShdw>
+                </a:effectLst>
+                <a:latin typeface="Patrick Hand" pitchFamily="2" charset="77"/>
+              </a:rPr>
+              <a:t>name of package</a:t>
+            </a:r>
+            <a:endParaRPr lang="en-DE" sz="3600" b="1" dirty="0">
+              <a:latin typeface="Patrick Hand" pitchFamily="2" charset="77"/>
+            </a:endParaRPr>
+          </a:p>
+        </p:txBody>
+      </p:sp>
+      <p:pic>
+        <p:nvPicPr>
+          <p:cNvPr id="4" name="Picture 3">
+            <a:extLst>
+              <a:ext uri="{FF2B5EF4-FFF2-40B4-BE49-F238E27FC236}">
+                <a16:creationId xmlns:a16="http://schemas.microsoft.com/office/drawing/2014/main" id="{100686C9-E18B-4DD3-305F-2EB19B28DD11}"/>
+              </a:ext>
+            </a:extLst>
+          </p:cNvPr>
+          <p:cNvPicPr>
+            <a:picLocks noChangeAspect="1"/>
+          </p:cNvPicPr>
+          <p:nvPr/>
+        </p:nvPicPr>
+        <p:blipFill rotWithShape="1">
+          <a:blip r:embed="rId5"/>
+          <a:srcRect l="15264" t="20482" r="8581" b="11981"/>
+          <a:stretch>
+            <a:fillRect/>
+          </a:stretch>
+        </p:blipFill>
+        <p:spPr>
+          <a:xfrm>
+            <a:off x="151141" y="3616891"/>
+            <a:ext cx="9983131" cy="7286898"/>
+          </a:xfrm>
+          <a:prstGeom prst="rect">
+            <a:avLst/>
+          </a:prstGeom>
+        </p:spPr>
+      </p:pic>
+      <p:pic>
+        <p:nvPicPr>
+          <p:cNvPr id="10" name="Picture 9">
+            <a:extLst>
+              <a:ext uri="{FF2B5EF4-FFF2-40B4-BE49-F238E27FC236}">
+                <a16:creationId xmlns:a16="http://schemas.microsoft.com/office/drawing/2014/main" id="{D6102011-F70E-143B-2E74-E8E55F0FBD0D}"/>
+              </a:ext>
+            </a:extLst>
+          </p:cNvPr>
+          <p:cNvPicPr>
+            <a:picLocks noChangeAspect="1"/>
+          </p:cNvPicPr>
+          <p:nvPr/>
+        </p:nvPicPr>
+        <p:blipFill>
+          <a:blip r:embed="rId6"/>
+          <a:stretch>
+            <a:fillRect/>
+          </a:stretch>
+        </p:blipFill>
+        <p:spPr>
+          <a:xfrm>
+            <a:off x="8988573" y="9774866"/>
+            <a:ext cx="1063167" cy="1063167"/>
+          </a:xfrm>
+          <a:prstGeom prst="rect">
+            <a:avLst/>
+          </a:prstGeom>
+        </p:spPr>
+      </p:pic>
+      <p:sp>
+        <p:nvSpPr>
+          <p:cNvPr id="19" name="TextBox 18">
+            <a:extLst>
+              <a:ext uri="{FF2B5EF4-FFF2-40B4-BE49-F238E27FC236}">
+                <a16:creationId xmlns:a16="http://schemas.microsoft.com/office/drawing/2014/main" id="{BA150DD2-452F-B188-4AC9-00A3258E6533}"/>
+              </a:ext>
+            </a:extLst>
+          </p:cNvPr>
+          <p:cNvSpPr txBox="1"/>
+          <p:nvPr/>
+        </p:nvSpPr>
+        <p:spPr>
+          <a:xfrm>
+            <a:off x="6745857" y="3657597"/>
+            <a:ext cx="3321743" cy="461665"/>
+          </a:xfrm>
+          <a:prstGeom prst="rect">
+            <a:avLst/>
+          </a:prstGeom>
+          <a:noFill/>
+        </p:spPr>
+        <p:txBody>
+          <a:bodyPr wrap="none" rtlCol="0">
+            <a:spAutoFit/>
+          </a:bodyPr>
+          <a:lstStyle/>
+          <a:p>
+            <a:r>
+              <a:rPr lang="en-GB" sz="2400" dirty="0">
+                <a:solidFill>
+                  <a:schemeClr val="bg1"/>
+                </a:solidFill>
+              </a:rPr>
+              <a:t>F</a:t>
+            </a:r>
+            <a:r>
+              <a:rPr lang="en-DE" sz="2400" dirty="0">
+                <a:solidFill>
+                  <a:schemeClr val="bg1"/>
+                </a:solidFill>
+              </a:rPr>
+              <a:t>ile name: magic_vars.py</a:t>
+            </a:r>
+          </a:p>
+        </p:txBody>
+      </p:sp>
+      <p:sp>
+        <p:nvSpPr>
+          <p:cNvPr id="20" name="TextBox 19">
+            <a:extLst>
+              <a:ext uri="{FF2B5EF4-FFF2-40B4-BE49-F238E27FC236}">
+                <a16:creationId xmlns:a16="http://schemas.microsoft.com/office/drawing/2014/main" id="{8959F1A2-B22C-5219-5969-65113B4369B8}"/>
+              </a:ext>
+            </a:extLst>
+          </p:cNvPr>
+          <p:cNvSpPr txBox="1"/>
+          <p:nvPr/>
+        </p:nvSpPr>
+        <p:spPr>
+          <a:xfrm>
+            <a:off x="151141" y="2468165"/>
+            <a:ext cx="9982800" cy="1107996"/>
+          </a:xfrm>
+          <a:prstGeom prst="rect">
+            <a:avLst/>
+          </a:prstGeom>
+          <a:solidFill>
+            <a:srgbClr val="FFFF00"/>
+          </a:solidFill>
+          <a:ln>
+            <a:solidFill>
+              <a:schemeClr val="accent1">
+                <a:shade val="15000"/>
+              </a:schemeClr>
+            </a:solidFill>
+          </a:ln>
+        </p:spPr>
+        <p:txBody>
+          <a:bodyPr wrap="square" rtlCol="0">
+            <a:spAutoFit/>
+          </a:bodyPr>
+          <a:lstStyle/>
+          <a:p>
+            <a:pPr algn="ctr"/>
+            <a:r>
+              <a:rPr lang="en-DE" sz="6600" b="1" dirty="0">
+                <a:ln w="0">
+                  <a:solidFill>
+                    <a:schemeClr val="bg1"/>
+                  </a:solidFill>
+                </a:ln>
+                <a:gradFill>
+                  <a:gsLst>
+                    <a:gs pos="0">
+                      <a:schemeClr val="accent5">
+                        <a:lumMod val="50000"/>
+                      </a:schemeClr>
+                    </a:gs>
+                    <a:gs pos="50000">
+                      <a:schemeClr val="accent5"/>
+                    </a:gs>
+                    <a:gs pos="100000">
+                      <a:schemeClr val="accent5">
+                        <a:lumMod val="60000"/>
+                        <a:lumOff val="40000"/>
+                      </a:schemeClr>
+                    </a:gs>
+                  </a:gsLst>
+                  <a:lin ang="5400000"/>
+                </a:gradFill>
+                <a:effectLst>
+                  <a:reflection blurRad="6350" stA="53000" endA="300" endPos="35500" dir="5400000" sy="-90000" algn="bl" rotWithShape="0"/>
+                </a:effectLst>
+                <a:latin typeface="Patrick Hand" pitchFamily="2" charset="77"/>
+              </a:rPr>
+              <a:t>Python Special Variables</a:t>
+            </a:r>
+          </a:p>
+        </p:txBody>
+      </p:sp>
+    </p:spTree>
+    <p:extLst>
+      <p:ext uri="{BB962C8B-B14F-4D97-AF65-F5344CB8AC3E}">
+        <p14:creationId xmlns:p14="http://schemas.microsoft.com/office/powerpoint/2010/main" val="2641464813"/>
+      </p:ext>
+    </p:extLst>
+  </p:cSld>
+  <p:clrMapOvr>
+    <a:masterClrMapping/>
+  </p:clrMapOvr>
+  <p:extLst>
+    <p:ext uri="{6950BFC3-D8DA-4A85-94F7-54DA5524770B}">
+      <p188:commentRel xmlns:p188="http://schemas.microsoft.com/office/powerpoint/2018/8/main" r:id="rId2"/>
+    </p:ext>
+  </p:extLst>
+</p:sld>
+</file>
+
+<file path=ppt/slides/slide12.xml><?xml version="1.0" encoding="utf-8"?>
+<p:sld xmlns:a="http://schemas.openxmlformats.org/drawingml/2006/main" xmlns:r="http://schemas.openxmlformats.org/officeDocument/2006/relationships" xmlns:p="http://schemas.openxmlformats.org/presentationml/2006/main">
+  <p:cSld>
+    <p:bg>
+      <p:bgPr>
+        <a:blipFill>
+          <a:blip r:embed="rId2"/>
+          <a:tile tx="0" ty="0" sx="100000" sy="100000" flip="none" algn="tl"/>
+        </a:blipFill>
+        <a:effectLst/>
+      </p:bgPr>
+    </p:bg>
+    <p:spTree>
+      <p:nvGrpSpPr>
+        <p:cNvPr id="1" name=""/>
+        <p:cNvGrpSpPr/>
+        <p:nvPr/>
+      </p:nvGrpSpPr>
+      <p:grpSpPr>
+        <a:xfrm>
+          <a:off x="0" y="0"/>
+          <a:ext cx="0" cy="0"/>
+          <a:chOff x="0" y="0"/>
+          <a:chExt cx="0" cy="0"/>
+        </a:xfrm>
+      </p:grpSpPr>
+      <p:sp>
+        <p:nvSpPr>
+          <p:cNvPr id="9" name="TextBox 8">
+            <a:extLst>
+              <a:ext uri="{FF2B5EF4-FFF2-40B4-BE49-F238E27FC236}">
+                <a16:creationId xmlns:a16="http://schemas.microsoft.com/office/drawing/2014/main" id="{182B4FA4-54CE-F8EF-9FE8-9B59817B4D24}"/>
+              </a:ext>
+            </a:extLst>
+          </p:cNvPr>
+          <p:cNvSpPr txBox="1"/>
+          <p:nvPr/>
+        </p:nvSpPr>
+        <p:spPr>
+          <a:xfrm>
+            <a:off x="223306" y="2468165"/>
+            <a:ext cx="9838800" cy="1107996"/>
+          </a:xfrm>
+          <a:prstGeom prst="rect">
+            <a:avLst/>
+          </a:prstGeom>
+          <a:noFill/>
+          <a:ln>
+            <a:noFill/>
+          </a:ln>
+        </p:spPr>
+        <p:txBody>
+          <a:bodyPr wrap="square" rtlCol="0">
+            <a:spAutoFit/>
+            <a:scene3d>
+              <a:camera prst="orthographicFront"/>
+              <a:lightRig rig="harsh" dir="t"/>
+            </a:scene3d>
+            <a:sp3d extrusionH="57150" prstMaterial="matte">
+              <a:bevelT w="63500" h="12700" prst="angle"/>
+              <a:contourClr>
+                <a:schemeClr val="bg1">
+                  <a:lumMod val="65000"/>
+                </a:schemeClr>
+              </a:contourClr>
+            </a:sp3d>
+          </a:bodyPr>
+          <a:lstStyle/>
+          <a:p>
+            <a:pPr algn="ctr"/>
+            <a:r>
+              <a:rPr lang="en-DE" sz="6600" b="1" dirty="0">
+                <a:ln w="12700">
+                  <a:solidFill>
+                    <a:schemeClr val="tx2">
+                      <a:lumMod val="75000"/>
+                    </a:schemeClr>
+                  </a:solidFill>
+                  <a:prstDash val="solid"/>
+                </a:ln>
+                <a:pattFill prst="dkUpDiag">
+                  <a:fgClr>
+                    <a:schemeClr val="tx2"/>
+                  </a:fgClr>
+                  <a:bgClr>
+                    <a:schemeClr val="tx2">
+                      <a:lumMod val="20000"/>
+                      <a:lumOff val="80000"/>
+                    </a:schemeClr>
+                  </a:bgClr>
+                </a:pattFill>
+                <a:effectLst>
+                  <a:outerShdw dist="38100" dir="2640000" algn="bl" rotWithShape="0">
+                    <a:schemeClr val="tx2">
+                      <a:lumMod val="75000"/>
+                    </a:schemeClr>
+                  </a:outerShdw>
+                </a:effectLst>
+                <a:latin typeface="Patrick Hand" pitchFamily="2" charset="77"/>
+              </a:rPr>
+              <a:t>Python pathlib</a:t>
+            </a:r>
+          </a:p>
+        </p:txBody>
+      </p:sp>
+      <p:pic>
+        <p:nvPicPr>
+          <p:cNvPr id="13" name="Picture 12">
+            <a:extLst>
+              <a:ext uri="{FF2B5EF4-FFF2-40B4-BE49-F238E27FC236}">
+                <a16:creationId xmlns:a16="http://schemas.microsoft.com/office/drawing/2014/main" id="{68147BC7-63E8-F552-FAF5-1E8EA5F3D04B}"/>
+              </a:ext>
+            </a:extLst>
+          </p:cNvPr>
+          <p:cNvPicPr>
+            <a:picLocks noChangeAspect="1"/>
+          </p:cNvPicPr>
+          <p:nvPr/>
+        </p:nvPicPr>
+        <p:blipFill>
+          <a:blip r:embed="rId3"/>
+          <a:stretch>
+            <a:fillRect/>
+          </a:stretch>
+        </p:blipFill>
+        <p:spPr>
+          <a:xfrm>
+            <a:off x="213487" y="2623664"/>
+            <a:ext cx="1063167" cy="1063167"/>
+          </a:xfrm>
+          <a:prstGeom prst="rect">
+            <a:avLst/>
+          </a:prstGeom>
+        </p:spPr>
+      </p:pic>
+      <p:pic>
+        <p:nvPicPr>
+          <p:cNvPr id="14" name="Picture 13">
+            <a:extLst>
+              <a:ext uri="{FF2B5EF4-FFF2-40B4-BE49-F238E27FC236}">
+                <a16:creationId xmlns:a16="http://schemas.microsoft.com/office/drawing/2014/main" id="{F90E03DB-A5D0-7C3C-C45E-020B27EA03F4}"/>
+              </a:ext>
+            </a:extLst>
+          </p:cNvPr>
+          <p:cNvPicPr>
+            <a:picLocks noChangeAspect="1"/>
+          </p:cNvPicPr>
+          <p:nvPr/>
+        </p:nvPicPr>
+        <p:blipFill rotWithShape="1">
+          <a:blip r:embed="rId4"/>
+          <a:srcRect l="15099" t="18381" r="8553" b="9940"/>
+          <a:stretch>
+            <a:fillRect/>
+          </a:stretch>
+        </p:blipFill>
+        <p:spPr>
+          <a:xfrm>
+            <a:off x="223579" y="4037162"/>
+            <a:ext cx="9838255" cy="7783974"/>
+          </a:xfrm>
+          <a:prstGeom prst="rect">
+            <a:avLst/>
+          </a:prstGeom>
+        </p:spPr>
+      </p:pic>
+      <p:cxnSp>
+        <p:nvCxnSpPr>
+          <p:cNvPr id="16" name="Straight Connector 15">
+            <a:extLst>
+              <a:ext uri="{FF2B5EF4-FFF2-40B4-BE49-F238E27FC236}">
+                <a16:creationId xmlns:a16="http://schemas.microsoft.com/office/drawing/2014/main" id="{F3E6C352-2A47-650A-9234-C3DF3F810C43}"/>
+              </a:ext>
+            </a:extLst>
+          </p:cNvPr>
+          <p:cNvCxnSpPr>
+            <a:cxnSpLocks/>
+            <a:endCxn id="14" idx="3"/>
+          </p:cNvCxnSpPr>
+          <p:nvPr/>
+        </p:nvCxnSpPr>
+        <p:spPr>
+          <a:xfrm>
+            <a:off x="223579" y="7929149"/>
+            <a:ext cx="9838255" cy="0"/>
+          </a:xfrm>
+          <a:prstGeom prst="line">
+            <a:avLst/>
+          </a:prstGeom>
+          <a:ln w="38100">
+            <a:solidFill>
+              <a:schemeClr val="bg1"/>
+            </a:solidFill>
+            <a:headEnd type="none"/>
+            <a:tailEnd type="none" w="lg" len="lg"/>
+          </a:ln>
+        </p:spPr>
+        <p:style>
+          <a:lnRef idx="1">
+            <a:schemeClr val="accent1"/>
+          </a:lnRef>
+          <a:fillRef idx="0">
+            <a:schemeClr val="accent1"/>
+          </a:fillRef>
+          <a:effectRef idx="0">
+            <a:schemeClr val="accent1"/>
+          </a:effectRef>
+          <a:fontRef idx="minor">
+            <a:schemeClr val="tx1"/>
+          </a:fontRef>
+        </p:style>
+      </p:cxnSp>
+      <p:pic>
+        <p:nvPicPr>
+          <p:cNvPr id="18" name="Graphic 17" descr="Shield Tick with solid fill">
+            <a:extLst>
+              <a:ext uri="{FF2B5EF4-FFF2-40B4-BE49-F238E27FC236}">
+                <a16:creationId xmlns:a16="http://schemas.microsoft.com/office/drawing/2014/main" id="{2D6D7F89-C47E-56C4-9355-13A359543B8D}"/>
+              </a:ext>
+            </a:extLst>
+          </p:cNvPr>
+          <p:cNvPicPr>
+            <a:picLocks noChangeAspect="1"/>
+          </p:cNvPicPr>
+          <p:nvPr/>
+        </p:nvPicPr>
+        <p:blipFill>
+          <a:blip r:embed="rId5">
+            <a:extLst>
+              <a:ext uri="{96DAC541-7B7A-43D3-8B79-37D633B846F1}">
+                <asvg:svgBlip xmlns:asvg="http://schemas.microsoft.com/office/drawing/2016/SVG/main" r:embed="rId6"/>
+              </a:ext>
+            </a:extLst>
+          </a:blip>
+          <a:stretch>
+            <a:fillRect/>
+          </a:stretch>
+        </p:blipFill>
+        <p:spPr>
+          <a:xfrm>
+            <a:off x="7668075" y="10358851"/>
+            <a:ext cx="914400" cy="914400"/>
+          </a:xfrm>
+          <a:prstGeom prst="rect">
+            <a:avLst/>
+          </a:prstGeom>
+        </p:spPr>
+      </p:pic>
+      <p:pic>
+        <p:nvPicPr>
+          <p:cNvPr id="19" name="Graphic 18" descr="Close with solid fill">
+            <a:extLst>
+              <a:ext uri="{FF2B5EF4-FFF2-40B4-BE49-F238E27FC236}">
+                <a16:creationId xmlns:a16="http://schemas.microsoft.com/office/drawing/2014/main" id="{ADFF07AD-5C5D-EBE3-F7F1-7D805603E5BE}"/>
+              </a:ext>
+            </a:extLst>
+          </p:cNvPr>
+          <p:cNvPicPr>
+            <a:picLocks noChangeAspect="1"/>
+          </p:cNvPicPr>
+          <p:nvPr/>
+        </p:nvPicPr>
+        <p:blipFill>
+          <a:blip r:embed="rId7">
+            <a:extLst>
+              <a:ext uri="{96DAC541-7B7A-43D3-8B79-37D633B846F1}">
+                <asvg:svgBlip xmlns:asvg="http://schemas.microsoft.com/office/drawing/2016/SVG/main" r:embed="rId8"/>
+              </a:ext>
+            </a:extLst>
+          </a:blip>
+          <a:stretch>
+            <a:fillRect/>
+          </a:stretch>
+        </p:blipFill>
+        <p:spPr>
+          <a:xfrm>
+            <a:off x="7668075" y="5575171"/>
+            <a:ext cx="914400" cy="914400"/>
+          </a:xfrm>
+          <a:prstGeom prst="rect">
+            <a:avLst/>
+          </a:prstGeom>
+        </p:spPr>
+      </p:pic>
+      <p:sp>
+        <p:nvSpPr>
+          <p:cNvPr id="20" name="TextBox 19">
+            <a:extLst>
+              <a:ext uri="{FF2B5EF4-FFF2-40B4-BE49-F238E27FC236}">
+                <a16:creationId xmlns:a16="http://schemas.microsoft.com/office/drawing/2014/main" id="{DD1EF262-28AB-179A-F611-B5A8CFF9D9DB}"/>
+              </a:ext>
+            </a:extLst>
+          </p:cNvPr>
+          <p:cNvSpPr txBox="1"/>
+          <p:nvPr/>
+        </p:nvSpPr>
+        <p:spPr>
+          <a:xfrm>
+            <a:off x="213487" y="12387532"/>
+            <a:ext cx="2040815" cy="646331"/>
+          </a:xfrm>
+          <a:prstGeom prst="rect">
+            <a:avLst/>
+          </a:prstGeom>
+          <a:noFill/>
+        </p:spPr>
+        <p:txBody>
+          <a:bodyPr wrap="none" rtlCol="0">
+            <a:spAutoFit/>
+          </a:bodyPr>
+          <a:lstStyle/>
+          <a:p>
+            <a:r>
+              <a:rPr lang="en-GB" sz="3600" dirty="0">
+                <a:solidFill>
+                  <a:schemeClr val="bg1"/>
+                </a:solidFill>
+              </a:rPr>
+              <a:t>Readable:</a:t>
+            </a:r>
+            <a:endParaRPr lang="en-DE" sz="3600" dirty="0">
+              <a:solidFill>
+                <a:schemeClr val="bg1"/>
+              </a:solidFill>
+            </a:endParaRPr>
+          </a:p>
+        </p:txBody>
+      </p:sp>
+      <p:sp>
+        <p:nvSpPr>
+          <p:cNvPr id="21" name="TextBox 20">
+            <a:extLst>
+              <a:ext uri="{FF2B5EF4-FFF2-40B4-BE49-F238E27FC236}">
+                <a16:creationId xmlns:a16="http://schemas.microsoft.com/office/drawing/2014/main" id="{DEA5BC88-F15A-3738-DE5E-7E3E6AF2D763}"/>
+              </a:ext>
+            </a:extLst>
+          </p:cNvPr>
+          <p:cNvSpPr txBox="1"/>
+          <p:nvPr/>
+        </p:nvSpPr>
+        <p:spPr>
+          <a:xfrm>
+            <a:off x="2365380" y="12387532"/>
+            <a:ext cx="6738964" cy="646331"/>
+          </a:xfrm>
+          <a:prstGeom prst="rect">
+            <a:avLst/>
+          </a:prstGeom>
+          <a:noFill/>
+        </p:spPr>
+        <p:txBody>
+          <a:bodyPr wrap="square" rtlCol="0">
+            <a:spAutoFit/>
+          </a:bodyPr>
+          <a:lstStyle/>
+          <a:p>
+            <a:r>
+              <a:rPr lang="en-GB" sz="3600" dirty="0">
+                <a:latin typeface="Patrick Hand" pitchFamily="2" charset="77"/>
+              </a:rPr>
+              <a:t>Use the / operator to join paths easily.</a:t>
+            </a:r>
+            <a:endParaRPr lang="en-DE" sz="3600" dirty="0">
+              <a:latin typeface="Patrick Hand" pitchFamily="2" charset="77"/>
+            </a:endParaRPr>
+          </a:p>
+        </p:txBody>
+      </p:sp>
+      <p:sp>
+        <p:nvSpPr>
+          <p:cNvPr id="23" name="TextBox 22">
+            <a:extLst>
+              <a:ext uri="{FF2B5EF4-FFF2-40B4-BE49-F238E27FC236}">
+                <a16:creationId xmlns:a16="http://schemas.microsoft.com/office/drawing/2014/main" id="{F691A230-89C2-97BC-EA0B-5A1547026FC2}"/>
+              </a:ext>
+            </a:extLst>
+          </p:cNvPr>
+          <p:cNvSpPr txBox="1"/>
+          <p:nvPr/>
+        </p:nvSpPr>
+        <p:spPr>
+          <a:xfrm>
+            <a:off x="2365380" y="13207674"/>
+            <a:ext cx="6327171" cy="646331"/>
+          </a:xfrm>
+          <a:prstGeom prst="rect">
+            <a:avLst/>
+          </a:prstGeom>
+          <a:noFill/>
+        </p:spPr>
+        <p:txBody>
+          <a:bodyPr wrap="square" rtlCol="0">
+            <a:spAutoFit/>
+          </a:bodyPr>
+          <a:lstStyle/>
+          <a:p>
+            <a:r>
+              <a:rPr lang="en-GB" sz="3600" dirty="0"/>
+              <a:t>Auto-handles Windows vs. Linux</a:t>
+            </a:r>
+            <a:endParaRPr lang="en-DE" sz="3600" dirty="0">
+              <a:latin typeface="Patrick Hand" pitchFamily="2" charset="77"/>
+            </a:endParaRPr>
+          </a:p>
+        </p:txBody>
+      </p:sp>
+      <p:sp>
+        <p:nvSpPr>
+          <p:cNvPr id="24" name="TextBox 23">
+            <a:extLst>
+              <a:ext uri="{FF2B5EF4-FFF2-40B4-BE49-F238E27FC236}">
+                <a16:creationId xmlns:a16="http://schemas.microsoft.com/office/drawing/2014/main" id="{88EEEC48-48C2-1866-EF77-F57F21472377}"/>
+              </a:ext>
+            </a:extLst>
+          </p:cNvPr>
+          <p:cNvSpPr txBox="1"/>
+          <p:nvPr/>
+        </p:nvSpPr>
+        <p:spPr>
+          <a:xfrm>
+            <a:off x="2365380" y="14027816"/>
+            <a:ext cx="7686362" cy="646331"/>
+          </a:xfrm>
+          <a:prstGeom prst="rect">
+            <a:avLst/>
+          </a:prstGeom>
+          <a:noFill/>
+        </p:spPr>
+        <p:txBody>
+          <a:bodyPr wrap="square" rtlCol="0">
+            <a:spAutoFit/>
+          </a:bodyPr>
+          <a:lstStyle/>
+          <a:p>
+            <a:r>
+              <a:rPr lang="en-GB" sz="3600" dirty="0"/>
+              <a:t>Everything is an object, not just a string.</a:t>
+            </a:r>
+            <a:endParaRPr lang="en-DE" sz="3600" dirty="0">
+              <a:latin typeface="Patrick Hand" pitchFamily="2" charset="77"/>
+            </a:endParaRPr>
+          </a:p>
+        </p:txBody>
+      </p:sp>
+      <p:sp>
+        <p:nvSpPr>
+          <p:cNvPr id="25" name="TextBox 24">
+            <a:extLst>
+              <a:ext uri="{FF2B5EF4-FFF2-40B4-BE49-F238E27FC236}">
+                <a16:creationId xmlns:a16="http://schemas.microsoft.com/office/drawing/2014/main" id="{358B2339-07F2-9A25-79CD-9BB6EA178151}"/>
+              </a:ext>
+            </a:extLst>
+          </p:cNvPr>
+          <p:cNvSpPr txBox="1"/>
+          <p:nvPr/>
+        </p:nvSpPr>
+        <p:spPr>
+          <a:xfrm>
+            <a:off x="213487" y="13207674"/>
+            <a:ext cx="1423788" cy="646331"/>
+          </a:xfrm>
+          <a:prstGeom prst="rect">
+            <a:avLst/>
+          </a:prstGeom>
+          <a:noFill/>
+        </p:spPr>
+        <p:txBody>
+          <a:bodyPr wrap="none" rtlCol="0">
+            <a:spAutoFit/>
+          </a:bodyPr>
+          <a:lstStyle/>
+          <a:p>
+            <a:r>
+              <a:rPr lang="en-GB" sz="3600" dirty="0">
+                <a:solidFill>
+                  <a:schemeClr val="bg1"/>
+                </a:solidFill>
+              </a:rPr>
+              <a:t>Smart:</a:t>
+            </a:r>
+            <a:endParaRPr lang="en-DE" sz="3600" dirty="0">
+              <a:solidFill>
+                <a:schemeClr val="bg1"/>
+              </a:solidFill>
+            </a:endParaRPr>
+          </a:p>
+        </p:txBody>
+      </p:sp>
+      <p:sp>
+        <p:nvSpPr>
+          <p:cNvPr id="26" name="TextBox 25">
+            <a:extLst>
+              <a:ext uri="{FF2B5EF4-FFF2-40B4-BE49-F238E27FC236}">
+                <a16:creationId xmlns:a16="http://schemas.microsoft.com/office/drawing/2014/main" id="{B16A6396-DD35-DF1E-72A6-426DA90CEC4D}"/>
+              </a:ext>
+            </a:extLst>
+          </p:cNvPr>
+          <p:cNvSpPr txBox="1"/>
+          <p:nvPr/>
+        </p:nvSpPr>
+        <p:spPr>
+          <a:xfrm>
+            <a:off x="213487" y="14027816"/>
+            <a:ext cx="1984198" cy="646331"/>
+          </a:xfrm>
+          <a:prstGeom prst="rect">
+            <a:avLst/>
+          </a:prstGeom>
+          <a:noFill/>
+        </p:spPr>
+        <p:txBody>
+          <a:bodyPr wrap="none" rtlCol="0">
+            <a:spAutoFit/>
+          </a:bodyPr>
+          <a:lstStyle/>
+          <a:p>
+            <a:r>
+              <a:rPr lang="en-GB" sz="3600" dirty="0">
+                <a:solidFill>
+                  <a:schemeClr val="bg1"/>
+                </a:solidFill>
+              </a:rPr>
+              <a:t>Powerful:</a:t>
+            </a:r>
+            <a:endParaRPr lang="en-DE" sz="3600" dirty="0">
+              <a:solidFill>
+                <a:schemeClr val="bg1"/>
+              </a:solidFill>
+            </a:endParaRPr>
+          </a:p>
+        </p:txBody>
+      </p:sp>
+    </p:spTree>
+    <p:extLst>
+      <p:ext uri="{BB962C8B-B14F-4D97-AF65-F5344CB8AC3E}">
+        <p14:creationId xmlns:p14="http://schemas.microsoft.com/office/powerpoint/2010/main" val="1395270541"/>
+      </p:ext>
+    </p:extLst>
+  </p:cSld>
+  <p:clrMapOvr>
+    <a:masterClrMapping/>
+  </p:clrMapOvr>
+</p:sld>
+</file>
+
+<file path=ppt/slides/slide13.xml><?xml version="1.0" encoding="utf-8"?>
+<p:sld xmlns:a="http://schemas.openxmlformats.org/drawingml/2006/main" xmlns:r="http://schemas.openxmlformats.org/officeDocument/2006/relationships" xmlns:p="http://schemas.openxmlformats.org/presentationml/2006/main">
+  <p:cSld>
+    <p:spTree>
+      <p:nvGrpSpPr>
+        <p:cNvPr id="1" name=""/>
+        <p:cNvGrpSpPr/>
+        <p:nvPr/>
+      </p:nvGrpSpPr>
+      <p:grpSpPr>
+        <a:xfrm>
+          <a:off x="0" y="0"/>
+          <a:ext cx="0" cy="0"/>
+          <a:chOff x="0" y="0"/>
+          <a:chExt cx="0" cy="0"/>
+        </a:xfrm>
+      </p:grpSpPr>
+    </p:spTree>
+    <p:extLst>
+      <p:ext uri="{BB962C8B-B14F-4D97-AF65-F5344CB8AC3E}">
+        <p14:creationId xmlns:p14="http://schemas.microsoft.com/office/powerpoint/2010/main" val="1651426489"/>
+      </p:ext>
+    </p:extLst>
+  </p:cSld>
+  <p:clrMapOvr>
+    <a:masterClrMapping/>
+  </p:clrMapOvr>
+</p:sld>
+</file>
+
+<file path=ppt/slides/slide14.xml><?xml version="1.0" encoding="utf-8"?>
+<p:sld xmlns:a="http://schemas.openxmlformats.org/drawingml/2006/main" xmlns:r="http://schemas.openxmlformats.org/officeDocument/2006/relationships" xmlns:p="http://schemas.openxmlformats.org/presentationml/2006/main">
+  <p:cSld>
+    <p:spTree>
+      <p:nvGrpSpPr>
+        <p:cNvPr id="1" name=""/>
+        <p:cNvGrpSpPr/>
+        <p:nvPr/>
+      </p:nvGrpSpPr>
+      <p:grpSpPr>
+        <a:xfrm>
+          <a:off x="0" y="0"/>
+          <a:ext cx="0" cy="0"/>
+          <a:chOff x="0" y="0"/>
+          <a:chExt cx="0" cy="0"/>
+        </a:xfrm>
+      </p:grpSpPr>
+    </p:spTree>
+    <p:extLst>
+      <p:ext uri="{BB962C8B-B14F-4D97-AF65-F5344CB8AC3E}">
+        <p14:creationId xmlns:p14="http://schemas.microsoft.com/office/powerpoint/2010/main" val="1073550271"/>
+      </p:ext>
+    </p:extLst>
+  </p:cSld>
+  <p:clrMapOvr>
+    <a:masterClrMapping/>
+  </p:clrMapOvr>
+</p:sld>
+</file>
+
+<file path=ppt/slides/slide15.xml><?xml version="1.0" encoding="utf-8"?>
+<p:sld xmlns:a="http://schemas.openxmlformats.org/drawingml/2006/main" xmlns:r="http://schemas.openxmlformats.org/officeDocument/2006/relationships" xmlns:p="http://schemas.openxmlformats.org/presentationml/2006/main">
+  <p:cSld>
+    <p:spTree>
+      <p:nvGrpSpPr>
+        <p:cNvPr id="1" name=""/>
+        <p:cNvGrpSpPr/>
+        <p:nvPr/>
+      </p:nvGrpSpPr>
+      <p:grpSpPr>
+        <a:xfrm>
+          <a:off x="0" y="0"/>
+          <a:ext cx="0" cy="0"/>
+          <a:chOff x="0" y="0"/>
+          <a:chExt cx="0" cy="0"/>
+        </a:xfrm>
+      </p:grpSpPr>
+    </p:spTree>
+    <p:extLst>
+      <p:ext uri="{BB962C8B-B14F-4D97-AF65-F5344CB8AC3E}">
+        <p14:creationId xmlns:p14="http://schemas.microsoft.com/office/powerpoint/2010/main" val="3355690493"/>
+      </p:ext>
+    </p:extLst>
+  </p:cSld>
+  <p:clrMapOvr>
+    <a:masterClrMapping/>
+  </p:clrMapOvr>
+</p:sld>
+</file>
+
+<file path=ppt/slides/slide16.xml><?xml version="1.0" encoding="utf-8"?>
+<p:sld xmlns:a="http://schemas.openxmlformats.org/drawingml/2006/main" xmlns:r="http://schemas.openxmlformats.org/officeDocument/2006/relationships" xmlns:p="http://schemas.openxmlformats.org/presentationml/2006/main">
+  <p:cSld>
+    <p:spTree>
+      <p:nvGrpSpPr>
+        <p:cNvPr id="1" name=""/>
+        <p:cNvGrpSpPr/>
+        <p:nvPr/>
+      </p:nvGrpSpPr>
+      <p:grpSpPr>
+        <a:xfrm>
+          <a:off x="0" y="0"/>
+          <a:ext cx="0" cy="0"/>
+          <a:chOff x="0" y="0"/>
+          <a:chExt cx="0" cy="0"/>
+        </a:xfrm>
+      </p:grpSpPr>
+    </p:spTree>
+    <p:extLst>
+      <p:ext uri="{BB962C8B-B14F-4D97-AF65-F5344CB8AC3E}">
+        <p14:creationId xmlns:p14="http://schemas.microsoft.com/office/powerpoint/2010/main" val="2018481417"/>
+      </p:ext>
+    </p:extLst>
+  </p:cSld>
+  <p:clrMapOvr>
+    <a:masterClrMapping/>
+  </p:clrMapOvr>
+</p:sld>
+</file>
+
+<file path=ppt/slides/slide17.xml><?xml version="1.0" encoding="utf-8"?>
+<p:sld xmlns:a="http://schemas.openxmlformats.org/drawingml/2006/main" xmlns:r="http://schemas.openxmlformats.org/officeDocument/2006/relationships" xmlns:p="http://schemas.openxmlformats.org/presentationml/2006/main">
+  <p:cSld>
+    <p:spTree>
+      <p:nvGrpSpPr>
+        <p:cNvPr id="1" name=""/>
+        <p:cNvGrpSpPr/>
+        <p:nvPr/>
+      </p:nvGrpSpPr>
+      <p:grpSpPr>
+        <a:xfrm>
+          <a:off x="0" y="0"/>
+          <a:ext cx="0" cy="0"/>
+          <a:chOff x="0" y="0"/>
+          <a:chExt cx="0" cy="0"/>
+        </a:xfrm>
+      </p:grpSpPr>
+    </p:spTree>
+    <p:extLst>
+      <p:ext uri="{BB962C8B-B14F-4D97-AF65-F5344CB8AC3E}">
+        <p14:creationId xmlns:p14="http://schemas.microsoft.com/office/powerpoint/2010/main" val="2445154702"/>
+      </p:ext>
+    </p:extLst>
+  </p:cSld>
+  <p:clrMapOvr>
+    <a:masterClrMapping/>
+  </p:clrMapOvr>
+</p:sld>
+</file>
+
+<file path=ppt/slides/slide18.xml><?xml version="1.0" encoding="utf-8"?>
+<p:sld xmlns:a="http://schemas.openxmlformats.org/drawingml/2006/main" xmlns:r="http://schemas.openxmlformats.org/officeDocument/2006/relationships" xmlns:p="http://schemas.openxmlformats.org/presentationml/2006/main">
+  <p:cSld>
+    <p:spTree>
+      <p:nvGrpSpPr>
+        <p:cNvPr id="1" name=""/>
+        <p:cNvGrpSpPr/>
+        <p:nvPr/>
+      </p:nvGrpSpPr>
+      <p:grpSpPr>
+        <a:xfrm>
+          <a:off x="0" y="0"/>
+          <a:ext cx="0" cy="0"/>
+          <a:chOff x="0" y="0"/>
+          <a:chExt cx="0" cy="0"/>
+        </a:xfrm>
+      </p:grpSpPr>
+    </p:spTree>
+    <p:extLst>
+      <p:ext uri="{BB962C8B-B14F-4D97-AF65-F5344CB8AC3E}">
+        <p14:creationId xmlns:p14="http://schemas.microsoft.com/office/powerpoint/2010/main" val="1053544977"/>
+      </p:ext>
+    </p:extLst>
+  </p:cSld>
+  <p:clrMapOvr>
+    <a:masterClrMapping/>
+  </p:clrMapOvr>
+</p:sld>
+</file>
+
+<file path=ppt/slides/slide19.xml><?xml version="1.0" encoding="utf-8"?>
+<p:sld xmlns:a="http://schemas.openxmlformats.org/drawingml/2006/main" xmlns:r="http://schemas.openxmlformats.org/officeDocument/2006/relationships" xmlns:p="http://schemas.openxmlformats.org/presentationml/2006/main">
+  <p:cSld>
+    <p:spTree>
+      <p:nvGrpSpPr>
+        <p:cNvPr id="1" name=""/>
+        <p:cNvGrpSpPr/>
+        <p:nvPr/>
+      </p:nvGrpSpPr>
+      <p:grpSpPr>
+        <a:xfrm>
+          <a:off x="0" y="0"/>
+          <a:ext cx="0" cy="0"/>
+          <a:chOff x="0" y="0"/>
+          <a:chExt cx="0" cy="0"/>
+        </a:xfrm>
+      </p:grpSpPr>
+    </p:spTree>
+    <p:extLst>
+      <p:ext uri="{BB962C8B-B14F-4D97-AF65-F5344CB8AC3E}">
+        <p14:creationId xmlns:p14="http://schemas.microsoft.com/office/powerpoint/2010/main" val="1006381002"/>
       </p:ext>
     </p:extLst>
   </p:cSld>
@@ -4311,6 +6625,36 @@
     <p:extLst>
       <p:ext uri="{BB962C8B-B14F-4D97-AF65-F5344CB8AC3E}">
         <p14:creationId xmlns:p14="http://schemas.microsoft.com/office/powerpoint/2010/main" val="3215186301"/>
+      </p:ext>
+    </p:extLst>
+  </p:cSld>
+  <p:clrMapOvr>
+    <a:masterClrMapping/>
+  </p:clrMapOvr>
+</p:sld>
+</file>
+
+<file path=ppt/slides/slide20.xml><?xml version="1.0" encoding="utf-8"?>
+<p:sld xmlns:a="http://schemas.openxmlformats.org/drawingml/2006/main" xmlns:r="http://schemas.openxmlformats.org/officeDocument/2006/relationships" xmlns:p="http://schemas.openxmlformats.org/presentationml/2006/main">
+  <p:cSld>
+    <p:spTree>
+      <p:nvGrpSpPr>
+        <p:cNvPr id="1" name=""/>
+        <p:cNvGrpSpPr/>
+        <p:nvPr/>
+      </p:nvGrpSpPr>
+      <p:grpSpPr>
+        <a:xfrm>
+          <a:off x="0" y="0"/>
+          <a:ext cx="0" cy="0"/>
+          <a:chOff x="0" y="0"/>
+          <a:chExt cx="0" cy="0"/>
+        </a:xfrm>
+      </p:grpSpPr>
+    </p:spTree>
+    <p:extLst>
+      <p:ext uri="{BB962C8B-B14F-4D97-AF65-F5344CB8AC3E}">
+        <p14:creationId xmlns:p14="http://schemas.microsoft.com/office/powerpoint/2010/main" val="2604286344"/>
       </p:ext>
     </p:extLst>
   </p:cSld>
@@ -5580,137 +7924,6 @@
       </p:pic>
       <p:sp>
         <p:nvSpPr>
-          <p:cNvPr id="14" name="TextBox 13">
-            <a:extLst>
-              <a:ext uri="{FF2B5EF4-FFF2-40B4-BE49-F238E27FC236}">
-                <a16:creationId xmlns:a16="http://schemas.microsoft.com/office/drawing/2014/main" id="{EFB95669-C168-4572-DD10-024C3E650E04}"/>
-              </a:ext>
-            </a:extLst>
-          </p:cNvPr>
-          <p:cNvSpPr txBox="1"/>
-          <p:nvPr/>
-        </p:nvSpPr>
-        <p:spPr>
-          <a:xfrm>
-            <a:off x="2170229" y="1745204"/>
-            <a:ext cx="5944954" cy="923330"/>
-          </a:xfrm>
-          <a:prstGeom prst="rect">
-            <a:avLst/>
-          </a:prstGeom>
-          <a:noFill/>
-        </p:spPr>
-        <p:txBody>
-          <a:bodyPr wrap="square" rtlCol="0">
-            <a:spAutoFit/>
-          </a:bodyPr>
-          <a:lstStyle/>
-          <a:p>
-            <a:pPr algn="ctr"/>
-            <a:r>
-              <a:rPr lang="en-GB" sz="5400" b="1" dirty="0">
-                <a:ln/>
-                <a:latin typeface="+mj-lt"/>
-              </a:rPr>
-              <a:t>@</a:t>
-            </a:r>
-            <a:r>
-              <a:rPr lang="en-GB" sz="5400" b="1" dirty="0" err="1">
-                <a:ln/>
-                <a:latin typeface="+mj-lt"/>
-              </a:rPr>
-              <a:t>CodeWithEbrahim</a:t>
-            </a:r>
-            <a:endParaRPr lang="en-GB" sz="5400" b="1" dirty="0">
-              <a:ln/>
-              <a:latin typeface="+mj-lt"/>
-            </a:endParaRPr>
-          </a:p>
-        </p:txBody>
-      </p:sp>
-      <p:grpSp>
-        <p:nvGrpSpPr>
-          <p:cNvPr id="25" name="Group 24">
-            <a:extLst>
-              <a:ext uri="{FF2B5EF4-FFF2-40B4-BE49-F238E27FC236}">
-                <a16:creationId xmlns:a16="http://schemas.microsoft.com/office/drawing/2014/main" id="{6883BD0B-E8B4-948F-DE6D-863A162CA9C1}"/>
-              </a:ext>
-            </a:extLst>
-          </p:cNvPr>
-          <p:cNvGrpSpPr/>
-          <p:nvPr/>
-        </p:nvGrpSpPr>
-        <p:grpSpPr>
-          <a:xfrm>
-            <a:off x="4153139" y="492745"/>
-            <a:ext cx="1979135" cy="925200"/>
-            <a:chOff x="4315976" y="15244200"/>
-            <a:chExt cx="1979135" cy="925200"/>
-          </a:xfrm>
-        </p:grpSpPr>
-        <p:pic>
-          <p:nvPicPr>
-            <p:cNvPr id="22" name="Picture 21">
-              <a:extLst>
-                <a:ext uri="{FF2B5EF4-FFF2-40B4-BE49-F238E27FC236}">
-                  <a16:creationId xmlns:a16="http://schemas.microsoft.com/office/drawing/2014/main" id="{6D52AB9E-4D60-D0FB-656A-3E8AD099E56B}"/>
-                </a:ext>
-              </a:extLst>
-            </p:cNvPr>
-            <p:cNvPicPr>
-              <a:picLocks noChangeAspect="1"/>
-            </p:cNvPicPr>
-            <p:nvPr/>
-          </p:nvPicPr>
-          <p:blipFill>
-            <a:blip r:embed="rId6"/>
-            <a:stretch>
-              <a:fillRect/>
-            </a:stretch>
-          </p:blipFill>
-          <p:spPr>
-            <a:xfrm>
-              <a:off x="5369911" y="15244200"/>
-              <a:ext cx="925200" cy="925200"/>
-            </a:xfrm>
-            <a:prstGeom prst="rect">
-              <a:avLst/>
-            </a:prstGeom>
-          </p:spPr>
-        </p:pic>
-        <p:pic>
-          <p:nvPicPr>
-            <p:cNvPr id="24" name="Picture 23">
-              <a:extLst>
-                <a:ext uri="{FF2B5EF4-FFF2-40B4-BE49-F238E27FC236}">
-                  <a16:creationId xmlns:a16="http://schemas.microsoft.com/office/drawing/2014/main" id="{948D8E68-472C-127B-8D50-6ABFB3203F9D}"/>
-                </a:ext>
-              </a:extLst>
-            </p:cNvPr>
-            <p:cNvPicPr>
-              <a:picLocks noChangeAspect="1"/>
-            </p:cNvPicPr>
-            <p:nvPr/>
-          </p:nvPicPr>
-          <p:blipFill>
-            <a:blip r:embed="rId7"/>
-            <a:stretch>
-              <a:fillRect/>
-            </a:stretch>
-          </p:blipFill>
-          <p:spPr>
-            <a:xfrm>
-              <a:off x="4315976" y="15244200"/>
-              <a:ext cx="925200" cy="925200"/>
-            </a:xfrm>
-            <a:prstGeom prst="rect">
-              <a:avLst/>
-            </a:prstGeom>
-          </p:spPr>
-        </p:pic>
-      </p:grpSp>
-      <p:sp>
-        <p:nvSpPr>
           <p:cNvPr id="16" name="Rectangle 15">
             <a:extLst>
               <a:ext uri="{FF2B5EF4-FFF2-40B4-BE49-F238E27FC236}">
@@ -5886,7 +8099,7 @@
           <p:nvPr/>
         </p:nvPicPr>
         <p:blipFill>
-          <a:blip r:embed="rId8"/>
+          <a:blip r:embed="rId6"/>
           <a:stretch>
             <a:fillRect/>
           </a:stretch>
@@ -5916,7 +8129,7 @@
           <p:nvPr/>
         </p:nvPicPr>
         <p:blipFill>
-          <a:blip r:embed="rId8"/>
+          <a:blip r:embed="rId6"/>
           <a:stretch>
             <a:fillRect/>
           </a:stretch>
@@ -5976,137 +8189,6 @@
           <a:chExt cx="0" cy="0"/>
         </a:xfrm>
       </p:grpSpPr>
-      <p:sp>
-        <p:nvSpPr>
-          <p:cNvPr id="14" name="TextBox 13">
-            <a:extLst>
-              <a:ext uri="{FF2B5EF4-FFF2-40B4-BE49-F238E27FC236}">
-                <a16:creationId xmlns:a16="http://schemas.microsoft.com/office/drawing/2014/main" id="{0C94C1A1-69EB-E6EC-D3BA-027C6D90EB82}"/>
-              </a:ext>
-            </a:extLst>
-          </p:cNvPr>
-          <p:cNvSpPr txBox="1"/>
-          <p:nvPr/>
-        </p:nvSpPr>
-        <p:spPr>
-          <a:xfrm>
-            <a:off x="2170229" y="1745204"/>
-            <a:ext cx="5944954" cy="923330"/>
-          </a:xfrm>
-          <a:prstGeom prst="rect">
-            <a:avLst/>
-          </a:prstGeom>
-          <a:noFill/>
-        </p:spPr>
-        <p:txBody>
-          <a:bodyPr wrap="square" rtlCol="0">
-            <a:spAutoFit/>
-          </a:bodyPr>
-          <a:lstStyle/>
-          <a:p>
-            <a:pPr algn="ctr"/>
-            <a:r>
-              <a:rPr lang="en-GB" sz="5400" b="1" dirty="0">
-                <a:ln/>
-                <a:latin typeface="+mj-lt"/>
-              </a:rPr>
-              <a:t>@</a:t>
-            </a:r>
-            <a:r>
-              <a:rPr lang="en-GB" sz="5400" b="1" dirty="0" err="1">
-                <a:ln/>
-                <a:latin typeface="+mj-lt"/>
-              </a:rPr>
-              <a:t>CodeWithEbrahim</a:t>
-            </a:r>
-            <a:endParaRPr lang="en-GB" sz="5400" b="1" dirty="0">
-              <a:ln/>
-              <a:latin typeface="+mj-lt"/>
-            </a:endParaRPr>
-          </a:p>
-        </p:txBody>
-      </p:sp>
-      <p:grpSp>
-        <p:nvGrpSpPr>
-          <p:cNvPr id="25" name="Group 24">
-            <a:extLst>
-              <a:ext uri="{FF2B5EF4-FFF2-40B4-BE49-F238E27FC236}">
-                <a16:creationId xmlns:a16="http://schemas.microsoft.com/office/drawing/2014/main" id="{1D4EDCFD-B4CE-5F3E-8F52-3E9F9E32C756}"/>
-              </a:ext>
-            </a:extLst>
-          </p:cNvPr>
-          <p:cNvGrpSpPr/>
-          <p:nvPr/>
-        </p:nvGrpSpPr>
-        <p:grpSpPr>
-          <a:xfrm>
-            <a:off x="4153139" y="492745"/>
-            <a:ext cx="1979135" cy="925200"/>
-            <a:chOff x="4315976" y="15244200"/>
-            <a:chExt cx="1979135" cy="925200"/>
-          </a:xfrm>
-        </p:grpSpPr>
-        <p:pic>
-          <p:nvPicPr>
-            <p:cNvPr id="22" name="Picture 21">
-              <a:extLst>
-                <a:ext uri="{FF2B5EF4-FFF2-40B4-BE49-F238E27FC236}">
-                  <a16:creationId xmlns:a16="http://schemas.microsoft.com/office/drawing/2014/main" id="{C4E5CD8C-9467-E9B0-9A00-E872AB9F5519}"/>
-                </a:ext>
-              </a:extLst>
-            </p:cNvPr>
-            <p:cNvPicPr>
-              <a:picLocks noChangeAspect="1"/>
-            </p:cNvPicPr>
-            <p:nvPr/>
-          </p:nvPicPr>
-          <p:blipFill>
-            <a:blip r:embed="rId4"/>
-            <a:stretch>
-              <a:fillRect/>
-            </a:stretch>
-          </p:blipFill>
-          <p:spPr>
-            <a:xfrm>
-              <a:off x="5369911" y="15244200"/>
-              <a:ext cx="925200" cy="925200"/>
-            </a:xfrm>
-            <a:prstGeom prst="rect">
-              <a:avLst/>
-            </a:prstGeom>
-          </p:spPr>
-        </p:pic>
-        <p:pic>
-          <p:nvPicPr>
-            <p:cNvPr id="24" name="Picture 23">
-              <a:extLst>
-                <a:ext uri="{FF2B5EF4-FFF2-40B4-BE49-F238E27FC236}">
-                  <a16:creationId xmlns:a16="http://schemas.microsoft.com/office/drawing/2014/main" id="{3ED81F4E-8FE1-91C6-D491-DF069C1F3BC9}"/>
-                </a:ext>
-              </a:extLst>
-            </p:cNvPr>
-            <p:cNvPicPr>
-              <a:picLocks noChangeAspect="1"/>
-            </p:cNvPicPr>
-            <p:nvPr/>
-          </p:nvPicPr>
-          <p:blipFill>
-            <a:blip r:embed="rId5"/>
-            <a:stretch>
-              <a:fillRect/>
-            </a:stretch>
-          </p:blipFill>
-          <p:spPr>
-            <a:xfrm>
-              <a:off x="4315976" y="15244200"/>
-              <a:ext cx="925200" cy="925200"/>
-            </a:xfrm>
-            <a:prstGeom prst="rect">
-              <a:avLst/>
-            </a:prstGeom>
-          </p:spPr>
-        </p:pic>
-      </p:grpSp>
       <p:pic>
         <p:nvPicPr>
           <p:cNvPr id="20" name="Picture 19">
@@ -6122,7 +8204,7 @@
           <p:nvPr/>
         </p:nvPicPr>
         <p:blipFill>
-          <a:blip r:embed="rId6"/>
+          <a:blip r:embed="rId4"/>
           <a:stretch>
             <a:fillRect/>
           </a:stretch>
@@ -6201,7 +8283,7 @@
           <p:nvPr/>
         </p:nvPicPr>
         <p:blipFill rotWithShape="1">
-          <a:blip r:embed="rId7"/>
+          <a:blip r:embed="rId5"/>
           <a:srcRect l="30671" t="35066" r="18959" b="19538"/>
           <a:stretch>
             <a:fillRect/>
@@ -6235,7 +8317,7 @@
           <p:nvPr/>
         </p:nvPicPr>
         <p:blipFill rotWithShape="1">
-          <a:blip r:embed="rId8"/>
+          <a:blip r:embed="rId6"/>
           <a:srcRect l="30716" t="34385" r="19230" b="18534"/>
           <a:stretch>
             <a:fillRect/>
@@ -6525,137 +8607,6 @@
       </p:grpSpPr>
       <p:sp>
         <p:nvSpPr>
-          <p:cNvPr id="14" name="TextBox 13">
-            <a:extLst>
-              <a:ext uri="{FF2B5EF4-FFF2-40B4-BE49-F238E27FC236}">
-                <a16:creationId xmlns:a16="http://schemas.microsoft.com/office/drawing/2014/main" id="{3AF0F1A9-05DC-137D-4BCF-5553C2CAA58B}"/>
-              </a:ext>
-            </a:extLst>
-          </p:cNvPr>
-          <p:cNvSpPr txBox="1"/>
-          <p:nvPr/>
-        </p:nvSpPr>
-        <p:spPr>
-          <a:xfrm>
-            <a:off x="2170229" y="1745204"/>
-            <a:ext cx="5944954" cy="923330"/>
-          </a:xfrm>
-          <a:prstGeom prst="rect">
-            <a:avLst/>
-          </a:prstGeom>
-          <a:noFill/>
-        </p:spPr>
-        <p:txBody>
-          <a:bodyPr wrap="square" rtlCol="0">
-            <a:spAutoFit/>
-          </a:bodyPr>
-          <a:lstStyle/>
-          <a:p>
-            <a:pPr algn="ctr"/>
-            <a:r>
-              <a:rPr lang="en-GB" sz="5400" b="1" dirty="0">
-                <a:ln/>
-                <a:latin typeface="+mj-lt"/>
-              </a:rPr>
-              <a:t>@</a:t>
-            </a:r>
-            <a:r>
-              <a:rPr lang="en-GB" sz="5400" b="1" dirty="0" err="1">
-                <a:ln/>
-                <a:latin typeface="+mj-lt"/>
-              </a:rPr>
-              <a:t>CodeWithEbrahim</a:t>
-            </a:r>
-            <a:endParaRPr lang="en-GB" sz="5400" b="1" dirty="0">
-              <a:ln/>
-              <a:latin typeface="+mj-lt"/>
-            </a:endParaRPr>
-          </a:p>
-        </p:txBody>
-      </p:sp>
-      <p:grpSp>
-        <p:nvGrpSpPr>
-          <p:cNvPr id="25" name="Group 24">
-            <a:extLst>
-              <a:ext uri="{FF2B5EF4-FFF2-40B4-BE49-F238E27FC236}">
-                <a16:creationId xmlns:a16="http://schemas.microsoft.com/office/drawing/2014/main" id="{8B36CFE6-A506-32C2-D82C-D9CFA49A35B8}"/>
-              </a:ext>
-            </a:extLst>
-          </p:cNvPr>
-          <p:cNvGrpSpPr/>
-          <p:nvPr/>
-        </p:nvGrpSpPr>
-        <p:grpSpPr>
-          <a:xfrm>
-            <a:off x="4153139" y="492745"/>
-            <a:ext cx="1979135" cy="925200"/>
-            <a:chOff x="4315976" y="15244200"/>
-            <a:chExt cx="1979135" cy="925200"/>
-          </a:xfrm>
-        </p:grpSpPr>
-        <p:pic>
-          <p:nvPicPr>
-            <p:cNvPr id="22" name="Picture 21">
-              <a:extLst>
-                <a:ext uri="{FF2B5EF4-FFF2-40B4-BE49-F238E27FC236}">
-                  <a16:creationId xmlns:a16="http://schemas.microsoft.com/office/drawing/2014/main" id="{367077B8-EBC3-CC2C-6491-5C0D45B42B6C}"/>
-                </a:ext>
-              </a:extLst>
-            </p:cNvPr>
-            <p:cNvPicPr>
-              <a:picLocks noChangeAspect="1"/>
-            </p:cNvPicPr>
-            <p:nvPr/>
-          </p:nvPicPr>
-          <p:blipFill>
-            <a:blip r:embed="rId3"/>
-            <a:stretch>
-              <a:fillRect/>
-            </a:stretch>
-          </p:blipFill>
-          <p:spPr>
-            <a:xfrm>
-              <a:off x="5369911" y="15244200"/>
-              <a:ext cx="925200" cy="925200"/>
-            </a:xfrm>
-            <a:prstGeom prst="rect">
-              <a:avLst/>
-            </a:prstGeom>
-          </p:spPr>
-        </p:pic>
-        <p:pic>
-          <p:nvPicPr>
-            <p:cNvPr id="24" name="Picture 23">
-              <a:extLst>
-                <a:ext uri="{FF2B5EF4-FFF2-40B4-BE49-F238E27FC236}">
-                  <a16:creationId xmlns:a16="http://schemas.microsoft.com/office/drawing/2014/main" id="{45917954-65FF-A571-2710-6A1DE5EE48B5}"/>
-                </a:ext>
-              </a:extLst>
-            </p:cNvPr>
-            <p:cNvPicPr>
-              <a:picLocks noChangeAspect="1"/>
-            </p:cNvPicPr>
-            <p:nvPr/>
-          </p:nvPicPr>
-          <p:blipFill>
-            <a:blip r:embed="rId4"/>
-            <a:stretch>
-              <a:fillRect/>
-            </a:stretch>
-          </p:blipFill>
-          <p:spPr>
-            <a:xfrm>
-              <a:off x="4315976" y="15244200"/>
-              <a:ext cx="925200" cy="925200"/>
-            </a:xfrm>
-            <a:prstGeom prst="rect">
-              <a:avLst/>
-            </a:prstGeom>
-          </p:spPr>
-        </p:pic>
-      </p:grpSp>
-      <p:sp>
-        <p:nvSpPr>
           <p:cNvPr id="10" name="TextBox 9">
             <a:extLst>
               <a:ext uri="{FF2B5EF4-FFF2-40B4-BE49-F238E27FC236}">
@@ -6842,7 +8793,7 @@
           <p:nvPr/>
         </p:nvPicPr>
         <p:blipFill rotWithShape="1">
-          <a:blip r:embed="rId5"/>
+          <a:blip r:embed="rId3"/>
           <a:srcRect l="19320" t="33139" r="12833" b="18458"/>
           <a:stretch>
             <a:fillRect/>
@@ -6873,7 +8824,7 @@
           <p:nvPr/>
         </p:nvPicPr>
         <p:blipFill rotWithShape="1">
-          <a:blip r:embed="rId6"/>
+          <a:blip r:embed="rId4"/>
           <a:srcRect l="17225" t="32654" r="10336" b="17009"/>
           <a:stretch>
             <a:fillRect/>
@@ -6904,7 +8855,7 @@
           <p:nvPr/>
         </p:nvPicPr>
         <p:blipFill>
-          <a:blip r:embed="rId7"/>
+          <a:blip r:embed="rId5"/>
           <a:stretch>
             <a:fillRect/>
           </a:stretch>
@@ -7025,137 +8976,6 @@
           <a:chExt cx="0" cy="0"/>
         </a:xfrm>
       </p:grpSpPr>
-      <p:sp>
-        <p:nvSpPr>
-          <p:cNvPr id="8" name="TextBox 7">
-            <a:extLst>
-              <a:ext uri="{FF2B5EF4-FFF2-40B4-BE49-F238E27FC236}">
-                <a16:creationId xmlns:a16="http://schemas.microsoft.com/office/drawing/2014/main" id="{C8345EEA-8E33-AB34-6647-7D730998D0D4}"/>
-              </a:ext>
-            </a:extLst>
-          </p:cNvPr>
-          <p:cNvSpPr txBox="1"/>
-          <p:nvPr/>
-        </p:nvSpPr>
-        <p:spPr>
-          <a:xfrm>
-            <a:off x="2170229" y="1745204"/>
-            <a:ext cx="5944954" cy="923330"/>
-          </a:xfrm>
-          <a:prstGeom prst="rect">
-            <a:avLst/>
-          </a:prstGeom>
-          <a:noFill/>
-        </p:spPr>
-        <p:txBody>
-          <a:bodyPr wrap="square" rtlCol="0">
-            <a:spAutoFit/>
-          </a:bodyPr>
-          <a:lstStyle/>
-          <a:p>
-            <a:pPr algn="ctr"/>
-            <a:r>
-              <a:rPr lang="en-GB" sz="5400" b="1" dirty="0">
-                <a:ln/>
-                <a:latin typeface="+mj-lt"/>
-              </a:rPr>
-              <a:t>@</a:t>
-            </a:r>
-            <a:r>
-              <a:rPr lang="en-GB" sz="5400" b="1" dirty="0" err="1">
-                <a:ln/>
-                <a:latin typeface="+mj-lt"/>
-              </a:rPr>
-              <a:t>CodeWithEbrahim</a:t>
-            </a:r>
-            <a:endParaRPr lang="en-GB" sz="5400" b="1" dirty="0">
-              <a:ln/>
-              <a:latin typeface="+mj-lt"/>
-            </a:endParaRPr>
-          </a:p>
-        </p:txBody>
-      </p:sp>
-      <p:grpSp>
-        <p:nvGrpSpPr>
-          <p:cNvPr id="9" name="Group 8">
-            <a:extLst>
-              <a:ext uri="{FF2B5EF4-FFF2-40B4-BE49-F238E27FC236}">
-                <a16:creationId xmlns:a16="http://schemas.microsoft.com/office/drawing/2014/main" id="{C85A97EE-04CF-BB70-7A4E-EF65A741970A}"/>
-              </a:ext>
-            </a:extLst>
-          </p:cNvPr>
-          <p:cNvGrpSpPr/>
-          <p:nvPr/>
-        </p:nvGrpSpPr>
-        <p:grpSpPr>
-          <a:xfrm>
-            <a:off x="4153139" y="492745"/>
-            <a:ext cx="1979135" cy="925200"/>
-            <a:chOff x="4315976" y="15244200"/>
-            <a:chExt cx="1979135" cy="925200"/>
-          </a:xfrm>
-        </p:grpSpPr>
-        <p:pic>
-          <p:nvPicPr>
-            <p:cNvPr id="10" name="Picture 9">
-              <a:extLst>
-                <a:ext uri="{FF2B5EF4-FFF2-40B4-BE49-F238E27FC236}">
-                  <a16:creationId xmlns:a16="http://schemas.microsoft.com/office/drawing/2014/main" id="{EB62F72E-F833-B62D-AAA3-2D9858B82C3F}"/>
-                </a:ext>
-              </a:extLst>
-            </p:cNvPr>
-            <p:cNvPicPr>
-              <a:picLocks noChangeAspect="1"/>
-            </p:cNvPicPr>
-            <p:nvPr/>
-          </p:nvPicPr>
-          <p:blipFill>
-            <a:blip r:embed="rId3"/>
-            <a:stretch>
-              <a:fillRect/>
-            </a:stretch>
-          </p:blipFill>
-          <p:spPr>
-            <a:xfrm>
-              <a:off x="5369911" y="15244200"/>
-              <a:ext cx="925200" cy="925200"/>
-            </a:xfrm>
-            <a:prstGeom prst="rect">
-              <a:avLst/>
-            </a:prstGeom>
-          </p:spPr>
-        </p:pic>
-        <p:pic>
-          <p:nvPicPr>
-            <p:cNvPr id="11" name="Picture 10">
-              <a:extLst>
-                <a:ext uri="{FF2B5EF4-FFF2-40B4-BE49-F238E27FC236}">
-                  <a16:creationId xmlns:a16="http://schemas.microsoft.com/office/drawing/2014/main" id="{76C95DEE-C89F-14EA-3FD5-BE2B7A6C37B6}"/>
-                </a:ext>
-              </a:extLst>
-            </p:cNvPr>
-            <p:cNvPicPr>
-              <a:picLocks noChangeAspect="1"/>
-            </p:cNvPicPr>
-            <p:nvPr/>
-          </p:nvPicPr>
-          <p:blipFill>
-            <a:blip r:embed="rId4"/>
-            <a:stretch>
-              <a:fillRect/>
-            </a:stretch>
-          </p:blipFill>
-          <p:spPr>
-            <a:xfrm>
-              <a:off x="4315976" y="15244200"/>
-              <a:ext cx="925200" cy="925200"/>
-            </a:xfrm>
-            <a:prstGeom prst="rect">
-              <a:avLst/>
-            </a:prstGeom>
-          </p:spPr>
-        </p:pic>
-      </p:grpSp>
       <p:grpSp>
         <p:nvGrpSpPr>
           <p:cNvPr id="104" name="Group 103">
@@ -7191,7 +9011,7 @@
             <p:nvPr/>
           </p:nvPicPr>
           <p:blipFill rotWithShape="1">
-            <a:blip r:embed="rId5"/>
+            <a:blip r:embed="rId3"/>
             <a:srcRect l="18433" t="32757" r="11268" b="18316"/>
             <a:stretch>
               <a:fillRect/>
@@ -7222,10 +9042,10 @@
             <p:nvPr/>
           </p:nvPicPr>
           <p:blipFill>
-            <a:blip r:embed="rId6">
+            <a:blip r:embed="rId4">
               <a:extLst>
                 <a:ext uri="{96DAC541-7B7A-43D3-8B79-37D633B846F1}">
-                  <asvg:svgBlip xmlns:asvg="http://schemas.microsoft.com/office/drawing/2016/SVG/main" r:embed="rId7"/>
+                  <asvg:svgBlip xmlns:asvg="http://schemas.microsoft.com/office/drawing/2016/SVG/main" r:embed="rId5"/>
                 </a:ext>
               </a:extLst>
             </a:blip>
@@ -7324,7 +9144,7 @@
             <p:nvPr/>
           </p:nvPicPr>
           <p:blipFill rotWithShape="1">
-            <a:blip r:embed="rId8"/>
+            <a:blip r:embed="rId6"/>
             <a:srcRect l="18284" t="32749" r="11433" b="18336"/>
             <a:stretch>
               <a:fillRect/>
@@ -7355,7 +9175,7 @@
             <p:nvPr/>
           </p:nvPicPr>
           <p:blipFill>
-            <a:blip r:embed="rId9"/>
+            <a:blip r:embed="rId7"/>
             <a:stretch>
               <a:fillRect/>
             </a:stretch>
@@ -7385,10 +9205,10 @@
             <p:nvPr/>
           </p:nvPicPr>
           <p:blipFill>
-            <a:blip r:embed="rId10">
+            <a:blip r:embed="rId8">
               <a:extLst>
                 <a:ext uri="{96DAC541-7B7A-43D3-8B79-37D633B846F1}">
-                  <asvg:svgBlip xmlns:asvg="http://schemas.microsoft.com/office/drawing/2016/SVG/main" r:embed="rId11"/>
+                  <asvg:svgBlip xmlns:asvg="http://schemas.microsoft.com/office/drawing/2016/SVG/main" r:embed="rId9"/>
                 </a:ext>
               </a:extLst>
             </a:blip>
@@ -7767,6 +9587,455 @@
     <p:extLst>
       <p:ext uri="{BB962C8B-B14F-4D97-AF65-F5344CB8AC3E}">
         <p14:creationId xmlns:p14="http://schemas.microsoft.com/office/powerpoint/2010/main" val="1230972794"/>
+      </p:ext>
+    </p:extLst>
+  </p:cSld>
+  <p:clrMapOvr>
+    <a:masterClrMapping/>
+  </p:clrMapOvr>
+  <p:extLst>
+    <p:ext uri="{6950BFC3-D8DA-4A85-94F7-54DA5524770B}">
+      <p188:commentRel xmlns:p188="http://schemas.microsoft.com/office/powerpoint/2018/8/main" r:id="rId2"/>
+    </p:ext>
+  </p:extLst>
+</p:sld>
+</file>
+
+<file path=ppt/slides/slide9.xml><?xml version="1.0" encoding="utf-8"?>
+<p:sld xmlns:a="http://schemas.openxmlformats.org/drawingml/2006/main" xmlns:r="http://schemas.openxmlformats.org/officeDocument/2006/relationships" xmlns:p="http://schemas.openxmlformats.org/presentationml/2006/main">
+  <p:cSld>
+    <p:bg>
+      <p:bgPr>
+        <a:pattFill prst="solidDmnd">
+          <a:fgClr>
+            <a:schemeClr val="bg2"/>
+          </a:fgClr>
+          <a:bgClr>
+            <a:schemeClr val="bg1"/>
+          </a:bgClr>
+        </a:pattFill>
+        <a:effectLst/>
+      </p:bgPr>
+    </p:bg>
+    <p:spTree>
+      <p:nvGrpSpPr>
+        <p:cNvPr id="1" name=""/>
+        <p:cNvGrpSpPr/>
+        <p:nvPr/>
+      </p:nvGrpSpPr>
+      <p:grpSpPr>
+        <a:xfrm>
+          <a:off x="0" y="0"/>
+          <a:ext cx="0" cy="0"/>
+          <a:chOff x="0" y="0"/>
+          <a:chExt cx="0" cy="0"/>
+        </a:xfrm>
+      </p:grpSpPr>
+      <p:pic>
+        <p:nvPicPr>
+          <p:cNvPr id="68" name="Picture 67">
+            <a:extLst>
+              <a:ext uri="{FF2B5EF4-FFF2-40B4-BE49-F238E27FC236}">
+                <a16:creationId xmlns:a16="http://schemas.microsoft.com/office/drawing/2014/main" id="{F27F718B-3075-03B3-8216-CB5C90C11593}"/>
+              </a:ext>
+            </a:extLst>
+          </p:cNvPr>
+          <p:cNvPicPr>
+            <a:picLocks noChangeAspect="1"/>
+          </p:cNvPicPr>
+          <p:nvPr/>
+        </p:nvPicPr>
+        <p:blipFill rotWithShape="1">
+          <a:blip r:embed="rId3"/>
+          <a:srcRect l="19122" t="24607" r="11265" b="13804"/>
+          <a:stretch>
+            <a:fillRect/>
+          </a:stretch>
+        </p:blipFill>
+        <p:spPr>
+          <a:xfrm>
+            <a:off x="338586" y="4196968"/>
+            <a:ext cx="9544666" cy="6991756"/>
+          </a:xfrm>
+          <a:prstGeom prst="rect">
+            <a:avLst/>
+          </a:prstGeom>
+        </p:spPr>
+      </p:pic>
+      <p:sp>
+        <p:nvSpPr>
+          <p:cNvPr id="8" name="TextBox 7">
+            <a:extLst>
+              <a:ext uri="{FF2B5EF4-FFF2-40B4-BE49-F238E27FC236}">
+                <a16:creationId xmlns:a16="http://schemas.microsoft.com/office/drawing/2014/main" id="{9D88EAA7-EAD5-26FB-0617-9B43EF4A29B9}"/>
+              </a:ext>
+            </a:extLst>
+          </p:cNvPr>
+          <p:cNvSpPr txBox="1"/>
+          <p:nvPr/>
+        </p:nvSpPr>
+        <p:spPr>
+          <a:xfrm>
+            <a:off x="338586" y="3131629"/>
+            <a:ext cx="9544666" cy="923330"/>
+          </a:xfrm>
+          <a:prstGeom prst="rect">
+            <a:avLst/>
+          </a:prstGeom>
+          <a:noFill/>
+          <a:ln w="9525" cap="flat" cmpd="sng" algn="ctr">
+            <a:solidFill>
+              <a:schemeClr val="accent3"/>
+            </a:solidFill>
+            <a:prstDash val="solid"/>
+            <a:round/>
+            <a:headEnd type="none" w="med" len="med"/>
+            <a:tailEnd type="none" w="med" len="med"/>
+          </a:ln>
+        </p:spPr>
+        <p:style>
+          <a:lnRef idx="0">
+            <a:scrgbClr r="0" g="0" b="0"/>
+          </a:lnRef>
+          <a:fillRef idx="0">
+            <a:scrgbClr r="0" g="0" b="0"/>
+          </a:fillRef>
+          <a:effectRef idx="0">
+            <a:scrgbClr r="0" g="0" b="0"/>
+          </a:effectRef>
+          <a:fontRef idx="minor">
+            <a:schemeClr val="accent3"/>
+          </a:fontRef>
+        </p:style>
+        <p:txBody>
+          <a:bodyPr wrap="square" rtlCol="0">
+            <a:spAutoFit/>
+          </a:bodyPr>
+          <a:lstStyle/>
+          <a:p>
+            <a:pPr algn="ctr"/>
+            <a:r>
+              <a:rPr lang="en-GB" sz="5400" b="1" dirty="0">
+                <a:ln w="22225">
+                  <a:solidFill>
+                    <a:schemeClr val="accent2"/>
+                  </a:solidFill>
+                  <a:prstDash val="solid"/>
+                </a:ln>
+                <a:solidFill>
+                  <a:srgbClr val="C00000"/>
+                </a:solidFill>
+                <a:latin typeface="Patrick Hand" pitchFamily="2" charset="77"/>
+              </a:rPr>
+              <a:t>Stop using print() to test your code!</a:t>
+            </a:r>
+            <a:r>
+              <a:rPr lang="en-US" sz="5400" b="1" dirty="0">
+                <a:ln w="22225">
+                  <a:solidFill>
+                    <a:schemeClr val="accent2"/>
+                  </a:solidFill>
+                  <a:prstDash val="solid"/>
+                </a:ln>
+                <a:solidFill>
+                  <a:srgbClr val="C00000"/>
+                </a:solidFill>
+                <a:latin typeface="Patrick Hand" pitchFamily="2" charset="77"/>
+              </a:rPr>
+              <a:t> </a:t>
+            </a:r>
+            <a:endParaRPr lang="en-DE" sz="5400" b="1" dirty="0">
+              <a:ln w="22225">
+                <a:solidFill>
+                  <a:schemeClr val="accent2"/>
+                </a:solidFill>
+                <a:prstDash val="solid"/>
+              </a:ln>
+              <a:solidFill>
+                <a:srgbClr val="C00000"/>
+              </a:solidFill>
+              <a:latin typeface="Patrick Hand" pitchFamily="2" charset="77"/>
+            </a:endParaRPr>
+          </a:p>
+        </p:txBody>
+      </p:sp>
+      <p:sp>
+        <p:nvSpPr>
+          <p:cNvPr id="38" name="TextBox 37">
+            <a:extLst>
+              <a:ext uri="{FF2B5EF4-FFF2-40B4-BE49-F238E27FC236}">
+                <a16:creationId xmlns:a16="http://schemas.microsoft.com/office/drawing/2014/main" id="{D9D67AC1-8CD7-9EA6-AA44-75765EDCB4D3}"/>
+              </a:ext>
+            </a:extLst>
+          </p:cNvPr>
+          <p:cNvSpPr txBox="1"/>
+          <p:nvPr/>
+        </p:nvSpPr>
+        <p:spPr>
+          <a:xfrm>
+            <a:off x="338586" y="11505474"/>
+            <a:ext cx="8919714" cy="1446550"/>
+          </a:xfrm>
+          <a:prstGeom prst="rect">
+            <a:avLst/>
+          </a:prstGeom>
+          <a:noFill/>
+        </p:spPr>
+        <p:txBody>
+          <a:bodyPr wrap="square" rtlCol="0">
+            <a:spAutoFit/>
+          </a:bodyPr>
+          <a:lstStyle/>
+          <a:p>
+            <a:r>
+              <a:rPr lang="en-DE" sz="4400" dirty="0">
+                <a:ln w="0"/>
+                <a:solidFill>
+                  <a:srgbClr val="0070C0"/>
+                </a:solidFill>
+                <a:effectLst>
+                  <a:outerShdw blurRad="38100" dist="25400" dir="5400000" algn="ctr" rotWithShape="0">
+                    <a:srgbClr val="6E747A">
+                      <a:alpha val="43000"/>
+                    </a:srgbClr>
+                  </a:outerShdw>
+                </a:effectLst>
+              </a:rPr>
+              <a:t>Pre Requisite: pip install pytest</a:t>
+            </a:r>
+          </a:p>
+          <a:p>
+            <a:r>
+              <a:rPr lang="en-GB" sz="4400" dirty="0">
+                <a:ln w="0"/>
+                <a:solidFill>
+                  <a:srgbClr val="0070C0"/>
+                </a:solidFill>
+                <a:effectLst>
+                  <a:outerShdw blurRad="38100" dist="25400" dir="5400000" algn="ctr" rotWithShape="0">
+                    <a:srgbClr val="6E747A">
+                      <a:alpha val="43000"/>
+                    </a:srgbClr>
+                  </a:outerShdw>
+                </a:effectLst>
+              </a:rPr>
+              <a:t>R</a:t>
+            </a:r>
+            <a:r>
+              <a:rPr lang="en-DE" sz="4400" dirty="0">
+                <a:ln w="0"/>
+                <a:solidFill>
+                  <a:srgbClr val="0070C0"/>
+                </a:solidFill>
+                <a:effectLst>
+                  <a:outerShdw blurRad="38100" dist="25400" dir="5400000" algn="ctr" rotWithShape="0">
+                    <a:srgbClr val="6E747A">
+                      <a:alpha val="43000"/>
+                    </a:srgbClr>
+                  </a:outerShdw>
+                </a:effectLst>
+              </a:rPr>
+              <a:t>un: pytest</a:t>
+            </a:r>
+          </a:p>
+        </p:txBody>
+      </p:sp>
+      <p:pic>
+        <p:nvPicPr>
+          <p:cNvPr id="39" name="Picture 38">
+            <a:extLst>
+              <a:ext uri="{FF2B5EF4-FFF2-40B4-BE49-F238E27FC236}">
+                <a16:creationId xmlns:a16="http://schemas.microsoft.com/office/drawing/2014/main" id="{5D8269C7-709E-6998-5283-B107C7781FFA}"/>
+              </a:ext>
+            </a:extLst>
+          </p:cNvPr>
+          <p:cNvPicPr>
+            <a:picLocks noChangeAspect="1"/>
+          </p:cNvPicPr>
+          <p:nvPr/>
+        </p:nvPicPr>
+        <p:blipFill>
+          <a:blip r:embed="rId4"/>
+          <a:stretch>
+            <a:fillRect/>
+          </a:stretch>
+        </p:blipFill>
+        <p:spPr>
+          <a:xfrm>
+            <a:off x="396662" y="10058156"/>
+            <a:ext cx="1063167" cy="1063167"/>
+          </a:xfrm>
+          <a:prstGeom prst="rect">
+            <a:avLst/>
+          </a:prstGeom>
+        </p:spPr>
+      </p:pic>
+      <p:cxnSp>
+        <p:nvCxnSpPr>
+          <p:cNvPr id="41" name="Straight Connector 40">
+            <a:extLst>
+              <a:ext uri="{FF2B5EF4-FFF2-40B4-BE49-F238E27FC236}">
+                <a16:creationId xmlns:a16="http://schemas.microsoft.com/office/drawing/2014/main" id="{3DEC39D2-B0EB-4B63-00D7-3B3E21C2FDC1}"/>
+              </a:ext>
+            </a:extLst>
+          </p:cNvPr>
+          <p:cNvCxnSpPr>
+            <a:cxnSpLocks/>
+          </p:cNvCxnSpPr>
+          <p:nvPr/>
+        </p:nvCxnSpPr>
+        <p:spPr>
+          <a:xfrm>
+            <a:off x="313276" y="6263285"/>
+            <a:ext cx="9609827" cy="0"/>
+          </a:xfrm>
+          <a:prstGeom prst="line">
+            <a:avLst/>
+          </a:prstGeom>
+          <a:ln w="41275">
+            <a:solidFill>
+              <a:schemeClr val="bg1"/>
+            </a:solidFill>
+            <a:headEnd type="none"/>
+            <a:tailEnd type="none" w="lg" len="lg"/>
+          </a:ln>
+        </p:spPr>
+        <p:style>
+          <a:lnRef idx="1">
+            <a:schemeClr val="accent1"/>
+          </a:lnRef>
+          <a:fillRef idx="0">
+            <a:schemeClr val="accent1"/>
+          </a:fillRef>
+          <a:effectRef idx="0">
+            <a:schemeClr val="accent1"/>
+          </a:effectRef>
+          <a:fontRef idx="minor">
+            <a:schemeClr val="tx1"/>
+          </a:fontRef>
+        </p:style>
+      </p:cxnSp>
+      <p:cxnSp>
+        <p:nvCxnSpPr>
+          <p:cNvPr id="69" name="Straight Connector 68">
+            <a:extLst>
+              <a:ext uri="{FF2B5EF4-FFF2-40B4-BE49-F238E27FC236}">
+                <a16:creationId xmlns:a16="http://schemas.microsoft.com/office/drawing/2014/main" id="{F2728270-9B9A-7A9F-F2A8-323E7A58C200}"/>
+              </a:ext>
+            </a:extLst>
+          </p:cNvPr>
+          <p:cNvCxnSpPr>
+            <a:cxnSpLocks/>
+          </p:cNvCxnSpPr>
+          <p:nvPr/>
+        </p:nvCxnSpPr>
+        <p:spPr>
+          <a:xfrm>
+            <a:off x="344905" y="8417013"/>
+            <a:ext cx="9609827" cy="0"/>
+          </a:xfrm>
+          <a:prstGeom prst="line">
+            <a:avLst/>
+          </a:prstGeom>
+          <a:ln w="41275">
+            <a:solidFill>
+              <a:schemeClr val="bg1"/>
+            </a:solidFill>
+            <a:headEnd type="none"/>
+            <a:tailEnd type="none" w="lg" len="lg"/>
+          </a:ln>
+        </p:spPr>
+        <p:style>
+          <a:lnRef idx="1">
+            <a:schemeClr val="accent1"/>
+          </a:lnRef>
+          <a:fillRef idx="0">
+            <a:schemeClr val="accent1"/>
+          </a:fillRef>
+          <a:effectRef idx="0">
+            <a:schemeClr val="accent1"/>
+          </a:effectRef>
+          <a:fontRef idx="minor">
+            <a:schemeClr val="tx1"/>
+          </a:fontRef>
+        </p:style>
+      </p:cxnSp>
+      <p:pic>
+        <p:nvPicPr>
+          <p:cNvPr id="73" name="Graphic 72" descr="Shield Tick with solid fill">
+            <a:extLst>
+              <a:ext uri="{FF2B5EF4-FFF2-40B4-BE49-F238E27FC236}">
+                <a16:creationId xmlns:a16="http://schemas.microsoft.com/office/drawing/2014/main" id="{3E10B054-0ABA-4495-55F7-5348E50616A6}"/>
+              </a:ext>
+            </a:extLst>
+          </p:cNvPr>
+          <p:cNvPicPr>
+            <a:picLocks noChangeAspect="1"/>
+          </p:cNvPicPr>
+          <p:nvPr/>
+        </p:nvPicPr>
+        <p:blipFill>
+          <a:blip r:embed="rId5">
+            <a:extLst>
+              <a:ext uri="{96DAC541-7B7A-43D3-8B79-37D633B846F1}">
+                <asvg:svgBlip xmlns:asvg="http://schemas.microsoft.com/office/drawing/2016/SVG/main" r:embed="rId6"/>
+              </a:ext>
+            </a:extLst>
+          </a:blip>
+          <a:stretch>
+            <a:fillRect/>
+          </a:stretch>
+        </p:blipFill>
+        <p:spPr>
+          <a:xfrm>
+            <a:off x="6411582" y="8556576"/>
+            <a:ext cx="914400" cy="914400"/>
+          </a:xfrm>
+          <a:prstGeom prst="rect">
+            <a:avLst/>
+          </a:prstGeom>
+        </p:spPr>
+      </p:pic>
+      <p:pic>
+        <p:nvPicPr>
+          <p:cNvPr id="77" name="Graphic 76" descr="Close with solid fill">
+            <a:extLst>
+              <a:ext uri="{FF2B5EF4-FFF2-40B4-BE49-F238E27FC236}">
+                <a16:creationId xmlns:a16="http://schemas.microsoft.com/office/drawing/2014/main" id="{0045C14B-3459-5991-D210-53E90DC022C1}"/>
+              </a:ext>
+            </a:extLst>
+          </p:cNvPr>
+          <p:cNvPicPr>
+            <a:picLocks noChangeAspect="1"/>
+          </p:cNvPicPr>
+          <p:nvPr/>
+        </p:nvPicPr>
+        <p:blipFill>
+          <a:blip r:embed="rId7">
+            <a:extLst>
+              <a:ext uri="{96DAC541-7B7A-43D3-8B79-37D633B846F1}">
+                <asvg:svgBlip xmlns:asvg="http://schemas.microsoft.com/office/drawing/2016/SVG/main" r:embed="rId8"/>
+              </a:ext>
+            </a:extLst>
+          </a:blip>
+          <a:stretch>
+            <a:fillRect/>
+          </a:stretch>
+        </p:blipFill>
+        <p:spPr>
+          <a:xfrm>
+            <a:off x="6411582" y="6757642"/>
+            <a:ext cx="914400" cy="914400"/>
+          </a:xfrm>
+          <a:prstGeom prst="rect">
+            <a:avLst/>
+          </a:prstGeom>
+        </p:spPr>
+      </p:pic>
+    </p:spTree>
+    <p:extLst>
+      <p:ext uri="{BB962C8B-B14F-4D97-AF65-F5344CB8AC3E}">
+        <p14:creationId xmlns:p14="http://schemas.microsoft.com/office/powerpoint/2010/main" val="2419597336"/>
       </p:ext>
     </p:extLst>
   </p:cSld>

</xml_diff>

<commit_message>
feat: created a video number 013
</commit_message>
<xml_diff>
--- a/assets/get-ready.pptx
+++ b/assets/get-ready.pptx
@@ -297,6 +297,56 @@
 </p188:cmLst>
 </file>
 
+<file path=ppt/comments/modernComment_117_532A238D.xml><?xml version="1.0" encoding="utf-8"?>
+<p188:cmLst xmlns:a="http://schemas.openxmlformats.org/drawingml/2006/main" xmlns:r="http://schemas.openxmlformats.org/officeDocument/2006/relationships" xmlns:p188="http://schemas.microsoft.com/office/powerpoint/2018/8/main">
+  <p188:cm id="{C2077823-D24A-8947-B4FE-B579AFEE0A3A}" authorId="{8860045D-B334-310D-0A4E-9E20AA0B149E}" created="2026-01-03T21:47:30.016">
+    <pc:sldMkLst xmlns:pc="http://schemas.microsoft.com/office/powerpoint/2013/main/command">
+      <pc:docMk/>
+      <pc:sldMk cId="1395270541" sldId="279"/>
+    </pc:sldMkLst>
+    <p188:txBody>
+      <a:bodyPr/>
+      <a:lstStyle/>
+      <a:p>
+        <a:r>
+          <a:rPr lang="en-DE"/>
+          <a:t>Youtube
+Title: Why you should switch to Pathlib! 🐍
+Working with file paths doesn't have to be ugly. pathlib makes your code readable and object-oriented. No more messy strings!
+🚀 Pro Tip: Use the / operator to join paths easily.
+#Python #CleanCode #Pathlib #SoftwareEngineering #ProgrammingTips #CodingLife #Backend #CodeWithEbrahim</a:t>
+        </a:r>
+      </a:p>
+    </p188:txBody>
+  </p188:cm>
+</p188:cmLst>
+</file>
+
+<file path=ppt/comments/modernComment_118_626EC4B9.xml><?xml version="1.0" encoding="utf-8"?>
+<p188:cmLst xmlns:a="http://schemas.openxmlformats.org/drawingml/2006/main" xmlns:r="http://schemas.openxmlformats.org/officeDocument/2006/relationships" xmlns:p188="http://schemas.microsoft.com/office/powerpoint/2018/8/main">
+  <p188:cm id="{F289ECDD-2FC4-B843-90C4-2BBA8C3E356B}" authorId="{8860045D-B334-310D-0A4E-9E20AA0B149E}" created="2026-01-03T21:59:30.244">
+    <pc:sldMkLst xmlns:pc="http://schemas.microsoft.com/office/powerpoint/2013/main/command">
+      <pc:docMk/>
+      <pc:sldMk cId="1651426489" sldId="280"/>
+    </pc:sldMkLst>
+    <p188:txBody>
+      <a:bodyPr/>
+      <a:lstStyle/>
+      <a:p>
+        <a:r>
+          <a:rPr lang="en-DE"/>
+          <a:t>Title: Pythonic If-Statements: Use Truthiness! 🐍
+Why write more code when Python does it for you? Using Truthiness makes your scripts cleaner and more efficient. 🚀
+🇺🇸 Learn the Pythonic way! 🇩🇪 Python-Code sauberer schreiben!
+#Python #CleanCode #Pythonic #ProgrammingTips #Coding #SoftwareEngineering #USA #Germany #CodeWithEbrahim
+</a:t>
+        </a:r>
+      </a:p>
+    </p188:txBody>
+  </p188:cm>
+</p188:cmLst>
+</file>
+
 <file path=ppt/notesMasters/notesMaster1.xml><?xml version="1.0" encoding="utf-8"?>
 <p:notesMaster xmlns:a="http://schemas.openxmlformats.org/drawingml/2006/main" xmlns:r="http://schemas.openxmlformats.org/officeDocument/2006/relationships" xmlns:p="http://schemas.openxmlformats.org/presentationml/2006/main">
   <p:cSld>
@@ -1207,6 +1257,109 @@
     <p:extLst>
       <p:ext uri="{BB962C8B-B14F-4D97-AF65-F5344CB8AC3E}">
         <p14:creationId xmlns:p14="http://schemas.microsoft.com/office/powerpoint/2010/main" val="4123593181"/>
+      </p:ext>
+    </p:extLst>
+  </p:cSld>
+  <p:clrMapOvr>
+    <a:masterClrMapping/>
+  </p:clrMapOvr>
+</p:notes>
+</file>
+
+<file path=ppt/notesSlides/notesSlide6.xml><?xml version="1.0" encoding="utf-8"?>
+<p:notes xmlns:a="http://schemas.openxmlformats.org/drawingml/2006/main" xmlns:r="http://schemas.openxmlformats.org/officeDocument/2006/relationships" xmlns:p="http://schemas.openxmlformats.org/presentationml/2006/main">
+  <p:cSld>
+    <p:spTree>
+      <p:nvGrpSpPr>
+        <p:cNvPr id="1" name=""/>
+        <p:cNvGrpSpPr/>
+        <p:nvPr/>
+      </p:nvGrpSpPr>
+      <p:grpSpPr>
+        <a:xfrm>
+          <a:off x="0" y="0"/>
+          <a:ext cx="0" cy="0"/>
+          <a:chOff x="0" y="0"/>
+          <a:chExt cx="0" cy="0"/>
+        </a:xfrm>
+      </p:grpSpPr>
+      <p:sp>
+        <p:nvSpPr>
+          <p:cNvPr id="2" name="Slide Image Placeholder 1"/>
+          <p:cNvSpPr>
+            <a:spLocks noGrp="1" noRot="1" noChangeAspect="1"/>
+          </p:cNvSpPr>
+          <p:nvPr>
+            <p:ph type="sldImg"/>
+          </p:nvPr>
+        </p:nvSpPr>
+        <p:spPr/>
+      </p:sp>
+      <p:sp>
+        <p:nvSpPr>
+          <p:cNvPr id="3" name="Notes Placeholder 2"/>
+          <p:cNvSpPr>
+            <a:spLocks noGrp="1"/>
+          </p:cNvSpPr>
+          <p:nvPr>
+            <p:ph type="body" idx="1"/>
+          </p:nvPr>
+        </p:nvSpPr>
+        <p:spPr/>
+        <p:txBody>
+          <a:bodyPr/>
+          <a:lstStyle/>
+          <a:p>
+            <a:r>
+              <a:rPr lang="en-GB" dirty="0"/>
+              <a:t>Video 011</a:t>
+            </a:r>
+            <a:br>
+              <a:rPr lang="en-GB" dirty="0"/>
+            </a:br>
+            <a:r>
+              <a:rPr lang="en-GB" dirty="0"/>
+              <a:t>F</a:t>
+            </a:r>
+            <a:r>
+              <a:rPr lang="en-DE" dirty="0"/>
+              <a:t>older: </a:t>
+            </a:r>
+            <a:r>
+              <a:rPr lang="en-GB" dirty="0"/>
+              <a:t>py_011_pathlib</a:t>
+            </a:r>
+            <a:endParaRPr lang="en-DE" dirty="0"/>
+          </a:p>
+        </p:txBody>
+      </p:sp>
+      <p:sp>
+        <p:nvSpPr>
+          <p:cNvPr id="4" name="Slide Number Placeholder 3"/>
+          <p:cNvSpPr>
+            <a:spLocks noGrp="1"/>
+          </p:cNvSpPr>
+          <p:nvPr>
+            <p:ph type="sldNum" sz="quarter" idx="5"/>
+          </p:nvPr>
+        </p:nvSpPr>
+        <p:spPr/>
+        <p:txBody>
+          <a:bodyPr/>
+          <a:lstStyle/>
+          <a:p>
+            <a:fld id="{B46D1A58-C582-AC49-9010-037E894CD422}" type="slidenum">
+              <a:rPr lang="en-DE" smtClean="0"/>
+              <a:t>12</a:t>
+            </a:fld>
+            <a:endParaRPr lang="en-DE"/>
+          </a:p>
+        </p:txBody>
+      </p:sp>
+    </p:spTree>
+    <p:extLst>
+      <p:ext uri="{BB962C8B-B14F-4D97-AF65-F5344CB8AC3E}">
+        <p14:creationId xmlns:p14="http://schemas.microsoft.com/office/powerpoint/2010/main" val="2671372108"/>
       </p:ext>
     </p:extLst>
   </p:cSld>
@@ -5724,7 +5877,7 @@
     <p:bg>
       <p:bgPr>
         <a:blipFill>
-          <a:blip r:embed="rId2"/>
+          <a:blip r:embed="rId4"/>
           <a:tile tx="0" ty="0" sx="100000" sy="100000" flip="none" algn="tl"/>
         </a:blipFill>
         <a:effectLst/>
@@ -5764,11 +5917,22 @@
           <a:prstGeom prst="rect">
             <a:avLst/>
           </a:prstGeom>
-          <a:noFill/>
-          <a:ln>
-            <a:noFill/>
-          </a:ln>
-        </p:spPr>
+          <a:ln/>
+        </p:spPr>
+        <p:style>
+          <a:lnRef idx="0">
+            <a:schemeClr val="dk1"/>
+          </a:lnRef>
+          <a:fillRef idx="3">
+            <a:schemeClr val="dk1"/>
+          </a:fillRef>
+          <a:effectRef idx="3">
+            <a:schemeClr val="dk1"/>
+          </a:effectRef>
+          <a:fontRef idx="minor">
+            <a:schemeClr val="lt1"/>
+          </a:fontRef>
+        </p:style>
         <p:txBody>
           <a:bodyPr wrap="square" rtlCol="0">
             <a:spAutoFit/>
@@ -5790,36 +5954,35 @@
             <a:pPr algn="ctr"/>
             <a:r>
               <a:rPr lang="en-DE" sz="6600" b="1" dirty="0">
-                <a:ln w="12700">
+                <a:ln w="6600">
                   <a:solidFill>
-                    <a:schemeClr val="tx2">
-                      <a:lumMod val="75000"/>
-                    </a:schemeClr>
+                    <a:schemeClr val="accent2"/>
                   </a:solidFill>
                   <a:prstDash val="solid"/>
                 </a:ln>
-                <a:pattFill prst="dkUpDiag">
-                  <a:fgClr>
-                    <a:schemeClr val="tx2"/>
-                  </a:fgClr>
-                  <a:bgClr>
-                    <a:schemeClr val="tx2">
-                      <a:lumMod val="20000"/>
-                      <a:lumOff val="80000"/>
-                    </a:schemeClr>
-                  </a:bgClr>
-                </a:pattFill>
+                <a:solidFill>
+                  <a:srgbClr val="FFFFFF"/>
+                </a:solidFill>
                 <a:effectLst>
-                  <a:outerShdw dist="38100" dir="2640000" algn="bl" rotWithShape="0">
-                    <a:schemeClr val="tx2">
-                      <a:lumMod val="75000"/>
-                    </a:schemeClr>
+                  <a:outerShdw dist="38100" dir="2700000" algn="tl" rotWithShape="0">
+                    <a:schemeClr val="accent2"/>
                   </a:outerShdw>
                 </a:effectLst>
                 <a:latin typeface="Patrick Hand" pitchFamily="2" charset="77"/>
               </a:rPr>
-              <a:t>Python pathlib</a:t>
-            </a:r>
+              <a:t>pathlib</a:t>
+            </a:r>
+            <a:endParaRPr lang="en-DE" sz="6600" dirty="0">
+              <a:ln w="0"/>
+              <a:effectLst>
+                <a:outerShdw blurRad="38100" dist="19050" dir="2700000" algn="tl" rotWithShape="0">
+                  <a:schemeClr val="dk1">
+                    <a:alpha val="40000"/>
+                  </a:schemeClr>
+                </a:outerShdw>
+              </a:effectLst>
+              <a:latin typeface="Patrick Hand" pitchFamily="2" charset="77"/>
+            </a:endParaRPr>
           </a:p>
         </p:txBody>
       </p:sp>
@@ -5838,14 +6001,14 @@
           <p:nvPr/>
         </p:nvPicPr>
         <p:blipFill>
-          <a:blip r:embed="rId3"/>
+          <a:blip r:embed="rId5"/>
           <a:stretch>
             <a:fillRect/>
           </a:stretch>
         </p:blipFill>
         <p:spPr>
           <a:xfrm>
-            <a:off x="213487" y="2623664"/>
+            <a:off x="271852" y="2494115"/>
             <a:ext cx="1063167" cy="1063167"/>
           </a:xfrm>
           <a:prstGeom prst="rect">
@@ -5868,7 +6031,7 @@
           <p:nvPr/>
         </p:nvPicPr>
         <p:blipFill rotWithShape="1">
-          <a:blip r:embed="rId4"/>
+          <a:blip r:embed="rId6"/>
           <a:srcRect l="15099" t="18381" r="8553" b="9940"/>
           <a:stretch>
             <a:fillRect/>
@@ -5945,10 +6108,10 @@
           <p:nvPr/>
         </p:nvPicPr>
         <p:blipFill>
-          <a:blip r:embed="rId5">
+          <a:blip r:embed="rId7">
             <a:extLst>
               <a:ext uri="{96DAC541-7B7A-43D3-8B79-37D633B846F1}">
-                <asvg:svgBlip xmlns:asvg="http://schemas.microsoft.com/office/drawing/2016/SVG/main" r:embed="rId6"/>
+                <asvg:svgBlip xmlns:asvg="http://schemas.microsoft.com/office/drawing/2016/SVG/main" r:embed="rId8"/>
               </a:ext>
             </a:extLst>
           </a:blip>
@@ -5981,10 +6144,10 @@
           <p:nvPr/>
         </p:nvPicPr>
         <p:blipFill>
-          <a:blip r:embed="rId7">
+          <a:blip r:embed="rId9">
             <a:extLst>
               <a:ext uri="{96DAC541-7B7A-43D3-8B79-37D633B846F1}">
-                <asvg:svgBlip xmlns:asvg="http://schemas.microsoft.com/office/drawing/2016/SVG/main" r:embed="rId8"/>
+                <asvg:svgBlip xmlns:asvg="http://schemas.microsoft.com/office/drawing/2016/SVG/main" r:embed="rId10"/>
               </a:ext>
             </a:extLst>
           </a:blip>
@@ -6260,12 +6423,26 @@
   <p:clrMapOvr>
     <a:masterClrMapping/>
   </p:clrMapOvr>
+  <p:extLst>
+    <p:ext uri="{6950BFC3-D8DA-4A85-94F7-54DA5524770B}">
+      <p188:commentRel xmlns:p188="http://schemas.microsoft.com/office/powerpoint/2018/8/main" r:id="rId3"/>
+    </p:ext>
+  </p:extLst>
 </p:sld>
 </file>
 
 <file path=ppt/slides/slide13.xml><?xml version="1.0" encoding="utf-8"?>
 <p:sld xmlns:a="http://schemas.openxmlformats.org/drawingml/2006/main" xmlns:r="http://schemas.openxmlformats.org/officeDocument/2006/relationships" xmlns:p="http://schemas.openxmlformats.org/presentationml/2006/main">
   <p:cSld>
+    <p:bg>
+      <p:bgPr>
+        <a:blipFill>
+          <a:blip r:embed="rId3"/>
+          <a:tile tx="0" ty="0" sx="100000" sy="100000" flip="none" algn="tl"/>
+        </a:blipFill>
+        <a:effectLst/>
+      </p:bgPr>
+    </p:bg>
     <p:spTree>
       <p:nvGrpSpPr>
         <p:cNvPr id="1" name=""/>
@@ -6280,6 +6457,273 @@
           <a:chExt cx="0" cy="0"/>
         </a:xfrm>
       </p:grpSpPr>
+      <p:pic>
+        <p:nvPicPr>
+          <p:cNvPr id="37" name="Picture 36">
+            <a:extLst>
+              <a:ext uri="{FF2B5EF4-FFF2-40B4-BE49-F238E27FC236}">
+                <a16:creationId xmlns:a16="http://schemas.microsoft.com/office/drawing/2014/main" id="{971DBD18-ECBF-F0B4-AFE2-DCDA447C4C08}"/>
+              </a:ext>
+            </a:extLst>
+          </p:cNvPr>
+          <p:cNvPicPr>
+            <a:picLocks noChangeAspect="1"/>
+          </p:cNvPicPr>
+          <p:nvPr/>
+        </p:nvPicPr>
+        <p:blipFill rotWithShape="1">
+          <a:blip r:embed="rId4"/>
+          <a:srcRect l="24246" t="23158" r="13251" b="12790"/>
+          <a:stretch>
+            <a:fillRect/>
+          </a:stretch>
+        </p:blipFill>
+        <p:spPr>
+          <a:xfrm>
+            <a:off x="223306" y="4208562"/>
+            <a:ext cx="9838800" cy="10771790"/>
+          </a:xfrm>
+          <a:prstGeom prst="rect">
+            <a:avLst/>
+          </a:prstGeom>
+        </p:spPr>
+      </p:pic>
+      <p:sp>
+        <p:nvSpPr>
+          <p:cNvPr id="38" name="TextBox 37">
+            <a:extLst>
+              <a:ext uri="{FF2B5EF4-FFF2-40B4-BE49-F238E27FC236}">
+                <a16:creationId xmlns:a16="http://schemas.microsoft.com/office/drawing/2014/main" id="{02F516FD-316D-B719-C21B-68F85C795F3C}"/>
+              </a:ext>
+            </a:extLst>
+          </p:cNvPr>
+          <p:cNvSpPr txBox="1"/>
+          <p:nvPr/>
+        </p:nvSpPr>
+        <p:spPr>
+          <a:xfrm>
+            <a:off x="223306" y="2872200"/>
+            <a:ext cx="9838800" cy="1107996"/>
+          </a:xfrm>
+          <a:prstGeom prst="rect">
+            <a:avLst/>
+          </a:prstGeom>
+          <a:ln/>
+        </p:spPr>
+        <p:style>
+          <a:lnRef idx="0">
+            <a:schemeClr val="accent2"/>
+          </a:lnRef>
+          <a:fillRef idx="3">
+            <a:schemeClr val="accent2"/>
+          </a:fillRef>
+          <a:effectRef idx="3">
+            <a:schemeClr val="accent2"/>
+          </a:effectRef>
+          <a:fontRef idx="minor">
+            <a:schemeClr val="lt1"/>
+          </a:fontRef>
+        </p:style>
+        <p:txBody>
+          <a:bodyPr wrap="square" rtlCol="0">
+            <a:spAutoFit/>
+            <a:scene3d>
+              <a:camera prst="orthographicFront"/>
+              <a:lightRig rig="harsh" dir="t"/>
+            </a:scene3d>
+            <a:sp3d extrusionH="57150" prstMaterial="matte">
+              <a:bevelT w="63500" h="12700" prst="angle"/>
+              <a:contourClr>
+                <a:schemeClr val="bg1">
+                  <a:lumMod val="65000"/>
+                </a:schemeClr>
+              </a:contourClr>
+            </a:sp3d>
+          </a:bodyPr>
+          <a:lstStyle/>
+          <a:p>
+            <a:pPr algn="ctr"/>
+            <a:r>
+              <a:rPr lang="en-GB" sz="6600" b="1" dirty="0">
+                <a:ln w="0"/>
+                <a:solidFill>
+                  <a:schemeClr val="accent1"/>
+                </a:solidFill>
+                <a:effectLst>
+                  <a:outerShdw blurRad="38100" dist="25400" dir="5400000" algn="ctr" rotWithShape="0">
+                    <a:srgbClr val="6E747A">
+                      <a:alpha val="43000"/>
+                    </a:srgbClr>
+                  </a:outerShdw>
+                </a:effectLst>
+                <a:latin typeface="Patrick Hand" pitchFamily="2" charset="77"/>
+              </a:rPr>
+              <a:t>Truthiness</a:t>
+            </a:r>
+            <a:endParaRPr lang="en-GB" b="1" dirty="0">
+              <a:ln w="0"/>
+              <a:solidFill>
+                <a:schemeClr val="accent1"/>
+              </a:solidFill>
+              <a:effectLst>
+                <a:outerShdw blurRad="38100" dist="25400" dir="5400000" algn="ctr" rotWithShape="0">
+                  <a:srgbClr val="6E747A">
+                    <a:alpha val="43000"/>
+                  </a:srgbClr>
+                </a:outerShdw>
+              </a:effectLst>
+              <a:latin typeface="Patrick Hand" pitchFamily="2" charset="77"/>
+            </a:endParaRPr>
+          </a:p>
+        </p:txBody>
+      </p:sp>
+      <p:pic>
+        <p:nvPicPr>
+          <p:cNvPr id="39" name="Picture 38">
+            <a:extLst>
+              <a:ext uri="{FF2B5EF4-FFF2-40B4-BE49-F238E27FC236}">
+                <a16:creationId xmlns:a16="http://schemas.microsoft.com/office/drawing/2014/main" id="{CF25CE73-8562-EA92-101F-278FE6E68DFC}"/>
+              </a:ext>
+            </a:extLst>
+          </p:cNvPr>
+          <p:cNvPicPr>
+            <a:picLocks noChangeAspect="1"/>
+          </p:cNvPicPr>
+          <p:nvPr/>
+        </p:nvPicPr>
+        <p:blipFill>
+          <a:blip r:embed="rId5"/>
+          <a:stretch>
+            <a:fillRect/>
+          </a:stretch>
+        </p:blipFill>
+        <p:spPr>
+          <a:xfrm>
+            <a:off x="264001" y="2906105"/>
+            <a:ext cx="1063167" cy="1063167"/>
+          </a:xfrm>
+          <a:prstGeom prst="rect">
+            <a:avLst/>
+          </a:prstGeom>
+        </p:spPr>
+      </p:pic>
+      <p:cxnSp>
+        <p:nvCxnSpPr>
+          <p:cNvPr id="40" name="Straight Connector 39">
+            <a:extLst>
+              <a:ext uri="{FF2B5EF4-FFF2-40B4-BE49-F238E27FC236}">
+                <a16:creationId xmlns:a16="http://schemas.microsoft.com/office/drawing/2014/main" id="{E0DA8088-06F2-94B5-C3F4-15954706D4EF}"/>
+              </a:ext>
+            </a:extLst>
+          </p:cNvPr>
+          <p:cNvCxnSpPr>
+            <a:cxnSpLocks/>
+          </p:cNvCxnSpPr>
+          <p:nvPr/>
+        </p:nvCxnSpPr>
+        <p:spPr>
+          <a:xfrm>
+            <a:off x="223579" y="10395900"/>
+            <a:ext cx="9838255" cy="0"/>
+          </a:xfrm>
+          <a:prstGeom prst="line">
+            <a:avLst/>
+          </a:prstGeom>
+          <a:ln w="38100">
+            <a:solidFill>
+              <a:schemeClr val="bg1"/>
+            </a:solidFill>
+            <a:headEnd type="none"/>
+            <a:tailEnd type="none" w="lg" len="lg"/>
+          </a:ln>
+        </p:spPr>
+        <p:style>
+          <a:lnRef idx="1">
+            <a:schemeClr val="accent1"/>
+          </a:lnRef>
+          <a:fillRef idx="0">
+            <a:schemeClr val="accent1"/>
+          </a:fillRef>
+          <a:effectRef idx="0">
+            <a:schemeClr val="accent1"/>
+          </a:effectRef>
+          <a:fontRef idx="minor">
+            <a:schemeClr val="tx1"/>
+          </a:fontRef>
+        </p:style>
+      </p:cxnSp>
+      <p:pic>
+        <p:nvPicPr>
+          <p:cNvPr id="41" name="Graphic 40" descr="Shield Tick with solid fill">
+            <a:extLst>
+              <a:ext uri="{FF2B5EF4-FFF2-40B4-BE49-F238E27FC236}">
+                <a16:creationId xmlns:a16="http://schemas.microsoft.com/office/drawing/2014/main" id="{01510C08-436C-82D7-D02A-80A605474E8E}"/>
+              </a:ext>
+            </a:extLst>
+          </p:cNvPr>
+          <p:cNvPicPr>
+            <a:picLocks noChangeAspect="1"/>
+          </p:cNvPicPr>
+          <p:nvPr/>
+        </p:nvPicPr>
+        <p:blipFill>
+          <a:blip r:embed="rId6">
+            <a:extLst>
+              <a:ext uri="{96DAC541-7B7A-43D3-8B79-37D633B846F1}">
+                <asvg:svgBlip xmlns:asvg="http://schemas.microsoft.com/office/drawing/2016/SVG/main" r:embed="rId7"/>
+              </a:ext>
+            </a:extLst>
+          </a:blip>
+          <a:stretch>
+            <a:fillRect/>
+          </a:stretch>
+        </p:blipFill>
+        <p:spPr>
+          <a:xfrm>
+            <a:off x="7668075" y="10890478"/>
+            <a:ext cx="914400" cy="914400"/>
+          </a:xfrm>
+          <a:prstGeom prst="rect">
+            <a:avLst/>
+          </a:prstGeom>
+        </p:spPr>
+      </p:pic>
+      <p:pic>
+        <p:nvPicPr>
+          <p:cNvPr id="42" name="Graphic 41" descr="Close with solid fill">
+            <a:extLst>
+              <a:ext uri="{FF2B5EF4-FFF2-40B4-BE49-F238E27FC236}">
+                <a16:creationId xmlns:a16="http://schemas.microsoft.com/office/drawing/2014/main" id="{F9E50DDB-5369-3F10-6CE1-B12F3117D414}"/>
+              </a:ext>
+            </a:extLst>
+          </p:cNvPr>
+          <p:cNvPicPr>
+            <a:picLocks noChangeAspect="1"/>
+          </p:cNvPicPr>
+          <p:nvPr/>
+        </p:nvPicPr>
+        <p:blipFill>
+          <a:blip r:embed="rId8">
+            <a:extLst>
+              <a:ext uri="{96DAC541-7B7A-43D3-8B79-37D633B846F1}">
+                <asvg:svgBlip xmlns:asvg="http://schemas.microsoft.com/office/drawing/2016/SVG/main" r:embed="rId9"/>
+              </a:ext>
+            </a:extLst>
+          </a:blip>
+          <a:stretch>
+            <a:fillRect/>
+          </a:stretch>
+        </p:blipFill>
+        <p:spPr>
+          <a:xfrm>
+            <a:off x="7668075" y="6404513"/>
+            <a:ext cx="914400" cy="914400"/>
+          </a:xfrm>
+          <a:prstGeom prst="rect">
+            <a:avLst/>
+          </a:prstGeom>
+        </p:spPr>
+      </p:pic>
     </p:spTree>
     <p:extLst>
       <p:ext uri="{BB962C8B-B14F-4D97-AF65-F5344CB8AC3E}">
@@ -6290,12 +6734,30 @@
   <p:clrMapOvr>
     <a:masterClrMapping/>
   </p:clrMapOvr>
+  <p:extLst>
+    <p:ext uri="{6950BFC3-D8DA-4A85-94F7-54DA5524770B}">
+      <p188:commentRel xmlns:p188="http://schemas.microsoft.com/office/powerpoint/2018/8/main" r:id="rId2"/>
+    </p:ext>
+  </p:extLst>
 </p:sld>
 </file>
 
 <file path=ppt/slides/slide14.xml><?xml version="1.0" encoding="utf-8"?>
 <p:sld xmlns:a="http://schemas.openxmlformats.org/drawingml/2006/main" xmlns:r="http://schemas.openxmlformats.org/officeDocument/2006/relationships" xmlns:p="http://schemas.openxmlformats.org/presentationml/2006/main">
   <p:cSld>
+    <p:bg>
+      <p:bgPr>
+        <a:pattFill prst="dotGrid">
+          <a:fgClr>
+            <a:srgbClr val="92D050"/>
+          </a:fgClr>
+          <a:bgClr>
+            <a:schemeClr val="bg1"/>
+          </a:bgClr>
+        </a:pattFill>
+        <a:effectLst/>
+      </p:bgPr>
+    </p:bg>
     <p:spTree>
       <p:nvGrpSpPr>
         <p:cNvPr id="1" name=""/>
@@ -6310,6 +6772,590 @@
           <a:chExt cx="0" cy="0"/>
         </a:xfrm>
       </p:grpSpPr>
+      <p:grpSp>
+        <p:nvGrpSpPr>
+          <p:cNvPr id="23" name="Group 22">
+            <a:extLst>
+              <a:ext uri="{FF2B5EF4-FFF2-40B4-BE49-F238E27FC236}">
+                <a16:creationId xmlns:a16="http://schemas.microsoft.com/office/drawing/2014/main" id="{77507D99-36CB-6227-152C-9190E799B830}"/>
+              </a:ext>
+            </a:extLst>
+          </p:cNvPr>
+          <p:cNvGrpSpPr/>
+          <p:nvPr/>
+        </p:nvGrpSpPr>
+        <p:grpSpPr>
+          <a:xfrm>
+            <a:off x="223306" y="2872200"/>
+            <a:ext cx="9838800" cy="1107996"/>
+            <a:chOff x="223306" y="2872200"/>
+            <a:chExt cx="9838800" cy="1107996"/>
+          </a:xfrm>
+        </p:grpSpPr>
+        <p:sp>
+          <p:nvSpPr>
+            <p:cNvPr id="4" name="TextBox 3">
+              <a:extLst>
+                <a:ext uri="{FF2B5EF4-FFF2-40B4-BE49-F238E27FC236}">
+                  <a16:creationId xmlns:a16="http://schemas.microsoft.com/office/drawing/2014/main" id="{2D6272F5-EA5E-8E54-DAF0-417836251F1B}"/>
+                </a:ext>
+              </a:extLst>
+            </p:cNvPr>
+            <p:cNvSpPr txBox="1"/>
+            <p:nvPr/>
+          </p:nvSpPr>
+          <p:spPr>
+            <a:xfrm>
+              <a:off x="223306" y="2872200"/>
+              <a:ext cx="9838800" cy="1107996"/>
+            </a:xfrm>
+            <a:prstGeom prst="rect">
+              <a:avLst/>
+            </a:prstGeom>
+            <a:ln/>
+          </p:spPr>
+          <p:style>
+            <a:lnRef idx="1">
+              <a:schemeClr val="accent6"/>
+            </a:lnRef>
+            <a:fillRef idx="2">
+              <a:schemeClr val="accent6"/>
+            </a:fillRef>
+            <a:effectRef idx="1">
+              <a:schemeClr val="accent6"/>
+            </a:effectRef>
+            <a:fontRef idx="minor">
+              <a:schemeClr val="dk1"/>
+            </a:fontRef>
+          </p:style>
+          <p:txBody>
+            <a:bodyPr wrap="square" rtlCol="0">
+              <a:spAutoFit/>
+              <a:scene3d>
+                <a:camera prst="orthographicFront"/>
+                <a:lightRig rig="harsh" dir="t"/>
+              </a:scene3d>
+              <a:sp3d extrusionH="57150" prstMaterial="matte">
+                <a:bevelT w="63500" h="12700" prst="angle"/>
+                <a:contourClr>
+                  <a:schemeClr val="bg1">
+                    <a:lumMod val="65000"/>
+                  </a:schemeClr>
+                </a:contourClr>
+              </a:sp3d>
+            </a:bodyPr>
+            <a:lstStyle/>
+            <a:p>
+              <a:pPr algn="ctr"/>
+              <a:r>
+                <a:rPr lang="en-GB" sz="6600" dirty="0"/>
+                <a:t>is None </a:t>
+              </a:r>
+              <a:r>
+                <a:rPr lang="en-GB" sz="6600" b="1" dirty="0">
+                  <a:ln w="22225">
+                    <a:solidFill>
+                      <a:schemeClr val="accent2"/>
+                    </a:solidFill>
+                    <a:prstDash val="solid"/>
+                  </a:ln>
+                  <a:solidFill>
+                    <a:srgbClr val="00B0F0"/>
+                  </a:solidFill>
+                </a:rPr>
+                <a:t>vs</a:t>
+              </a:r>
+              <a:r>
+                <a:rPr lang="en-GB" sz="6600" dirty="0"/>
+                <a:t> == None</a:t>
+              </a:r>
+              <a:endParaRPr lang="en-GB" b="1" dirty="0">
+                <a:ln w="0"/>
+                <a:solidFill>
+                  <a:schemeClr val="tx1"/>
+                </a:solidFill>
+                <a:effectLst>
+                  <a:outerShdw blurRad="38100" dist="25400" dir="5400000" algn="ctr" rotWithShape="0">
+                    <a:srgbClr val="6E747A">
+                      <a:alpha val="43000"/>
+                    </a:srgbClr>
+                  </a:outerShdw>
+                </a:effectLst>
+                <a:latin typeface="Patrick Hand" pitchFamily="2" charset="77"/>
+              </a:endParaRPr>
+            </a:p>
+          </p:txBody>
+        </p:sp>
+        <p:pic>
+          <p:nvPicPr>
+            <p:cNvPr id="5" name="Picture 4">
+              <a:extLst>
+                <a:ext uri="{FF2B5EF4-FFF2-40B4-BE49-F238E27FC236}">
+                  <a16:creationId xmlns:a16="http://schemas.microsoft.com/office/drawing/2014/main" id="{A749827E-2E74-ACEC-8444-637079C18620}"/>
+                </a:ext>
+              </a:extLst>
+            </p:cNvPr>
+            <p:cNvPicPr>
+              <a:picLocks noChangeAspect="1"/>
+            </p:cNvPicPr>
+            <p:nvPr/>
+          </p:nvPicPr>
+          <p:blipFill>
+            <a:blip r:embed="rId2"/>
+            <a:stretch>
+              <a:fillRect/>
+            </a:stretch>
+          </p:blipFill>
+          <p:spPr>
+            <a:xfrm>
+              <a:off x="264001" y="2906105"/>
+              <a:ext cx="1063167" cy="1063167"/>
+            </a:xfrm>
+            <a:prstGeom prst="rect">
+              <a:avLst/>
+            </a:prstGeom>
+          </p:spPr>
+        </p:pic>
+      </p:grpSp>
+      <p:pic>
+        <p:nvPicPr>
+          <p:cNvPr id="6" name="Picture 5">
+            <a:extLst>
+              <a:ext uri="{FF2B5EF4-FFF2-40B4-BE49-F238E27FC236}">
+                <a16:creationId xmlns:a16="http://schemas.microsoft.com/office/drawing/2014/main" id="{32D2F3E9-1457-70B6-481C-8273E393E203}"/>
+              </a:ext>
+            </a:extLst>
+          </p:cNvPr>
+          <p:cNvPicPr>
+            <a:picLocks noChangeAspect="1"/>
+          </p:cNvPicPr>
+          <p:nvPr/>
+        </p:nvPicPr>
+        <p:blipFill rotWithShape="1">
+          <a:blip r:embed="rId3"/>
+          <a:srcRect l="18942" t="25483" r="11277" b="14650"/>
+          <a:stretch>
+            <a:fillRect/>
+          </a:stretch>
+        </p:blipFill>
+        <p:spPr>
+          <a:xfrm>
+            <a:off x="223306" y="4282067"/>
+            <a:ext cx="9838800" cy="6841548"/>
+          </a:xfrm>
+          <a:prstGeom prst="rect">
+            <a:avLst/>
+          </a:prstGeom>
+        </p:spPr>
+      </p:pic>
+      <p:grpSp>
+        <p:nvGrpSpPr>
+          <p:cNvPr id="14" name="Group 13">
+            <a:extLst>
+              <a:ext uri="{FF2B5EF4-FFF2-40B4-BE49-F238E27FC236}">
+                <a16:creationId xmlns:a16="http://schemas.microsoft.com/office/drawing/2014/main" id="{1CEB479B-9B53-E6F7-25C4-5B4B3EE93314}"/>
+              </a:ext>
+            </a:extLst>
+          </p:cNvPr>
+          <p:cNvGrpSpPr/>
+          <p:nvPr/>
+        </p:nvGrpSpPr>
+        <p:grpSpPr>
+          <a:xfrm>
+            <a:off x="22445" y="11731083"/>
+            <a:ext cx="10240523" cy="707886"/>
+            <a:chOff x="44890" y="11731083"/>
+            <a:chExt cx="10240523" cy="707886"/>
+          </a:xfrm>
+        </p:grpSpPr>
+        <p:sp>
+          <p:nvSpPr>
+            <p:cNvPr id="7" name="TextBox 6">
+              <a:extLst>
+                <a:ext uri="{FF2B5EF4-FFF2-40B4-BE49-F238E27FC236}">
+                  <a16:creationId xmlns:a16="http://schemas.microsoft.com/office/drawing/2014/main" id="{4726C78F-5842-BADA-97BD-2A58BA5E5C84}"/>
+                </a:ext>
+              </a:extLst>
+            </p:cNvPr>
+            <p:cNvSpPr txBox="1"/>
+            <p:nvPr/>
+          </p:nvSpPr>
+          <p:spPr>
+            <a:xfrm>
+              <a:off x="44890" y="11731083"/>
+              <a:ext cx="1727909" cy="707886"/>
+            </a:xfrm>
+            <a:prstGeom prst="rect">
+              <a:avLst/>
+            </a:prstGeom>
+            <a:noFill/>
+          </p:spPr>
+          <p:txBody>
+            <a:bodyPr wrap="none" rtlCol="0">
+              <a:spAutoFit/>
+            </a:bodyPr>
+            <a:lstStyle/>
+            <a:p>
+              <a:r>
+                <a:rPr lang="en-GB" sz="4000" b="1" dirty="0"/>
+                <a:t>Faster:</a:t>
+              </a:r>
+              <a:r>
+                <a:rPr lang="en-GB" sz="4000" dirty="0"/>
+                <a:t> </a:t>
+              </a:r>
+              <a:endParaRPr lang="en-DE" sz="4000" dirty="0"/>
+            </a:p>
+          </p:txBody>
+        </p:sp>
+        <p:sp>
+          <p:nvSpPr>
+            <p:cNvPr id="11" name="TextBox 10">
+              <a:extLst>
+                <a:ext uri="{FF2B5EF4-FFF2-40B4-BE49-F238E27FC236}">
+                  <a16:creationId xmlns:a16="http://schemas.microsoft.com/office/drawing/2014/main" id="{3B956DD6-0D86-8B09-E89A-759DDDD3D6BC}"/>
+                </a:ext>
+              </a:extLst>
+            </p:cNvPr>
+            <p:cNvSpPr txBox="1"/>
+            <p:nvPr/>
+          </p:nvSpPr>
+          <p:spPr>
+            <a:xfrm>
+              <a:off x="1824428" y="11731083"/>
+              <a:ext cx="8460985" cy="707886"/>
+            </a:xfrm>
+            <a:prstGeom prst="rect">
+              <a:avLst/>
+            </a:prstGeom>
+            <a:noFill/>
+          </p:spPr>
+          <p:txBody>
+            <a:bodyPr wrap="square" rtlCol="0">
+              <a:spAutoFit/>
+            </a:bodyPr>
+            <a:lstStyle/>
+            <a:p>
+              <a:r>
+                <a:rPr lang="en-GB" sz="4000" dirty="0">
+                  <a:latin typeface="Patrick Hand" pitchFamily="2" charset="77"/>
+                </a:rPr>
+                <a:t>is compares memory addresses(Singletons)</a:t>
+              </a:r>
+              <a:endParaRPr lang="en-DE" sz="4000" dirty="0">
+                <a:latin typeface="Patrick Hand" pitchFamily="2" charset="77"/>
+              </a:endParaRPr>
+            </a:p>
+          </p:txBody>
+        </p:sp>
+      </p:grpSp>
+      <p:grpSp>
+        <p:nvGrpSpPr>
+          <p:cNvPr id="15" name="Group 14">
+            <a:extLst>
+              <a:ext uri="{FF2B5EF4-FFF2-40B4-BE49-F238E27FC236}">
+                <a16:creationId xmlns:a16="http://schemas.microsoft.com/office/drawing/2014/main" id="{A14E27FE-7BB8-A2C8-6FAC-F01447238097}"/>
+              </a:ext>
+            </a:extLst>
+          </p:cNvPr>
+          <p:cNvGrpSpPr/>
+          <p:nvPr/>
+        </p:nvGrpSpPr>
+        <p:grpSpPr>
+          <a:xfrm>
+            <a:off x="22445" y="12804707"/>
+            <a:ext cx="10240523" cy="717361"/>
+            <a:chOff x="44890" y="12804707"/>
+            <a:chExt cx="10240523" cy="717361"/>
+          </a:xfrm>
+        </p:grpSpPr>
+        <p:sp>
+          <p:nvSpPr>
+            <p:cNvPr id="8" name="TextBox 7">
+              <a:extLst>
+                <a:ext uri="{FF2B5EF4-FFF2-40B4-BE49-F238E27FC236}">
+                  <a16:creationId xmlns:a16="http://schemas.microsoft.com/office/drawing/2014/main" id="{46D9AEC7-81A8-D8FA-9B3F-D7975BB39742}"/>
+                </a:ext>
+              </a:extLst>
+            </p:cNvPr>
+            <p:cNvSpPr txBox="1"/>
+            <p:nvPr/>
+          </p:nvSpPr>
+          <p:spPr>
+            <a:xfrm>
+              <a:off x="44890" y="12814182"/>
+              <a:ext cx="1527406" cy="707886"/>
+            </a:xfrm>
+            <a:prstGeom prst="rect">
+              <a:avLst/>
+            </a:prstGeom>
+            <a:noFill/>
+          </p:spPr>
+          <p:txBody>
+            <a:bodyPr wrap="none" rtlCol="0">
+              <a:spAutoFit/>
+            </a:bodyPr>
+            <a:lstStyle/>
+            <a:p>
+              <a:r>
+                <a:rPr lang="en-GB" sz="4000" b="1" dirty="0"/>
+                <a:t>Safer: </a:t>
+              </a:r>
+              <a:endParaRPr lang="en-DE" sz="4000" b="1" dirty="0"/>
+            </a:p>
+          </p:txBody>
+        </p:sp>
+        <p:sp>
+          <p:nvSpPr>
+            <p:cNvPr id="12" name="TextBox 11">
+              <a:extLst>
+                <a:ext uri="{FF2B5EF4-FFF2-40B4-BE49-F238E27FC236}">
+                  <a16:creationId xmlns:a16="http://schemas.microsoft.com/office/drawing/2014/main" id="{A2A4893F-4945-B7EB-1C1A-4AFCB0335910}"/>
+                </a:ext>
+              </a:extLst>
+            </p:cNvPr>
+            <p:cNvSpPr txBox="1"/>
+            <p:nvPr/>
+          </p:nvSpPr>
+          <p:spPr>
+            <a:xfrm>
+              <a:off x="1539466" y="12804707"/>
+              <a:ext cx="8745947" cy="707886"/>
+            </a:xfrm>
+            <a:prstGeom prst="rect">
+              <a:avLst/>
+            </a:prstGeom>
+            <a:noFill/>
+          </p:spPr>
+          <p:txBody>
+            <a:bodyPr wrap="square" rtlCol="0">
+              <a:spAutoFit/>
+            </a:bodyPr>
+            <a:lstStyle/>
+            <a:p>
+              <a:r>
+                <a:rPr lang="en-GB" sz="4000" dirty="0"/>
+                <a:t>Avoids bugs with classes that override ==</a:t>
+              </a:r>
+              <a:endParaRPr lang="en-DE" sz="4000" dirty="0">
+                <a:latin typeface="Patrick Hand" pitchFamily="2" charset="77"/>
+              </a:endParaRPr>
+            </a:p>
+          </p:txBody>
+        </p:sp>
+      </p:grpSp>
+      <p:grpSp>
+        <p:nvGrpSpPr>
+          <p:cNvPr id="16" name="Group 15">
+            <a:extLst>
+              <a:ext uri="{FF2B5EF4-FFF2-40B4-BE49-F238E27FC236}">
+                <a16:creationId xmlns:a16="http://schemas.microsoft.com/office/drawing/2014/main" id="{D6C6D89F-E93D-214F-D90F-37122956D077}"/>
+              </a:ext>
+            </a:extLst>
+          </p:cNvPr>
+          <p:cNvGrpSpPr/>
+          <p:nvPr/>
+        </p:nvGrpSpPr>
+        <p:grpSpPr>
+          <a:xfrm>
+            <a:off x="22445" y="13878330"/>
+            <a:ext cx="10240523" cy="726837"/>
+            <a:chOff x="44890" y="13878330"/>
+            <a:chExt cx="10240523" cy="726837"/>
+          </a:xfrm>
+        </p:grpSpPr>
+        <p:sp>
+          <p:nvSpPr>
+            <p:cNvPr id="9" name="TextBox 8">
+              <a:extLst>
+                <a:ext uri="{FF2B5EF4-FFF2-40B4-BE49-F238E27FC236}">
+                  <a16:creationId xmlns:a16="http://schemas.microsoft.com/office/drawing/2014/main" id="{B266C270-8250-9E8C-0C34-1C95D283B5CB}"/>
+                </a:ext>
+              </a:extLst>
+            </p:cNvPr>
+            <p:cNvSpPr txBox="1"/>
+            <p:nvPr/>
+          </p:nvSpPr>
+          <p:spPr>
+            <a:xfrm>
+              <a:off x="44890" y="13897281"/>
+              <a:ext cx="2310120" cy="707886"/>
+            </a:xfrm>
+            <a:prstGeom prst="rect">
+              <a:avLst/>
+            </a:prstGeom>
+            <a:noFill/>
+          </p:spPr>
+          <p:txBody>
+            <a:bodyPr wrap="none" rtlCol="0">
+              <a:spAutoFit/>
+            </a:bodyPr>
+            <a:lstStyle/>
+            <a:p>
+              <a:r>
+                <a:rPr lang="en-GB" sz="4000" b="1" dirty="0"/>
+                <a:t>Pythonic: </a:t>
+              </a:r>
+              <a:endParaRPr lang="en-DE" sz="4000" b="1" dirty="0"/>
+            </a:p>
+          </p:txBody>
+        </p:sp>
+        <p:sp>
+          <p:nvSpPr>
+            <p:cNvPr id="13" name="TextBox 12">
+              <a:extLst>
+                <a:ext uri="{FF2B5EF4-FFF2-40B4-BE49-F238E27FC236}">
+                  <a16:creationId xmlns:a16="http://schemas.microsoft.com/office/drawing/2014/main" id="{AD66807C-E3C5-9589-B831-282432DEFF7E}"/>
+                </a:ext>
+              </a:extLst>
+            </p:cNvPr>
+            <p:cNvSpPr txBox="1"/>
+            <p:nvPr/>
+          </p:nvSpPr>
+          <p:spPr>
+            <a:xfrm>
+              <a:off x="2355010" y="13878330"/>
+              <a:ext cx="7930403" cy="707886"/>
+            </a:xfrm>
+            <a:prstGeom prst="rect">
+              <a:avLst/>
+            </a:prstGeom>
+            <a:noFill/>
+          </p:spPr>
+          <p:txBody>
+            <a:bodyPr wrap="square" rtlCol="0">
+              <a:spAutoFit/>
+            </a:bodyPr>
+            <a:lstStyle/>
+            <a:p>
+              <a:r>
+                <a:rPr lang="en-GB" sz="4000" dirty="0"/>
+                <a:t>It's the PEP 8 official standard</a:t>
+              </a:r>
+              <a:endParaRPr lang="en-DE" sz="4000" dirty="0">
+                <a:latin typeface="Patrick Hand" pitchFamily="2" charset="77"/>
+              </a:endParaRPr>
+            </a:p>
+          </p:txBody>
+        </p:sp>
+      </p:grpSp>
+      <p:cxnSp>
+        <p:nvCxnSpPr>
+          <p:cNvPr id="17" name="Straight Connector 16">
+            <a:extLst>
+              <a:ext uri="{FF2B5EF4-FFF2-40B4-BE49-F238E27FC236}">
+                <a16:creationId xmlns:a16="http://schemas.microsoft.com/office/drawing/2014/main" id="{4B53DAC6-803E-6E54-0AFE-08E92D625C58}"/>
+              </a:ext>
+            </a:extLst>
+          </p:cNvPr>
+          <p:cNvCxnSpPr>
+            <a:cxnSpLocks/>
+          </p:cNvCxnSpPr>
+          <p:nvPr/>
+        </p:nvCxnSpPr>
+        <p:spPr>
+          <a:xfrm>
+            <a:off x="223579" y="8410989"/>
+            <a:ext cx="9838255" cy="0"/>
+          </a:xfrm>
+          <a:prstGeom prst="line">
+            <a:avLst/>
+          </a:prstGeom>
+          <a:ln w="38100">
+            <a:solidFill>
+              <a:schemeClr val="bg1"/>
+            </a:solidFill>
+            <a:headEnd type="none"/>
+            <a:tailEnd type="none" w="lg" len="lg"/>
+          </a:ln>
+        </p:spPr>
+        <p:style>
+          <a:lnRef idx="1">
+            <a:schemeClr val="accent1"/>
+          </a:lnRef>
+          <a:fillRef idx="0">
+            <a:schemeClr val="accent1"/>
+          </a:fillRef>
+          <a:effectRef idx="0">
+            <a:schemeClr val="accent1"/>
+          </a:effectRef>
+          <a:fontRef idx="minor">
+            <a:schemeClr val="tx1"/>
+          </a:fontRef>
+        </p:style>
+      </p:cxnSp>
+      <p:pic>
+        <p:nvPicPr>
+          <p:cNvPr id="18" name="Graphic 17" descr="Shield Tick with solid fill">
+            <a:extLst>
+              <a:ext uri="{FF2B5EF4-FFF2-40B4-BE49-F238E27FC236}">
+                <a16:creationId xmlns:a16="http://schemas.microsoft.com/office/drawing/2014/main" id="{C66AB981-805B-D3EA-B666-79A9BBF3F4F9}"/>
+              </a:ext>
+            </a:extLst>
+          </p:cNvPr>
+          <p:cNvPicPr>
+            <a:picLocks noChangeAspect="1"/>
+          </p:cNvPicPr>
+          <p:nvPr/>
+        </p:nvPicPr>
+        <p:blipFill>
+          <a:blip r:embed="rId4">
+            <a:extLst>
+              <a:ext uri="{96DAC541-7B7A-43D3-8B79-37D633B846F1}">
+                <asvg:svgBlip xmlns:asvg="http://schemas.microsoft.com/office/drawing/2016/SVG/main" r:embed="rId5"/>
+              </a:ext>
+            </a:extLst>
+          </a:blip>
+          <a:stretch>
+            <a:fillRect/>
+          </a:stretch>
+        </p:blipFill>
+        <p:spPr>
+          <a:xfrm>
+            <a:off x="7668075" y="8637940"/>
+            <a:ext cx="914400" cy="914400"/>
+          </a:xfrm>
+          <a:prstGeom prst="rect">
+            <a:avLst/>
+          </a:prstGeom>
+        </p:spPr>
+      </p:pic>
+      <p:pic>
+        <p:nvPicPr>
+          <p:cNvPr id="19" name="Graphic 18" descr="Close with solid fill">
+            <a:extLst>
+              <a:ext uri="{FF2B5EF4-FFF2-40B4-BE49-F238E27FC236}">
+                <a16:creationId xmlns:a16="http://schemas.microsoft.com/office/drawing/2014/main" id="{A5EA347C-65F5-100D-F091-6637F8AA15E0}"/>
+              </a:ext>
+            </a:extLst>
+          </p:cNvPr>
+          <p:cNvPicPr>
+            <a:picLocks noChangeAspect="1"/>
+          </p:cNvPicPr>
+          <p:nvPr/>
+        </p:nvPicPr>
+        <p:blipFill>
+          <a:blip r:embed="rId6">
+            <a:extLst>
+              <a:ext uri="{96DAC541-7B7A-43D3-8B79-37D633B846F1}">
+                <asvg:svgBlip xmlns:asvg="http://schemas.microsoft.com/office/drawing/2016/SVG/main" r:embed="rId7"/>
+              </a:ext>
+            </a:extLst>
+          </a:blip>
+          <a:stretch>
+            <a:fillRect/>
+          </a:stretch>
+        </p:blipFill>
+        <p:spPr>
+          <a:xfrm>
+            <a:off x="7668075" y="6560627"/>
+            <a:ext cx="914400" cy="914400"/>
+          </a:xfrm>
+          <a:prstGeom prst="rect">
+            <a:avLst/>
+          </a:prstGeom>
+        </p:spPr>
+      </p:pic>
     </p:spTree>
     <p:extLst>
       <p:ext uri="{BB962C8B-B14F-4D97-AF65-F5344CB8AC3E}">

</xml_diff>

<commit_message>
feat: restructured the folders and names+added video 014
</commit_message>
<xml_diff>
--- a/assets/get-ready.pptx
+++ b/assets/get-ready.pptx
@@ -5,7 +5,7 @@
     <p:sldMasterId id="2147483732" r:id="rId1"/>
   </p:sldMasterIdLst>
   <p:notesMasterIdLst>
-    <p:notesMasterId r:id="rId22"/>
+    <p:notesMasterId r:id="rId21"/>
   </p:notesMasterIdLst>
   <p:sldIdLst>
     <p:sldId id="263" r:id="rId2"/>
@@ -22,12 +22,11 @@
     <p:sldId id="279" r:id="rId13"/>
     <p:sldId id="280" r:id="rId14"/>
     <p:sldId id="281" r:id="rId15"/>
-    <p:sldId id="282" r:id="rId16"/>
-    <p:sldId id="283" r:id="rId17"/>
-    <p:sldId id="284" r:id="rId18"/>
-    <p:sldId id="285" r:id="rId19"/>
-    <p:sldId id="286" r:id="rId20"/>
-    <p:sldId id="287" r:id="rId21"/>
+    <p:sldId id="288" r:id="rId16"/>
+    <p:sldId id="289" r:id="rId17"/>
+    <p:sldId id="290" r:id="rId18"/>
+    <p:sldId id="291" r:id="rId19"/>
+    <p:sldId id="282" r:id="rId20"/>
   </p:sldIdLst>
   <p:sldSz cx="10285413" cy="18288000"/>
   <p:notesSz cx="6858000" cy="9144000"/>
@@ -347,6 +346,30 @@
 </p188:cmLst>
 </file>
 
+<file path=ppt/comments/modernComment_120_FA024C04.xml><?xml version="1.0" encoding="utf-8"?>
+<p188:cmLst xmlns:a="http://schemas.openxmlformats.org/drawingml/2006/main" xmlns:r="http://schemas.openxmlformats.org/officeDocument/2006/relationships" xmlns:p188="http://schemas.microsoft.com/office/powerpoint/2018/8/main">
+  <p188:cm id="{2D904378-B2C9-5241-A08B-375F4FC6B280}" authorId="{8860045D-B334-310D-0A4E-9E20AA0B149E}" created="2026-01-04T06:33:22.990">
+    <pc:sldMkLst xmlns:pc="http://schemas.microsoft.com/office/powerpoint/2013/main/command">
+      <pc:docMk/>
+      <pc:sldMk cId="4194454532" sldId="288"/>
+    </pc:sldMkLst>
+    <p188:txBody>
+      <a:bodyPr/>
+      <a:lstStyle/>
+      <a:p>
+        <a:r>
+          <a:rPr lang="en-DE"/>
+          <a:t>Title: Python 'with' Statement: Resource Management Made Easy! 🛡️
+Tired of forgetting to close your files or database connections? The with statement in Python is your clean code superpower!
+🇺🇸 Keep your Python code safe and clean! 🇩🇪 Python: Ressourcen sicher verwalten!
+#Python #CleanCode #ProgrammingTips #ContextManager #FileHandling #CodeWithEbrahim</a:t>
+        </a:r>
+      </a:p>
+    </p188:txBody>
+  </p188:cm>
+</p188:cmLst>
+</file>
+
 <file path=ppt/notesMasters/notesMaster1.xml><?xml version="1.0" encoding="utf-8"?>
 <p:notesMaster xmlns:a="http://schemas.openxmlformats.org/drawingml/2006/main" xmlns:r="http://schemas.openxmlformats.org/officeDocument/2006/relationships" xmlns:p="http://schemas.openxmlformats.org/presentationml/2006/main">
   <p:cSld>
@@ -1360,6 +1383,133 @@
     <p:extLst>
       <p:ext uri="{BB962C8B-B14F-4D97-AF65-F5344CB8AC3E}">
         <p14:creationId xmlns:p14="http://schemas.microsoft.com/office/powerpoint/2010/main" val="2671372108"/>
+      </p:ext>
+    </p:extLst>
+  </p:cSld>
+  <p:clrMapOvr>
+    <a:masterClrMapping/>
+  </p:clrMapOvr>
+</p:notes>
+</file>
+
+<file path=ppt/notesSlides/notesSlide7.xml><?xml version="1.0" encoding="utf-8"?>
+<p:notes xmlns:a="http://schemas.openxmlformats.org/drawingml/2006/main" xmlns:r="http://schemas.openxmlformats.org/officeDocument/2006/relationships" xmlns:p="http://schemas.openxmlformats.org/presentationml/2006/main">
+  <p:cSld>
+    <p:spTree>
+      <p:nvGrpSpPr>
+        <p:cNvPr id="1" name="">
+          <a:extLst>
+            <a:ext uri="{FF2B5EF4-FFF2-40B4-BE49-F238E27FC236}">
+              <a16:creationId xmlns:a16="http://schemas.microsoft.com/office/drawing/2014/main" id="{9EC732FD-D9E9-AAE3-0DFD-25C6A5879AE3}"/>
+            </a:ext>
+          </a:extLst>
+        </p:cNvPr>
+        <p:cNvGrpSpPr/>
+        <p:nvPr/>
+      </p:nvGrpSpPr>
+      <p:grpSpPr>
+        <a:xfrm>
+          <a:off x="0" y="0"/>
+          <a:ext cx="0" cy="0"/>
+          <a:chOff x="0" y="0"/>
+          <a:chExt cx="0" cy="0"/>
+        </a:xfrm>
+      </p:grpSpPr>
+      <p:sp>
+        <p:nvSpPr>
+          <p:cNvPr id="2" name="Slide Image Placeholder 1">
+            <a:extLst>
+              <a:ext uri="{FF2B5EF4-FFF2-40B4-BE49-F238E27FC236}">
+                <a16:creationId xmlns:a16="http://schemas.microsoft.com/office/drawing/2014/main" id="{3BF65AD2-BF8F-55A2-6C49-4C74899FC2CA}"/>
+              </a:ext>
+            </a:extLst>
+          </p:cNvPr>
+          <p:cNvSpPr>
+            <a:spLocks noGrp="1" noRot="1" noChangeAspect="1"/>
+          </p:cNvSpPr>
+          <p:nvPr>
+            <p:ph type="sldImg"/>
+          </p:nvPr>
+        </p:nvSpPr>
+        <p:spPr/>
+      </p:sp>
+      <p:sp>
+        <p:nvSpPr>
+          <p:cNvPr id="3" name="Notes Placeholder 2">
+            <a:extLst>
+              <a:ext uri="{FF2B5EF4-FFF2-40B4-BE49-F238E27FC236}">
+                <a16:creationId xmlns:a16="http://schemas.microsoft.com/office/drawing/2014/main" id="{03E244BB-A6D8-1077-F5B9-623B75F9D79E}"/>
+              </a:ext>
+            </a:extLst>
+          </p:cNvPr>
+          <p:cNvSpPr>
+            <a:spLocks noGrp="1"/>
+          </p:cNvSpPr>
+          <p:nvPr>
+            <p:ph type="body" idx="1"/>
+          </p:nvPr>
+        </p:nvSpPr>
+        <p:spPr/>
+        <p:txBody>
+          <a:bodyPr/>
+          <a:lstStyle/>
+          <a:p>
+            <a:r>
+              <a:rPr lang="en-GB" dirty="0"/>
+              <a:t>Video 011</a:t>
+            </a:r>
+            <a:br>
+              <a:rPr lang="en-GB" dirty="0"/>
+            </a:br>
+            <a:r>
+              <a:rPr lang="en-GB" dirty="0"/>
+              <a:t>F</a:t>
+            </a:r>
+            <a:r>
+              <a:rPr lang="en-DE" dirty="0"/>
+              <a:t>older: </a:t>
+            </a:r>
+            <a:r>
+              <a:rPr lang="en-GB" dirty="0"/>
+              <a:t>py_011_pathlib</a:t>
+            </a:r>
+            <a:endParaRPr lang="en-DE" dirty="0"/>
+          </a:p>
+        </p:txBody>
+      </p:sp>
+      <p:sp>
+        <p:nvSpPr>
+          <p:cNvPr id="4" name="Slide Number Placeholder 3">
+            <a:extLst>
+              <a:ext uri="{FF2B5EF4-FFF2-40B4-BE49-F238E27FC236}">
+                <a16:creationId xmlns:a16="http://schemas.microsoft.com/office/drawing/2014/main" id="{A9999D23-2291-E2AF-4349-FDA5EB6F07AD}"/>
+              </a:ext>
+            </a:extLst>
+          </p:cNvPr>
+          <p:cNvSpPr>
+            <a:spLocks noGrp="1"/>
+          </p:cNvSpPr>
+          <p:nvPr>
+            <p:ph type="sldNum" sz="quarter" idx="5"/>
+          </p:nvPr>
+        </p:nvSpPr>
+        <p:spPr/>
+        <p:txBody>
+          <a:bodyPr/>
+          <a:lstStyle/>
+          <a:p>
+            <a:fld id="{B46D1A58-C582-AC49-9010-037E894CD422}" type="slidenum">
+              <a:rPr lang="en-DE" smtClean="0"/>
+              <a:t>16</a:t>
+            </a:fld>
+            <a:endParaRPr lang="en-DE"/>
+          </a:p>
+        </p:txBody>
+      </p:sp>
+    </p:spTree>
+    <p:extLst>
+      <p:ext uri="{BB962C8B-B14F-4D97-AF65-F5344CB8AC3E}">
+        <p14:creationId xmlns:p14="http://schemas.microsoft.com/office/powerpoint/2010/main" val="1832236588"/>
       </p:ext>
     </p:extLst>
   </p:cSld>
@@ -4953,6 +5103,95 @@
           </a:p>
         </p:txBody>
       </p:sp>
+      <p:sp>
+        <p:nvSpPr>
+          <p:cNvPr id="39" name="Rectangle 38">
+            <a:extLst>
+              <a:ext uri="{FF2B5EF4-FFF2-40B4-BE49-F238E27FC236}">
+                <a16:creationId xmlns:a16="http://schemas.microsoft.com/office/drawing/2014/main" id="{A27BD8FC-909C-7707-EADD-9BB7EF082556}"/>
+              </a:ext>
+            </a:extLst>
+          </p:cNvPr>
+          <p:cNvSpPr/>
+          <p:nvPr/>
+        </p:nvSpPr>
+        <p:spPr>
+          <a:xfrm>
+            <a:off x="-7878251" y="2819400"/>
+            <a:ext cx="7108036" cy="923330"/>
+          </a:xfrm>
+          <a:prstGeom prst="rect">
+            <a:avLst/>
+          </a:prstGeom>
+          <a:ln>
+            <a:solidFill>
+              <a:schemeClr val="tx1"/>
+            </a:solidFill>
+          </a:ln>
+        </p:spPr>
+        <p:style>
+          <a:lnRef idx="1">
+            <a:schemeClr val="accent6"/>
+          </a:lnRef>
+          <a:fillRef idx="2">
+            <a:schemeClr val="accent6"/>
+          </a:fillRef>
+          <a:effectRef idx="1">
+            <a:schemeClr val="accent6"/>
+          </a:effectRef>
+          <a:fontRef idx="minor">
+            <a:schemeClr val="dk1"/>
+          </a:fontRef>
+        </p:style>
+        <p:txBody>
+          <a:bodyPr wrap="none" lIns="91440" tIns="45720" rIns="91440" bIns="45720">
+            <a:spAutoFit/>
+            <a:scene3d>
+              <a:camera prst="orthographicFront"/>
+              <a:lightRig rig="soft" dir="t">
+                <a:rot lat="0" lon="0" rev="15600000"/>
+              </a:lightRig>
+            </a:scene3d>
+            <a:sp3d extrusionH="57150" prstMaterial="softEdge">
+              <a:bevelT w="25400" h="38100"/>
+            </a:sp3d>
+          </a:bodyPr>
+          <a:lstStyle/>
+          <a:p>
+            <a:pPr algn="ctr"/>
+            <a:r>
+              <a:rPr lang="en-GB" sz="5400" dirty="0">
+                <a:ln w="0"/>
+                <a:solidFill>
+                  <a:schemeClr val="tx1"/>
+                </a:solidFill>
+                <a:effectLst>
+                  <a:outerShdw blurRad="38100" dist="19050" dir="2700000" algn="tl" rotWithShape="0">
+                    <a:schemeClr val="dk1">
+                      <a:alpha val="40000"/>
+                    </a:schemeClr>
+                  </a:outerShdw>
+                </a:effectLst>
+                <a:latin typeface="Patrick Hand" pitchFamily="2" charset="77"/>
+              </a:rPr>
+              <a:t>py_009_raise_value_error</a:t>
+            </a:r>
+            <a:endParaRPr lang="en-DE" sz="5400" dirty="0">
+              <a:ln w="0"/>
+              <a:solidFill>
+                <a:schemeClr val="tx1"/>
+              </a:solidFill>
+              <a:effectLst>
+                <a:outerShdw blurRad="38100" dist="19050" dir="2700000" algn="tl" rotWithShape="0">
+                  <a:schemeClr val="dk1">
+                    <a:alpha val="40000"/>
+                  </a:schemeClr>
+                </a:outerShdw>
+              </a:effectLst>
+            </a:endParaRPr>
+          </a:p>
+        </p:txBody>
+      </p:sp>
     </p:spTree>
     <p:extLst>
       <p:ext uri="{BB962C8B-B14F-4D97-AF65-F5344CB8AC3E}">
@@ -5853,6 +6092,65 @@
           </a:p>
         </p:txBody>
       </p:sp>
+      <p:sp>
+        <p:nvSpPr>
+          <p:cNvPr id="22" name="TextBox 21">
+            <a:extLst>
+              <a:ext uri="{FF2B5EF4-FFF2-40B4-BE49-F238E27FC236}">
+                <a16:creationId xmlns:a16="http://schemas.microsoft.com/office/drawing/2014/main" id="{7A649A9D-2FA9-D9EC-895D-62F1C7539235}"/>
+              </a:ext>
+            </a:extLst>
+          </p:cNvPr>
+          <p:cNvSpPr txBox="1"/>
+          <p:nvPr/>
+        </p:nvSpPr>
+        <p:spPr>
+          <a:xfrm>
+            <a:off x="-8753367" y="2826600"/>
+            <a:ext cx="7603363" cy="830997"/>
+          </a:xfrm>
+          <a:prstGeom prst="rect">
+            <a:avLst/>
+          </a:prstGeom>
+        </p:spPr>
+        <p:style>
+          <a:lnRef idx="1">
+            <a:schemeClr val="accent2"/>
+          </a:lnRef>
+          <a:fillRef idx="2">
+            <a:schemeClr val="accent2"/>
+          </a:fillRef>
+          <a:effectRef idx="1">
+            <a:schemeClr val="accent2"/>
+          </a:effectRef>
+          <a:fontRef idx="minor">
+            <a:schemeClr val="dk1"/>
+          </a:fontRef>
+        </p:style>
+        <p:txBody>
+          <a:bodyPr wrap="none" rtlCol="0">
+            <a:spAutoFit/>
+          </a:bodyPr>
+          <a:lstStyle/>
+          <a:p>
+            <a:r>
+              <a:rPr lang="en-US" sz="4800" dirty="0">
+                <a:solidFill>
+                  <a:srgbClr val="FF0000"/>
+                </a:solidFill>
+                <a:latin typeface="Patrick Hand" pitchFamily="2" charset="77"/>
+              </a:rPr>
+              <a:t>py_010_special_variable_names</a:t>
+            </a:r>
+            <a:endParaRPr lang="en-DE" sz="4800" dirty="0">
+              <a:solidFill>
+                <a:srgbClr val="FF0000"/>
+              </a:solidFill>
+              <a:latin typeface="Patrick Hand" pitchFamily="2" charset="77"/>
+            </a:endParaRPr>
+          </a:p>
+        </p:txBody>
+      </p:sp>
     </p:spTree>
     <p:extLst>
       <p:ext uri="{BB962C8B-B14F-4D97-AF65-F5344CB8AC3E}">
@@ -6409,6 +6707,65 @@
               <a:solidFill>
                 <a:schemeClr val="bg1"/>
               </a:solidFill>
+            </a:endParaRPr>
+          </a:p>
+        </p:txBody>
+      </p:sp>
+      <p:sp>
+        <p:nvSpPr>
+          <p:cNvPr id="29" name="TextBox 28">
+            <a:extLst>
+              <a:ext uri="{FF2B5EF4-FFF2-40B4-BE49-F238E27FC236}">
+                <a16:creationId xmlns:a16="http://schemas.microsoft.com/office/drawing/2014/main" id="{11EABB6E-2AF5-A580-AFF3-F00672FA1B08}"/>
+              </a:ext>
+            </a:extLst>
+          </p:cNvPr>
+          <p:cNvSpPr txBox="1"/>
+          <p:nvPr/>
+        </p:nvSpPr>
+        <p:spPr>
+          <a:xfrm>
+            <a:off x="-7857400" y="2527667"/>
+            <a:ext cx="3659976" cy="830997"/>
+          </a:xfrm>
+          <a:prstGeom prst="rect">
+            <a:avLst/>
+          </a:prstGeom>
+        </p:spPr>
+        <p:style>
+          <a:lnRef idx="1">
+            <a:schemeClr val="accent2"/>
+          </a:lnRef>
+          <a:fillRef idx="2">
+            <a:schemeClr val="accent2"/>
+          </a:fillRef>
+          <a:effectRef idx="1">
+            <a:schemeClr val="accent2"/>
+          </a:effectRef>
+          <a:fontRef idx="minor">
+            <a:schemeClr val="dk1"/>
+          </a:fontRef>
+        </p:style>
+        <p:txBody>
+          <a:bodyPr wrap="none" rtlCol="0">
+            <a:spAutoFit/>
+          </a:bodyPr>
+          <a:lstStyle/>
+          <a:p>
+            <a:r>
+              <a:rPr lang="en-US" sz="4800" dirty="0">
+                <a:solidFill>
+                  <a:srgbClr val="FF0000"/>
+                </a:solidFill>
+                <a:latin typeface="Patrick Hand" pitchFamily="2" charset="77"/>
+              </a:rPr>
+              <a:t>py_011_pathlib</a:t>
+            </a:r>
+            <a:endParaRPr lang="en-DE" sz="4800" dirty="0">
+              <a:solidFill>
+                <a:srgbClr val="FF0000"/>
+              </a:solidFill>
+              <a:latin typeface="Patrick Hand" pitchFamily="2" charset="77"/>
             </a:endParaRPr>
           </a:p>
         </p:txBody>
@@ -6724,6 +7081,65 @@
           </a:prstGeom>
         </p:spPr>
       </p:pic>
+      <p:sp>
+        <p:nvSpPr>
+          <p:cNvPr id="52" name="TextBox 51">
+            <a:extLst>
+              <a:ext uri="{FF2B5EF4-FFF2-40B4-BE49-F238E27FC236}">
+                <a16:creationId xmlns:a16="http://schemas.microsoft.com/office/drawing/2014/main" id="{B12A4097-8AAB-831B-3B48-4F55095ED0A3}"/>
+              </a:ext>
+            </a:extLst>
+          </p:cNvPr>
+          <p:cNvSpPr txBox="1"/>
+          <p:nvPr/>
+        </p:nvSpPr>
+        <p:spPr>
+          <a:xfrm>
+            <a:off x="-7857400" y="2527667"/>
+            <a:ext cx="6369051" cy="830997"/>
+          </a:xfrm>
+          <a:prstGeom prst="rect">
+            <a:avLst/>
+          </a:prstGeom>
+        </p:spPr>
+        <p:style>
+          <a:lnRef idx="1">
+            <a:schemeClr val="accent2"/>
+          </a:lnRef>
+          <a:fillRef idx="2">
+            <a:schemeClr val="accent2"/>
+          </a:fillRef>
+          <a:effectRef idx="1">
+            <a:schemeClr val="accent2"/>
+          </a:effectRef>
+          <a:fontRef idx="minor">
+            <a:schemeClr val="dk1"/>
+          </a:fontRef>
+        </p:style>
+        <p:txBody>
+          <a:bodyPr wrap="none" rtlCol="0">
+            <a:spAutoFit/>
+          </a:bodyPr>
+          <a:lstStyle/>
+          <a:p>
+            <a:r>
+              <a:rPr lang="en-US" sz="4800" dirty="0">
+                <a:solidFill>
+                  <a:srgbClr val="FF0000"/>
+                </a:solidFill>
+                <a:latin typeface="Patrick Hand" pitchFamily="2" charset="77"/>
+              </a:rPr>
+              <a:t>py_012_python_truthiness</a:t>
+            </a:r>
+            <a:endParaRPr lang="en-DE" sz="4800" dirty="0">
+              <a:solidFill>
+                <a:srgbClr val="FF0000"/>
+              </a:solidFill>
+              <a:latin typeface="Patrick Hand" pitchFamily="2" charset="77"/>
+            </a:endParaRPr>
+          </a:p>
+        </p:txBody>
+      </p:sp>
     </p:spTree>
     <p:extLst>
       <p:ext uri="{BB962C8B-B14F-4D97-AF65-F5344CB8AC3E}">
@@ -6948,297 +7364,250 @@
           </a:prstGeom>
         </p:spPr>
       </p:pic>
-      <p:grpSp>
-        <p:nvGrpSpPr>
-          <p:cNvPr id="14" name="Group 13">
-            <a:extLst>
-              <a:ext uri="{FF2B5EF4-FFF2-40B4-BE49-F238E27FC236}">
-                <a16:creationId xmlns:a16="http://schemas.microsoft.com/office/drawing/2014/main" id="{1CEB479B-9B53-E6F7-25C4-5B4B3EE93314}"/>
-              </a:ext>
-            </a:extLst>
-          </p:cNvPr>
-          <p:cNvGrpSpPr/>
-          <p:nvPr/>
-        </p:nvGrpSpPr>
-        <p:grpSpPr>
-          <a:xfrm>
-            <a:off x="22445" y="11731083"/>
-            <a:ext cx="10240523" cy="707886"/>
-            <a:chOff x="44890" y="11731083"/>
-            <a:chExt cx="10240523" cy="707886"/>
-          </a:xfrm>
-        </p:grpSpPr>
-        <p:sp>
-          <p:nvSpPr>
-            <p:cNvPr id="7" name="TextBox 6">
-              <a:extLst>
-                <a:ext uri="{FF2B5EF4-FFF2-40B4-BE49-F238E27FC236}">
-                  <a16:creationId xmlns:a16="http://schemas.microsoft.com/office/drawing/2014/main" id="{4726C78F-5842-BADA-97BD-2A58BA5E5C84}"/>
-                </a:ext>
-              </a:extLst>
-            </p:cNvPr>
-            <p:cNvSpPr txBox="1"/>
-            <p:nvPr/>
-          </p:nvSpPr>
-          <p:spPr>
-            <a:xfrm>
-              <a:off x="44890" y="11731083"/>
-              <a:ext cx="1727909" cy="707886"/>
-            </a:xfrm>
-            <a:prstGeom prst="rect">
-              <a:avLst/>
-            </a:prstGeom>
-            <a:noFill/>
-          </p:spPr>
-          <p:txBody>
-            <a:bodyPr wrap="none" rtlCol="0">
-              <a:spAutoFit/>
-            </a:bodyPr>
-            <a:lstStyle/>
-            <a:p>
-              <a:r>
-                <a:rPr lang="en-GB" sz="4000" b="1" dirty="0"/>
-                <a:t>Faster:</a:t>
-              </a:r>
-              <a:r>
-                <a:rPr lang="en-GB" sz="4000" dirty="0"/>
-                <a:t> </a:t>
-              </a:r>
-              <a:endParaRPr lang="en-DE" sz="4000" dirty="0"/>
-            </a:p>
-          </p:txBody>
-        </p:sp>
-        <p:sp>
-          <p:nvSpPr>
-            <p:cNvPr id="11" name="TextBox 10">
-              <a:extLst>
-                <a:ext uri="{FF2B5EF4-FFF2-40B4-BE49-F238E27FC236}">
-                  <a16:creationId xmlns:a16="http://schemas.microsoft.com/office/drawing/2014/main" id="{3B956DD6-0D86-8B09-E89A-759DDDD3D6BC}"/>
-                </a:ext>
-              </a:extLst>
-            </p:cNvPr>
-            <p:cNvSpPr txBox="1"/>
-            <p:nvPr/>
-          </p:nvSpPr>
-          <p:spPr>
-            <a:xfrm>
-              <a:off x="1824428" y="11731083"/>
-              <a:ext cx="8460985" cy="707886"/>
-            </a:xfrm>
-            <a:prstGeom prst="rect">
-              <a:avLst/>
-            </a:prstGeom>
-            <a:noFill/>
-          </p:spPr>
-          <p:txBody>
-            <a:bodyPr wrap="square" rtlCol="0">
-              <a:spAutoFit/>
-            </a:bodyPr>
-            <a:lstStyle/>
-            <a:p>
-              <a:r>
-                <a:rPr lang="en-GB" sz="4000" dirty="0">
-                  <a:latin typeface="Patrick Hand" pitchFamily="2" charset="77"/>
-                </a:rPr>
-                <a:t>is compares memory addresses(Singletons)</a:t>
-              </a:r>
-              <a:endParaRPr lang="en-DE" sz="4000" dirty="0">
+      <p:sp>
+        <p:nvSpPr>
+          <p:cNvPr id="7" name="TextBox 6">
+            <a:extLst>
+              <a:ext uri="{FF2B5EF4-FFF2-40B4-BE49-F238E27FC236}">
+                <a16:creationId xmlns:a16="http://schemas.microsoft.com/office/drawing/2014/main" id="{4726C78F-5842-BADA-97BD-2A58BA5E5C84}"/>
+              </a:ext>
+            </a:extLst>
+          </p:cNvPr>
+          <p:cNvSpPr txBox="1"/>
+          <p:nvPr/>
+        </p:nvSpPr>
+        <p:spPr>
+          <a:xfrm>
+            <a:off x="223306" y="11731083"/>
+            <a:ext cx="1727909" cy="707886"/>
+          </a:xfrm>
+          <a:prstGeom prst="rect">
+            <a:avLst/>
+          </a:prstGeom>
+          <a:noFill/>
+        </p:spPr>
+        <p:txBody>
+          <a:bodyPr wrap="none" rtlCol="0">
+            <a:spAutoFit/>
+          </a:bodyPr>
+          <a:lstStyle/>
+          <a:p>
+            <a:r>
+              <a:rPr lang="en-GB" sz="4000" b="1" dirty="0"/>
+              <a:t>Faster:</a:t>
+            </a:r>
+            <a:r>
+              <a:rPr lang="en-GB" sz="4000" dirty="0"/>
+              <a:t> </a:t>
+            </a:r>
+            <a:endParaRPr lang="en-DE" sz="4000" dirty="0"/>
+          </a:p>
+        </p:txBody>
+      </p:sp>
+      <p:sp>
+        <p:nvSpPr>
+          <p:cNvPr id="11" name="TextBox 10">
+            <a:extLst>
+              <a:ext uri="{FF2B5EF4-FFF2-40B4-BE49-F238E27FC236}">
+                <a16:creationId xmlns:a16="http://schemas.microsoft.com/office/drawing/2014/main" id="{3B956DD6-0D86-8B09-E89A-759DDDD3D6BC}"/>
+              </a:ext>
+            </a:extLst>
+          </p:cNvPr>
+          <p:cNvSpPr txBox="1"/>
+          <p:nvPr/>
+        </p:nvSpPr>
+        <p:spPr>
+          <a:xfrm>
+            <a:off x="2609831" y="11731083"/>
+            <a:ext cx="7315200" cy="707886"/>
+          </a:xfrm>
+          <a:prstGeom prst="rect">
+            <a:avLst/>
+          </a:prstGeom>
+          <a:noFill/>
+        </p:spPr>
+        <p:txBody>
+          <a:bodyPr wrap="square" rtlCol="0">
+            <a:spAutoFit/>
+          </a:bodyPr>
+          <a:lstStyle/>
+          <a:p>
+            <a:r>
+              <a:rPr lang="en-GB" sz="4000" dirty="0">
                 <a:latin typeface="Patrick Hand" pitchFamily="2" charset="77"/>
-              </a:endParaRPr>
-            </a:p>
-          </p:txBody>
-        </p:sp>
-      </p:grpSp>
-      <p:grpSp>
-        <p:nvGrpSpPr>
-          <p:cNvPr id="15" name="Group 14">
-            <a:extLst>
-              <a:ext uri="{FF2B5EF4-FFF2-40B4-BE49-F238E27FC236}">
-                <a16:creationId xmlns:a16="http://schemas.microsoft.com/office/drawing/2014/main" id="{A14E27FE-7BB8-A2C8-6FAC-F01447238097}"/>
-              </a:ext>
-            </a:extLst>
-          </p:cNvPr>
-          <p:cNvGrpSpPr/>
-          <p:nvPr/>
-        </p:nvGrpSpPr>
-        <p:grpSpPr>
-          <a:xfrm>
-            <a:off x="22445" y="12804707"/>
-            <a:ext cx="10240523" cy="717361"/>
-            <a:chOff x="44890" y="12804707"/>
-            <a:chExt cx="10240523" cy="717361"/>
-          </a:xfrm>
-        </p:grpSpPr>
-        <p:sp>
-          <p:nvSpPr>
-            <p:cNvPr id="8" name="TextBox 7">
-              <a:extLst>
-                <a:ext uri="{FF2B5EF4-FFF2-40B4-BE49-F238E27FC236}">
-                  <a16:creationId xmlns:a16="http://schemas.microsoft.com/office/drawing/2014/main" id="{46D9AEC7-81A8-D8FA-9B3F-D7975BB39742}"/>
-                </a:ext>
-              </a:extLst>
-            </p:cNvPr>
-            <p:cNvSpPr txBox="1"/>
-            <p:nvPr/>
-          </p:nvSpPr>
-          <p:spPr>
-            <a:xfrm>
-              <a:off x="44890" y="12814182"/>
-              <a:ext cx="1527406" cy="707886"/>
-            </a:xfrm>
-            <a:prstGeom prst="rect">
-              <a:avLst/>
-            </a:prstGeom>
-            <a:noFill/>
-          </p:spPr>
-          <p:txBody>
-            <a:bodyPr wrap="none" rtlCol="0">
-              <a:spAutoFit/>
-            </a:bodyPr>
-            <a:lstStyle/>
-            <a:p>
-              <a:r>
-                <a:rPr lang="en-GB" sz="4000" b="1" dirty="0"/>
-                <a:t>Safer: </a:t>
-              </a:r>
-              <a:endParaRPr lang="en-DE" sz="4000" b="1" dirty="0"/>
-            </a:p>
-          </p:txBody>
-        </p:sp>
-        <p:sp>
-          <p:nvSpPr>
-            <p:cNvPr id="12" name="TextBox 11">
-              <a:extLst>
-                <a:ext uri="{FF2B5EF4-FFF2-40B4-BE49-F238E27FC236}">
-                  <a16:creationId xmlns:a16="http://schemas.microsoft.com/office/drawing/2014/main" id="{A2A4893F-4945-B7EB-1C1A-4AFCB0335910}"/>
-                </a:ext>
-              </a:extLst>
-            </p:cNvPr>
-            <p:cNvSpPr txBox="1"/>
-            <p:nvPr/>
-          </p:nvSpPr>
-          <p:spPr>
-            <a:xfrm>
-              <a:off x="1539466" y="12804707"/>
-              <a:ext cx="8745947" cy="707886"/>
-            </a:xfrm>
-            <a:prstGeom prst="rect">
-              <a:avLst/>
-            </a:prstGeom>
-            <a:noFill/>
-          </p:spPr>
-          <p:txBody>
-            <a:bodyPr wrap="square" rtlCol="0">
-              <a:spAutoFit/>
-            </a:bodyPr>
-            <a:lstStyle/>
-            <a:p>
-              <a:r>
-                <a:rPr lang="en-GB" sz="4000" dirty="0"/>
-                <a:t>Avoids bugs with classes that override ==</a:t>
-              </a:r>
-              <a:endParaRPr lang="en-DE" sz="4000" dirty="0">
+              </a:rPr>
+              <a:t>Uses memory address comparison</a:t>
+            </a:r>
+            <a:endParaRPr lang="en-DE" sz="4000" dirty="0">
+              <a:latin typeface="Patrick Hand" pitchFamily="2" charset="77"/>
+            </a:endParaRPr>
+          </a:p>
+        </p:txBody>
+      </p:sp>
+      <p:sp>
+        <p:nvSpPr>
+          <p:cNvPr id="8" name="TextBox 7">
+            <a:extLst>
+              <a:ext uri="{FF2B5EF4-FFF2-40B4-BE49-F238E27FC236}">
+                <a16:creationId xmlns:a16="http://schemas.microsoft.com/office/drawing/2014/main" id="{46D9AEC7-81A8-D8FA-9B3F-D7975BB39742}"/>
+              </a:ext>
+            </a:extLst>
+          </p:cNvPr>
+          <p:cNvSpPr txBox="1"/>
+          <p:nvPr/>
+        </p:nvSpPr>
+        <p:spPr>
+          <a:xfrm>
+            <a:off x="223306" y="12814182"/>
+            <a:ext cx="1527406" cy="707886"/>
+          </a:xfrm>
+          <a:prstGeom prst="rect">
+            <a:avLst/>
+          </a:prstGeom>
+          <a:noFill/>
+        </p:spPr>
+        <p:txBody>
+          <a:bodyPr wrap="none" rtlCol="0">
+            <a:spAutoFit/>
+          </a:bodyPr>
+          <a:lstStyle/>
+          <a:p>
+            <a:r>
+              <a:rPr lang="en-GB" sz="4000" b="1" dirty="0"/>
+              <a:t>Safer: </a:t>
+            </a:r>
+            <a:endParaRPr lang="en-DE" sz="4000" b="1" dirty="0"/>
+          </a:p>
+        </p:txBody>
+      </p:sp>
+      <p:sp>
+        <p:nvSpPr>
+          <p:cNvPr id="12" name="TextBox 11">
+            <a:extLst>
+              <a:ext uri="{FF2B5EF4-FFF2-40B4-BE49-F238E27FC236}">
+                <a16:creationId xmlns:a16="http://schemas.microsoft.com/office/drawing/2014/main" id="{A2A4893F-4945-B7EB-1C1A-4AFCB0335910}"/>
+              </a:ext>
+            </a:extLst>
+          </p:cNvPr>
+          <p:cNvSpPr txBox="1"/>
+          <p:nvPr/>
+        </p:nvSpPr>
+        <p:spPr>
+          <a:xfrm>
+            <a:off x="2609831" y="12804706"/>
+            <a:ext cx="7315200" cy="707886"/>
+          </a:xfrm>
+          <a:prstGeom prst="rect">
+            <a:avLst/>
+          </a:prstGeom>
+          <a:noFill/>
+        </p:spPr>
+        <p:txBody>
+          <a:bodyPr wrap="square" rtlCol="0">
+            <a:spAutoFit/>
+          </a:bodyPr>
+          <a:lstStyle/>
+          <a:p>
+            <a:r>
+              <a:rPr lang="en-GB" sz="4000" dirty="0">
                 <a:latin typeface="Patrick Hand" pitchFamily="2" charset="77"/>
-              </a:endParaRPr>
-            </a:p>
-          </p:txBody>
-        </p:sp>
-      </p:grpSp>
-      <p:grpSp>
-        <p:nvGrpSpPr>
-          <p:cNvPr id="16" name="Group 15">
-            <a:extLst>
-              <a:ext uri="{FF2B5EF4-FFF2-40B4-BE49-F238E27FC236}">
-                <a16:creationId xmlns:a16="http://schemas.microsoft.com/office/drawing/2014/main" id="{D6C6D89F-E93D-214F-D90F-37122956D077}"/>
-              </a:ext>
-            </a:extLst>
-          </p:cNvPr>
-          <p:cNvGrpSpPr/>
-          <p:nvPr/>
-        </p:nvGrpSpPr>
-        <p:grpSpPr>
-          <a:xfrm>
-            <a:off x="22445" y="13878330"/>
-            <a:ext cx="10240523" cy="726837"/>
-            <a:chOff x="44890" y="13878330"/>
-            <a:chExt cx="10240523" cy="726837"/>
-          </a:xfrm>
-        </p:grpSpPr>
-        <p:sp>
-          <p:nvSpPr>
-            <p:cNvPr id="9" name="TextBox 8">
-              <a:extLst>
-                <a:ext uri="{FF2B5EF4-FFF2-40B4-BE49-F238E27FC236}">
-                  <a16:creationId xmlns:a16="http://schemas.microsoft.com/office/drawing/2014/main" id="{B266C270-8250-9E8C-0C34-1C95D283B5CB}"/>
-                </a:ext>
-              </a:extLst>
-            </p:cNvPr>
-            <p:cNvSpPr txBox="1"/>
-            <p:nvPr/>
-          </p:nvSpPr>
-          <p:spPr>
-            <a:xfrm>
-              <a:off x="44890" y="13897281"/>
-              <a:ext cx="2310120" cy="707886"/>
-            </a:xfrm>
-            <a:prstGeom prst="rect">
-              <a:avLst/>
-            </a:prstGeom>
-            <a:noFill/>
-          </p:spPr>
-          <p:txBody>
-            <a:bodyPr wrap="none" rtlCol="0">
-              <a:spAutoFit/>
-            </a:bodyPr>
-            <a:lstStyle/>
-            <a:p>
-              <a:r>
-                <a:rPr lang="en-GB" sz="4000" b="1" dirty="0"/>
-                <a:t>Pythonic: </a:t>
-              </a:r>
-              <a:endParaRPr lang="en-DE" sz="4000" b="1" dirty="0"/>
-            </a:p>
-          </p:txBody>
-        </p:sp>
-        <p:sp>
-          <p:nvSpPr>
-            <p:cNvPr id="13" name="TextBox 12">
-              <a:extLst>
-                <a:ext uri="{FF2B5EF4-FFF2-40B4-BE49-F238E27FC236}">
-                  <a16:creationId xmlns:a16="http://schemas.microsoft.com/office/drawing/2014/main" id="{AD66807C-E3C5-9589-B831-282432DEFF7E}"/>
-                </a:ext>
-              </a:extLst>
-            </p:cNvPr>
-            <p:cNvSpPr txBox="1"/>
-            <p:nvPr/>
-          </p:nvSpPr>
-          <p:spPr>
-            <a:xfrm>
-              <a:off x="2355010" y="13878330"/>
-              <a:ext cx="7930403" cy="707886"/>
-            </a:xfrm>
-            <a:prstGeom prst="rect">
-              <a:avLst/>
-            </a:prstGeom>
-            <a:noFill/>
-          </p:spPr>
-          <p:txBody>
-            <a:bodyPr wrap="square" rtlCol="0">
-              <a:spAutoFit/>
-            </a:bodyPr>
-            <a:lstStyle/>
-            <a:p>
-              <a:r>
-                <a:rPr lang="en-GB" sz="4000" dirty="0"/>
-                <a:t>It's the PEP 8 official standard</a:t>
-              </a:r>
-              <a:endParaRPr lang="en-DE" sz="4000" dirty="0">
+              </a:rPr>
+              <a:t>Avoids custom --</a:t>
+            </a:r>
+            <a:r>
+              <a:rPr lang="en-GB" sz="4000" dirty="0" err="1">
                 <a:latin typeface="Patrick Hand" pitchFamily="2" charset="77"/>
-              </a:endParaRPr>
-            </a:p>
-          </p:txBody>
-        </p:sp>
-      </p:grpSp>
+              </a:rPr>
+              <a:t>eq</a:t>
+            </a:r>
+            <a:r>
+              <a:rPr lang="en-GB" sz="4000" dirty="0">
+                <a:latin typeface="Patrick Hand" pitchFamily="2" charset="77"/>
+              </a:rPr>
+              <a:t>-- method bugs</a:t>
+            </a:r>
+            <a:endParaRPr lang="en-DE" sz="4000" dirty="0">
+              <a:latin typeface="Patrick Hand" pitchFamily="2" charset="77"/>
+            </a:endParaRPr>
+          </a:p>
+        </p:txBody>
+      </p:sp>
+      <p:sp>
+        <p:nvSpPr>
+          <p:cNvPr id="9" name="TextBox 8">
+            <a:extLst>
+              <a:ext uri="{FF2B5EF4-FFF2-40B4-BE49-F238E27FC236}">
+                <a16:creationId xmlns:a16="http://schemas.microsoft.com/office/drawing/2014/main" id="{B266C270-8250-9E8C-0C34-1C95D283B5CB}"/>
+              </a:ext>
+            </a:extLst>
+          </p:cNvPr>
+          <p:cNvSpPr txBox="1"/>
+          <p:nvPr/>
+        </p:nvSpPr>
+        <p:spPr>
+          <a:xfrm>
+            <a:off x="223306" y="13897281"/>
+            <a:ext cx="2310120" cy="707886"/>
+          </a:xfrm>
+          <a:prstGeom prst="rect">
+            <a:avLst/>
+          </a:prstGeom>
+          <a:noFill/>
+        </p:spPr>
+        <p:txBody>
+          <a:bodyPr wrap="none" rtlCol="0">
+            <a:spAutoFit/>
+          </a:bodyPr>
+          <a:lstStyle/>
+          <a:p>
+            <a:r>
+              <a:rPr lang="en-GB" sz="4000" b="1" dirty="0"/>
+              <a:t>Pythonic: </a:t>
+            </a:r>
+            <a:endParaRPr lang="en-DE" sz="4000" b="1" dirty="0"/>
+          </a:p>
+        </p:txBody>
+      </p:sp>
+      <p:sp>
+        <p:nvSpPr>
+          <p:cNvPr id="13" name="TextBox 12">
+            <a:extLst>
+              <a:ext uri="{FF2B5EF4-FFF2-40B4-BE49-F238E27FC236}">
+                <a16:creationId xmlns:a16="http://schemas.microsoft.com/office/drawing/2014/main" id="{AD66807C-E3C5-9589-B831-282432DEFF7E}"/>
+              </a:ext>
+            </a:extLst>
+          </p:cNvPr>
+          <p:cNvSpPr txBox="1"/>
+          <p:nvPr/>
+        </p:nvSpPr>
+        <p:spPr>
+          <a:xfrm>
+            <a:off x="2609831" y="13878330"/>
+            <a:ext cx="7314747" cy="707886"/>
+          </a:xfrm>
+          <a:prstGeom prst="rect">
+            <a:avLst/>
+          </a:prstGeom>
+          <a:noFill/>
+        </p:spPr>
+        <p:txBody>
+          <a:bodyPr wrap="square" rtlCol="0">
+            <a:spAutoFit/>
+          </a:bodyPr>
+          <a:lstStyle/>
+          <a:p>
+            <a:r>
+              <a:rPr lang="en-GB" sz="4000" dirty="0">
+                <a:latin typeface="Patrick Hand" pitchFamily="2" charset="77"/>
+              </a:rPr>
+              <a:t>Follows the official PEP 8 standard</a:t>
+            </a:r>
+            <a:endParaRPr lang="en-DE" sz="4000" dirty="0">
+              <a:latin typeface="Patrick Hand" pitchFamily="2" charset="77"/>
+            </a:endParaRPr>
+          </a:p>
+        </p:txBody>
+      </p:sp>
       <p:cxnSp>
         <p:nvCxnSpPr>
           <p:cNvPr id="17" name="Straight Connector 16">
@@ -7356,6 +7725,65 @@
           </a:prstGeom>
         </p:spPr>
       </p:pic>
+      <p:sp>
+        <p:nvSpPr>
+          <p:cNvPr id="25" name="TextBox 24">
+            <a:extLst>
+              <a:ext uri="{FF2B5EF4-FFF2-40B4-BE49-F238E27FC236}">
+                <a16:creationId xmlns:a16="http://schemas.microsoft.com/office/drawing/2014/main" id="{2A68B83D-36C3-1AF4-295A-A3B5F70300FD}"/>
+              </a:ext>
+            </a:extLst>
+          </p:cNvPr>
+          <p:cNvSpPr txBox="1"/>
+          <p:nvPr/>
+        </p:nvSpPr>
+        <p:spPr>
+          <a:xfrm>
+            <a:off x="-7857400" y="2527667"/>
+            <a:ext cx="7000634" cy="830997"/>
+          </a:xfrm>
+          <a:prstGeom prst="rect">
+            <a:avLst/>
+          </a:prstGeom>
+        </p:spPr>
+        <p:style>
+          <a:lnRef idx="1">
+            <a:schemeClr val="accent2"/>
+          </a:lnRef>
+          <a:fillRef idx="2">
+            <a:schemeClr val="accent2"/>
+          </a:fillRef>
+          <a:effectRef idx="1">
+            <a:schemeClr val="accent2"/>
+          </a:effectRef>
+          <a:fontRef idx="minor">
+            <a:schemeClr val="dk1"/>
+          </a:fontRef>
+        </p:style>
+        <p:txBody>
+          <a:bodyPr wrap="none" rtlCol="0">
+            <a:spAutoFit/>
+          </a:bodyPr>
+          <a:lstStyle/>
+          <a:p>
+            <a:r>
+              <a:rPr lang="en-US" sz="4800" dirty="0">
+                <a:solidFill>
+                  <a:srgbClr val="FF0000"/>
+                </a:solidFill>
+                <a:latin typeface="Patrick Hand" pitchFamily="2" charset="77"/>
+              </a:rPr>
+              <a:t>py_013_is_none_comparision</a:t>
+            </a:r>
+            <a:endParaRPr lang="en-DE" sz="4800" dirty="0">
+              <a:solidFill>
+                <a:srgbClr val="FF0000"/>
+              </a:solidFill>
+              <a:latin typeface="Patrick Hand" pitchFamily="2" charset="77"/>
+            </a:endParaRPr>
+          </a:p>
+        </p:txBody>
+      </p:sp>
     </p:spTree>
     <p:extLst>
       <p:ext uri="{BB962C8B-B14F-4D97-AF65-F5344CB8AC3E}">
@@ -7372,9 +7800,50 @@
 <file path=ppt/slides/slide15.xml><?xml version="1.0" encoding="utf-8"?>
 <p:sld xmlns:a="http://schemas.openxmlformats.org/drawingml/2006/main" xmlns:r="http://schemas.openxmlformats.org/officeDocument/2006/relationships" xmlns:p="http://schemas.openxmlformats.org/presentationml/2006/main">
   <p:cSld>
+    <p:bg>
+      <p:bgPr>
+        <a:gradFill flip="none" rotWithShape="1">
+          <a:gsLst>
+            <a:gs pos="0">
+              <a:schemeClr val="accent3">
+                <a:lumMod val="5000"/>
+                <a:lumOff val="95000"/>
+              </a:schemeClr>
+            </a:gs>
+            <a:gs pos="74000">
+              <a:schemeClr val="accent3">
+                <a:lumMod val="45000"/>
+                <a:lumOff val="55000"/>
+              </a:schemeClr>
+            </a:gs>
+            <a:gs pos="83000">
+              <a:schemeClr val="accent3">
+                <a:lumMod val="45000"/>
+                <a:lumOff val="55000"/>
+              </a:schemeClr>
+            </a:gs>
+            <a:gs pos="100000">
+              <a:schemeClr val="accent3">
+                <a:lumMod val="30000"/>
+                <a:lumOff val="70000"/>
+              </a:schemeClr>
+            </a:gs>
+          </a:gsLst>
+          <a:lin ang="5400000" scaled="1"/>
+          <a:tileRect/>
+        </a:gradFill>
+        <a:effectLst/>
+      </p:bgPr>
+    </p:bg>
     <p:spTree>
       <p:nvGrpSpPr>
-        <p:cNvPr id="1" name=""/>
+        <p:cNvPr id="1" name="">
+          <a:extLst>
+            <a:ext uri="{FF2B5EF4-FFF2-40B4-BE49-F238E27FC236}">
+              <a16:creationId xmlns:a16="http://schemas.microsoft.com/office/drawing/2014/main" id="{263935C7-D76D-D8A9-B1A0-857B7FCF6699}"/>
+            </a:ext>
+          </a:extLst>
+        </p:cNvPr>
         <p:cNvGrpSpPr/>
         <p:nvPr/>
       </p:nvGrpSpPr>
@@ -7386,25 +7855,609 @@
           <a:chExt cx="0" cy="0"/>
         </a:xfrm>
       </p:grpSpPr>
+      <p:grpSp>
+        <p:nvGrpSpPr>
+          <p:cNvPr id="15" name="Group 14">
+            <a:extLst>
+              <a:ext uri="{FF2B5EF4-FFF2-40B4-BE49-F238E27FC236}">
+                <a16:creationId xmlns:a16="http://schemas.microsoft.com/office/drawing/2014/main" id="{5E57E8F2-34E1-D30F-1E3C-9D9F815C62CE}"/>
+              </a:ext>
+            </a:extLst>
+          </p:cNvPr>
+          <p:cNvGrpSpPr/>
+          <p:nvPr/>
+        </p:nvGrpSpPr>
+        <p:grpSpPr>
+          <a:xfrm>
+            <a:off x="223306" y="2872200"/>
+            <a:ext cx="9838800" cy="1107996"/>
+            <a:chOff x="223306" y="2872200"/>
+            <a:chExt cx="9838800" cy="1107996"/>
+          </a:xfrm>
+        </p:grpSpPr>
+        <p:sp>
+          <p:nvSpPr>
+            <p:cNvPr id="4" name="TextBox 3">
+              <a:extLst>
+                <a:ext uri="{FF2B5EF4-FFF2-40B4-BE49-F238E27FC236}">
+                  <a16:creationId xmlns:a16="http://schemas.microsoft.com/office/drawing/2014/main" id="{D9811DF6-DCA6-5BA5-173D-D3A1AD21181A}"/>
+                </a:ext>
+              </a:extLst>
+            </p:cNvPr>
+            <p:cNvSpPr txBox="1"/>
+            <p:nvPr/>
+          </p:nvSpPr>
+          <p:spPr>
+            <a:xfrm>
+              <a:off x="223306" y="2872200"/>
+              <a:ext cx="9838800" cy="1107996"/>
+            </a:xfrm>
+            <a:prstGeom prst="rect">
+              <a:avLst/>
+            </a:prstGeom>
+            <a:ln/>
+          </p:spPr>
+          <p:style>
+            <a:lnRef idx="0">
+              <a:schemeClr val="dk1"/>
+            </a:lnRef>
+            <a:fillRef idx="3">
+              <a:schemeClr val="dk1"/>
+            </a:fillRef>
+            <a:effectRef idx="3">
+              <a:schemeClr val="dk1"/>
+            </a:effectRef>
+            <a:fontRef idx="minor">
+              <a:schemeClr val="lt1"/>
+            </a:fontRef>
+          </p:style>
+          <p:txBody>
+            <a:bodyPr wrap="square" rtlCol="0">
+              <a:spAutoFit/>
+              <a:scene3d>
+                <a:camera prst="orthographicFront"/>
+                <a:lightRig rig="harsh" dir="t"/>
+              </a:scene3d>
+              <a:sp3d extrusionH="57150" prstMaterial="matte">
+                <a:bevelT w="63500" h="12700" prst="angle"/>
+                <a:contourClr>
+                  <a:schemeClr val="bg1">
+                    <a:lumMod val="65000"/>
+                  </a:schemeClr>
+                </a:contourClr>
+              </a:sp3d>
+            </a:bodyPr>
+            <a:lstStyle/>
+            <a:p>
+              <a:pPr algn="ctr"/>
+              <a:r>
+                <a:rPr lang="en-GB" sz="6600" b="1" dirty="0">
+                  <a:latin typeface="+mj-lt"/>
+                </a:rPr>
+                <a:t>Use 'with' Statement</a:t>
+              </a:r>
+              <a:endParaRPr lang="en-GB" b="1" dirty="0">
+                <a:ln w="0"/>
+                <a:solidFill>
+                  <a:schemeClr val="tx1"/>
+                </a:solidFill>
+                <a:effectLst>
+                  <a:outerShdw blurRad="38100" dist="25400" dir="5400000" algn="ctr" rotWithShape="0">
+                    <a:srgbClr val="6E747A">
+                      <a:alpha val="43000"/>
+                    </a:srgbClr>
+                  </a:outerShdw>
+                </a:effectLst>
+                <a:latin typeface="+mj-lt"/>
+              </a:endParaRPr>
+            </a:p>
+          </p:txBody>
+        </p:sp>
+        <p:pic>
+          <p:nvPicPr>
+            <p:cNvPr id="5" name="Picture 4">
+              <a:extLst>
+                <a:ext uri="{FF2B5EF4-FFF2-40B4-BE49-F238E27FC236}">
+                  <a16:creationId xmlns:a16="http://schemas.microsoft.com/office/drawing/2014/main" id="{37B55E9B-ABE8-F7C9-F6DE-0B1F6CDFDDAF}"/>
+                </a:ext>
+              </a:extLst>
+            </p:cNvPr>
+            <p:cNvPicPr>
+              <a:picLocks noChangeAspect="1"/>
+            </p:cNvPicPr>
+            <p:nvPr/>
+          </p:nvPicPr>
+          <p:blipFill>
+            <a:blip r:embed="rId3"/>
+            <a:stretch>
+              <a:fillRect/>
+            </a:stretch>
+          </p:blipFill>
+          <p:spPr>
+            <a:xfrm>
+              <a:off x="264001" y="2906105"/>
+              <a:ext cx="1063167" cy="1063167"/>
+            </a:xfrm>
+            <a:prstGeom prst="rect">
+              <a:avLst/>
+            </a:prstGeom>
+          </p:spPr>
+        </p:pic>
+      </p:grpSp>
+      <p:sp>
+        <p:nvSpPr>
+          <p:cNvPr id="7" name="TextBox 6">
+            <a:extLst>
+              <a:ext uri="{FF2B5EF4-FFF2-40B4-BE49-F238E27FC236}">
+                <a16:creationId xmlns:a16="http://schemas.microsoft.com/office/drawing/2014/main" id="{FC490A48-FDDC-CA56-7D3A-6259AD2D71C3}"/>
+              </a:ext>
+            </a:extLst>
+          </p:cNvPr>
+          <p:cNvSpPr txBox="1"/>
+          <p:nvPr/>
+        </p:nvSpPr>
+        <p:spPr>
+          <a:xfrm>
+            <a:off x="186673" y="11731083"/>
+            <a:ext cx="2545762" cy="707886"/>
+          </a:xfrm>
+          <a:prstGeom prst="rect">
+            <a:avLst/>
+          </a:prstGeom>
+          <a:noFill/>
+        </p:spPr>
+        <p:txBody>
+          <a:bodyPr wrap="none" rtlCol="0">
+            <a:spAutoFit/>
+          </a:bodyPr>
+          <a:lstStyle/>
+          <a:p>
+            <a:r>
+              <a:rPr lang="en-US" sz="4000" b="1" dirty="0"/>
+              <a:t>Automatic:</a:t>
+            </a:r>
+            <a:endParaRPr lang="en-DE" sz="4000" dirty="0"/>
+          </a:p>
+        </p:txBody>
+      </p:sp>
+      <p:sp>
+        <p:nvSpPr>
+          <p:cNvPr id="11" name="TextBox 10">
+            <a:extLst>
+              <a:ext uri="{FF2B5EF4-FFF2-40B4-BE49-F238E27FC236}">
+                <a16:creationId xmlns:a16="http://schemas.microsoft.com/office/drawing/2014/main" id="{3C107D96-4FC3-027C-1D15-683F85C805B5}"/>
+              </a:ext>
+            </a:extLst>
+          </p:cNvPr>
+          <p:cNvSpPr txBox="1"/>
+          <p:nvPr/>
+        </p:nvSpPr>
+        <p:spPr>
+          <a:xfrm>
+            <a:off x="3425118" y="11731083"/>
+            <a:ext cx="6673622" cy="830997"/>
+          </a:xfrm>
+          <a:prstGeom prst="rect">
+            <a:avLst/>
+          </a:prstGeom>
+          <a:noFill/>
+        </p:spPr>
+        <p:txBody>
+          <a:bodyPr wrap="none" rtlCol="0">
+            <a:spAutoFit/>
+          </a:bodyPr>
+          <a:lstStyle/>
+          <a:p>
+            <a:r>
+              <a:rPr lang="en-GB" sz="4800" dirty="0">
+                <a:latin typeface="Patrick Hand" pitchFamily="2" charset="77"/>
+              </a:rPr>
+              <a:t>No more manual close() calls</a:t>
+            </a:r>
+            <a:endParaRPr lang="en-DE" sz="4800" dirty="0">
+              <a:latin typeface="Patrick Hand" pitchFamily="2" charset="77"/>
+            </a:endParaRPr>
+          </a:p>
+        </p:txBody>
+      </p:sp>
+      <p:sp>
+        <p:nvSpPr>
+          <p:cNvPr id="8" name="TextBox 7">
+            <a:extLst>
+              <a:ext uri="{FF2B5EF4-FFF2-40B4-BE49-F238E27FC236}">
+                <a16:creationId xmlns:a16="http://schemas.microsoft.com/office/drawing/2014/main" id="{12E3EC7A-21B7-943A-EA25-C438EAE74DC0}"/>
+              </a:ext>
+            </a:extLst>
+          </p:cNvPr>
+          <p:cNvSpPr txBox="1"/>
+          <p:nvPr/>
+        </p:nvSpPr>
+        <p:spPr>
+          <a:xfrm>
+            <a:off x="186673" y="12814182"/>
+            <a:ext cx="1344663" cy="707886"/>
+          </a:xfrm>
+          <a:prstGeom prst="rect">
+            <a:avLst/>
+          </a:prstGeom>
+          <a:noFill/>
+        </p:spPr>
+        <p:txBody>
+          <a:bodyPr wrap="none" rtlCol="0">
+            <a:spAutoFit/>
+          </a:bodyPr>
+          <a:lstStyle/>
+          <a:p>
+            <a:r>
+              <a:rPr lang="en-GB" sz="4000" b="1" dirty="0"/>
+              <a:t>Safe: </a:t>
+            </a:r>
+            <a:endParaRPr lang="en-DE" sz="4000" b="1" dirty="0"/>
+          </a:p>
+        </p:txBody>
+      </p:sp>
+      <p:sp>
+        <p:nvSpPr>
+          <p:cNvPr id="12" name="TextBox 11">
+            <a:extLst>
+              <a:ext uri="{FF2B5EF4-FFF2-40B4-BE49-F238E27FC236}">
+                <a16:creationId xmlns:a16="http://schemas.microsoft.com/office/drawing/2014/main" id="{30FAB019-507A-2EC2-3DA2-A9BB1C904276}"/>
+              </a:ext>
+            </a:extLst>
+          </p:cNvPr>
+          <p:cNvSpPr txBox="1"/>
+          <p:nvPr/>
+        </p:nvSpPr>
+        <p:spPr>
+          <a:xfrm>
+            <a:off x="3490841" y="12804707"/>
+            <a:ext cx="6607899" cy="830997"/>
+          </a:xfrm>
+          <a:prstGeom prst="rect">
+            <a:avLst/>
+          </a:prstGeom>
+          <a:noFill/>
+        </p:spPr>
+        <p:txBody>
+          <a:bodyPr wrap="none" rtlCol="0">
+            <a:spAutoFit/>
+          </a:bodyPr>
+          <a:lstStyle/>
+          <a:p>
+            <a:r>
+              <a:rPr lang="en-GB" sz="4800" dirty="0">
+                <a:latin typeface="Patrick Hand" pitchFamily="2" charset="77"/>
+              </a:rPr>
+              <a:t>Prevents leaks during errors</a:t>
+            </a:r>
+            <a:endParaRPr lang="en-DE" sz="4800" dirty="0">
+              <a:latin typeface="Patrick Hand" pitchFamily="2" charset="77"/>
+            </a:endParaRPr>
+          </a:p>
+        </p:txBody>
+      </p:sp>
+      <p:sp>
+        <p:nvSpPr>
+          <p:cNvPr id="9" name="TextBox 8">
+            <a:extLst>
+              <a:ext uri="{FF2B5EF4-FFF2-40B4-BE49-F238E27FC236}">
+                <a16:creationId xmlns:a16="http://schemas.microsoft.com/office/drawing/2014/main" id="{15FEAAD5-4282-A2CD-8811-5319C0B2D77D}"/>
+              </a:ext>
+            </a:extLst>
+          </p:cNvPr>
+          <p:cNvSpPr txBox="1"/>
+          <p:nvPr/>
+        </p:nvSpPr>
+        <p:spPr>
+          <a:xfrm>
+            <a:off x="186673" y="13878330"/>
+            <a:ext cx="1625766" cy="707886"/>
+          </a:xfrm>
+          <a:prstGeom prst="rect">
+            <a:avLst/>
+          </a:prstGeom>
+          <a:noFill/>
+        </p:spPr>
+        <p:txBody>
+          <a:bodyPr wrap="none" rtlCol="0">
+            <a:spAutoFit/>
+          </a:bodyPr>
+          <a:lstStyle/>
+          <a:p>
+            <a:r>
+              <a:rPr lang="en-GB" sz="4000" b="1" dirty="0"/>
+              <a:t>Clean: </a:t>
+            </a:r>
+            <a:endParaRPr lang="en-DE" sz="4000" b="1" dirty="0"/>
+          </a:p>
+        </p:txBody>
+      </p:sp>
+      <p:sp>
+        <p:nvSpPr>
+          <p:cNvPr id="13" name="TextBox 12">
+            <a:extLst>
+              <a:ext uri="{FF2B5EF4-FFF2-40B4-BE49-F238E27FC236}">
+                <a16:creationId xmlns:a16="http://schemas.microsoft.com/office/drawing/2014/main" id="{6AACDDF8-9461-833E-A5D0-B258E1311441}"/>
+              </a:ext>
+            </a:extLst>
+          </p:cNvPr>
+          <p:cNvSpPr txBox="1"/>
+          <p:nvPr/>
+        </p:nvSpPr>
+        <p:spPr>
+          <a:xfrm>
+            <a:off x="3668775" y="13878330"/>
+            <a:ext cx="6429965" cy="830997"/>
+          </a:xfrm>
+          <a:prstGeom prst="rect">
+            <a:avLst/>
+          </a:prstGeom>
+          <a:noFill/>
+        </p:spPr>
+        <p:txBody>
+          <a:bodyPr wrap="none" rtlCol="0">
+            <a:spAutoFit/>
+          </a:bodyPr>
+          <a:lstStyle/>
+          <a:p>
+            <a:r>
+              <a:rPr lang="en-GB" sz="4800" dirty="0">
+                <a:latin typeface="Patrick Hand" pitchFamily="2" charset="77"/>
+              </a:rPr>
+              <a:t>Less code, better readability</a:t>
+            </a:r>
+            <a:endParaRPr lang="en-DE" sz="4800" dirty="0">
+              <a:latin typeface="Patrick Hand" pitchFamily="2" charset="77"/>
+            </a:endParaRPr>
+          </a:p>
+        </p:txBody>
+      </p:sp>
+      <p:pic>
+        <p:nvPicPr>
+          <p:cNvPr id="2" name="Picture 1">
+            <a:extLst>
+              <a:ext uri="{FF2B5EF4-FFF2-40B4-BE49-F238E27FC236}">
+                <a16:creationId xmlns:a16="http://schemas.microsoft.com/office/drawing/2014/main" id="{6D698CA1-BEA0-6457-A8B8-5A203D1CE907}"/>
+              </a:ext>
+            </a:extLst>
+          </p:cNvPr>
+          <p:cNvPicPr>
+            <a:picLocks noChangeAspect="1"/>
+          </p:cNvPicPr>
+          <p:nvPr/>
+        </p:nvPicPr>
+        <p:blipFill rotWithShape="1">
+          <a:blip r:embed="rId4"/>
+          <a:srcRect l="17574" t="23797" r="10300" b="14590"/>
+          <a:stretch>
+            <a:fillRect/>
+          </a:stretch>
+        </p:blipFill>
+        <p:spPr>
+          <a:xfrm>
+            <a:off x="186673" y="4318974"/>
+            <a:ext cx="9912067" cy="6765325"/>
+          </a:xfrm>
+          <a:prstGeom prst="rect">
+            <a:avLst/>
+          </a:prstGeom>
+        </p:spPr>
+      </p:pic>
+      <p:cxnSp>
+        <p:nvCxnSpPr>
+          <p:cNvPr id="17" name="Straight Connector 16">
+            <a:extLst>
+              <a:ext uri="{FF2B5EF4-FFF2-40B4-BE49-F238E27FC236}">
+                <a16:creationId xmlns:a16="http://schemas.microsoft.com/office/drawing/2014/main" id="{078A09D0-33BF-6B03-AE47-665AE3D0A683}"/>
+              </a:ext>
+            </a:extLst>
+          </p:cNvPr>
+          <p:cNvCxnSpPr>
+            <a:cxnSpLocks/>
+          </p:cNvCxnSpPr>
+          <p:nvPr/>
+        </p:nvCxnSpPr>
+        <p:spPr>
+          <a:xfrm>
+            <a:off x="235460" y="6872124"/>
+            <a:ext cx="9838255" cy="0"/>
+          </a:xfrm>
+          <a:prstGeom prst="line">
+            <a:avLst/>
+          </a:prstGeom>
+          <a:ln w="38100">
+            <a:solidFill>
+              <a:schemeClr val="bg1"/>
+            </a:solidFill>
+            <a:headEnd type="none"/>
+            <a:tailEnd type="none" w="lg" len="lg"/>
+          </a:ln>
+        </p:spPr>
+        <p:style>
+          <a:lnRef idx="1">
+            <a:schemeClr val="accent1"/>
+          </a:lnRef>
+          <a:fillRef idx="0">
+            <a:schemeClr val="accent1"/>
+          </a:fillRef>
+          <a:effectRef idx="0">
+            <a:schemeClr val="accent1"/>
+          </a:effectRef>
+          <a:fontRef idx="minor">
+            <a:schemeClr val="tx1"/>
+          </a:fontRef>
+        </p:style>
+      </p:cxnSp>
+      <p:pic>
+        <p:nvPicPr>
+          <p:cNvPr id="18" name="Graphic 17" descr="Shield Tick with solid fill">
+            <a:extLst>
+              <a:ext uri="{FF2B5EF4-FFF2-40B4-BE49-F238E27FC236}">
+                <a16:creationId xmlns:a16="http://schemas.microsoft.com/office/drawing/2014/main" id="{5828BDD9-29EC-80B8-F9E0-00FC6D12F564}"/>
+              </a:ext>
+            </a:extLst>
+          </p:cNvPr>
+          <p:cNvPicPr>
+            <a:picLocks noChangeAspect="1"/>
+          </p:cNvPicPr>
+          <p:nvPr/>
+        </p:nvPicPr>
+        <p:blipFill>
+          <a:blip r:embed="rId5">
+            <a:extLst>
+              <a:ext uri="{96DAC541-7B7A-43D3-8B79-37D633B846F1}">
+                <asvg:svgBlip xmlns:asvg="http://schemas.microsoft.com/office/drawing/2016/SVG/main" r:embed="rId6"/>
+              </a:ext>
+            </a:extLst>
+          </a:blip>
+          <a:stretch>
+            <a:fillRect/>
+          </a:stretch>
+        </p:blipFill>
+        <p:spPr>
+          <a:xfrm>
+            <a:off x="8973493" y="7032169"/>
+            <a:ext cx="914400" cy="914400"/>
+          </a:xfrm>
+          <a:prstGeom prst="rect">
+            <a:avLst/>
+          </a:prstGeom>
+        </p:spPr>
+      </p:pic>
+      <p:pic>
+        <p:nvPicPr>
+          <p:cNvPr id="19" name="Graphic 18" descr="Close with solid fill">
+            <a:extLst>
+              <a:ext uri="{FF2B5EF4-FFF2-40B4-BE49-F238E27FC236}">
+                <a16:creationId xmlns:a16="http://schemas.microsoft.com/office/drawing/2014/main" id="{A9BD8DFA-A234-2917-65AF-90E0E24DEF89}"/>
+              </a:ext>
+            </a:extLst>
+          </p:cNvPr>
+          <p:cNvPicPr>
+            <a:picLocks noChangeAspect="1"/>
+          </p:cNvPicPr>
+          <p:nvPr/>
+        </p:nvPicPr>
+        <p:blipFill>
+          <a:blip r:embed="rId7">
+            <a:extLst>
+              <a:ext uri="{96DAC541-7B7A-43D3-8B79-37D633B846F1}">
+                <asvg:svgBlip xmlns:asvg="http://schemas.microsoft.com/office/drawing/2016/SVG/main" r:embed="rId8"/>
+              </a:ext>
+            </a:extLst>
+          </a:blip>
+          <a:stretch>
+            <a:fillRect/>
+          </a:stretch>
+        </p:blipFill>
+        <p:spPr>
+          <a:xfrm>
+            <a:off x="8973493" y="4553412"/>
+            <a:ext cx="914400" cy="914400"/>
+          </a:xfrm>
+          <a:prstGeom prst="rect">
+            <a:avLst/>
+          </a:prstGeom>
+        </p:spPr>
+      </p:pic>
+      <p:sp>
+        <p:nvSpPr>
+          <p:cNvPr id="21" name="TextBox 20">
+            <a:extLst>
+              <a:ext uri="{FF2B5EF4-FFF2-40B4-BE49-F238E27FC236}">
+                <a16:creationId xmlns:a16="http://schemas.microsoft.com/office/drawing/2014/main" id="{564E587C-A795-B2BF-C5C7-7BBE30BE9381}"/>
+              </a:ext>
+            </a:extLst>
+          </p:cNvPr>
+          <p:cNvSpPr txBox="1"/>
+          <p:nvPr/>
+        </p:nvSpPr>
+        <p:spPr>
+          <a:xfrm>
+            <a:off x="-7857400" y="2527667"/>
+            <a:ext cx="5684569" cy="830997"/>
+          </a:xfrm>
+          <a:prstGeom prst="rect">
+            <a:avLst/>
+          </a:prstGeom>
+        </p:spPr>
+        <p:style>
+          <a:lnRef idx="1">
+            <a:schemeClr val="accent2"/>
+          </a:lnRef>
+          <a:fillRef idx="2">
+            <a:schemeClr val="accent2"/>
+          </a:fillRef>
+          <a:effectRef idx="1">
+            <a:schemeClr val="accent2"/>
+          </a:effectRef>
+          <a:fontRef idx="minor">
+            <a:schemeClr val="dk1"/>
+          </a:fontRef>
+        </p:style>
+        <p:txBody>
+          <a:bodyPr wrap="none" rtlCol="0">
+            <a:spAutoFit/>
+          </a:bodyPr>
+          <a:lstStyle/>
+          <a:p>
+            <a:r>
+              <a:rPr lang="en-US" sz="4800" dirty="0">
+                <a:solidFill>
+                  <a:srgbClr val="FF0000"/>
+                </a:solidFill>
+                <a:latin typeface="Patrick Hand" pitchFamily="2" charset="77"/>
+              </a:rPr>
+              <a:t>py_014_with_statement</a:t>
+            </a:r>
+            <a:endParaRPr lang="en-DE" sz="4800" dirty="0">
+              <a:solidFill>
+                <a:srgbClr val="FF0000"/>
+              </a:solidFill>
+              <a:latin typeface="Patrick Hand" pitchFamily="2" charset="77"/>
+            </a:endParaRPr>
+          </a:p>
+        </p:txBody>
+      </p:sp>
     </p:spTree>
     <p:extLst>
       <p:ext uri="{BB962C8B-B14F-4D97-AF65-F5344CB8AC3E}">
-        <p14:creationId xmlns:p14="http://schemas.microsoft.com/office/powerpoint/2010/main" val="3355690493"/>
+        <p14:creationId xmlns:p14="http://schemas.microsoft.com/office/powerpoint/2010/main" val="4194454532"/>
       </p:ext>
     </p:extLst>
   </p:cSld>
   <p:clrMapOvr>
     <a:masterClrMapping/>
   </p:clrMapOvr>
+  <p:extLst>
+    <p:ext uri="{6950BFC3-D8DA-4A85-94F7-54DA5524770B}">
+      <p188:commentRel xmlns:p188="http://schemas.microsoft.com/office/powerpoint/2018/8/main" r:id="rId2"/>
+    </p:ext>
+  </p:extLst>
 </p:sld>
 </file>
 
 <file path=ppt/slides/slide16.xml><?xml version="1.0" encoding="utf-8"?>
 <p:sld xmlns:a="http://schemas.openxmlformats.org/drawingml/2006/main" xmlns:r="http://schemas.openxmlformats.org/officeDocument/2006/relationships" xmlns:p="http://schemas.openxmlformats.org/presentationml/2006/main">
   <p:cSld>
+    <p:bg>
+      <p:bgPr>
+        <a:blipFill>
+          <a:blip r:embed="rId3"/>
+          <a:tile tx="0" ty="0" sx="100000" sy="100000" flip="none" algn="tl"/>
+        </a:blipFill>
+        <a:effectLst/>
+      </p:bgPr>
+    </p:bg>
     <p:spTree>
       <p:nvGrpSpPr>
-        <p:cNvPr id="1" name=""/>
+        <p:cNvPr id="1" name="">
+          <a:extLst>
+            <a:ext uri="{FF2B5EF4-FFF2-40B4-BE49-F238E27FC236}">
+              <a16:creationId xmlns:a16="http://schemas.microsoft.com/office/drawing/2014/main" id="{38D6513E-44C3-8C15-A7B0-E379B4EE782B}"/>
+            </a:ext>
+          </a:extLst>
+        </p:cNvPr>
         <p:cNvGrpSpPr/>
         <p:nvPr/>
       </p:nvGrpSpPr>
@@ -7416,10 +8469,563 @@
           <a:chExt cx="0" cy="0"/>
         </a:xfrm>
       </p:grpSpPr>
+      <p:sp>
+        <p:nvSpPr>
+          <p:cNvPr id="9" name="TextBox 8">
+            <a:extLst>
+              <a:ext uri="{FF2B5EF4-FFF2-40B4-BE49-F238E27FC236}">
+                <a16:creationId xmlns:a16="http://schemas.microsoft.com/office/drawing/2014/main" id="{9F05B7D4-F280-F06F-B39C-2F00BFC25F26}"/>
+              </a:ext>
+            </a:extLst>
+          </p:cNvPr>
+          <p:cNvSpPr txBox="1"/>
+          <p:nvPr/>
+        </p:nvSpPr>
+        <p:spPr>
+          <a:xfrm>
+            <a:off x="223306" y="2468165"/>
+            <a:ext cx="9838800" cy="1107996"/>
+          </a:xfrm>
+          <a:prstGeom prst="rect">
+            <a:avLst/>
+          </a:prstGeom>
+          <a:ln/>
+        </p:spPr>
+        <p:style>
+          <a:lnRef idx="0">
+            <a:schemeClr val="dk1"/>
+          </a:lnRef>
+          <a:fillRef idx="3">
+            <a:schemeClr val="dk1"/>
+          </a:fillRef>
+          <a:effectRef idx="3">
+            <a:schemeClr val="dk1"/>
+          </a:effectRef>
+          <a:fontRef idx="minor">
+            <a:schemeClr val="lt1"/>
+          </a:fontRef>
+        </p:style>
+        <p:txBody>
+          <a:bodyPr wrap="square" rtlCol="0">
+            <a:spAutoFit/>
+            <a:scene3d>
+              <a:camera prst="orthographicFront"/>
+              <a:lightRig rig="harsh" dir="t"/>
+            </a:scene3d>
+            <a:sp3d extrusionH="57150" prstMaterial="matte">
+              <a:bevelT w="63500" h="12700" prst="angle"/>
+              <a:contourClr>
+                <a:schemeClr val="bg1">
+                  <a:lumMod val="65000"/>
+                </a:schemeClr>
+              </a:contourClr>
+            </a:sp3d>
+          </a:bodyPr>
+          <a:lstStyle/>
+          <a:p>
+            <a:pPr algn="ctr"/>
+            <a:r>
+              <a:rPr lang="en-DE" sz="6600" b="1" dirty="0">
+                <a:ln w="6600">
+                  <a:solidFill>
+                    <a:schemeClr val="accent2"/>
+                  </a:solidFill>
+                  <a:prstDash val="solid"/>
+                </a:ln>
+                <a:solidFill>
+                  <a:srgbClr val="FFFFFF"/>
+                </a:solidFill>
+                <a:effectLst>
+                  <a:outerShdw dist="38100" dir="2700000" algn="tl" rotWithShape="0">
+                    <a:schemeClr val="accent2"/>
+                  </a:outerShdw>
+                </a:effectLst>
+                <a:latin typeface="Patrick Hand" pitchFamily="2" charset="77"/>
+              </a:rPr>
+              <a:t>Decoretors</a:t>
+            </a:r>
+            <a:endParaRPr lang="en-DE" sz="6600" dirty="0">
+              <a:ln w="0"/>
+              <a:effectLst>
+                <a:outerShdw blurRad="38100" dist="19050" dir="2700000" algn="tl" rotWithShape="0">
+                  <a:schemeClr val="dk1">
+                    <a:alpha val="40000"/>
+                  </a:schemeClr>
+                </a:outerShdw>
+              </a:effectLst>
+              <a:latin typeface="Patrick Hand" pitchFamily="2" charset="77"/>
+            </a:endParaRPr>
+          </a:p>
+        </p:txBody>
+      </p:sp>
+      <p:pic>
+        <p:nvPicPr>
+          <p:cNvPr id="13" name="Picture 12">
+            <a:extLst>
+              <a:ext uri="{FF2B5EF4-FFF2-40B4-BE49-F238E27FC236}">
+                <a16:creationId xmlns:a16="http://schemas.microsoft.com/office/drawing/2014/main" id="{B0F0CA92-46F0-129E-D4FC-B71F8C1DEB31}"/>
+              </a:ext>
+            </a:extLst>
+          </p:cNvPr>
+          <p:cNvPicPr>
+            <a:picLocks noChangeAspect="1"/>
+          </p:cNvPicPr>
+          <p:nvPr/>
+        </p:nvPicPr>
+        <p:blipFill>
+          <a:blip r:embed="rId4"/>
+          <a:stretch>
+            <a:fillRect/>
+          </a:stretch>
+        </p:blipFill>
+        <p:spPr>
+          <a:xfrm>
+            <a:off x="271852" y="2494115"/>
+            <a:ext cx="1063167" cy="1063167"/>
+          </a:xfrm>
+          <a:prstGeom prst="rect">
+            <a:avLst/>
+          </a:prstGeom>
+        </p:spPr>
+      </p:pic>
+      <p:cxnSp>
+        <p:nvCxnSpPr>
+          <p:cNvPr id="16" name="Straight Connector 15">
+            <a:extLst>
+              <a:ext uri="{FF2B5EF4-FFF2-40B4-BE49-F238E27FC236}">
+                <a16:creationId xmlns:a16="http://schemas.microsoft.com/office/drawing/2014/main" id="{096EFBF3-9D7A-45C0-5825-529AF9B87540}"/>
+              </a:ext>
+            </a:extLst>
+          </p:cNvPr>
+          <p:cNvCxnSpPr>
+            <a:cxnSpLocks/>
+          </p:cNvCxnSpPr>
+          <p:nvPr/>
+        </p:nvCxnSpPr>
+        <p:spPr>
+          <a:xfrm>
+            <a:off x="223579" y="7929149"/>
+            <a:ext cx="9838255" cy="0"/>
+          </a:xfrm>
+          <a:prstGeom prst="line">
+            <a:avLst/>
+          </a:prstGeom>
+          <a:ln w="38100">
+            <a:solidFill>
+              <a:schemeClr val="bg1"/>
+            </a:solidFill>
+            <a:headEnd type="none"/>
+            <a:tailEnd type="none" w="lg" len="lg"/>
+          </a:ln>
+        </p:spPr>
+        <p:style>
+          <a:lnRef idx="1">
+            <a:schemeClr val="accent1"/>
+          </a:lnRef>
+          <a:fillRef idx="0">
+            <a:schemeClr val="accent1"/>
+          </a:fillRef>
+          <a:effectRef idx="0">
+            <a:schemeClr val="accent1"/>
+          </a:effectRef>
+          <a:fontRef idx="minor">
+            <a:schemeClr val="tx1"/>
+          </a:fontRef>
+        </p:style>
+      </p:cxnSp>
+      <p:pic>
+        <p:nvPicPr>
+          <p:cNvPr id="18" name="Graphic 17" descr="Shield Tick with solid fill">
+            <a:extLst>
+              <a:ext uri="{FF2B5EF4-FFF2-40B4-BE49-F238E27FC236}">
+                <a16:creationId xmlns:a16="http://schemas.microsoft.com/office/drawing/2014/main" id="{1D3086D5-48CC-ED96-614E-18E795A99AF7}"/>
+              </a:ext>
+            </a:extLst>
+          </p:cNvPr>
+          <p:cNvPicPr>
+            <a:picLocks noChangeAspect="1"/>
+          </p:cNvPicPr>
+          <p:nvPr/>
+        </p:nvPicPr>
+        <p:blipFill>
+          <a:blip r:embed="rId5">
+            <a:extLst>
+              <a:ext uri="{96DAC541-7B7A-43D3-8B79-37D633B846F1}">
+                <asvg:svgBlip xmlns:asvg="http://schemas.microsoft.com/office/drawing/2016/SVG/main" r:embed="rId6"/>
+              </a:ext>
+            </a:extLst>
+          </a:blip>
+          <a:stretch>
+            <a:fillRect/>
+          </a:stretch>
+        </p:blipFill>
+        <p:spPr>
+          <a:xfrm>
+            <a:off x="7668075" y="10358851"/>
+            <a:ext cx="914400" cy="914400"/>
+          </a:xfrm>
+          <a:prstGeom prst="rect">
+            <a:avLst/>
+          </a:prstGeom>
+        </p:spPr>
+      </p:pic>
+      <p:pic>
+        <p:nvPicPr>
+          <p:cNvPr id="19" name="Graphic 18" descr="Close with solid fill">
+            <a:extLst>
+              <a:ext uri="{FF2B5EF4-FFF2-40B4-BE49-F238E27FC236}">
+                <a16:creationId xmlns:a16="http://schemas.microsoft.com/office/drawing/2014/main" id="{B4714FB7-C189-E14C-AA62-67E825ED6B3D}"/>
+              </a:ext>
+            </a:extLst>
+          </p:cNvPr>
+          <p:cNvPicPr>
+            <a:picLocks noChangeAspect="1"/>
+          </p:cNvPicPr>
+          <p:nvPr/>
+        </p:nvPicPr>
+        <p:blipFill>
+          <a:blip r:embed="rId7">
+            <a:extLst>
+              <a:ext uri="{96DAC541-7B7A-43D3-8B79-37D633B846F1}">
+                <asvg:svgBlip xmlns:asvg="http://schemas.microsoft.com/office/drawing/2016/SVG/main" r:embed="rId8"/>
+              </a:ext>
+            </a:extLst>
+          </a:blip>
+          <a:stretch>
+            <a:fillRect/>
+          </a:stretch>
+        </p:blipFill>
+        <p:spPr>
+          <a:xfrm>
+            <a:off x="7668075" y="5575171"/>
+            <a:ext cx="914400" cy="914400"/>
+          </a:xfrm>
+          <a:prstGeom prst="rect">
+            <a:avLst/>
+          </a:prstGeom>
+        </p:spPr>
+      </p:pic>
+      <p:sp>
+        <p:nvSpPr>
+          <p:cNvPr id="20" name="TextBox 19">
+            <a:extLst>
+              <a:ext uri="{FF2B5EF4-FFF2-40B4-BE49-F238E27FC236}">
+                <a16:creationId xmlns:a16="http://schemas.microsoft.com/office/drawing/2014/main" id="{55431B90-4C81-C2E6-27F3-4BE1F59B0FD5}"/>
+              </a:ext>
+            </a:extLst>
+          </p:cNvPr>
+          <p:cNvSpPr txBox="1"/>
+          <p:nvPr/>
+        </p:nvSpPr>
+        <p:spPr>
+          <a:xfrm>
+            <a:off x="124279" y="12387532"/>
+            <a:ext cx="2000741" cy="646331"/>
+          </a:xfrm>
+          <a:prstGeom prst="rect">
+            <a:avLst/>
+          </a:prstGeom>
+          <a:noFill/>
+        </p:spPr>
+        <p:txBody>
+          <a:bodyPr wrap="none" rtlCol="0">
+            <a:spAutoFit/>
+          </a:bodyPr>
+          <a:lstStyle/>
+          <a:p>
+            <a:r>
+              <a:rPr lang="en-GB" sz="3600" dirty="0">
+                <a:solidFill>
+                  <a:schemeClr val="bg1"/>
+                </a:solidFill>
+              </a:rPr>
+              <a:t>Reusable:</a:t>
+            </a:r>
+            <a:endParaRPr lang="en-DE" sz="3600" dirty="0">
+              <a:solidFill>
+                <a:schemeClr val="bg1"/>
+              </a:solidFill>
+            </a:endParaRPr>
+          </a:p>
+        </p:txBody>
+      </p:sp>
+      <p:sp>
+        <p:nvSpPr>
+          <p:cNvPr id="21" name="TextBox 20">
+            <a:extLst>
+              <a:ext uri="{FF2B5EF4-FFF2-40B4-BE49-F238E27FC236}">
+                <a16:creationId xmlns:a16="http://schemas.microsoft.com/office/drawing/2014/main" id="{4CC720A1-BB63-65E7-EAD2-2F645218BC30}"/>
+              </a:ext>
+            </a:extLst>
+          </p:cNvPr>
+          <p:cNvSpPr txBox="1"/>
+          <p:nvPr/>
+        </p:nvSpPr>
+        <p:spPr>
+          <a:xfrm>
+            <a:off x="2008547" y="12387532"/>
+            <a:ext cx="8040984" cy="769441"/>
+          </a:xfrm>
+          <a:prstGeom prst="rect">
+            <a:avLst/>
+          </a:prstGeom>
+          <a:noFill/>
+        </p:spPr>
+        <p:txBody>
+          <a:bodyPr wrap="none" rtlCol="0">
+            <a:spAutoFit/>
+          </a:bodyPr>
+          <a:lstStyle/>
+          <a:p>
+            <a:r>
+              <a:rPr lang="en-GB" sz="4400" dirty="0">
+                <a:latin typeface="Patrick Hand" pitchFamily="2" charset="77"/>
+              </a:rPr>
+              <a:t>Write the logic once, use if everywhere</a:t>
+            </a:r>
+            <a:endParaRPr lang="en-DE" sz="4400" dirty="0">
+              <a:latin typeface="Patrick Hand" pitchFamily="2" charset="77"/>
+            </a:endParaRPr>
+          </a:p>
+        </p:txBody>
+      </p:sp>
+      <p:sp>
+        <p:nvSpPr>
+          <p:cNvPr id="23" name="TextBox 22">
+            <a:extLst>
+              <a:ext uri="{FF2B5EF4-FFF2-40B4-BE49-F238E27FC236}">
+                <a16:creationId xmlns:a16="http://schemas.microsoft.com/office/drawing/2014/main" id="{0B5AB7AE-FDDE-F521-0E84-263E12DC19C4}"/>
+              </a:ext>
+            </a:extLst>
+          </p:cNvPr>
+          <p:cNvSpPr txBox="1"/>
+          <p:nvPr/>
+        </p:nvSpPr>
+        <p:spPr>
+          <a:xfrm>
+            <a:off x="2008547" y="13207674"/>
+            <a:ext cx="8231741" cy="769441"/>
+          </a:xfrm>
+          <a:prstGeom prst="rect">
+            <a:avLst/>
+          </a:prstGeom>
+          <a:noFill/>
+        </p:spPr>
+        <p:txBody>
+          <a:bodyPr wrap="none" rtlCol="0">
+            <a:spAutoFit/>
+          </a:bodyPr>
+          <a:lstStyle/>
+          <a:p>
+            <a:r>
+              <a:rPr lang="en-GB" sz="4400" dirty="0">
+                <a:latin typeface="Patrick Hand" pitchFamily="2" charset="77"/>
+              </a:rPr>
+              <a:t>Keeps your core function logic readable</a:t>
+            </a:r>
+            <a:endParaRPr lang="en-DE" sz="4400" dirty="0">
+              <a:latin typeface="Patrick Hand" pitchFamily="2" charset="77"/>
+            </a:endParaRPr>
+          </a:p>
+        </p:txBody>
+      </p:sp>
+      <p:sp>
+        <p:nvSpPr>
+          <p:cNvPr id="24" name="TextBox 23">
+            <a:extLst>
+              <a:ext uri="{FF2B5EF4-FFF2-40B4-BE49-F238E27FC236}">
+                <a16:creationId xmlns:a16="http://schemas.microsoft.com/office/drawing/2014/main" id="{8DE4F7AD-7DCB-D486-C377-47A73B19A851}"/>
+              </a:ext>
+            </a:extLst>
+          </p:cNvPr>
+          <p:cNvSpPr txBox="1"/>
+          <p:nvPr/>
+        </p:nvSpPr>
+        <p:spPr>
+          <a:xfrm>
+            <a:off x="2008547" y="14027816"/>
+            <a:ext cx="8318303" cy="769441"/>
+          </a:xfrm>
+          <a:prstGeom prst="rect">
+            <a:avLst/>
+          </a:prstGeom>
+          <a:noFill/>
+        </p:spPr>
+        <p:txBody>
+          <a:bodyPr wrap="none" rtlCol="0">
+            <a:spAutoFit/>
+          </a:bodyPr>
+          <a:lstStyle/>
+          <a:p>
+            <a:r>
+              <a:rPr lang="en-GB" sz="4400" dirty="0">
+                <a:latin typeface="Patrick Hand" pitchFamily="2" charset="77"/>
+              </a:rPr>
+              <a:t>The professional way to extend </a:t>
+            </a:r>
+            <a:r>
+              <a:rPr lang="en-GB" sz="4400" dirty="0" err="1">
+                <a:latin typeface="Patrick Hand" pitchFamily="2" charset="77"/>
+              </a:rPr>
+              <a:t>behavior</a:t>
+            </a:r>
+            <a:endParaRPr lang="en-DE" sz="4400" dirty="0">
+              <a:latin typeface="Patrick Hand" pitchFamily="2" charset="77"/>
+            </a:endParaRPr>
+          </a:p>
+        </p:txBody>
+      </p:sp>
+      <p:sp>
+        <p:nvSpPr>
+          <p:cNvPr id="25" name="TextBox 24">
+            <a:extLst>
+              <a:ext uri="{FF2B5EF4-FFF2-40B4-BE49-F238E27FC236}">
+                <a16:creationId xmlns:a16="http://schemas.microsoft.com/office/drawing/2014/main" id="{23CB8D42-1B49-C015-A397-76B34C4AEA4F}"/>
+              </a:ext>
+            </a:extLst>
+          </p:cNvPr>
+          <p:cNvSpPr txBox="1"/>
+          <p:nvPr/>
+        </p:nvSpPr>
+        <p:spPr>
+          <a:xfrm>
+            <a:off x="124279" y="13207674"/>
+            <a:ext cx="1353256" cy="646331"/>
+          </a:xfrm>
+          <a:prstGeom prst="rect">
+            <a:avLst/>
+          </a:prstGeom>
+          <a:noFill/>
+        </p:spPr>
+        <p:txBody>
+          <a:bodyPr wrap="none" rtlCol="0">
+            <a:spAutoFit/>
+          </a:bodyPr>
+          <a:lstStyle/>
+          <a:p>
+            <a:r>
+              <a:rPr lang="en-GB" sz="3600" dirty="0">
+                <a:solidFill>
+                  <a:schemeClr val="bg1"/>
+                </a:solidFill>
+              </a:rPr>
+              <a:t>Clean:</a:t>
+            </a:r>
+            <a:endParaRPr lang="en-DE" sz="3600" dirty="0">
+              <a:solidFill>
+                <a:schemeClr val="bg1"/>
+              </a:solidFill>
+            </a:endParaRPr>
+          </a:p>
+        </p:txBody>
+      </p:sp>
+      <p:sp>
+        <p:nvSpPr>
+          <p:cNvPr id="26" name="TextBox 25">
+            <a:extLst>
+              <a:ext uri="{FF2B5EF4-FFF2-40B4-BE49-F238E27FC236}">
+                <a16:creationId xmlns:a16="http://schemas.microsoft.com/office/drawing/2014/main" id="{D44F2063-4801-CB91-C048-5E528FED3270}"/>
+              </a:ext>
+            </a:extLst>
+          </p:cNvPr>
+          <p:cNvSpPr txBox="1"/>
+          <p:nvPr/>
+        </p:nvSpPr>
+        <p:spPr>
+          <a:xfrm>
+            <a:off x="124279" y="14027816"/>
+            <a:ext cx="1691425" cy="646331"/>
+          </a:xfrm>
+          <a:prstGeom prst="rect">
+            <a:avLst/>
+          </a:prstGeom>
+          <a:noFill/>
+        </p:spPr>
+        <p:txBody>
+          <a:bodyPr wrap="none" rtlCol="0">
+            <a:spAutoFit/>
+          </a:bodyPr>
+          <a:lstStyle/>
+          <a:p>
+            <a:r>
+              <a:rPr lang="en-GB" sz="3600" dirty="0">
+                <a:solidFill>
+                  <a:schemeClr val="bg1"/>
+                </a:solidFill>
+              </a:rPr>
+              <a:t>Elegant:</a:t>
+            </a:r>
+            <a:endParaRPr lang="en-DE" sz="3600" dirty="0">
+              <a:solidFill>
+                <a:schemeClr val="bg1"/>
+              </a:solidFill>
+            </a:endParaRPr>
+          </a:p>
+        </p:txBody>
+      </p:sp>
+      <p:sp>
+        <p:nvSpPr>
+          <p:cNvPr id="29" name="TextBox 28">
+            <a:extLst>
+              <a:ext uri="{FF2B5EF4-FFF2-40B4-BE49-F238E27FC236}">
+                <a16:creationId xmlns:a16="http://schemas.microsoft.com/office/drawing/2014/main" id="{AAA0906F-C1A8-69EB-29A2-B230DC472ED4}"/>
+              </a:ext>
+            </a:extLst>
+          </p:cNvPr>
+          <p:cNvSpPr txBox="1"/>
+          <p:nvPr/>
+        </p:nvSpPr>
+        <p:spPr>
+          <a:xfrm>
+            <a:off x="-7857400" y="2527667"/>
+            <a:ext cx="4554452" cy="830997"/>
+          </a:xfrm>
+          <a:prstGeom prst="rect">
+            <a:avLst/>
+          </a:prstGeom>
+        </p:spPr>
+        <p:style>
+          <a:lnRef idx="1">
+            <a:schemeClr val="accent2"/>
+          </a:lnRef>
+          <a:fillRef idx="2">
+            <a:schemeClr val="accent2"/>
+          </a:fillRef>
+          <a:effectRef idx="1">
+            <a:schemeClr val="accent2"/>
+          </a:effectRef>
+          <a:fontRef idx="minor">
+            <a:schemeClr val="dk1"/>
+          </a:fontRef>
+        </p:style>
+        <p:txBody>
+          <a:bodyPr wrap="none" rtlCol="0">
+            <a:spAutoFit/>
+          </a:bodyPr>
+          <a:lstStyle/>
+          <a:p>
+            <a:r>
+              <a:rPr lang="en-US" sz="4800" dirty="0">
+                <a:solidFill>
+                  <a:srgbClr val="FF0000"/>
+                </a:solidFill>
+                <a:latin typeface="Patrick Hand" pitchFamily="2" charset="77"/>
+              </a:rPr>
+              <a:t>py_015_decorators</a:t>
+            </a:r>
+            <a:endParaRPr lang="en-DE" sz="4800" dirty="0">
+              <a:solidFill>
+                <a:srgbClr val="FF0000"/>
+              </a:solidFill>
+              <a:latin typeface="Patrick Hand" pitchFamily="2" charset="77"/>
+            </a:endParaRPr>
+          </a:p>
+        </p:txBody>
+      </p:sp>
     </p:spTree>
     <p:extLst>
       <p:ext uri="{BB962C8B-B14F-4D97-AF65-F5344CB8AC3E}">
-        <p14:creationId xmlns:p14="http://schemas.microsoft.com/office/powerpoint/2010/main" val="2018481417"/>
+        <p14:creationId xmlns:p14="http://schemas.microsoft.com/office/powerpoint/2010/main" val="2261611437"/>
       </p:ext>
     </p:extLst>
   </p:cSld>
@@ -7432,9 +9038,50 @@
 <file path=ppt/slides/slide17.xml><?xml version="1.0" encoding="utf-8"?>
 <p:sld xmlns:a="http://schemas.openxmlformats.org/drawingml/2006/main" xmlns:r="http://schemas.openxmlformats.org/officeDocument/2006/relationships" xmlns:p="http://schemas.openxmlformats.org/presentationml/2006/main">
   <p:cSld>
+    <p:bg>
+      <p:bgPr>
+        <a:gradFill flip="none" rotWithShape="1">
+          <a:gsLst>
+            <a:gs pos="0">
+              <a:schemeClr val="accent6">
+                <a:lumMod val="5000"/>
+                <a:lumOff val="95000"/>
+              </a:schemeClr>
+            </a:gs>
+            <a:gs pos="74000">
+              <a:schemeClr val="accent6">
+                <a:lumMod val="45000"/>
+                <a:lumOff val="55000"/>
+              </a:schemeClr>
+            </a:gs>
+            <a:gs pos="83000">
+              <a:schemeClr val="accent6">
+                <a:lumMod val="45000"/>
+                <a:lumOff val="55000"/>
+              </a:schemeClr>
+            </a:gs>
+            <a:gs pos="100000">
+              <a:schemeClr val="accent6">
+                <a:lumMod val="30000"/>
+                <a:lumOff val="70000"/>
+              </a:schemeClr>
+            </a:gs>
+          </a:gsLst>
+          <a:lin ang="5400000" scaled="1"/>
+          <a:tileRect/>
+        </a:gradFill>
+        <a:effectLst/>
+      </p:bgPr>
+    </p:bg>
     <p:spTree>
       <p:nvGrpSpPr>
-        <p:cNvPr id="1" name=""/>
+        <p:cNvPr id="1" name="">
+          <a:extLst>
+            <a:ext uri="{FF2B5EF4-FFF2-40B4-BE49-F238E27FC236}">
+              <a16:creationId xmlns:a16="http://schemas.microsoft.com/office/drawing/2014/main" id="{D8E99C58-5AF8-CF25-9DE3-F4ED5841DEEA}"/>
+            </a:ext>
+          </a:extLst>
+        </p:cNvPr>
         <p:cNvGrpSpPr/>
         <p:nvPr/>
       </p:nvGrpSpPr>
@@ -7446,10 +9093,563 @@
           <a:chExt cx="0" cy="0"/>
         </a:xfrm>
       </p:grpSpPr>
+      <p:grpSp>
+        <p:nvGrpSpPr>
+          <p:cNvPr id="23" name="Group 22">
+            <a:extLst>
+              <a:ext uri="{FF2B5EF4-FFF2-40B4-BE49-F238E27FC236}">
+                <a16:creationId xmlns:a16="http://schemas.microsoft.com/office/drawing/2014/main" id="{A5510903-B9DD-D124-C83B-60D6C500B19D}"/>
+              </a:ext>
+            </a:extLst>
+          </p:cNvPr>
+          <p:cNvGrpSpPr/>
+          <p:nvPr/>
+        </p:nvGrpSpPr>
+        <p:grpSpPr>
+          <a:xfrm>
+            <a:off x="223306" y="2872200"/>
+            <a:ext cx="9838800" cy="1107996"/>
+            <a:chOff x="223306" y="2872200"/>
+            <a:chExt cx="9838800" cy="1107996"/>
+          </a:xfrm>
+        </p:grpSpPr>
+        <p:sp>
+          <p:nvSpPr>
+            <p:cNvPr id="4" name="TextBox 3">
+              <a:extLst>
+                <a:ext uri="{FF2B5EF4-FFF2-40B4-BE49-F238E27FC236}">
+                  <a16:creationId xmlns:a16="http://schemas.microsoft.com/office/drawing/2014/main" id="{68103D25-9216-BAB2-ACB7-9FFD1936580E}"/>
+                </a:ext>
+              </a:extLst>
+            </p:cNvPr>
+            <p:cNvSpPr txBox="1"/>
+            <p:nvPr/>
+          </p:nvSpPr>
+          <p:spPr>
+            <a:xfrm>
+              <a:off x="223306" y="2872200"/>
+              <a:ext cx="9838800" cy="1107996"/>
+            </a:xfrm>
+            <a:prstGeom prst="rect">
+              <a:avLst/>
+            </a:prstGeom>
+            <a:ln/>
+          </p:spPr>
+          <p:style>
+            <a:lnRef idx="1">
+              <a:schemeClr val="accent6"/>
+            </a:lnRef>
+            <a:fillRef idx="2">
+              <a:schemeClr val="accent6"/>
+            </a:fillRef>
+            <a:effectRef idx="1">
+              <a:schemeClr val="accent6"/>
+            </a:effectRef>
+            <a:fontRef idx="minor">
+              <a:schemeClr val="dk1"/>
+            </a:fontRef>
+          </p:style>
+          <p:txBody>
+            <a:bodyPr wrap="square" rtlCol="0">
+              <a:spAutoFit/>
+              <a:scene3d>
+                <a:camera prst="orthographicFront"/>
+                <a:lightRig rig="harsh" dir="t"/>
+              </a:scene3d>
+              <a:sp3d extrusionH="57150" prstMaterial="matte">
+                <a:bevelT w="63500" h="12700" prst="angle"/>
+                <a:contourClr>
+                  <a:schemeClr val="bg1">
+                    <a:lumMod val="65000"/>
+                  </a:schemeClr>
+                </a:contourClr>
+              </a:sp3d>
+            </a:bodyPr>
+            <a:lstStyle/>
+            <a:p>
+              <a:pPr algn="ctr"/>
+              <a:r>
+                <a:rPr lang="en-GB" sz="6600" dirty="0"/>
+                <a:t>F-Strings </a:t>
+              </a:r>
+              <a:r>
+                <a:rPr lang="en-GB" sz="6600" b="1" dirty="0">
+                  <a:ln w="22225">
+                    <a:solidFill>
+                      <a:schemeClr val="accent2"/>
+                    </a:solidFill>
+                    <a:prstDash val="solid"/>
+                  </a:ln>
+                  <a:solidFill>
+                    <a:srgbClr val="00B0F0"/>
+                  </a:solidFill>
+                </a:rPr>
+                <a:t>vs</a:t>
+              </a:r>
+              <a:r>
+                <a:rPr lang="en-GB" sz="6600" dirty="0"/>
+                <a:t> Format</a:t>
+              </a:r>
+              <a:endParaRPr lang="en-GB" b="1" dirty="0">
+                <a:ln w="0"/>
+                <a:solidFill>
+                  <a:schemeClr val="tx1"/>
+                </a:solidFill>
+                <a:effectLst>
+                  <a:outerShdw blurRad="38100" dist="25400" dir="5400000" algn="ctr" rotWithShape="0">
+                    <a:srgbClr val="6E747A">
+                      <a:alpha val="43000"/>
+                    </a:srgbClr>
+                  </a:outerShdw>
+                </a:effectLst>
+                <a:latin typeface="Patrick Hand" pitchFamily="2" charset="77"/>
+              </a:endParaRPr>
+            </a:p>
+          </p:txBody>
+        </p:sp>
+        <p:pic>
+          <p:nvPicPr>
+            <p:cNvPr id="5" name="Picture 4">
+              <a:extLst>
+                <a:ext uri="{FF2B5EF4-FFF2-40B4-BE49-F238E27FC236}">
+                  <a16:creationId xmlns:a16="http://schemas.microsoft.com/office/drawing/2014/main" id="{2C4B819E-3D27-043B-A206-CB6B14345940}"/>
+                </a:ext>
+              </a:extLst>
+            </p:cNvPr>
+            <p:cNvPicPr>
+              <a:picLocks noChangeAspect="1"/>
+            </p:cNvPicPr>
+            <p:nvPr/>
+          </p:nvPicPr>
+          <p:blipFill>
+            <a:blip r:embed="rId2"/>
+            <a:stretch>
+              <a:fillRect/>
+            </a:stretch>
+          </p:blipFill>
+          <p:spPr>
+            <a:xfrm>
+              <a:off x="264001" y="2906105"/>
+              <a:ext cx="1063167" cy="1063167"/>
+            </a:xfrm>
+            <a:prstGeom prst="rect">
+              <a:avLst/>
+            </a:prstGeom>
+          </p:spPr>
+        </p:pic>
+      </p:grpSp>
+      <p:sp>
+        <p:nvSpPr>
+          <p:cNvPr id="7" name="TextBox 6">
+            <a:extLst>
+              <a:ext uri="{FF2B5EF4-FFF2-40B4-BE49-F238E27FC236}">
+                <a16:creationId xmlns:a16="http://schemas.microsoft.com/office/drawing/2014/main" id="{470B9811-0F6C-A74D-399A-984849072C23}"/>
+              </a:ext>
+            </a:extLst>
+          </p:cNvPr>
+          <p:cNvSpPr txBox="1"/>
+          <p:nvPr/>
+        </p:nvSpPr>
+        <p:spPr>
+          <a:xfrm>
+            <a:off x="223306" y="11731083"/>
+            <a:ext cx="2422971" cy="707886"/>
+          </a:xfrm>
+          <a:prstGeom prst="rect">
+            <a:avLst/>
+          </a:prstGeom>
+          <a:noFill/>
+        </p:spPr>
+        <p:txBody>
+          <a:bodyPr wrap="none" rtlCol="0">
+            <a:spAutoFit/>
+          </a:bodyPr>
+          <a:lstStyle/>
+          <a:p>
+            <a:r>
+              <a:rPr lang="en-GB" sz="4000" b="1" dirty="0"/>
+              <a:t>Readable:</a:t>
+            </a:r>
+            <a:r>
+              <a:rPr lang="en-GB" sz="4000" dirty="0"/>
+              <a:t> </a:t>
+            </a:r>
+            <a:endParaRPr lang="en-DE" sz="4000" dirty="0"/>
+          </a:p>
+        </p:txBody>
+      </p:sp>
+      <p:sp>
+        <p:nvSpPr>
+          <p:cNvPr id="11" name="TextBox 10">
+            <a:extLst>
+              <a:ext uri="{FF2B5EF4-FFF2-40B4-BE49-F238E27FC236}">
+                <a16:creationId xmlns:a16="http://schemas.microsoft.com/office/drawing/2014/main" id="{A78813AD-F7A7-B5FC-5C7D-0687E4D3D610}"/>
+              </a:ext>
+            </a:extLst>
+          </p:cNvPr>
+          <p:cNvSpPr txBox="1"/>
+          <p:nvPr/>
+        </p:nvSpPr>
+        <p:spPr>
+          <a:xfrm>
+            <a:off x="2381255" y="11731083"/>
+            <a:ext cx="7543776" cy="707886"/>
+          </a:xfrm>
+          <a:prstGeom prst="rect">
+            <a:avLst/>
+          </a:prstGeom>
+          <a:noFill/>
+        </p:spPr>
+        <p:txBody>
+          <a:bodyPr wrap="square" rtlCol="0">
+            <a:spAutoFit/>
+          </a:bodyPr>
+          <a:lstStyle/>
+          <a:p>
+            <a:r>
+              <a:rPr lang="en-GB" sz="4000" dirty="0">
+                <a:latin typeface="Patrick Hand" pitchFamily="2" charset="77"/>
+              </a:rPr>
+              <a:t>Direct variable injection into strings</a:t>
+            </a:r>
+            <a:endParaRPr lang="en-DE" sz="4000" dirty="0">
+              <a:latin typeface="Patrick Hand" pitchFamily="2" charset="77"/>
+            </a:endParaRPr>
+          </a:p>
+        </p:txBody>
+      </p:sp>
+      <p:sp>
+        <p:nvSpPr>
+          <p:cNvPr id="8" name="TextBox 7">
+            <a:extLst>
+              <a:ext uri="{FF2B5EF4-FFF2-40B4-BE49-F238E27FC236}">
+                <a16:creationId xmlns:a16="http://schemas.microsoft.com/office/drawing/2014/main" id="{256376E3-CABD-1877-68D4-60BF8B8214F8}"/>
+              </a:ext>
+            </a:extLst>
+          </p:cNvPr>
+          <p:cNvSpPr txBox="1"/>
+          <p:nvPr/>
+        </p:nvSpPr>
+        <p:spPr>
+          <a:xfrm>
+            <a:off x="223306" y="12814182"/>
+            <a:ext cx="1727909" cy="707886"/>
+          </a:xfrm>
+          <a:prstGeom prst="rect">
+            <a:avLst/>
+          </a:prstGeom>
+          <a:noFill/>
+        </p:spPr>
+        <p:txBody>
+          <a:bodyPr wrap="none" rtlCol="0">
+            <a:spAutoFit/>
+          </a:bodyPr>
+          <a:lstStyle/>
+          <a:p>
+            <a:r>
+              <a:rPr lang="en-GB" sz="4000" b="1" dirty="0"/>
+              <a:t>Faster: </a:t>
+            </a:r>
+            <a:endParaRPr lang="en-DE" sz="4000" b="1" dirty="0"/>
+          </a:p>
+        </p:txBody>
+      </p:sp>
+      <p:sp>
+        <p:nvSpPr>
+          <p:cNvPr id="12" name="TextBox 11">
+            <a:extLst>
+              <a:ext uri="{FF2B5EF4-FFF2-40B4-BE49-F238E27FC236}">
+                <a16:creationId xmlns:a16="http://schemas.microsoft.com/office/drawing/2014/main" id="{084482C2-56C7-DEF8-3919-CB98C47190C8}"/>
+              </a:ext>
+            </a:extLst>
+          </p:cNvPr>
+          <p:cNvSpPr txBox="1"/>
+          <p:nvPr/>
+        </p:nvSpPr>
+        <p:spPr>
+          <a:xfrm>
+            <a:off x="2369994" y="12804706"/>
+            <a:ext cx="7915419" cy="707886"/>
+          </a:xfrm>
+          <a:prstGeom prst="rect">
+            <a:avLst/>
+          </a:prstGeom>
+          <a:noFill/>
+        </p:spPr>
+        <p:txBody>
+          <a:bodyPr wrap="square" rtlCol="0">
+            <a:spAutoFit/>
+          </a:bodyPr>
+          <a:lstStyle/>
+          <a:p>
+            <a:r>
+              <a:rPr lang="en-GB" sz="4000" dirty="0">
+                <a:latin typeface="Patrick Hand" pitchFamily="2" charset="77"/>
+              </a:rPr>
+              <a:t>F-Strings are optimized by the compiler</a:t>
+            </a:r>
+            <a:endParaRPr lang="en-DE" sz="4000" dirty="0">
+              <a:latin typeface="Patrick Hand" pitchFamily="2" charset="77"/>
+            </a:endParaRPr>
+          </a:p>
+        </p:txBody>
+      </p:sp>
+      <p:sp>
+        <p:nvSpPr>
+          <p:cNvPr id="9" name="TextBox 8">
+            <a:extLst>
+              <a:ext uri="{FF2B5EF4-FFF2-40B4-BE49-F238E27FC236}">
+                <a16:creationId xmlns:a16="http://schemas.microsoft.com/office/drawing/2014/main" id="{366DD4EA-520B-F2EB-D460-A5C71B3EE88D}"/>
+              </a:ext>
+            </a:extLst>
+          </p:cNvPr>
+          <p:cNvSpPr txBox="1"/>
+          <p:nvPr/>
+        </p:nvSpPr>
+        <p:spPr>
+          <a:xfrm>
+            <a:off x="223306" y="13897281"/>
+            <a:ext cx="2157963" cy="707886"/>
+          </a:xfrm>
+          <a:prstGeom prst="rect">
+            <a:avLst/>
+          </a:prstGeom>
+          <a:noFill/>
+        </p:spPr>
+        <p:txBody>
+          <a:bodyPr wrap="none" rtlCol="0">
+            <a:spAutoFit/>
+          </a:bodyPr>
+          <a:lstStyle/>
+          <a:p>
+            <a:r>
+              <a:rPr lang="en-GB" sz="4000" b="1" dirty="0"/>
+              <a:t>Modern: </a:t>
+            </a:r>
+            <a:endParaRPr lang="en-DE" sz="4000" b="1" dirty="0"/>
+          </a:p>
+        </p:txBody>
+      </p:sp>
+      <p:sp>
+        <p:nvSpPr>
+          <p:cNvPr id="13" name="TextBox 12">
+            <a:extLst>
+              <a:ext uri="{FF2B5EF4-FFF2-40B4-BE49-F238E27FC236}">
+                <a16:creationId xmlns:a16="http://schemas.microsoft.com/office/drawing/2014/main" id="{52E6ABE3-1E92-6F86-7CA0-C6FADF7C5095}"/>
+              </a:ext>
+            </a:extLst>
+          </p:cNvPr>
+          <p:cNvSpPr txBox="1"/>
+          <p:nvPr/>
+        </p:nvSpPr>
+        <p:spPr>
+          <a:xfrm>
+            <a:off x="2381269" y="13878330"/>
+            <a:ext cx="7543309" cy="707886"/>
+          </a:xfrm>
+          <a:prstGeom prst="rect">
+            <a:avLst/>
+          </a:prstGeom>
+          <a:noFill/>
+        </p:spPr>
+        <p:txBody>
+          <a:bodyPr wrap="square" rtlCol="0">
+            <a:spAutoFit/>
+          </a:bodyPr>
+          <a:lstStyle/>
+          <a:p>
+            <a:r>
+              <a:rPr lang="en-GB" sz="4000" dirty="0">
+                <a:latin typeface="Patrick Hand" pitchFamily="2" charset="77"/>
+              </a:rPr>
+              <a:t>The standard since Python 3.6+</a:t>
+            </a:r>
+            <a:endParaRPr lang="en-DE" sz="4000" dirty="0">
+              <a:latin typeface="Patrick Hand" pitchFamily="2" charset="77"/>
+            </a:endParaRPr>
+          </a:p>
+        </p:txBody>
+      </p:sp>
+      <p:cxnSp>
+        <p:nvCxnSpPr>
+          <p:cNvPr id="17" name="Straight Connector 16">
+            <a:extLst>
+              <a:ext uri="{FF2B5EF4-FFF2-40B4-BE49-F238E27FC236}">
+                <a16:creationId xmlns:a16="http://schemas.microsoft.com/office/drawing/2014/main" id="{620ED27D-E93D-A20A-4C8F-B643F6E96957}"/>
+              </a:ext>
+            </a:extLst>
+          </p:cNvPr>
+          <p:cNvCxnSpPr>
+            <a:cxnSpLocks/>
+          </p:cNvCxnSpPr>
+          <p:nvPr/>
+        </p:nvCxnSpPr>
+        <p:spPr>
+          <a:xfrm>
+            <a:off x="223579" y="8410989"/>
+            <a:ext cx="9838255" cy="0"/>
+          </a:xfrm>
+          <a:prstGeom prst="line">
+            <a:avLst/>
+          </a:prstGeom>
+          <a:ln w="38100">
+            <a:solidFill>
+              <a:srgbClr val="FFC000"/>
+            </a:solidFill>
+            <a:headEnd type="none"/>
+            <a:tailEnd type="none" w="lg" len="lg"/>
+          </a:ln>
+        </p:spPr>
+        <p:style>
+          <a:lnRef idx="1">
+            <a:schemeClr val="accent1"/>
+          </a:lnRef>
+          <a:fillRef idx="0">
+            <a:schemeClr val="accent1"/>
+          </a:fillRef>
+          <a:effectRef idx="0">
+            <a:schemeClr val="accent1"/>
+          </a:effectRef>
+          <a:fontRef idx="minor">
+            <a:schemeClr val="tx1"/>
+          </a:fontRef>
+        </p:style>
+      </p:cxnSp>
+      <p:pic>
+        <p:nvPicPr>
+          <p:cNvPr id="18" name="Graphic 17" descr="Shield Tick with solid fill">
+            <a:extLst>
+              <a:ext uri="{FF2B5EF4-FFF2-40B4-BE49-F238E27FC236}">
+                <a16:creationId xmlns:a16="http://schemas.microsoft.com/office/drawing/2014/main" id="{ACE77A71-8D07-48B7-30F8-7E68A4376FB7}"/>
+              </a:ext>
+            </a:extLst>
+          </p:cNvPr>
+          <p:cNvPicPr>
+            <a:picLocks noChangeAspect="1"/>
+          </p:cNvPicPr>
+          <p:nvPr/>
+        </p:nvPicPr>
+        <p:blipFill>
+          <a:blip r:embed="rId3">
+            <a:extLst>
+              <a:ext uri="{96DAC541-7B7A-43D3-8B79-37D633B846F1}">
+                <asvg:svgBlip xmlns:asvg="http://schemas.microsoft.com/office/drawing/2016/SVG/main" r:embed="rId4"/>
+              </a:ext>
+            </a:extLst>
+          </a:blip>
+          <a:stretch>
+            <a:fillRect/>
+          </a:stretch>
+        </p:blipFill>
+        <p:spPr>
+          <a:xfrm>
+            <a:off x="7668075" y="8637940"/>
+            <a:ext cx="914400" cy="914400"/>
+          </a:xfrm>
+          <a:prstGeom prst="rect">
+            <a:avLst/>
+          </a:prstGeom>
+        </p:spPr>
+      </p:pic>
+      <p:pic>
+        <p:nvPicPr>
+          <p:cNvPr id="19" name="Graphic 18" descr="Close with solid fill">
+            <a:extLst>
+              <a:ext uri="{FF2B5EF4-FFF2-40B4-BE49-F238E27FC236}">
+                <a16:creationId xmlns:a16="http://schemas.microsoft.com/office/drawing/2014/main" id="{C1FF8D1C-0DE8-68A0-48D5-B6ED8B1B7C75}"/>
+              </a:ext>
+            </a:extLst>
+          </p:cNvPr>
+          <p:cNvPicPr>
+            <a:picLocks noChangeAspect="1"/>
+          </p:cNvPicPr>
+          <p:nvPr/>
+        </p:nvPicPr>
+        <p:blipFill>
+          <a:blip r:embed="rId5">
+            <a:extLst>
+              <a:ext uri="{96DAC541-7B7A-43D3-8B79-37D633B846F1}">
+                <asvg:svgBlip xmlns:asvg="http://schemas.microsoft.com/office/drawing/2016/SVG/main" r:embed="rId6"/>
+              </a:ext>
+            </a:extLst>
+          </a:blip>
+          <a:stretch>
+            <a:fillRect/>
+          </a:stretch>
+        </p:blipFill>
+        <p:spPr>
+          <a:xfrm>
+            <a:off x="7668075" y="6560627"/>
+            <a:ext cx="914400" cy="914400"/>
+          </a:xfrm>
+          <a:prstGeom prst="rect">
+            <a:avLst/>
+          </a:prstGeom>
+        </p:spPr>
+      </p:pic>
+      <p:sp>
+        <p:nvSpPr>
+          <p:cNvPr id="25" name="TextBox 24">
+            <a:extLst>
+              <a:ext uri="{FF2B5EF4-FFF2-40B4-BE49-F238E27FC236}">
+                <a16:creationId xmlns:a16="http://schemas.microsoft.com/office/drawing/2014/main" id="{E69FC5ED-505E-33C0-5388-8BBC9AF48473}"/>
+              </a:ext>
+            </a:extLst>
+          </p:cNvPr>
+          <p:cNvSpPr txBox="1"/>
+          <p:nvPr/>
+        </p:nvSpPr>
+        <p:spPr>
+          <a:xfrm>
+            <a:off x="-7857400" y="2527667"/>
+            <a:ext cx="7104830" cy="830997"/>
+          </a:xfrm>
+          <a:prstGeom prst="rect">
+            <a:avLst/>
+          </a:prstGeom>
+        </p:spPr>
+        <p:style>
+          <a:lnRef idx="1">
+            <a:schemeClr val="accent2"/>
+          </a:lnRef>
+          <a:fillRef idx="2">
+            <a:schemeClr val="accent2"/>
+          </a:fillRef>
+          <a:effectRef idx="1">
+            <a:schemeClr val="accent2"/>
+          </a:effectRef>
+          <a:fontRef idx="minor">
+            <a:schemeClr val="dk1"/>
+          </a:fontRef>
+        </p:style>
+        <p:txBody>
+          <a:bodyPr wrap="none" rtlCol="0">
+            <a:spAutoFit/>
+          </a:bodyPr>
+          <a:lstStyle/>
+          <a:p>
+            <a:r>
+              <a:rPr lang="en-US" sz="4800" dirty="0">
+                <a:solidFill>
+                  <a:srgbClr val="FF0000"/>
+                </a:solidFill>
+                <a:latin typeface="Patrick Hand" pitchFamily="2" charset="77"/>
+              </a:rPr>
+              <a:t>py_016_f_strings_vs_format</a:t>
+            </a:r>
+            <a:endParaRPr lang="en-DE" sz="4800" dirty="0">
+              <a:solidFill>
+                <a:srgbClr val="FF0000"/>
+              </a:solidFill>
+              <a:latin typeface="Patrick Hand" pitchFamily="2" charset="77"/>
+            </a:endParaRPr>
+          </a:p>
+        </p:txBody>
+      </p:sp>
     </p:spTree>
     <p:extLst>
       <p:ext uri="{BB962C8B-B14F-4D97-AF65-F5344CB8AC3E}">
-        <p14:creationId xmlns:p14="http://schemas.microsoft.com/office/powerpoint/2010/main" val="2445154702"/>
+        <p14:creationId xmlns:p14="http://schemas.microsoft.com/office/powerpoint/2010/main" val="2587286016"/>
       </p:ext>
     </p:extLst>
   </p:cSld>
@@ -7462,9 +9662,28 @@
 <file path=ppt/slides/slide18.xml><?xml version="1.0" encoding="utf-8"?>
 <p:sld xmlns:a="http://schemas.openxmlformats.org/drawingml/2006/main" xmlns:r="http://schemas.openxmlformats.org/officeDocument/2006/relationships" xmlns:p="http://schemas.openxmlformats.org/presentationml/2006/main">
   <p:cSld>
+    <p:bg>
+      <p:bgPr>
+        <a:pattFill prst="pct20">
+          <a:fgClr>
+            <a:srgbClr val="FFC000"/>
+          </a:fgClr>
+          <a:bgClr>
+            <a:schemeClr val="bg1"/>
+          </a:bgClr>
+        </a:pattFill>
+        <a:effectLst/>
+      </p:bgPr>
+    </p:bg>
     <p:spTree>
       <p:nvGrpSpPr>
-        <p:cNvPr id="1" name=""/>
+        <p:cNvPr id="1" name="">
+          <a:extLst>
+            <a:ext uri="{FF2B5EF4-FFF2-40B4-BE49-F238E27FC236}">
+              <a16:creationId xmlns:a16="http://schemas.microsoft.com/office/drawing/2014/main" id="{DFDB729E-F8DD-029C-9B05-01CFB72ACF7B}"/>
+            </a:ext>
+          </a:extLst>
+        </p:cNvPr>
         <p:cNvGrpSpPr/>
         <p:nvPr/>
       </p:nvGrpSpPr>
@@ -7476,10 +9695,570 @@
           <a:chExt cx="0" cy="0"/>
         </a:xfrm>
       </p:grpSpPr>
+      <p:sp>
+        <p:nvSpPr>
+          <p:cNvPr id="4" name="TextBox 3">
+            <a:extLst>
+              <a:ext uri="{FF2B5EF4-FFF2-40B4-BE49-F238E27FC236}">
+                <a16:creationId xmlns:a16="http://schemas.microsoft.com/office/drawing/2014/main" id="{C8B3B024-AFE3-B787-1CF0-88840F303020}"/>
+              </a:ext>
+            </a:extLst>
+          </p:cNvPr>
+          <p:cNvSpPr txBox="1"/>
+          <p:nvPr/>
+        </p:nvSpPr>
+        <p:spPr>
+          <a:xfrm>
+            <a:off x="223306" y="2872200"/>
+            <a:ext cx="9838800" cy="1107996"/>
+          </a:xfrm>
+          <a:prstGeom prst="rect">
+            <a:avLst/>
+          </a:prstGeom>
+          <a:ln/>
+        </p:spPr>
+        <p:style>
+          <a:lnRef idx="0">
+            <a:schemeClr val="accent6"/>
+          </a:lnRef>
+          <a:fillRef idx="3">
+            <a:schemeClr val="accent6"/>
+          </a:fillRef>
+          <a:effectRef idx="3">
+            <a:schemeClr val="accent6"/>
+          </a:effectRef>
+          <a:fontRef idx="minor">
+            <a:schemeClr val="lt1"/>
+          </a:fontRef>
+        </p:style>
+        <p:txBody>
+          <a:bodyPr wrap="square" rtlCol="0">
+            <a:spAutoFit/>
+            <a:scene3d>
+              <a:camera prst="orthographicFront"/>
+              <a:lightRig rig="harsh" dir="t"/>
+            </a:scene3d>
+            <a:sp3d extrusionH="57150" prstMaterial="matte">
+              <a:bevelT w="63500" h="12700" prst="angle"/>
+              <a:contourClr>
+                <a:schemeClr val="bg1">
+                  <a:lumMod val="65000"/>
+                </a:schemeClr>
+              </a:contourClr>
+            </a:sp3d>
+          </a:bodyPr>
+          <a:lstStyle/>
+          <a:p>
+            <a:pPr algn="ctr"/>
+            <a:r>
+              <a:rPr lang="en-GB" sz="6600" b="1" dirty="0">
+                <a:ln/>
+                <a:pattFill prst="dkUpDiag">
+                  <a:fgClr>
+                    <a:schemeClr val="bg1">
+                      <a:lumMod val="50000"/>
+                    </a:schemeClr>
+                  </a:fgClr>
+                  <a:bgClr>
+                    <a:schemeClr val="tx1">
+                      <a:lumMod val="75000"/>
+                      <a:lumOff val="25000"/>
+                    </a:schemeClr>
+                  </a:bgClr>
+                </a:pattFill>
+                <a:effectLst>
+                  <a:outerShdw blurRad="38100" dist="19050" dir="2700000" algn="tl" rotWithShape="0">
+                    <a:schemeClr val="dk1">
+                      <a:lumMod val="50000"/>
+                      <a:alpha val="40000"/>
+                    </a:schemeClr>
+                  </a:outerShdw>
+                </a:effectLst>
+              </a:rPr>
+              <a:t>Zip function</a:t>
+            </a:r>
+            <a:endParaRPr lang="en-GB" b="1" dirty="0">
+              <a:ln/>
+              <a:pattFill prst="dkUpDiag">
+                <a:fgClr>
+                  <a:schemeClr val="bg1">
+                    <a:lumMod val="50000"/>
+                  </a:schemeClr>
+                </a:fgClr>
+                <a:bgClr>
+                  <a:schemeClr val="tx1">
+                    <a:lumMod val="75000"/>
+                    <a:lumOff val="25000"/>
+                  </a:schemeClr>
+                </a:bgClr>
+              </a:pattFill>
+              <a:effectLst>
+                <a:outerShdw blurRad="38100" dist="19050" dir="2700000" algn="tl" rotWithShape="0">
+                  <a:schemeClr val="dk1">
+                    <a:lumMod val="50000"/>
+                    <a:alpha val="40000"/>
+                  </a:schemeClr>
+                </a:outerShdw>
+              </a:effectLst>
+              <a:latin typeface="Patrick Hand" pitchFamily="2" charset="77"/>
+            </a:endParaRPr>
+          </a:p>
+        </p:txBody>
+      </p:sp>
+      <p:pic>
+        <p:nvPicPr>
+          <p:cNvPr id="5" name="Picture 4">
+            <a:extLst>
+              <a:ext uri="{FF2B5EF4-FFF2-40B4-BE49-F238E27FC236}">
+                <a16:creationId xmlns:a16="http://schemas.microsoft.com/office/drawing/2014/main" id="{0F2CAF92-9DDC-DFC3-FF81-8A5C6F4225A0}"/>
+              </a:ext>
+            </a:extLst>
+          </p:cNvPr>
+          <p:cNvPicPr>
+            <a:picLocks noChangeAspect="1"/>
+          </p:cNvPicPr>
+          <p:nvPr/>
+        </p:nvPicPr>
+        <p:blipFill>
+          <a:blip r:embed="rId2"/>
+          <a:stretch>
+            <a:fillRect/>
+          </a:stretch>
+        </p:blipFill>
+        <p:spPr>
+          <a:xfrm>
+            <a:off x="264001" y="2906105"/>
+            <a:ext cx="1063167" cy="1063167"/>
+          </a:xfrm>
+          <a:prstGeom prst="rect">
+            <a:avLst/>
+          </a:prstGeom>
+        </p:spPr>
+      </p:pic>
+      <p:sp>
+        <p:nvSpPr>
+          <p:cNvPr id="7" name="TextBox 6">
+            <a:extLst>
+              <a:ext uri="{FF2B5EF4-FFF2-40B4-BE49-F238E27FC236}">
+                <a16:creationId xmlns:a16="http://schemas.microsoft.com/office/drawing/2014/main" id="{69BBD432-F653-9467-301C-A4F29799E896}"/>
+              </a:ext>
+            </a:extLst>
+          </p:cNvPr>
+          <p:cNvSpPr txBox="1"/>
+          <p:nvPr/>
+        </p:nvSpPr>
+        <p:spPr>
+          <a:xfrm>
+            <a:off x="223306" y="11731083"/>
+            <a:ext cx="2176301" cy="707886"/>
+          </a:xfrm>
+          <a:prstGeom prst="rect">
+            <a:avLst/>
+          </a:prstGeom>
+          <a:noFill/>
+        </p:spPr>
+        <p:txBody>
+          <a:bodyPr wrap="none" rtlCol="0">
+            <a:spAutoFit/>
+          </a:bodyPr>
+          <a:lstStyle/>
+          <a:p>
+            <a:r>
+              <a:rPr lang="en-GB" sz="4000" b="1" dirty="0"/>
+              <a:t>Efficient:</a:t>
+            </a:r>
+            <a:r>
+              <a:rPr lang="en-GB" sz="4000" dirty="0"/>
+              <a:t> </a:t>
+            </a:r>
+            <a:endParaRPr lang="en-DE" sz="4000" dirty="0"/>
+          </a:p>
+        </p:txBody>
+      </p:sp>
+      <p:sp>
+        <p:nvSpPr>
+          <p:cNvPr id="11" name="TextBox 10">
+            <a:extLst>
+              <a:ext uri="{FF2B5EF4-FFF2-40B4-BE49-F238E27FC236}">
+                <a16:creationId xmlns:a16="http://schemas.microsoft.com/office/drawing/2014/main" id="{0F29FF69-10AD-2D7D-57DB-432C9733AE0A}"/>
+              </a:ext>
+            </a:extLst>
+          </p:cNvPr>
+          <p:cNvSpPr txBox="1"/>
+          <p:nvPr/>
+        </p:nvSpPr>
+        <p:spPr>
+          <a:xfrm>
+            <a:off x="2369994" y="11731083"/>
+            <a:ext cx="7680579" cy="707886"/>
+          </a:xfrm>
+          <a:prstGeom prst="rect">
+            <a:avLst/>
+          </a:prstGeom>
+          <a:noFill/>
+        </p:spPr>
+        <p:txBody>
+          <a:bodyPr wrap="square" rtlCol="0">
+            <a:spAutoFit/>
+          </a:bodyPr>
+          <a:lstStyle/>
+          <a:p>
+            <a:r>
+              <a:rPr lang="en-GB" sz="4000" dirty="0">
+                <a:latin typeface="Patrick Hand" pitchFamily="2" charset="77"/>
+              </a:rPr>
+              <a:t>Loops through multiple </a:t>
+            </a:r>
+            <a:r>
+              <a:rPr lang="en-GB" sz="4000" dirty="0" err="1">
+                <a:latin typeface="Patrick Hand" pitchFamily="2" charset="77"/>
+              </a:rPr>
+              <a:t>iterables</a:t>
+            </a:r>
+            <a:r>
+              <a:rPr lang="en-GB" sz="4000" dirty="0">
+                <a:latin typeface="Patrick Hand" pitchFamily="2" charset="77"/>
+              </a:rPr>
+              <a:t> at once</a:t>
+            </a:r>
+            <a:endParaRPr lang="en-DE" sz="4000" dirty="0">
+              <a:latin typeface="Patrick Hand" pitchFamily="2" charset="77"/>
+            </a:endParaRPr>
+          </a:p>
+        </p:txBody>
+      </p:sp>
+      <p:sp>
+        <p:nvSpPr>
+          <p:cNvPr id="8" name="TextBox 7">
+            <a:extLst>
+              <a:ext uri="{FF2B5EF4-FFF2-40B4-BE49-F238E27FC236}">
+                <a16:creationId xmlns:a16="http://schemas.microsoft.com/office/drawing/2014/main" id="{0868B171-25AA-CACD-A094-E0B38D31F23D}"/>
+              </a:ext>
+            </a:extLst>
+          </p:cNvPr>
+          <p:cNvSpPr txBox="1"/>
+          <p:nvPr/>
+        </p:nvSpPr>
+        <p:spPr>
+          <a:xfrm>
+            <a:off x="223306" y="12814182"/>
+            <a:ext cx="2310120" cy="707886"/>
+          </a:xfrm>
+          <a:prstGeom prst="rect">
+            <a:avLst/>
+          </a:prstGeom>
+          <a:noFill/>
+        </p:spPr>
+        <p:txBody>
+          <a:bodyPr wrap="none" rtlCol="0">
+            <a:spAutoFit/>
+          </a:bodyPr>
+          <a:lstStyle/>
+          <a:p>
+            <a:r>
+              <a:rPr lang="en-GB" sz="4000" b="1" dirty="0"/>
+              <a:t>Pythonic: </a:t>
+            </a:r>
+            <a:endParaRPr lang="en-DE" sz="4000" b="1" dirty="0"/>
+          </a:p>
+        </p:txBody>
+      </p:sp>
+      <p:sp>
+        <p:nvSpPr>
+          <p:cNvPr id="12" name="TextBox 11">
+            <a:extLst>
+              <a:ext uri="{FF2B5EF4-FFF2-40B4-BE49-F238E27FC236}">
+                <a16:creationId xmlns:a16="http://schemas.microsoft.com/office/drawing/2014/main" id="{115BBC69-7564-146A-362D-6284651CA860}"/>
+              </a:ext>
+            </a:extLst>
+          </p:cNvPr>
+          <p:cNvSpPr txBox="1"/>
+          <p:nvPr/>
+        </p:nvSpPr>
+        <p:spPr>
+          <a:xfrm>
+            <a:off x="2369994" y="12804706"/>
+            <a:ext cx="7915419" cy="707886"/>
+          </a:xfrm>
+          <a:prstGeom prst="rect">
+            <a:avLst/>
+          </a:prstGeom>
+          <a:noFill/>
+        </p:spPr>
+        <p:txBody>
+          <a:bodyPr wrap="square" rtlCol="0">
+            <a:spAutoFit/>
+          </a:bodyPr>
+          <a:lstStyle/>
+          <a:p>
+            <a:r>
+              <a:rPr lang="en-GB" sz="4000" dirty="0">
+                <a:latin typeface="Patrick Hand" pitchFamily="2" charset="77"/>
+              </a:rPr>
+              <a:t>Eliminates the need for manual indexing</a:t>
+            </a:r>
+            <a:endParaRPr lang="en-DE" sz="4000" dirty="0">
+              <a:latin typeface="Patrick Hand" pitchFamily="2" charset="77"/>
+            </a:endParaRPr>
+          </a:p>
+        </p:txBody>
+      </p:sp>
+      <p:sp>
+        <p:nvSpPr>
+          <p:cNvPr id="9" name="TextBox 8">
+            <a:extLst>
+              <a:ext uri="{FF2B5EF4-FFF2-40B4-BE49-F238E27FC236}">
+                <a16:creationId xmlns:a16="http://schemas.microsoft.com/office/drawing/2014/main" id="{19005E2A-72FF-9431-1DDA-030C01BAAB6B}"/>
+              </a:ext>
+            </a:extLst>
+          </p:cNvPr>
+          <p:cNvSpPr txBox="1"/>
+          <p:nvPr/>
+        </p:nvSpPr>
+        <p:spPr>
+          <a:xfrm>
+            <a:off x="223306" y="13897281"/>
+            <a:ext cx="1887055" cy="707886"/>
+          </a:xfrm>
+          <a:prstGeom prst="rect">
+            <a:avLst/>
+          </a:prstGeom>
+          <a:noFill/>
+        </p:spPr>
+        <p:txBody>
+          <a:bodyPr wrap="none" rtlCol="0">
+            <a:spAutoFit/>
+          </a:bodyPr>
+          <a:lstStyle/>
+          <a:p>
+            <a:r>
+              <a:rPr lang="en-GB" sz="4000" b="1" dirty="0"/>
+              <a:t>Simple: </a:t>
+            </a:r>
+            <a:endParaRPr lang="en-DE" sz="4000" b="1" dirty="0"/>
+          </a:p>
+        </p:txBody>
+      </p:sp>
+      <p:sp>
+        <p:nvSpPr>
+          <p:cNvPr id="13" name="TextBox 12">
+            <a:extLst>
+              <a:ext uri="{FF2B5EF4-FFF2-40B4-BE49-F238E27FC236}">
+                <a16:creationId xmlns:a16="http://schemas.microsoft.com/office/drawing/2014/main" id="{2DC93386-7003-550B-8361-770B236BA91B}"/>
+              </a:ext>
+            </a:extLst>
+          </p:cNvPr>
+          <p:cNvSpPr txBox="1"/>
+          <p:nvPr/>
+        </p:nvSpPr>
+        <p:spPr>
+          <a:xfrm>
+            <a:off x="2369994" y="13878330"/>
+            <a:ext cx="7543309" cy="707886"/>
+          </a:xfrm>
+          <a:prstGeom prst="rect">
+            <a:avLst/>
+          </a:prstGeom>
+          <a:noFill/>
+        </p:spPr>
+        <p:txBody>
+          <a:bodyPr wrap="square" rtlCol="0">
+            <a:spAutoFit/>
+          </a:bodyPr>
+          <a:lstStyle/>
+          <a:p>
+            <a:r>
+              <a:rPr lang="en-GB" sz="4000" dirty="0">
+                <a:latin typeface="Patrick Hand" pitchFamily="2" charset="77"/>
+              </a:rPr>
+              <a:t>Makes your loops cleaner and shorter</a:t>
+            </a:r>
+            <a:endParaRPr lang="en-DE" sz="4000" dirty="0">
+              <a:latin typeface="Patrick Hand" pitchFamily="2" charset="77"/>
+            </a:endParaRPr>
+          </a:p>
+        </p:txBody>
+      </p:sp>
+      <p:cxnSp>
+        <p:nvCxnSpPr>
+          <p:cNvPr id="17" name="Straight Connector 16">
+            <a:extLst>
+              <a:ext uri="{FF2B5EF4-FFF2-40B4-BE49-F238E27FC236}">
+                <a16:creationId xmlns:a16="http://schemas.microsoft.com/office/drawing/2014/main" id="{37A0EC55-6918-894A-527C-6A7222C04E32}"/>
+              </a:ext>
+            </a:extLst>
+          </p:cNvPr>
+          <p:cNvCxnSpPr>
+            <a:cxnSpLocks/>
+          </p:cNvCxnSpPr>
+          <p:nvPr/>
+        </p:nvCxnSpPr>
+        <p:spPr>
+          <a:xfrm>
+            <a:off x="223579" y="8410989"/>
+            <a:ext cx="9838255" cy="0"/>
+          </a:xfrm>
+          <a:prstGeom prst="line">
+            <a:avLst/>
+          </a:prstGeom>
+          <a:ln w="38100">
+            <a:solidFill>
+              <a:srgbClr val="FFC000"/>
+            </a:solidFill>
+            <a:headEnd type="none"/>
+            <a:tailEnd type="none" w="lg" len="lg"/>
+          </a:ln>
+        </p:spPr>
+        <p:style>
+          <a:lnRef idx="1">
+            <a:schemeClr val="accent1"/>
+          </a:lnRef>
+          <a:fillRef idx="0">
+            <a:schemeClr val="accent1"/>
+          </a:fillRef>
+          <a:effectRef idx="0">
+            <a:schemeClr val="accent1"/>
+          </a:effectRef>
+          <a:fontRef idx="minor">
+            <a:schemeClr val="tx1"/>
+          </a:fontRef>
+        </p:style>
+      </p:cxnSp>
+      <p:pic>
+        <p:nvPicPr>
+          <p:cNvPr id="18" name="Graphic 17" descr="Shield Tick with solid fill">
+            <a:extLst>
+              <a:ext uri="{FF2B5EF4-FFF2-40B4-BE49-F238E27FC236}">
+                <a16:creationId xmlns:a16="http://schemas.microsoft.com/office/drawing/2014/main" id="{D3791C2A-331F-9DF3-9F0C-661BDA710972}"/>
+              </a:ext>
+            </a:extLst>
+          </p:cNvPr>
+          <p:cNvPicPr>
+            <a:picLocks noChangeAspect="1"/>
+          </p:cNvPicPr>
+          <p:nvPr/>
+        </p:nvPicPr>
+        <p:blipFill>
+          <a:blip r:embed="rId3">
+            <a:extLst>
+              <a:ext uri="{96DAC541-7B7A-43D3-8B79-37D633B846F1}">
+                <asvg:svgBlip xmlns:asvg="http://schemas.microsoft.com/office/drawing/2016/SVG/main" r:embed="rId4"/>
+              </a:ext>
+            </a:extLst>
+          </a:blip>
+          <a:stretch>
+            <a:fillRect/>
+          </a:stretch>
+        </p:blipFill>
+        <p:spPr>
+          <a:xfrm>
+            <a:off x="7668075" y="8637940"/>
+            <a:ext cx="914400" cy="914400"/>
+          </a:xfrm>
+          <a:prstGeom prst="rect">
+            <a:avLst/>
+          </a:prstGeom>
+        </p:spPr>
+      </p:pic>
+      <p:pic>
+        <p:nvPicPr>
+          <p:cNvPr id="19" name="Graphic 18" descr="Close with solid fill">
+            <a:extLst>
+              <a:ext uri="{FF2B5EF4-FFF2-40B4-BE49-F238E27FC236}">
+                <a16:creationId xmlns:a16="http://schemas.microsoft.com/office/drawing/2014/main" id="{0F6E4447-33BF-BCE5-BC44-10826ACC2BA9}"/>
+              </a:ext>
+            </a:extLst>
+          </p:cNvPr>
+          <p:cNvPicPr>
+            <a:picLocks noChangeAspect="1"/>
+          </p:cNvPicPr>
+          <p:nvPr/>
+        </p:nvPicPr>
+        <p:blipFill>
+          <a:blip r:embed="rId5">
+            <a:extLst>
+              <a:ext uri="{96DAC541-7B7A-43D3-8B79-37D633B846F1}">
+                <asvg:svgBlip xmlns:asvg="http://schemas.microsoft.com/office/drawing/2016/SVG/main" r:embed="rId6"/>
+              </a:ext>
+            </a:extLst>
+          </a:blip>
+          <a:stretch>
+            <a:fillRect/>
+          </a:stretch>
+        </p:blipFill>
+        <p:spPr>
+          <a:xfrm>
+            <a:off x="7668075" y="6560627"/>
+            <a:ext cx="914400" cy="914400"/>
+          </a:xfrm>
+          <a:prstGeom prst="rect">
+            <a:avLst/>
+          </a:prstGeom>
+        </p:spPr>
+      </p:pic>
+      <p:sp>
+        <p:nvSpPr>
+          <p:cNvPr id="25" name="TextBox 24">
+            <a:extLst>
+              <a:ext uri="{FF2B5EF4-FFF2-40B4-BE49-F238E27FC236}">
+                <a16:creationId xmlns:a16="http://schemas.microsoft.com/office/drawing/2014/main" id="{74C48AE9-4418-800E-A60F-791956D2CB7B}"/>
+              </a:ext>
+            </a:extLst>
+          </p:cNvPr>
+          <p:cNvSpPr txBox="1"/>
+          <p:nvPr/>
+        </p:nvSpPr>
+        <p:spPr>
+          <a:xfrm>
+            <a:off x="-7857400" y="2527667"/>
+            <a:ext cx="5089855" cy="830997"/>
+          </a:xfrm>
+          <a:prstGeom prst="rect">
+            <a:avLst/>
+          </a:prstGeom>
+        </p:spPr>
+        <p:style>
+          <a:lnRef idx="1">
+            <a:schemeClr val="accent2"/>
+          </a:lnRef>
+          <a:fillRef idx="2">
+            <a:schemeClr val="accent2"/>
+          </a:fillRef>
+          <a:effectRef idx="1">
+            <a:schemeClr val="accent2"/>
+          </a:effectRef>
+          <a:fontRef idx="minor">
+            <a:schemeClr val="dk1"/>
+          </a:fontRef>
+        </p:style>
+        <p:txBody>
+          <a:bodyPr wrap="none" rtlCol="0">
+            <a:spAutoFit/>
+          </a:bodyPr>
+          <a:lstStyle/>
+          <a:p>
+            <a:r>
+              <a:rPr lang="en-US" sz="4800" dirty="0">
+                <a:solidFill>
+                  <a:srgbClr val="FF0000"/>
+                </a:solidFill>
+                <a:latin typeface="Patrick Hand" pitchFamily="2" charset="77"/>
+              </a:rPr>
+              <a:t>py_017_zip_function</a:t>
+            </a:r>
+            <a:endParaRPr lang="en-DE" sz="4800" dirty="0">
+              <a:solidFill>
+                <a:srgbClr val="FF0000"/>
+              </a:solidFill>
+              <a:latin typeface="Patrick Hand" pitchFamily="2" charset="77"/>
+            </a:endParaRPr>
+          </a:p>
+        </p:txBody>
+      </p:sp>
     </p:spTree>
     <p:extLst>
       <p:ext uri="{BB962C8B-B14F-4D97-AF65-F5344CB8AC3E}">
-        <p14:creationId xmlns:p14="http://schemas.microsoft.com/office/powerpoint/2010/main" val="1053544977"/>
+        <p14:creationId xmlns:p14="http://schemas.microsoft.com/office/powerpoint/2010/main" val="3565809834"/>
       </p:ext>
     </p:extLst>
   </p:cSld>
@@ -7509,7 +10288,7 @@
     </p:spTree>
     <p:extLst>
       <p:ext uri="{BB962C8B-B14F-4D97-AF65-F5344CB8AC3E}">
-        <p14:creationId xmlns:p14="http://schemas.microsoft.com/office/powerpoint/2010/main" val="1006381002"/>
+        <p14:creationId xmlns:p14="http://schemas.microsoft.com/office/powerpoint/2010/main" val="3355690493"/>
       </p:ext>
     </p:extLst>
   </p:cSld>
@@ -7667,40 +10446,99 @@
           </a:p>
         </p:txBody>
       </p:sp>
+      <p:sp>
+        <p:nvSpPr>
+          <p:cNvPr id="5" name="Rectangle 4">
+            <a:extLst>
+              <a:ext uri="{FF2B5EF4-FFF2-40B4-BE49-F238E27FC236}">
+                <a16:creationId xmlns:a16="http://schemas.microsoft.com/office/drawing/2014/main" id="{F56907A9-1B63-0191-197F-5D8CE2A57CB7}"/>
+              </a:ext>
+            </a:extLst>
+          </p:cNvPr>
+          <p:cNvSpPr/>
+          <p:nvPr/>
+        </p:nvSpPr>
+        <p:spPr>
+          <a:xfrm>
+            <a:off x="-5255086" y="2883701"/>
+            <a:ext cx="3712876" cy="923330"/>
+          </a:xfrm>
+          <a:prstGeom prst="rect">
+            <a:avLst/>
+          </a:prstGeom>
+          <a:ln>
+            <a:solidFill>
+              <a:schemeClr val="tx1"/>
+            </a:solidFill>
+          </a:ln>
+        </p:spPr>
+        <p:style>
+          <a:lnRef idx="1">
+            <a:schemeClr val="accent6"/>
+          </a:lnRef>
+          <a:fillRef idx="2">
+            <a:schemeClr val="accent6"/>
+          </a:fillRef>
+          <a:effectRef idx="1">
+            <a:schemeClr val="accent6"/>
+          </a:effectRef>
+          <a:fontRef idx="minor">
+            <a:schemeClr val="dk1"/>
+          </a:fontRef>
+        </p:style>
+        <p:txBody>
+          <a:bodyPr wrap="none" lIns="91440" tIns="45720" rIns="91440" bIns="45720">
+            <a:spAutoFit/>
+            <a:scene3d>
+              <a:camera prst="orthographicFront"/>
+              <a:lightRig rig="soft" dir="t">
+                <a:rot lat="0" lon="0" rev="15600000"/>
+              </a:lightRig>
+            </a:scene3d>
+            <a:sp3d extrusionH="57150" prstMaterial="softEdge">
+              <a:bevelT w="25400" h="38100"/>
+            </a:sp3d>
+          </a:bodyPr>
+          <a:lstStyle/>
+          <a:p>
+            <a:pPr algn="ctr"/>
+            <a:r>
+              <a:rPr lang="en-GB" sz="5400" dirty="0">
+                <a:ln w="0"/>
+                <a:solidFill>
+                  <a:schemeClr val="tx1"/>
+                </a:solidFill>
+                <a:effectLst>
+                  <a:outerShdw blurRad="38100" dist="19050" dir="2700000" algn="tl" rotWithShape="0">
+                    <a:schemeClr val="dk1">
+                      <a:alpha val="40000"/>
+                    </a:schemeClr>
+                  </a:outerShdw>
+                </a:effectLst>
+                <a:latin typeface="Patrick Hand" pitchFamily="2" charset="77"/>
+              </a:rPr>
+              <a:t>py_001_print</a:t>
+            </a:r>
+            <a:endParaRPr lang="en-DE" sz="5400" dirty="0">
+              <a:ln w="0"/>
+              <a:solidFill>
+                <a:schemeClr val="tx1"/>
+              </a:solidFill>
+              <a:effectLst>
+                <a:outerShdw blurRad="38100" dist="19050" dir="2700000" algn="tl" rotWithShape="0">
+                  <a:schemeClr val="dk1">
+                    <a:alpha val="40000"/>
+                  </a:schemeClr>
+                </a:outerShdw>
+              </a:effectLst>
+            </a:endParaRPr>
+          </a:p>
+        </p:txBody>
+      </p:sp>
     </p:spTree>
     <p:extLst>
       <p:ext uri="{BB962C8B-B14F-4D97-AF65-F5344CB8AC3E}">
         <p14:creationId xmlns:p14="http://schemas.microsoft.com/office/powerpoint/2010/main" val="3215186301"/>
-      </p:ext>
-    </p:extLst>
-  </p:cSld>
-  <p:clrMapOvr>
-    <a:masterClrMapping/>
-  </p:clrMapOvr>
-</p:sld>
-</file>
-
-<file path=ppt/slides/slide20.xml><?xml version="1.0" encoding="utf-8"?>
-<p:sld xmlns:a="http://schemas.openxmlformats.org/drawingml/2006/main" xmlns:r="http://schemas.openxmlformats.org/officeDocument/2006/relationships" xmlns:p="http://schemas.openxmlformats.org/presentationml/2006/main">
-  <p:cSld>
-    <p:spTree>
-      <p:nvGrpSpPr>
-        <p:cNvPr id="1" name=""/>
-        <p:cNvGrpSpPr/>
-        <p:nvPr/>
-      </p:nvGrpSpPr>
-      <p:grpSpPr>
-        <a:xfrm>
-          <a:off x="0" y="0"/>
-          <a:ext cx="0" cy="0"/>
-          <a:chOff x="0" y="0"/>
-          <a:chExt cx="0" cy="0"/>
-        </a:xfrm>
-      </p:grpSpPr>
-    </p:spTree>
-    <p:extLst>
-      <p:ext uri="{BB962C8B-B14F-4D97-AF65-F5344CB8AC3E}">
-        <p14:creationId xmlns:p14="http://schemas.microsoft.com/office/powerpoint/2010/main" val="2604286344"/>
       </p:ext>
     </p:extLst>
   </p:cSld>
@@ -8233,6 +11071,95 @@
             <a:pPr marL="0" algn="ctr" defTabSz="457200" rtl="0" eaLnBrk="1" latinLnBrk="0" hangingPunct="1"/>
             <a:endParaRPr lang="en-DE" dirty="0">
               <a:latin typeface="Patrick Hand" pitchFamily="2" charset="77"/>
+            </a:endParaRPr>
+          </a:p>
+        </p:txBody>
+      </p:sp>
+      <p:sp>
+        <p:nvSpPr>
+          <p:cNvPr id="3" name="Rectangle 2">
+            <a:extLst>
+              <a:ext uri="{FF2B5EF4-FFF2-40B4-BE49-F238E27FC236}">
+                <a16:creationId xmlns:a16="http://schemas.microsoft.com/office/drawing/2014/main" id="{0A3573D3-02FD-8867-C498-4782AE7F0917}"/>
+              </a:ext>
+            </a:extLst>
+          </p:cNvPr>
+          <p:cNvSpPr/>
+          <p:nvPr/>
+        </p:nvSpPr>
+        <p:spPr>
+          <a:xfrm>
+            <a:off x="-8208470" y="2819400"/>
+            <a:ext cx="7768473" cy="923330"/>
+          </a:xfrm>
+          <a:prstGeom prst="rect">
+            <a:avLst/>
+          </a:prstGeom>
+          <a:ln>
+            <a:solidFill>
+              <a:schemeClr val="tx1"/>
+            </a:solidFill>
+          </a:ln>
+        </p:spPr>
+        <p:style>
+          <a:lnRef idx="1">
+            <a:schemeClr val="accent6"/>
+          </a:lnRef>
+          <a:fillRef idx="2">
+            <a:schemeClr val="accent6"/>
+          </a:fillRef>
+          <a:effectRef idx="1">
+            <a:schemeClr val="accent6"/>
+          </a:effectRef>
+          <a:fontRef idx="minor">
+            <a:schemeClr val="dk1"/>
+          </a:fontRef>
+        </p:style>
+        <p:txBody>
+          <a:bodyPr wrap="none" lIns="91440" tIns="45720" rIns="91440" bIns="45720">
+            <a:spAutoFit/>
+            <a:scene3d>
+              <a:camera prst="orthographicFront"/>
+              <a:lightRig rig="soft" dir="t">
+                <a:rot lat="0" lon="0" rev="15600000"/>
+              </a:lightRig>
+            </a:scene3d>
+            <a:sp3d extrusionH="57150" prstMaterial="softEdge">
+              <a:bevelT w="25400" h="38100"/>
+            </a:sp3d>
+          </a:bodyPr>
+          <a:lstStyle/>
+          <a:p>
+            <a:pPr algn="ctr"/>
+            <a:r>
+              <a:rPr lang="en-GB" sz="5400" dirty="0">
+                <a:ln w="0"/>
+                <a:solidFill>
+                  <a:schemeClr val="tx1"/>
+                </a:solidFill>
+                <a:effectLst>
+                  <a:outerShdw blurRad="38100" dist="19050" dir="2700000" algn="tl" rotWithShape="0">
+                    <a:schemeClr val="dk1">
+                      <a:alpha val="40000"/>
+                    </a:schemeClr>
+                  </a:outerShdw>
+                </a:effectLst>
+                <a:latin typeface="Patrick Hand" pitchFamily="2" charset="77"/>
+              </a:rPr>
+              <a:t>py_002_list_comprehensions</a:t>
+            </a:r>
+            <a:endParaRPr lang="en-DE" sz="5400" dirty="0">
+              <a:ln w="0"/>
+              <a:solidFill>
+                <a:schemeClr val="tx1"/>
+              </a:solidFill>
+              <a:effectLst>
+                <a:outerShdw blurRad="38100" dist="19050" dir="2700000" algn="tl" rotWithShape="0">
+                  <a:schemeClr val="dk1">
+                    <a:alpha val="40000"/>
+                  </a:schemeClr>
+                </a:outerShdw>
+              </a:effectLst>
             </a:endParaRPr>
           </a:p>
         </p:txBody>
@@ -8861,6 +11788,95 @@
           </p:spPr>
         </p:pic>
       </p:grpSp>
+      <p:sp>
+        <p:nvSpPr>
+          <p:cNvPr id="3" name="Rectangle 2">
+            <a:extLst>
+              <a:ext uri="{FF2B5EF4-FFF2-40B4-BE49-F238E27FC236}">
+                <a16:creationId xmlns:a16="http://schemas.microsoft.com/office/drawing/2014/main" id="{946FF087-C041-0658-59B7-B05AD6F4493E}"/>
+              </a:ext>
+            </a:extLst>
+          </p:cNvPr>
+          <p:cNvSpPr/>
+          <p:nvPr/>
+        </p:nvSpPr>
+        <p:spPr>
+          <a:xfrm>
+            <a:off x="-7438227" y="2819400"/>
+            <a:ext cx="6227987" cy="923330"/>
+          </a:xfrm>
+          <a:prstGeom prst="rect">
+            <a:avLst/>
+          </a:prstGeom>
+          <a:ln>
+            <a:solidFill>
+              <a:schemeClr val="tx1"/>
+            </a:solidFill>
+          </a:ln>
+        </p:spPr>
+        <p:style>
+          <a:lnRef idx="1">
+            <a:schemeClr val="accent6"/>
+          </a:lnRef>
+          <a:fillRef idx="2">
+            <a:schemeClr val="accent6"/>
+          </a:fillRef>
+          <a:effectRef idx="1">
+            <a:schemeClr val="accent6"/>
+          </a:effectRef>
+          <a:fontRef idx="minor">
+            <a:schemeClr val="dk1"/>
+          </a:fontRef>
+        </p:style>
+        <p:txBody>
+          <a:bodyPr wrap="none" lIns="91440" tIns="45720" rIns="91440" bIns="45720">
+            <a:spAutoFit/>
+            <a:scene3d>
+              <a:camera prst="orthographicFront"/>
+              <a:lightRig rig="soft" dir="t">
+                <a:rot lat="0" lon="0" rev="15600000"/>
+              </a:lightRig>
+            </a:scene3d>
+            <a:sp3d extrusionH="57150" prstMaterial="softEdge">
+              <a:bevelT w="25400" h="38100"/>
+            </a:sp3d>
+          </a:bodyPr>
+          <a:lstStyle/>
+          <a:p>
+            <a:pPr algn="ctr"/>
+            <a:r>
+              <a:rPr lang="en-GB" sz="5400" dirty="0">
+                <a:ln w="0"/>
+                <a:solidFill>
+                  <a:schemeClr val="tx1"/>
+                </a:solidFill>
+                <a:effectLst>
+                  <a:outerShdw blurRad="38100" dist="19050" dir="2700000" algn="tl" rotWithShape="0">
+                    <a:schemeClr val="dk1">
+                      <a:alpha val="40000"/>
+                    </a:schemeClr>
+                  </a:outerShdw>
+                </a:effectLst>
+                <a:latin typeface="Patrick Hand" pitchFamily="2" charset="77"/>
+              </a:rPr>
+              <a:t>py_003_dictionary_get</a:t>
+            </a:r>
+            <a:endParaRPr lang="en-DE" sz="5400" dirty="0">
+              <a:ln w="0"/>
+              <a:solidFill>
+                <a:schemeClr val="tx1"/>
+              </a:solidFill>
+              <a:effectLst>
+                <a:outerShdw blurRad="38100" dist="19050" dir="2700000" algn="tl" rotWithShape="0">
+                  <a:schemeClr val="dk1">
+                    <a:alpha val="40000"/>
+                  </a:schemeClr>
+                </a:outerShdw>
+              </a:effectLst>
+            </a:endParaRPr>
+          </a:p>
+        </p:txBody>
+      </p:sp>
     </p:spTree>
     <p:extLst>
       <p:ext uri="{BB962C8B-B14F-4D97-AF65-F5344CB8AC3E}">
@@ -9190,6 +12206,95 @@
           </a:prstGeom>
         </p:spPr>
       </p:pic>
+      <p:sp>
+        <p:nvSpPr>
+          <p:cNvPr id="29" name="Rectangle 28">
+            <a:extLst>
+              <a:ext uri="{FF2B5EF4-FFF2-40B4-BE49-F238E27FC236}">
+                <a16:creationId xmlns:a16="http://schemas.microsoft.com/office/drawing/2014/main" id="{ECF38632-8D5A-997E-0904-548E4DA9ABDA}"/>
+              </a:ext>
+            </a:extLst>
+          </p:cNvPr>
+          <p:cNvSpPr/>
+          <p:nvPr/>
+        </p:nvSpPr>
+        <p:spPr>
+          <a:xfrm>
+            <a:off x="-7708333" y="2819400"/>
+            <a:ext cx="6768199" cy="923330"/>
+          </a:xfrm>
+          <a:prstGeom prst="rect">
+            <a:avLst/>
+          </a:prstGeom>
+          <a:ln>
+            <a:solidFill>
+              <a:schemeClr val="tx1"/>
+            </a:solidFill>
+          </a:ln>
+        </p:spPr>
+        <p:style>
+          <a:lnRef idx="1">
+            <a:schemeClr val="accent6"/>
+          </a:lnRef>
+          <a:fillRef idx="2">
+            <a:schemeClr val="accent6"/>
+          </a:fillRef>
+          <a:effectRef idx="1">
+            <a:schemeClr val="accent6"/>
+          </a:effectRef>
+          <a:fontRef idx="minor">
+            <a:schemeClr val="dk1"/>
+          </a:fontRef>
+        </p:style>
+        <p:txBody>
+          <a:bodyPr wrap="none" lIns="91440" tIns="45720" rIns="91440" bIns="45720">
+            <a:spAutoFit/>
+            <a:scene3d>
+              <a:camera prst="orthographicFront"/>
+              <a:lightRig rig="soft" dir="t">
+                <a:rot lat="0" lon="0" rev="15600000"/>
+              </a:lightRig>
+            </a:scene3d>
+            <a:sp3d extrusionH="57150" prstMaterial="softEdge">
+              <a:bevelT w="25400" h="38100"/>
+            </a:sp3d>
+          </a:bodyPr>
+          <a:lstStyle/>
+          <a:p>
+            <a:pPr algn="ctr"/>
+            <a:r>
+              <a:rPr lang="en-GB" sz="5400" dirty="0">
+                <a:ln w="0"/>
+                <a:solidFill>
+                  <a:schemeClr val="tx1"/>
+                </a:solidFill>
+                <a:effectLst>
+                  <a:outerShdw blurRad="38100" dist="19050" dir="2700000" algn="tl" rotWithShape="0">
+                    <a:schemeClr val="dk1">
+                      <a:alpha val="40000"/>
+                    </a:schemeClr>
+                  </a:outerShdw>
+                </a:effectLst>
+                <a:latin typeface="Patrick Hand" pitchFamily="2" charset="77"/>
+              </a:rPr>
+              <a:t>py_004_sequence_slicing</a:t>
+            </a:r>
+            <a:endParaRPr lang="en-DE" sz="5400" dirty="0">
+              <a:ln w="0"/>
+              <a:solidFill>
+                <a:schemeClr val="tx1"/>
+              </a:solidFill>
+              <a:effectLst>
+                <a:outerShdw blurRad="38100" dist="19050" dir="2700000" algn="tl" rotWithShape="0">
+                  <a:schemeClr val="dk1">
+                    <a:alpha val="40000"/>
+                  </a:schemeClr>
+                </a:outerShdw>
+              </a:effectLst>
+            </a:endParaRPr>
+          </a:p>
+        </p:txBody>
+      </p:sp>
     </p:spTree>
     <p:extLst>
       <p:ext uri="{BB962C8B-B14F-4D97-AF65-F5344CB8AC3E}">
@@ -9598,6 +12703,95 @@
             <a:pPr marL="0" algn="ctr" defTabSz="457200" rtl="0" eaLnBrk="1" latinLnBrk="0" hangingPunct="1"/>
             <a:endParaRPr lang="en-DE" dirty="0">
               <a:latin typeface="Patrick Hand" pitchFamily="2" charset="77"/>
+            </a:endParaRPr>
+          </a:p>
+        </p:txBody>
+      </p:sp>
+      <p:sp>
+        <p:nvSpPr>
+          <p:cNvPr id="28" name="Rectangle 27">
+            <a:extLst>
+              <a:ext uri="{FF2B5EF4-FFF2-40B4-BE49-F238E27FC236}">
+                <a16:creationId xmlns:a16="http://schemas.microsoft.com/office/drawing/2014/main" id="{37DF25F1-84EC-E55D-F294-EEE7333BFE9C}"/>
+              </a:ext>
+            </a:extLst>
+          </p:cNvPr>
+          <p:cNvSpPr/>
+          <p:nvPr/>
+        </p:nvSpPr>
+        <p:spPr>
+          <a:xfrm>
+            <a:off x="-7438227" y="2819400"/>
+            <a:ext cx="6227987" cy="923330"/>
+          </a:xfrm>
+          <a:prstGeom prst="rect">
+            <a:avLst/>
+          </a:prstGeom>
+          <a:ln>
+            <a:solidFill>
+              <a:schemeClr val="tx1"/>
+            </a:solidFill>
+          </a:ln>
+        </p:spPr>
+        <p:style>
+          <a:lnRef idx="1">
+            <a:schemeClr val="accent6"/>
+          </a:lnRef>
+          <a:fillRef idx="2">
+            <a:schemeClr val="accent6"/>
+          </a:fillRef>
+          <a:effectRef idx="1">
+            <a:schemeClr val="accent6"/>
+          </a:effectRef>
+          <a:fontRef idx="minor">
+            <a:schemeClr val="dk1"/>
+          </a:fontRef>
+        </p:style>
+        <p:txBody>
+          <a:bodyPr wrap="none" lIns="91440" tIns="45720" rIns="91440" bIns="45720">
+            <a:spAutoFit/>
+            <a:scene3d>
+              <a:camera prst="orthographicFront"/>
+              <a:lightRig rig="soft" dir="t">
+                <a:rot lat="0" lon="0" rev="15600000"/>
+              </a:lightRig>
+            </a:scene3d>
+            <a:sp3d extrusionH="57150" prstMaterial="softEdge">
+              <a:bevelT w="25400" h="38100"/>
+            </a:sp3d>
+          </a:bodyPr>
+          <a:lstStyle/>
+          <a:p>
+            <a:pPr algn="ctr"/>
+            <a:r>
+              <a:rPr lang="en-GB" sz="5400" dirty="0">
+                <a:ln w="0"/>
+                <a:solidFill>
+                  <a:schemeClr val="tx1"/>
+                </a:solidFill>
+                <a:effectLst>
+                  <a:outerShdw blurRad="38100" dist="19050" dir="2700000" algn="tl" rotWithShape="0">
+                    <a:schemeClr val="dk1">
+                      <a:alpha val="40000"/>
+                    </a:schemeClr>
+                  </a:outerShdw>
+                </a:effectLst>
+                <a:latin typeface="Patrick Hand" pitchFamily="2" charset="77"/>
+              </a:rPr>
+              <a:t>py_005_swap_variables</a:t>
+            </a:r>
+            <a:endParaRPr lang="en-DE" sz="5400" dirty="0">
+              <a:ln w="0"/>
+              <a:solidFill>
+                <a:schemeClr val="tx1"/>
+              </a:solidFill>
+              <a:effectLst>
+                <a:outerShdw blurRad="38100" dist="19050" dir="2700000" algn="tl" rotWithShape="0">
+                  <a:schemeClr val="dk1">
+                    <a:alpha val="40000"/>
+                  </a:schemeClr>
+                </a:outerShdw>
+              </a:effectLst>
             </a:endParaRPr>
           </a:p>
         </p:txBody>
@@ -9973,6 +13167,95 @@
                 <a:schemeClr val="tx1"/>
               </a:solidFill>
               <a:latin typeface="Patrick Hand" pitchFamily="2" charset="77"/>
+            </a:endParaRPr>
+          </a:p>
+        </p:txBody>
+      </p:sp>
+      <p:sp>
+        <p:nvSpPr>
+          <p:cNvPr id="13" name="Rectangle 12">
+            <a:extLst>
+              <a:ext uri="{FF2B5EF4-FFF2-40B4-BE49-F238E27FC236}">
+                <a16:creationId xmlns:a16="http://schemas.microsoft.com/office/drawing/2014/main" id="{A5B73D5E-1D32-6F09-29CE-A81E7A6F23E4}"/>
+              </a:ext>
+            </a:extLst>
+          </p:cNvPr>
+          <p:cNvSpPr/>
+          <p:nvPr/>
+        </p:nvSpPr>
+        <p:spPr>
+          <a:xfrm>
+            <a:off x="-6888397" y="2819400"/>
+            <a:ext cx="5128327" cy="923330"/>
+          </a:xfrm>
+          <a:prstGeom prst="rect">
+            <a:avLst/>
+          </a:prstGeom>
+          <a:ln>
+            <a:solidFill>
+              <a:schemeClr val="tx1"/>
+            </a:solidFill>
+          </a:ln>
+        </p:spPr>
+        <p:style>
+          <a:lnRef idx="1">
+            <a:schemeClr val="accent6"/>
+          </a:lnRef>
+          <a:fillRef idx="2">
+            <a:schemeClr val="accent6"/>
+          </a:fillRef>
+          <a:effectRef idx="1">
+            <a:schemeClr val="accent6"/>
+          </a:effectRef>
+          <a:fontRef idx="minor">
+            <a:schemeClr val="dk1"/>
+          </a:fontRef>
+        </p:style>
+        <p:txBody>
+          <a:bodyPr wrap="none" lIns="91440" tIns="45720" rIns="91440" bIns="45720">
+            <a:spAutoFit/>
+            <a:scene3d>
+              <a:camera prst="orthographicFront"/>
+              <a:lightRig rig="soft" dir="t">
+                <a:rot lat="0" lon="0" rev="15600000"/>
+              </a:lightRig>
+            </a:scene3d>
+            <a:sp3d extrusionH="57150" prstMaterial="softEdge">
+              <a:bevelT w="25400" h="38100"/>
+            </a:sp3d>
+          </a:bodyPr>
+          <a:lstStyle/>
+          <a:p>
+            <a:pPr algn="ctr"/>
+            <a:r>
+              <a:rPr lang="en-GB" sz="5400" dirty="0">
+                <a:ln w="0"/>
+                <a:solidFill>
+                  <a:schemeClr val="tx1"/>
+                </a:solidFill>
+                <a:effectLst>
+                  <a:outerShdw blurRad="38100" dist="19050" dir="2700000" algn="tl" rotWithShape="0">
+                    <a:schemeClr val="dk1">
+                      <a:alpha val="40000"/>
+                    </a:schemeClr>
+                  </a:outerShdw>
+                </a:effectLst>
+                <a:latin typeface="Patrick Hand" pitchFamily="2" charset="77"/>
+              </a:rPr>
+              <a:t>py_006_enumerate</a:t>
+            </a:r>
+            <a:endParaRPr lang="en-DE" sz="5400" dirty="0">
+              <a:ln w="0"/>
+              <a:solidFill>
+                <a:schemeClr val="tx1"/>
+              </a:solidFill>
+              <a:effectLst>
+                <a:outerShdw blurRad="38100" dist="19050" dir="2700000" algn="tl" rotWithShape="0">
+                  <a:schemeClr val="dk1">
+                    <a:alpha val="40000"/>
+                  </a:schemeClr>
+                </a:outerShdw>
+              </a:effectLst>
             </a:endParaRPr>
           </a:p>
         </p:txBody>
@@ -10629,6 +13912,95 @@
           </a:p>
         </p:txBody>
       </p:sp>
+      <p:sp>
+        <p:nvSpPr>
+          <p:cNvPr id="114" name="Rectangle 113">
+            <a:extLst>
+              <a:ext uri="{FF2B5EF4-FFF2-40B4-BE49-F238E27FC236}">
+                <a16:creationId xmlns:a16="http://schemas.microsoft.com/office/drawing/2014/main" id="{446986AC-1C3A-B474-6747-68140547BDEB}"/>
+              </a:ext>
+            </a:extLst>
+          </p:cNvPr>
+          <p:cNvSpPr/>
+          <p:nvPr/>
+        </p:nvSpPr>
+        <p:spPr>
+          <a:xfrm>
+            <a:off x="-7666655" y="2819400"/>
+            <a:ext cx="6684843" cy="923330"/>
+          </a:xfrm>
+          <a:prstGeom prst="rect">
+            <a:avLst/>
+          </a:prstGeom>
+          <a:ln>
+            <a:solidFill>
+              <a:schemeClr val="tx1"/>
+            </a:solidFill>
+          </a:ln>
+        </p:spPr>
+        <p:style>
+          <a:lnRef idx="1">
+            <a:schemeClr val="accent6"/>
+          </a:lnRef>
+          <a:fillRef idx="2">
+            <a:schemeClr val="accent6"/>
+          </a:fillRef>
+          <a:effectRef idx="1">
+            <a:schemeClr val="accent6"/>
+          </a:effectRef>
+          <a:fontRef idx="minor">
+            <a:schemeClr val="dk1"/>
+          </a:fontRef>
+        </p:style>
+        <p:txBody>
+          <a:bodyPr wrap="none" lIns="91440" tIns="45720" rIns="91440" bIns="45720">
+            <a:spAutoFit/>
+            <a:scene3d>
+              <a:camera prst="orthographicFront"/>
+              <a:lightRig rig="soft" dir="t">
+                <a:rot lat="0" lon="0" rev="15600000"/>
+              </a:lightRig>
+            </a:scene3d>
+            <a:sp3d extrusionH="57150" prstMaterial="softEdge">
+              <a:bevelT w="25400" h="38100"/>
+            </a:sp3d>
+          </a:bodyPr>
+          <a:lstStyle/>
+          <a:p>
+            <a:pPr algn="ctr"/>
+            <a:r>
+              <a:rPr lang="en-GB" sz="5400" dirty="0">
+                <a:ln w="0"/>
+                <a:solidFill>
+                  <a:schemeClr val="tx1"/>
+                </a:solidFill>
+                <a:effectLst>
+                  <a:outerShdw blurRad="38100" dist="19050" dir="2700000" algn="tl" rotWithShape="0">
+                    <a:schemeClr val="dk1">
+                      <a:alpha val="40000"/>
+                    </a:schemeClr>
+                  </a:outerShdw>
+                </a:effectLst>
+                <a:latin typeface="Patrick Hand" pitchFamily="2" charset="77"/>
+              </a:rPr>
+              <a:t>py_007_walrus_operator</a:t>
+            </a:r>
+            <a:endParaRPr lang="en-DE" sz="5400" dirty="0">
+              <a:ln w="0"/>
+              <a:solidFill>
+                <a:schemeClr val="tx1"/>
+              </a:solidFill>
+              <a:effectLst>
+                <a:outerShdw blurRad="38100" dist="19050" dir="2700000" algn="tl" rotWithShape="0">
+                  <a:schemeClr val="dk1">
+                    <a:alpha val="40000"/>
+                  </a:schemeClr>
+                </a:outerShdw>
+              </a:effectLst>
+            </a:endParaRPr>
+          </a:p>
+        </p:txBody>
+      </p:sp>
     </p:spTree>
     <p:extLst>
       <p:ext uri="{BB962C8B-B14F-4D97-AF65-F5344CB8AC3E}">
@@ -11078,6 +14450,95 @@
           </a:prstGeom>
         </p:spPr>
       </p:pic>
+      <p:sp>
+        <p:nvSpPr>
+          <p:cNvPr id="78" name="Rectangle 77">
+            <a:extLst>
+              <a:ext uri="{FF2B5EF4-FFF2-40B4-BE49-F238E27FC236}">
+                <a16:creationId xmlns:a16="http://schemas.microsoft.com/office/drawing/2014/main" id="{1982C4BB-6191-68AC-3E62-B22939BA4D48}"/>
+              </a:ext>
+            </a:extLst>
+          </p:cNvPr>
+          <p:cNvSpPr/>
+          <p:nvPr/>
+        </p:nvSpPr>
+        <p:spPr>
+          <a:xfrm>
+            <a:off x="-7438227" y="2819400"/>
+            <a:ext cx="6227987" cy="923330"/>
+          </a:xfrm>
+          <a:prstGeom prst="rect">
+            <a:avLst/>
+          </a:prstGeom>
+          <a:ln>
+            <a:solidFill>
+              <a:schemeClr val="tx1"/>
+            </a:solidFill>
+          </a:ln>
+        </p:spPr>
+        <p:style>
+          <a:lnRef idx="1">
+            <a:schemeClr val="accent6"/>
+          </a:lnRef>
+          <a:fillRef idx="2">
+            <a:schemeClr val="accent6"/>
+          </a:fillRef>
+          <a:effectRef idx="1">
+            <a:schemeClr val="accent6"/>
+          </a:effectRef>
+          <a:fontRef idx="minor">
+            <a:schemeClr val="dk1"/>
+          </a:fontRef>
+        </p:style>
+        <p:txBody>
+          <a:bodyPr wrap="none" lIns="91440" tIns="45720" rIns="91440" bIns="45720">
+            <a:spAutoFit/>
+            <a:scene3d>
+              <a:camera prst="orthographicFront"/>
+              <a:lightRig rig="soft" dir="t">
+                <a:rot lat="0" lon="0" rev="15600000"/>
+              </a:lightRig>
+            </a:scene3d>
+            <a:sp3d extrusionH="57150" prstMaterial="softEdge">
+              <a:bevelT w="25400" h="38100"/>
+            </a:sp3d>
+          </a:bodyPr>
+          <a:lstStyle/>
+          <a:p>
+            <a:pPr algn="ctr"/>
+            <a:r>
+              <a:rPr lang="en-GB" sz="5400" dirty="0">
+                <a:ln w="0"/>
+                <a:solidFill>
+                  <a:schemeClr val="tx1"/>
+                </a:solidFill>
+                <a:effectLst>
+                  <a:outerShdw blurRad="38100" dist="19050" dir="2700000" algn="tl" rotWithShape="0">
+                    <a:schemeClr val="dk1">
+                      <a:alpha val="40000"/>
+                    </a:schemeClr>
+                  </a:outerShdw>
+                </a:effectLst>
+                <a:latin typeface="Patrick Hand" pitchFamily="2" charset="77"/>
+              </a:rPr>
+              <a:t>py_008_pytest_assert</a:t>
+            </a:r>
+            <a:endParaRPr lang="en-DE" sz="5400" dirty="0">
+              <a:ln w="0"/>
+              <a:solidFill>
+                <a:schemeClr val="tx1"/>
+              </a:solidFill>
+              <a:effectLst>
+                <a:outerShdw blurRad="38100" dist="19050" dir="2700000" algn="tl" rotWithShape="0">
+                  <a:schemeClr val="dk1">
+                    <a:alpha val="40000"/>
+                  </a:schemeClr>
+                </a:outerShdw>
+              </a:effectLst>
+            </a:endParaRPr>
+          </a:p>
+        </p:txBody>
+      </p:sp>
     </p:spTree>
     <p:extLst>
       <p:ext uri="{BB962C8B-B14F-4D97-AF65-F5344CB8AC3E}">
@@ -11411,6 +14872,21 @@
         </a:fontRef>
       </a:style>
     </a:lnDef>
+    <a:txDef>
+      <a:spPr>
+        <a:noFill/>
+      </a:spPr>
+      <a:bodyPr wrap="square" rtlCol="0">
+        <a:spAutoFit/>
+      </a:bodyPr>
+      <a:lstStyle>
+        <a:defPPr algn="l">
+          <a:defRPr sz="4000" dirty="0" smtClean="0">
+            <a:latin typeface="Patrick Hand" pitchFamily="2" charset="77"/>
+          </a:defRPr>
+        </a:defPPr>
+      </a:lstStyle>
+    </a:txDef>
   </a:objectDefaults>
   <a:extraClrSchemeLst/>
   <a:extLst>

</xml_diff>

<commit_message>
feat: produced new videos 015 and 016
</commit_message>
<xml_diff>
--- a/assets/get-ready.pptx
+++ b/assets/get-ready.pptx
@@ -363,6 +363,30 @@
 Tired of forgetting to close your files or database connections? The with statement in Python is your clean code superpower!
 🇺🇸 Keep your Python code safe and clean! 🇩🇪 Python: Ressourcen sicher verwalten!
 #Python #CleanCode #ProgrammingTips #ContextManager #FileHandling #CodeWithEbrahim</a:t>
+        </a:r>
+      </a:p>
+    </p188:txBody>
+  </p188:cm>
+</p188:cmLst>
+</file>
+
+<file path=ppt/comments/modernComment_122_9A36DA00.xml><?xml version="1.0" encoding="utf-8"?>
+<p188:cmLst xmlns:a="http://schemas.openxmlformats.org/drawingml/2006/main" xmlns:r="http://schemas.openxmlformats.org/officeDocument/2006/relationships" xmlns:p188="http://schemas.microsoft.com/office/powerpoint/2018/8/main">
+  <p188:cm id="{62DADDA2-3D15-FC44-A576-7980490464C2}" authorId="{8860045D-B334-310D-0A4E-9E20AA0B149E}" created="2026-01-05T00:38:35.625">
+    <pc:sldMkLst xmlns:pc="http://schemas.microsoft.com/office/powerpoint/2013/main/command">
+      <pc:docMk/>
+      <pc:sldMk cId="2587286016" sldId="290"/>
+    </pc:sldMkLst>
+    <p188:txBody>
+      <a:bodyPr/>
+      <a:lstStyle/>
+      <a:p>
+        <a:r>
+          <a:rPr lang="en-DE"/>
+          <a:t>Python f-Strings: The Faster &amp; Cleaner Way 🐍
+Are you still using % or .format() to handle strings in Python? It’s time to upgrade! 🐍✨
+f-Strings are not just more readable; they are also faster because they're evaluated
+#Python #CleanCode #ProgrammingTips #fstrings #Python3 #CodeWithEbrahim #CodingLife</a:t>
         </a:r>
       </a:p>
     </p188:txBody>
@@ -8469,6 +8493,37 @@
           <a:chExt cx="0" cy="0"/>
         </a:xfrm>
       </p:grpSpPr>
+      <p:pic>
+        <p:nvPicPr>
+          <p:cNvPr id="2" name="Picture 1">
+            <a:extLst>
+              <a:ext uri="{FF2B5EF4-FFF2-40B4-BE49-F238E27FC236}">
+                <a16:creationId xmlns:a16="http://schemas.microsoft.com/office/drawing/2014/main" id="{9F43F2C2-B062-5AB0-8070-46F523BB3B85}"/>
+              </a:ext>
+            </a:extLst>
+          </p:cNvPr>
+          <p:cNvPicPr>
+            <a:picLocks noChangeAspect="1"/>
+          </p:cNvPicPr>
+          <p:nvPr/>
+        </p:nvPicPr>
+        <p:blipFill rotWithShape="1">
+          <a:blip r:embed="rId4"/>
+          <a:srcRect l="20069" t="16107" r="11536" b="8322"/>
+          <a:stretch>
+            <a:fillRect/>
+          </a:stretch>
+        </p:blipFill>
+        <p:spPr>
+          <a:xfrm>
+            <a:off x="963121" y="3537654"/>
+            <a:ext cx="8359169" cy="11860978"/>
+          </a:xfrm>
+          <a:prstGeom prst="rect">
+            <a:avLst/>
+          </a:prstGeom>
+        </p:spPr>
+      </p:pic>
       <p:sp>
         <p:nvSpPr>
           <p:cNvPr id="9" name="TextBox 8">
@@ -8483,8 +8538,8 @@
         </p:nvSpPr>
         <p:spPr>
           <a:xfrm>
-            <a:off x="223306" y="2468165"/>
-            <a:ext cx="9838800" cy="1107996"/>
+            <a:off x="963120" y="2356655"/>
+            <a:ext cx="8359169" cy="1107996"/>
           </a:xfrm>
           <a:prstGeom prst="rect">
             <a:avLst/>
@@ -8542,7 +8597,47 @@
                 </a:effectLst>
                 <a:latin typeface="Patrick Hand" pitchFamily="2" charset="77"/>
               </a:rPr>
-              <a:t>Decoretors</a:t>
+              <a:t>Decor</a:t>
+            </a:r>
+            <a:r>
+              <a:rPr lang="en-US" sz="6600" b="1" dirty="0">
+                <a:ln w="6600">
+                  <a:solidFill>
+                    <a:schemeClr val="accent2"/>
+                  </a:solidFill>
+                  <a:prstDash val="solid"/>
+                </a:ln>
+                <a:solidFill>
+                  <a:srgbClr val="FFFFFF"/>
+                </a:solidFill>
+                <a:effectLst>
+                  <a:outerShdw dist="38100" dir="2700000" algn="tl" rotWithShape="0">
+                    <a:schemeClr val="accent2"/>
+                  </a:outerShdw>
+                </a:effectLst>
+                <a:latin typeface="Patrick Hand" pitchFamily="2" charset="77"/>
+              </a:rPr>
+              <a:t>a</a:t>
+            </a:r>
+            <a:r>
+              <a:rPr lang="en-DE" sz="6600" b="1" dirty="0">
+                <a:ln w="6600">
+                  <a:solidFill>
+                    <a:schemeClr val="accent2"/>
+                  </a:solidFill>
+                  <a:prstDash val="solid"/>
+                </a:ln>
+                <a:solidFill>
+                  <a:srgbClr val="FFFFFF"/>
+                </a:solidFill>
+                <a:effectLst>
+                  <a:outerShdw dist="38100" dir="2700000" algn="tl" rotWithShape="0">
+                    <a:schemeClr val="accent2"/>
+                  </a:outerShdw>
+                </a:effectLst>
+                <a:latin typeface="Patrick Hand" pitchFamily="2" charset="77"/>
+              </a:rPr>
+              <a:t>tors</a:t>
             </a:r>
             <a:endParaRPr lang="en-DE" sz="6600" dirty="0">
               <a:ln w="0"/>
@@ -8573,14 +8668,14 @@
           <p:nvPr/>
         </p:nvPicPr>
         <p:blipFill>
-          <a:blip r:embed="rId4"/>
+          <a:blip r:embed="rId5"/>
           <a:stretch>
             <a:fillRect/>
           </a:stretch>
         </p:blipFill>
         <p:spPr>
           <a:xfrm>
-            <a:off x="271852" y="2494115"/>
+            <a:off x="1097040" y="2382605"/>
             <a:ext cx="1063167" cy="1063167"/>
           </a:xfrm>
           <a:prstGeom prst="rect">
@@ -8604,8 +8699,8 @@
         </p:nvCxnSpPr>
         <p:spPr>
           <a:xfrm>
-            <a:off x="223579" y="7929149"/>
-            <a:ext cx="9838255" cy="0"/>
+            <a:off x="963120" y="7661523"/>
+            <a:ext cx="8359169" cy="0"/>
           </a:xfrm>
           <a:prstGeom prst="line">
             <a:avLst/>
@@ -8648,10 +8743,10 @@
           <p:nvPr/>
         </p:nvPicPr>
         <p:blipFill>
-          <a:blip r:embed="rId5">
+          <a:blip r:embed="rId6">
             <a:extLst>
               <a:ext uri="{96DAC541-7B7A-43D3-8B79-37D633B846F1}">
-                <asvg:svgBlip xmlns:asvg="http://schemas.microsoft.com/office/drawing/2016/SVG/main" r:embed="rId6"/>
+                <asvg:svgBlip xmlns:asvg="http://schemas.microsoft.com/office/drawing/2016/SVG/main" r:embed="rId7"/>
               </a:ext>
             </a:extLst>
           </a:blip>
@@ -8661,7 +8756,7 @@
         </p:blipFill>
         <p:spPr>
           <a:xfrm>
-            <a:off x="7668075" y="10358851"/>
+            <a:off x="5883882" y="8084006"/>
             <a:ext cx="914400" cy="914400"/>
           </a:xfrm>
           <a:prstGeom prst="rect">
@@ -8684,10 +8779,10 @@
           <p:nvPr/>
         </p:nvPicPr>
         <p:blipFill>
-          <a:blip r:embed="rId7">
+          <a:blip r:embed="rId8">
             <a:extLst>
               <a:ext uri="{96DAC541-7B7A-43D3-8B79-37D633B846F1}">
-                <asvg:svgBlip xmlns:asvg="http://schemas.microsoft.com/office/drawing/2016/SVG/main" r:embed="rId8"/>
+                <asvg:svgBlip xmlns:asvg="http://schemas.microsoft.com/office/drawing/2016/SVG/main" r:embed="rId9"/>
               </a:ext>
             </a:extLst>
           </a:blip>
@@ -8697,7 +8792,7 @@
         </p:blipFill>
         <p:spPr>
           <a:xfrm>
-            <a:off x="7668075" y="5575171"/>
+            <a:off x="5883882" y="6333449"/>
             <a:ext cx="914400" cy="914400"/>
           </a:xfrm>
           <a:prstGeom prst="rect">
@@ -8719,8 +8814,8 @@
         </p:nvSpPr>
         <p:spPr>
           <a:xfrm>
-            <a:off x="124279" y="12387532"/>
-            <a:ext cx="2000741" cy="646331"/>
+            <a:off x="3104712" y="15407460"/>
+            <a:ext cx="4509440" cy="707886"/>
           </a:xfrm>
           <a:prstGeom prst="rect">
             <a:avLst/>
@@ -8733,15 +8828,16 @@
           </a:bodyPr>
           <a:lstStyle/>
           <a:p>
-            <a:r>
-              <a:rPr lang="en-GB" sz="3600" dirty="0">
+            <a:pPr marL="0" algn="l" defTabSz="457200" rtl="0" eaLnBrk="1" latinLnBrk="0" hangingPunct="1"/>
+            <a:r>
+              <a:rPr lang="en-US" sz="4000" dirty="0">
                 <a:solidFill>
                   <a:schemeClr val="bg1"/>
                 </a:solidFill>
               </a:rPr>
-              <a:t>Reusable:</a:t>
-            </a:r>
-            <a:endParaRPr lang="en-DE" sz="3600" dirty="0">
+              <a:t>Powerful &amp; Reusable</a:t>
+            </a:r>
+            <a:endParaRPr lang="en-DE" sz="4000" dirty="0">
               <a:solidFill>
                 <a:schemeClr val="bg1"/>
               </a:solidFill>
@@ -8763,8 +8859,8 @@
         </p:nvSpPr>
         <p:spPr>
           <a:xfrm>
-            <a:off x="2008547" y="12387532"/>
-            <a:ext cx="8040984" cy="769441"/>
+            <a:off x="202892" y="16076093"/>
+            <a:ext cx="9879628" cy="769441"/>
           </a:xfrm>
           <a:prstGeom prst="rect">
             <a:avLst/>
@@ -8781,87 +8877,7 @@
               <a:rPr lang="en-GB" sz="4400" dirty="0">
                 <a:latin typeface="Patrick Hand" pitchFamily="2" charset="77"/>
               </a:rPr>
-              <a:t>Write the logic once, use if everywhere</a:t>
-            </a:r>
-            <a:endParaRPr lang="en-DE" sz="4400" dirty="0">
-              <a:latin typeface="Patrick Hand" pitchFamily="2" charset="77"/>
-            </a:endParaRPr>
-          </a:p>
-        </p:txBody>
-      </p:sp>
-      <p:sp>
-        <p:nvSpPr>
-          <p:cNvPr id="23" name="TextBox 22">
-            <a:extLst>
-              <a:ext uri="{FF2B5EF4-FFF2-40B4-BE49-F238E27FC236}">
-                <a16:creationId xmlns:a16="http://schemas.microsoft.com/office/drawing/2014/main" id="{0B5AB7AE-FDDE-F521-0E84-263E12DC19C4}"/>
-              </a:ext>
-            </a:extLst>
-          </p:cNvPr>
-          <p:cNvSpPr txBox="1"/>
-          <p:nvPr/>
-        </p:nvSpPr>
-        <p:spPr>
-          <a:xfrm>
-            <a:off x="2008547" y="13207674"/>
-            <a:ext cx="8231741" cy="769441"/>
-          </a:xfrm>
-          <a:prstGeom prst="rect">
-            <a:avLst/>
-          </a:prstGeom>
-          <a:noFill/>
-        </p:spPr>
-        <p:txBody>
-          <a:bodyPr wrap="none" rtlCol="0">
-            <a:spAutoFit/>
-          </a:bodyPr>
-          <a:lstStyle/>
-          <a:p>
-            <a:r>
-              <a:rPr lang="en-GB" sz="4400" dirty="0">
-                <a:latin typeface="Patrick Hand" pitchFamily="2" charset="77"/>
-              </a:rPr>
-              <a:t>Keeps your core function logic readable</a:t>
-            </a:r>
-            <a:endParaRPr lang="en-DE" sz="4400" dirty="0">
-              <a:latin typeface="Patrick Hand" pitchFamily="2" charset="77"/>
-            </a:endParaRPr>
-          </a:p>
-        </p:txBody>
-      </p:sp>
-      <p:sp>
-        <p:nvSpPr>
-          <p:cNvPr id="24" name="TextBox 23">
-            <a:extLst>
-              <a:ext uri="{FF2B5EF4-FFF2-40B4-BE49-F238E27FC236}">
-                <a16:creationId xmlns:a16="http://schemas.microsoft.com/office/drawing/2014/main" id="{8DE4F7AD-7DCB-D486-C377-47A73B19A851}"/>
-              </a:ext>
-            </a:extLst>
-          </p:cNvPr>
-          <p:cNvSpPr txBox="1"/>
-          <p:nvPr/>
-        </p:nvSpPr>
-        <p:spPr>
-          <a:xfrm>
-            <a:off x="2008547" y="14027816"/>
-            <a:ext cx="8318303" cy="769441"/>
-          </a:xfrm>
-          <a:prstGeom prst="rect">
-            <a:avLst/>
-          </a:prstGeom>
-          <a:noFill/>
-        </p:spPr>
-        <p:txBody>
-          <a:bodyPr wrap="none" rtlCol="0">
-            <a:spAutoFit/>
-          </a:bodyPr>
-          <a:lstStyle/>
-          <a:p>
-            <a:r>
-              <a:rPr lang="en-GB" sz="4400" dirty="0">
-                <a:latin typeface="Patrick Hand" pitchFamily="2" charset="77"/>
-              </a:rPr>
-              <a:t>The professional way to extend </a:t>
+              <a:t>Extend </a:t>
             </a:r>
             <a:r>
               <a:rPr lang="en-GB" sz="4400" dirty="0" err="1">
@@ -8869,96 +8885,14 @@
               </a:rPr>
               <a:t>behavior</a:t>
             </a:r>
+            <a:r>
+              <a:rPr lang="en-GB" sz="4400" dirty="0">
+                <a:latin typeface="Patrick Hand" pitchFamily="2" charset="77"/>
+              </a:rPr>
+              <a:t> without changing the core logic</a:t>
+            </a:r>
             <a:endParaRPr lang="en-DE" sz="4400" dirty="0">
               <a:latin typeface="Patrick Hand" pitchFamily="2" charset="77"/>
-            </a:endParaRPr>
-          </a:p>
-        </p:txBody>
-      </p:sp>
-      <p:sp>
-        <p:nvSpPr>
-          <p:cNvPr id="25" name="TextBox 24">
-            <a:extLst>
-              <a:ext uri="{FF2B5EF4-FFF2-40B4-BE49-F238E27FC236}">
-                <a16:creationId xmlns:a16="http://schemas.microsoft.com/office/drawing/2014/main" id="{23CB8D42-1B49-C015-A397-76B34C4AEA4F}"/>
-              </a:ext>
-            </a:extLst>
-          </p:cNvPr>
-          <p:cNvSpPr txBox="1"/>
-          <p:nvPr/>
-        </p:nvSpPr>
-        <p:spPr>
-          <a:xfrm>
-            <a:off x="124279" y="13207674"/>
-            <a:ext cx="1353256" cy="646331"/>
-          </a:xfrm>
-          <a:prstGeom prst="rect">
-            <a:avLst/>
-          </a:prstGeom>
-          <a:noFill/>
-        </p:spPr>
-        <p:txBody>
-          <a:bodyPr wrap="none" rtlCol="0">
-            <a:spAutoFit/>
-          </a:bodyPr>
-          <a:lstStyle/>
-          <a:p>
-            <a:r>
-              <a:rPr lang="en-GB" sz="3600" dirty="0">
-                <a:solidFill>
-                  <a:schemeClr val="bg1"/>
-                </a:solidFill>
-              </a:rPr>
-              <a:t>Clean:</a:t>
-            </a:r>
-            <a:endParaRPr lang="en-DE" sz="3600" dirty="0">
-              <a:solidFill>
-                <a:schemeClr val="bg1"/>
-              </a:solidFill>
-            </a:endParaRPr>
-          </a:p>
-        </p:txBody>
-      </p:sp>
-      <p:sp>
-        <p:nvSpPr>
-          <p:cNvPr id="26" name="TextBox 25">
-            <a:extLst>
-              <a:ext uri="{FF2B5EF4-FFF2-40B4-BE49-F238E27FC236}">
-                <a16:creationId xmlns:a16="http://schemas.microsoft.com/office/drawing/2014/main" id="{D44F2063-4801-CB91-C048-5E528FED3270}"/>
-              </a:ext>
-            </a:extLst>
-          </p:cNvPr>
-          <p:cNvSpPr txBox="1"/>
-          <p:nvPr/>
-        </p:nvSpPr>
-        <p:spPr>
-          <a:xfrm>
-            <a:off x="124279" y="14027816"/>
-            <a:ext cx="1691425" cy="646331"/>
-          </a:xfrm>
-          <a:prstGeom prst="rect">
-            <a:avLst/>
-          </a:prstGeom>
-          <a:noFill/>
-        </p:spPr>
-        <p:txBody>
-          <a:bodyPr wrap="none" rtlCol="0">
-            <a:spAutoFit/>
-          </a:bodyPr>
-          <a:lstStyle/>
-          <a:p>
-            <a:r>
-              <a:rPr lang="en-GB" sz="3600" dirty="0">
-                <a:solidFill>
-                  <a:schemeClr val="bg1"/>
-                </a:solidFill>
-              </a:rPr>
-              <a:t>Elegant:</a:t>
-            </a:r>
-            <a:endParaRPr lang="en-DE" sz="3600" dirty="0">
-              <a:solidFill>
-                <a:schemeClr val="bg1"/>
-              </a:solidFill>
             </a:endParaRPr>
           </a:p>
         </p:txBody>
@@ -9093,151 +9027,161 @@
           <a:chExt cx="0" cy="0"/>
         </a:xfrm>
       </p:grpSpPr>
-      <p:grpSp>
-        <p:nvGrpSpPr>
-          <p:cNvPr id="23" name="Group 22">
-            <a:extLst>
-              <a:ext uri="{FF2B5EF4-FFF2-40B4-BE49-F238E27FC236}">
-                <a16:creationId xmlns:a16="http://schemas.microsoft.com/office/drawing/2014/main" id="{A5510903-B9DD-D124-C83B-60D6C500B19D}"/>
-              </a:ext>
-            </a:extLst>
-          </p:cNvPr>
-          <p:cNvGrpSpPr/>
-          <p:nvPr/>
-        </p:nvGrpSpPr>
-        <p:grpSpPr>
+      <p:pic>
+        <p:nvPicPr>
+          <p:cNvPr id="10" name="Picture 9">
+            <a:extLst>
+              <a:ext uri="{FF2B5EF4-FFF2-40B4-BE49-F238E27FC236}">
+                <a16:creationId xmlns:a16="http://schemas.microsoft.com/office/drawing/2014/main" id="{DB527F96-D69C-E9DE-95C3-EFD7D7FB10AA}"/>
+              </a:ext>
+            </a:extLst>
+          </p:cNvPr>
+          <p:cNvPicPr>
+            <a:picLocks noChangeAspect="1"/>
+          </p:cNvPicPr>
+          <p:nvPr/>
+        </p:nvPicPr>
+        <p:blipFill rotWithShape="1">
+          <a:blip r:embed="rId3"/>
+          <a:srcRect l="19291" t="19079" r="10810" b="12309"/>
+          <a:stretch>
+            <a:fillRect/>
+          </a:stretch>
+        </p:blipFill>
+        <p:spPr>
+          <a:xfrm>
+            <a:off x="236178" y="4227986"/>
+            <a:ext cx="9838800" cy="9514154"/>
+          </a:xfrm>
+          <a:prstGeom prst="rect">
+            <a:avLst/>
+          </a:prstGeom>
+        </p:spPr>
+      </p:pic>
+      <p:sp>
+        <p:nvSpPr>
+          <p:cNvPr id="4" name="TextBox 3">
+            <a:extLst>
+              <a:ext uri="{FF2B5EF4-FFF2-40B4-BE49-F238E27FC236}">
+                <a16:creationId xmlns:a16="http://schemas.microsoft.com/office/drawing/2014/main" id="{68103D25-9216-BAB2-ACB7-9FFD1936580E}"/>
+              </a:ext>
+            </a:extLst>
+          </p:cNvPr>
+          <p:cNvSpPr txBox="1"/>
+          <p:nvPr/>
+        </p:nvSpPr>
+        <p:spPr>
           <a:xfrm>
             <a:off x="223306" y="2872200"/>
             <a:ext cx="9838800" cy="1107996"/>
-            <a:chOff x="223306" y="2872200"/>
-            <a:chExt cx="9838800" cy="1107996"/>
-          </a:xfrm>
-        </p:grpSpPr>
-        <p:sp>
-          <p:nvSpPr>
-            <p:cNvPr id="4" name="TextBox 3">
-              <a:extLst>
-                <a:ext uri="{FF2B5EF4-FFF2-40B4-BE49-F238E27FC236}">
-                  <a16:creationId xmlns:a16="http://schemas.microsoft.com/office/drawing/2014/main" id="{68103D25-9216-BAB2-ACB7-9FFD1936580E}"/>
-                </a:ext>
-              </a:extLst>
-            </p:cNvPr>
-            <p:cNvSpPr txBox="1"/>
-            <p:nvPr/>
-          </p:nvSpPr>
-          <p:spPr>
-            <a:xfrm>
-              <a:off x="223306" y="2872200"/>
-              <a:ext cx="9838800" cy="1107996"/>
-            </a:xfrm>
-            <a:prstGeom prst="rect">
-              <a:avLst/>
-            </a:prstGeom>
-            <a:ln/>
-          </p:spPr>
-          <p:style>
-            <a:lnRef idx="1">
-              <a:schemeClr val="accent6"/>
-            </a:lnRef>
-            <a:fillRef idx="2">
-              <a:schemeClr val="accent6"/>
-            </a:fillRef>
-            <a:effectRef idx="1">
-              <a:schemeClr val="accent6"/>
-            </a:effectRef>
-            <a:fontRef idx="minor">
-              <a:schemeClr val="dk1"/>
-            </a:fontRef>
-          </p:style>
-          <p:txBody>
-            <a:bodyPr wrap="square" rtlCol="0">
-              <a:spAutoFit/>
-              <a:scene3d>
-                <a:camera prst="orthographicFront"/>
-                <a:lightRig rig="harsh" dir="t"/>
-              </a:scene3d>
-              <a:sp3d extrusionH="57150" prstMaterial="matte">
-                <a:bevelT w="63500" h="12700" prst="angle"/>
-                <a:contourClr>
-                  <a:schemeClr val="bg1">
-                    <a:lumMod val="65000"/>
-                  </a:schemeClr>
-                </a:contourClr>
-              </a:sp3d>
-            </a:bodyPr>
-            <a:lstStyle/>
-            <a:p>
-              <a:pPr algn="ctr"/>
-              <a:r>
-                <a:rPr lang="en-GB" sz="6600" dirty="0"/>
-                <a:t>F-Strings </a:t>
-              </a:r>
-              <a:r>
-                <a:rPr lang="en-GB" sz="6600" b="1" dirty="0">
-                  <a:ln w="22225">
-                    <a:solidFill>
-                      <a:schemeClr val="accent2"/>
-                    </a:solidFill>
-                    <a:prstDash val="solid"/>
-                  </a:ln>
+          </a:xfrm>
+          <a:prstGeom prst="rect">
+            <a:avLst/>
+          </a:prstGeom>
+          <a:ln/>
+        </p:spPr>
+        <p:style>
+          <a:lnRef idx="1">
+            <a:schemeClr val="accent6"/>
+          </a:lnRef>
+          <a:fillRef idx="2">
+            <a:schemeClr val="accent6"/>
+          </a:fillRef>
+          <a:effectRef idx="1">
+            <a:schemeClr val="accent6"/>
+          </a:effectRef>
+          <a:fontRef idx="minor">
+            <a:schemeClr val="dk1"/>
+          </a:fontRef>
+        </p:style>
+        <p:txBody>
+          <a:bodyPr wrap="square" rtlCol="0">
+            <a:spAutoFit/>
+            <a:scene3d>
+              <a:camera prst="orthographicFront"/>
+              <a:lightRig rig="harsh" dir="t"/>
+            </a:scene3d>
+            <a:sp3d extrusionH="57150" prstMaterial="matte">
+              <a:bevelT w="63500" h="12700" prst="angle"/>
+              <a:contourClr>
+                <a:schemeClr val="bg1">
+                  <a:lumMod val="65000"/>
+                </a:schemeClr>
+              </a:contourClr>
+            </a:sp3d>
+          </a:bodyPr>
+          <a:lstStyle/>
+          <a:p>
+            <a:pPr algn="ctr"/>
+            <a:r>
+              <a:rPr lang="en-GB" sz="6600" dirty="0"/>
+              <a:t>F-Strings </a:t>
+            </a:r>
+            <a:r>
+              <a:rPr lang="en-GB" sz="6600" b="1" dirty="0">
+                <a:ln w="22225">
                   <a:solidFill>
-                    <a:srgbClr val="00B0F0"/>
+                    <a:schemeClr val="accent2"/>
                   </a:solidFill>
-                </a:rPr>
-                <a:t>vs</a:t>
-              </a:r>
-              <a:r>
-                <a:rPr lang="en-GB" sz="6600" dirty="0"/>
-                <a:t> Format</a:t>
-              </a:r>
-              <a:endParaRPr lang="en-GB" b="1" dirty="0">
-                <a:ln w="0"/>
+                  <a:prstDash val="solid"/>
+                </a:ln>
                 <a:solidFill>
-                  <a:schemeClr val="tx1"/>
+                  <a:srgbClr val="00B0F0"/>
                 </a:solidFill>
-                <a:effectLst>
-                  <a:outerShdw blurRad="38100" dist="25400" dir="5400000" algn="ctr" rotWithShape="0">
-                    <a:srgbClr val="6E747A">
-                      <a:alpha val="43000"/>
-                    </a:srgbClr>
-                  </a:outerShdw>
-                </a:effectLst>
-                <a:latin typeface="Patrick Hand" pitchFamily="2" charset="77"/>
-              </a:endParaRPr>
-            </a:p>
-          </p:txBody>
-        </p:sp>
-        <p:pic>
-          <p:nvPicPr>
-            <p:cNvPr id="5" name="Picture 4">
-              <a:extLst>
-                <a:ext uri="{FF2B5EF4-FFF2-40B4-BE49-F238E27FC236}">
-                  <a16:creationId xmlns:a16="http://schemas.microsoft.com/office/drawing/2014/main" id="{2C4B819E-3D27-043B-A206-CB6B14345940}"/>
-                </a:ext>
-              </a:extLst>
-            </p:cNvPr>
-            <p:cNvPicPr>
-              <a:picLocks noChangeAspect="1"/>
-            </p:cNvPicPr>
-            <p:nvPr/>
-          </p:nvPicPr>
-          <p:blipFill>
-            <a:blip r:embed="rId2"/>
-            <a:stretch>
-              <a:fillRect/>
-            </a:stretch>
-          </p:blipFill>
-          <p:spPr>
-            <a:xfrm>
-              <a:off x="264001" y="2906105"/>
-              <a:ext cx="1063167" cy="1063167"/>
-            </a:xfrm>
-            <a:prstGeom prst="rect">
-              <a:avLst/>
-            </a:prstGeom>
-          </p:spPr>
-        </p:pic>
-      </p:grpSp>
+              </a:rPr>
+              <a:t>vs</a:t>
+            </a:r>
+            <a:r>
+              <a:rPr lang="en-GB" sz="6600" dirty="0"/>
+              <a:t> Format</a:t>
+            </a:r>
+            <a:endParaRPr lang="en-GB" b="1" dirty="0">
+              <a:ln w="0"/>
+              <a:solidFill>
+                <a:schemeClr val="tx1"/>
+              </a:solidFill>
+              <a:effectLst>
+                <a:outerShdw blurRad="38100" dist="25400" dir="5400000" algn="ctr" rotWithShape="0">
+                  <a:srgbClr val="6E747A">
+                    <a:alpha val="43000"/>
+                  </a:srgbClr>
+                </a:outerShdw>
+              </a:effectLst>
+              <a:latin typeface="Patrick Hand" pitchFamily="2" charset="77"/>
+            </a:endParaRPr>
+          </a:p>
+        </p:txBody>
+      </p:sp>
+      <p:pic>
+        <p:nvPicPr>
+          <p:cNvPr id="5" name="Picture 4">
+            <a:extLst>
+              <a:ext uri="{FF2B5EF4-FFF2-40B4-BE49-F238E27FC236}">
+                <a16:creationId xmlns:a16="http://schemas.microsoft.com/office/drawing/2014/main" id="{2C4B819E-3D27-043B-A206-CB6B14345940}"/>
+              </a:ext>
+            </a:extLst>
+          </p:cNvPr>
+          <p:cNvPicPr>
+            <a:picLocks noChangeAspect="1"/>
+          </p:cNvPicPr>
+          <p:nvPr/>
+        </p:nvPicPr>
+        <p:blipFill>
+          <a:blip r:embed="rId4"/>
+          <a:stretch>
+            <a:fillRect/>
+          </a:stretch>
+        </p:blipFill>
+        <p:spPr>
+          <a:xfrm>
+            <a:off x="264001" y="2906105"/>
+            <a:ext cx="1063167" cy="1063167"/>
+          </a:xfrm>
+          <a:prstGeom prst="rect">
+            <a:avLst/>
+          </a:prstGeom>
+        </p:spPr>
+      </p:pic>
       <p:sp>
         <p:nvSpPr>
           <p:cNvPr id="7" name="TextBox 6">
@@ -9252,7 +9196,7 @@
         </p:nvSpPr>
         <p:spPr>
           <a:xfrm>
-            <a:off x="223306" y="11731083"/>
+            <a:off x="223306" y="13872121"/>
             <a:ext cx="2422971" cy="707886"/>
           </a:xfrm>
           <a:prstGeom prst="rect">
@@ -9292,7 +9236,7 @@
         </p:nvSpPr>
         <p:spPr>
           <a:xfrm>
-            <a:off x="2381255" y="11731083"/>
+            <a:off x="2381255" y="13872121"/>
             <a:ext cx="7543776" cy="707886"/>
           </a:xfrm>
           <a:prstGeom prst="rect">
@@ -9332,7 +9276,7 @@
         </p:nvSpPr>
         <p:spPr>
           <a:xfrm>
-            <a:off x="223306" y="12814182"/>
+            <a:off x="223306" y="14955220"/>
             <a:ext cx="1727909" cy="707886"/>
           </a:xfrm>
           <a:prstGeom prst="rect">
@@ -9368,7 +9312,7 @@
         </p:nvSpPr>
         <p:spPr>
           <a:xfrm>
-            <a:off x="2369994" y="12804706"/>
+            <a:off x="2369994" y="14945744"/>
             <a:ext cx="7915419" cy="707886"/>
           </a:xfrm>
           <a:prstGeom prst="rect">
@@ -9408,7 +9352,7 @@
         </p:nvSpPr>
         <p:spPr>
           <a:xfrm>
-            <a:off x="223306" y="13897281"/>
+            <a:off x="223306" y="16038319"/>
             <a:ext cx="2157963" cy="707886"/>
           </a:xfrm>
           <a:prstGeom prst="rect">
@@ -9444,7 +9388,7 @@
         </p:nvSpPr>
         <p:spPr>
           <a:xfrm>
-            <a:off x="2381269" y="13878330"/>
+            <a:off x="2381269" y="16019368"/>
             <a:ext cx="7543309" cy="707886"/>
           </a:xfrm>
           <a:prstGeom prst="rect">
@@ -9470,6 +9414,101 @@
           </a:p>
         </p:txBody>
       </p:sp>
+      <p:pic>
+        <p:nvPicPr>
+          <p:cNvPr id="18" name="Graphic 17" descr="Shield Tick with solid fill">
+            <a:extLst>
+              <a:ext uri="{FF2B5EF4-FFF2-40B4-BE49-F238E27FC236}">
+                <a16:creationId xmlns:a16="http://schemas.microsoft.com/office/drawing/2014/main" id="{ACE77A71-8D07-48B7-30F8-7E68A4376FB7}"/>
+              </a:ext>
+            </a:extLst>
+          </p:cNvPr>
+          <p:cNvPicPr>
+            <a:picLocks noChangeAspect="1"/>
+          </p:cNvPicPr>
+          <p:nvPr/>
+        </p:nvPicPr>
+        <p:blipFill>
+          <a:blip r:embed="rId5">
+            <a:extLst>
+              <a:ext uri="{96DAC541-7B7A-43D3-8B79-37D633B846F1}">
+                <asvg:svgBlip xmlns:asvg="http://schemas.microsoft.com/office/drawing/2016/SVG/main" r:embed="rId6"/>
+              </a:ext>
+            </a:extLst>
+          </a:blip>
+          <a:stretch>
+            <a:fillRect/>
+          </a:stretch>
+        </p:blipFill>
+        <p:spPr>
+          <a:xfrm>
+            <a:off x="754331" y="12429350"/>
+            <a:ext cx="914400" cy="914400"/>
+          </a:xfrm>
+          <a:prstGeom prst="rect">
+            <a:avLst/>
+          </a:prstGeom>
+        </p:spPr>
+      </p:pic>
+      <p:sp>
+        <p:nvSpPr>
+          <p:cNvPr id="25" name="TextBox 24">
+            <a:extLst>
+              <a:ext uri="{FF2B5EF4-FFF2-40B4-BE49-F238E27FC236}">
+                <a16:creationId xmlns:a16="http://schemas.microsoft.com/office/drawing/2014/main" id="{E69FC5ED-505E-33C0-5388-8BBC9AF48473}"/>
+              </a:ext>
+            </a:extLst>
+          </p:cNvPr>
+          <p:cNvSpPr txBox="1"/>
+          <p:nvPr/>
+        </p:nvSpPr>
+        <p:spPr>
+          <a:xfrm>
+            <a:off x="-7857400" y="2527667"/>
+            <a:ext cx="7104830" cy="830997"/>
+          </a:xfrm>
+          <a:prstGeom prst="rect">
+            <a:avLst/>
+          </a:prstGeom>
+        </p:spPr>
+        <p:style>
+          <a:lnRef idx="1">
+            <a:schemeClr val="accent2"/>
+          </a:lnRef>
+          <a:fillRef idx="2">
+            <a:schemeClr val="accent2"/>
+          </a:fillRef>
+          <a:effectRef idx="1">
+            <a:schemeClr val="accent2"/>
+          </a:effectRef>
+          <a:fontRef idx="minor">
+            <a:schemeClr val="dk1"/>
+          </a:fontRef>
+        </p:style>
+        <p:txBody>
+          <a:bodyPr wrap="none" rtlCol="0">
+            <a:spAutoFit/>
+          </a:bodyPr>
+          <a:lstStyle/>
+          <a:p>
+            <a:r>
+              <a:rPr lang="en-US" sz="4800" dirty="0">
+                <a:solidFill>
+                  <a:srgbClr val="FF0000"/>
+                </a:solidFill>
+                <a:latin typeface="Patrick Hand" pitchFamily="2" charset="77"/>
+              </a:rPr>
+              <a:t>py_016_f_strings_vs_format</a:t>
+            </a:r>
+            <a:endParaRPr lang="en-DE" sz="4800" dirty="0">
+              <a:solidFill>
+                <a:srgbClr val="FF0000"/>
+              </a:solidFill>
+              <a:latin typeface="Patrick Hand" pitchFamily="2" charset="77"/>
+            </a:endParaRPr>
+          </a:p>
+        </p:txBody>
+      </p:sp>
       <p:cxnSp>
         <p:nvCxnSpPr>
           <p:cNvPr id="17" name="Straight Connector 16">
@@ -9486,7 +9525,7 @@
         </p:nvCxnSpPr>
         <p:spPr>
           <a:xfrm>
-            <a:off x="223579" y="8410989"/>
+            <a:off x="236451" y="8767822"/>
             <a:ext cx="9838255" cy="0"/>
           </a:xfrm>
           <a:prstGeom prst="line">
@@ -9494,7 +9533,7 @@
           </a:prstGeom>
           <a:ln w="38100">
             <a:solidFill>
-              <a:srgbClr val="FFC000"/>
+              <a:schemeClr val="bg1"/>
             </a:solidFill>
             <a:headEnd type="none"/>
             <a:tailEnd type="none" w="lg" len="lg"/>
@@ -9517,10 +9556,10 @@
       </p:cxnSp>
       <p:pic>
         <p:nvPicPr>
-          <p:cNvPr id="18" name="Graphic 17" descr="Shield Tick with solid fill">
-            <a:extLst>
-              <a:ext uri="{FF2B5EF4-FFF2-40B4-BE49-F238E27FC236}">
-                <a16:creationId xmlns:a16="http://schemas.microsoft.com/office/drawing/2014/main" id="{ACE77A71-8D07-48B7-30F8-7E68A4376FB7}"/>
+          <p:cNvPr id="19" name="Graphic 18" descr="Close with solid fill">
+            <a:extLst>
+              <a:ext uri="{FF2B5EF4-FFF2-40B4-BE49-F238E27FC236}">
+                <a16:creationId xmlns:a16="http://schemas.microsoft.com/office/drawing/2014/main" id="{C1FF8D1C-0DE8-68A0-48D5-B6ED8B1B7C75}"/>
               </a:ext>
             </a:extLst>
           </p:cNvPr>
@@ -9530,10 +9569,10 @@
           <p:nvPr/>
         </p:nvPicPr>
         <p:blipFill>
-          <a:blip r:embed="rId3">
+          <a:blip r:embed="rId7">
             <a:extLst>
               <a:ext uri="{96DAC541-7B7A-43D3-8B79-37D633B846F1}">
-                <asvg:svgBlip xmlns:asvg="http://schemas.microsoft.com/office/drawing/2016/SVG/main" r:embed="rId4"/>
+                <asvg:svgBlip xmlns:asvg="http://schemas.microsoft.com/office/drawing/2016/SVG/main" r:embed="rId8"/>
               </a:ext>
             </a:extLst>
           </a:blip>
@@ -9543,7 +9582,7 @@
         </p:blipFill>
         <p:spPr>
           <a:xfrm>
-            <a:off x="7668075" y="8637940"/>
+            <a:off x="767203" y="7809557"/>
             <a:ext cx="914400" cy="914400"/>
           </a:xfrm>
           <a:prstGeom prst="rect">
@@ -9551,12 +9590,57 @@
           </a:prstGeom>
         </p:spPr>
       </p:pic>
+      <p:cxnSp>
+        <p:nvCxnSpPr>
+          <p:cNvPr id="14" name="Straight Connector 13">
+            <a:extLst>
+              <a:ext uri="{FF2B5EF4-FFF2-40B4-BE49-F238E27FC236}">
+                <a16:creationId xmlns:a16="http://schemas.microsoft.com/office/drawing/2014/main" id="{ADE21DD3-BC0C-FFAD-871E-662DE0033853}"/>
+              </a:ext>
+            </a:extLst>
+          </p:cNvPr>
+          <p:cNvCxnSpPr>
+            <a:cxnSpLocks/>
+          </p:cNvCxnSpPr>
+          <p:nvPr/>
+        </p:nvCxnSpPr>
+        <p:spPr>
+          <a:xfrm>
+            <a:off x="232736" y="10659811"/>
+            <a:ext cx="9838255" cy="0"/>
+          </a:xfrm>
+          <a:prstGeom prst="line">
+            <a:avLst/>
+          </a:prstGeom>
+          <a:ln w="38100">
+            <a:solidFill>
+              <a:schemeClr val="bg1"/>
+            </a:solidFill>
+            <a:headEnd type="none"/>
+            <a:tailEnd type="none" w="lg" len="lg"/>
+          </a:ln>
+        </p:spPr>
+        <p:style>
+          <a:lnRef idx="1">
+            <a:schemeClr val="accent1"/>
+          </a:lnRef>
+          <a:fillRef idx="0">
+            <a:schemeClr val="accent1"/>
+          </a:fillRef>
+          <a:effectRef idx="0">
+            <a:schemeClr val="accent1"/>
+          </a:effectRef>
+          <a:fontRef idx="minor">
+            <a:schemeClr val="tx1"/>
+          </a:fontRef>
+        </p:style>
+      </p:cxnSp>
       <p:pic>
         <p:nvPicPr>
-          <p:cNvPr id="19" name="Graphic 18" descr="Close with solid fill">
-            <a:extLst>
-              <a:ext uri="{FF2B5EF4-FFF2-40B4-BE49-F238E27FC236}">
-                <a16:creationId xmlns:a16="http://schemas.microsoft.com/office/drawing/2014/main" id="{C1FF8D1C-0DE8-68A0-48D5-B6ED8B1B7C75}"/>
+          <p:cNvPr id="15" name="Graphic 14" descr="Close with solid fill">
+            <a:extLst>
+              <a:ext uri="{FF2B5EF4-FFF2-40B4-BE49-F238E27FC236}">
+                <a16:creationId xmlns:a16="http://schemas.microsoft.com/office/drawing/2014/main" id="{54038AA9-B89F-0FCE-89F0-93FC98974320}"/>
               </a:ext>
             </a:extLst>
           </p:cNvPr>
@@ -9566,10 +9650,10 @@
           <p:nvPr/>
         </p:nvPicPr>
         <p:blipFill>
-          <a:blip r:embed="rId5">
+          <a:blip r:embed="rId7">
             <a:extLst>
               <a:ext uri="{96DAC541-7B7A-43D3-8B79-37D633B846F1}">
-                <asvg:svgBlip xmlns:asvg="http://schemas.microsoft.com/office/drawing/2016/SVG/main" r:embed="rId6"/>
+                <asvg:svgBlip xmlns:asvg="http://schemas.microsoft.com/office/drawing/2016/SVG/main" r:embed="rId8"/>
               </a:ext>
             </a:extLst>
           </a:blip>
@@ -9579,7 +9663,7 @@
         </p:blipFill>
         <p:spPr>
           <a:xfrm>
-            <a:off x="7668075" y="6560627"/>
+            <a:off x="767203" y="9701540"/>
             <a:ext cx="914400" cy="914400"/>
           </a:xfrm>
           <a:prstGeom prst="rect">
@@ -9587,65 +9671,51 @@
           </a:prstGeom>
         </p:spPr>
       </p:pic>
-      <p:sp>
-        <p:nvSpPr>
-          <p:cNvPr id="25" name="TextBox 24">
-            <a:extLst>
-              <a:ext uri="{FF2B5EF4-FFF2-40B4-BE49-F238E27FC236}">
-                <a16:creationId xmlns:a16="http://schemas.microsoft.com/office/drawing/2014/main" id="{E69FC5ED-505E-33C0-5388-8BBC9AF48473}"/>
-              </a:ext>
-            </a:extLst>
-          </p:cNvPr>
-          <p:cNvSpPr txBox="1"/>
-          <p:nvPr/>
-        </p:nvSpPr>
-        <p:spPr>
-          <a:xfrm>
-            <a:off x="-7857400" y="2527667"/>
-            <a:ext cx="7104830" cy="830997"/>
-          </a:xfrm>
-          <a:prstGeom prst="rect">
-            <a:avLst/>
-          </a:prstGeom>
+      <p:cxnSp>
+        <p:nvCxnSpPr>
+          <p:cNvPr id="16" name="Straight Connector 15">
+            <a:extLst>
+              <a:ext uri="{FF2B5EF4-FFF2-40B4-BE49-F238E27FC236}">
+                <a16:creationId xmlns:a16="http://schemas.microsoft.com/office/drawing/2014/main" id="{66790796-F6C2-8B89-95FA-2E549CC68251}"/>
+              </a:ext>
+            </a:extLst>
+          </p:cNvPr>
+          <p:cNvCxnSpPr>
+            <a:cxnSpLocks/>
+          </p:cNvCxnSpPr>
+          <p:nvPr/>
+        </p:nvCxnSpPr>
+        <p:spPr>
+          <a:xfrm>
+            <a:off x="210435" y="6846096"/>
+            <a:ext cx="9838255" cy="0"/>
+          </a:xfrm>
+          <a:prstGeom prst="line">
+            <a:avLst/>
+          </a:prstGeom>
+          <a:ln w="38100">
+            <a:solidFill>
+              <a:schemeClr val="bg1"/>
+            </a:solidFill>
+            <a:headEnd type="none"/>
+            <a:tailEnd type="none" w="lg" len="lg"/>
+          </a:ln>
         </p:spPr>
         <p:style>
           <a:lnRef idx="1">
-            <a:schemeClr val="accent2"/>
+            <a:schemeClr val="accent1"/>
           </a:lnRef>
-          <a:fillRef idx="2">
-            <a:schemeClr val="accent2"/>
+          <a:fillRef idx="0">
+            <a:schemeClr val="accent1"/>
           </a:fillRef>
-          <a:effectRef idx="1">
-            <a:schemeClr val="accent2"/>
+          <a:effectRef idx="0">
+            <a:schemeClr val="accent1"/>
           </a:effectRef>
           <a:fontRef idx="minor">
-            <a:schemeClr val="dk1"/>
+            <a:schemeClr val="tx1"/>
           </a:fontRef>
         </p:style>
-        <p:txBody>
-          <a:bodyPr wrap="none" rtlCol="0">
-            <a:spAutoFit/>
-          </a:bodyPr>
-          <a:lstStyle/>
-          <a:p>
-            <a:r>
-              <a:rPr lang="en-US" sz="4800" dirty="0">
-                <a:solidFill>
-                  <a:srgbClr val="FF0000"/>
-                </a:solidFill>
-                <a:latin typeface="Patrick Hand" pitchFamily="2" charset="77"/>
-              </a:rPr>
-              <a:t>py_016_f_strings_vs_format</a:t>
-            </a:r>
-            <a:endParaRPr lang="en-DE" sz="4800" dirty="0">
-              <a:solidFill>
-                <a:srgbClr val="FF0000"/>
-              </a:solidFill>
-              <a:latin typeface="Patrick Hand" pitchFamily="2" charset="77"/>
-            </a:endParaRPr>
-          </a:p>
-        </p:txBody>
-      </p:sp>
+      </p:cxnSp>
     </p:spTree>
     <p:extLst>
       <p:ext uri="{BB962C8B-B14F-4D97-AF65-F5344CB8AC3E}">
@@ -9656,6 +9726,11 @@
   <p:clrMapOvr>
     <a:masterClrMapping/>
   </p:clrMapOvr>
+  <p:extLst>
+    <p:ext uri="{6950BFC3-D8DA-4A85-94F7-54DA5524770B}">
+      <p188:commentRel xmlns:p188="http://schemas.microsoft.com/office/powerpoint/2018/8/main" r:id="rId2"/>
+    </p:ext>
+  </p:extLst>
 </p:sld>
 </file>
 

</xml_diff>

<commit_message>
feat: added a video 017
</commit_message>
<xml_diff>
--- a/assets/get-ready.pptx
+++ b/assets/get-ready.pptx
@@ -5,7 +5,7 @@
     <p:sldMasterId id="2147483732" r:id="rId1"/>
   </p:sldMasterIdLst>
   <p:notesMasterIdLst>
-    <p:notesMasterId r:id="rId21"/>
+    <p:notesMasterId r:id="rId22"/>
   </p:notesMasterIdLst>
   <p:sldIdLst>
     <p:sldId id="263" r:id="rId2"/>
@@ -26,7 +26,8 @@
     <p:sldId id="289" r:id="rId17"/>
     <p:sldId id="290" r:id="rId18"/>
     <p:sldId id="291" r:id="rId19"/>
-    <p:sldId id="282" r:id="rId20"/>
+    <p:sldId id="292" r:id="rId20"/>
+    <p:sldId id="282" r:id="rId21"/>
   </p:sldIdLst>
   <p:sldSz cx="10285413" cy="18288000"/>
   <p:notesSz cx="6858000" cy="9144000"/>
@@ -9924,7 +9925,7 @@
         </p:nvSpPr>
         <p:spPr>
           <a:xfrm>
-            <a:off x="223306" y="11731083"/>
+            <a:off x="111653" y="11731083"/>
             <a:ext cx="2176301" cy="707886"/>
           </a:xfrm>
           <a:prstGeom prst="rect">
@@ -9964,7 +9965,7 @@
         </p:nvSpPr>
         <p:spPr>
           <a:xfrm>
-            <a:off x="2369994" y="11731083"/>
+            <a:off x="2258341" y="11731083"/>
             <a:ext cx="7680579" cy="707886"/>
           </a:xfrm>
           <a:prstGeom prst="rect">
@@ -10016,7 +10017,7 @@
         </p:nvSpPr>
         <p:spPr>
           <a:xfrm>
-            <a:off x="223306" y="12814182"/>
+            <a:off x="111653" y="12814182"/>
             <a:ext cx="2310120" cy="707886"/>
           </a:xfrm>
           <a:prstGeom prst="rect">
@@ -10052,7 +10053,7 @@
         </p:nvSpPr>
         <p:spPr>
           <a:xfrm>
-            <a:off x="2369994" y="12804706"/>
+            <a:off x="2258341" y="12804706"/>
             <a:ext cx="7915419" cy="707886"/>
           </a:xfrm>
           <a:prstGeom prst="rect">
@@ -10092,7 +10093,7 @@
         </p:nvSpPr>
         <p:spPr>
           <a:xfrm>
-            <a:off x="223306" y="13897281"/>
+            <a:off x="111653" y="13897281"/>
             <a:ext cx="1887055" cy="707886"/>
           </a:xfrm>
           <a:prstGeom prst="rect">
@@ -10128,7 +10129,7 @@
         </p:nvSpPr>
         <p:spPr>
           <a:xfrm>
-            <a:off x="2369994" y="13878330"/>
+            <a:off x="2258341" y="13878330"/>
             <a:ext cx="7543309" cy="707886"/>
           </a:xfrm>
           <a:prstGeom prst="rect">
@@ -10154,6 +10155,37 @@
           </a:p>
         </p:txBody>
       </p:sp>
+      <p:pic>
+        <p:nvPicPr>
+          <p:cNvPr id="2" name="Picture 1">
+            <a:extLst>
+              <a:ext uri="{FF2B5EF4-FFF2-40B4-BE49-F238E27FC236}">
+                <a16:creationId xmlns:a16="http://schemas.microsoft.com/office/drawing/2014/main" id="{6E6C76C4-FC93-6C5B-E086-9AF81FFBFE37}"/>
+              </a:ext>
+            </a:extLst>
+          </p:cNvPr>
+          <p:cNvPicPr>
+            <a:picLocks noChangeAspect="1"/>
+          </p:cNvPicPr>
+          <p:nvPr/>
+        </p:nvPicPr>
+        <p:blipFill rotWithShape="1">
+          <a:blip r:embed="rId3"/>
+          <a:srcRect l="18633" t="23605" r="10338" b="13822"/>
+          <a:stretch>
+            <a:fillRect/>
+          </a:stretch>
+        </p:blipFill>
+        <p:spPr>
+          <a:xfrm>
+            <a:off x="230584" y="4178515"/>
+            <a:ext cx="9814357" cy="6647320"/>
+          </a:xfrm>
+          <a:prstGeom prst="rect">
+            <a:avLst/>
+          </a:prstGeom>
+        </p:spPr>
+      </p:pic>
       <p:cxnSp>
         <p:nvCxnSpPr>
           <p:cNvPr id="17" name="Straight Connector 16">
@@ -10178,7 +10210,7 @@
           </a:prstGeom>
           <a:ln w="38100">
             <a:solidFill>
-              <a:srgbClr val="FFC000"/>
+              <a:schemeClr val="bg1"/>
             </a:solidFill>
             <a:headEnd type="none"/>
             <a:tailEnd type="none" w="lg" len="lg"/>
@@ -10214,10 +10246,10 @@
           <p:nvPr/>
         </p:nvPicPr>
         <p:blipFill>
-          <a:blip r:embed="rId3">
+          <a:blip r:embed="rId4">
             <a:extLst>
               <a:ext uri="{96DAC541-7B7A-43D3-8B79-37D633B846F1}">
-                <asvg:svgBlip xmlns:asvg="http://schemas.microsoft.com/office/drawing/2016/SVG/main" r:embed="rId4"/>
+                <asvg:svgBlip xmlns:asvg="http://schemas.microsoft.com/office/drawing/2016/SVG/main" r:embed="rId5"/>
               </a:ext>
             </a:extLst>
           </a:blip>
@@ -10227,7 +10259,7 @@
         </p:blipFill>
         <p:spPr>
           <a:xfrm>
-            <a:off x="7668075" y="8637940"/>
+            <a:off x="7700733" y="9487027"/>
             <a:ext cx="914400" cy="914400"/>
           </a:xfrm>
           <a:prstGeom prst="rect">
@@ -10250,10 +10282,10 @@
           <p:nvPr/>
         </p:nvPicPr>
         <p:blipFill>
-          <a:blip r:embed="rId5">
+          <a:blip r:embed="rId6">
             <a:extLst>
               <a:ext uri="{96DAC541-7B7A-43D3-8B79-37D633B846F1}">
-                <asvg:svgBlip xmlns:asvg="http://schemas.microsoft.com/office/drawing/2016/SVG/main" r:embed="rId6"/>
+                <asvg:svgBlip xmlns:asvg="http://schemas.microsoft.com/office/drawing/2016/SVG/main" r:embed="rId7"/>
               </a:ext>
             </a:extLst>
           </a:blip>
@@ -10263,7 +10295,7 @@
         </p:blipFill>
         <p:spPr>
           <a:xfrm>
-            <a:off x="7668075" y="6560627"/>
+            <a:off x="7700733" y="7132128"/>
             <a:ext cx="914400" cy="914400"/>
           </a:xfrm>
           <a:prstGeom prst="rect">
@@ -10346,9 +10378,28 @@
 <file path=ppt/slides/slide19.xml><?xml version="1.0" encoding="utf-8"?>
 <p:sld xmlns:a="http://schemas.openxmlformats.org/drawingml/2006/main" xmlns:r="http://schemas.openxmlformats.org/officeDocument/2006/relationships" xmlns:p="http://schemas.openxmlformats.org/presentationml/2006/main">
   <p:cSld>
+    <p:bg>
+      <p:bgPr>
+        <a:pattFill prst="pct20">
+          <a:fgClr>
+            <a:srgbClr val="FFC000"/>
+          </a:fgClr>
+          <a:bgClr>
+            <a:schemeClr val="bg1"/>
+          </a:bgClr>
+        </a:pattFill>
+        <a:effectLst/>
+      </p:bgPr>
+    </p:bg>
     <p:spTree>
       <p:nvGrpSpPr>
-        <p:cNvPr id="1" name=""/>
+        <p:cNvPr id="1" name="">
+          <a:extLst>
+            <a:ext uri="{FF2B5EF4-FFF2-40B4-BE49-F238E27FC236}">
+              <a16:creationId xmlns:a16="http://schemas.microsoft.com/office/drawing/2014/main" id="{9CEDEF06-3490-6241-1F61-A42204550561}"/>
+            </a:ext>
+          </a:extLst>
+        </p:cNvPr>
         <p:cNvGrpSpPr/>
         <p:nvPr/>
       </p:nvGrpSpPr>
@@ -10360,10 +10411,556 @@
           <a:chExt cx="0" cy="0"/>
         </a:xfrm>
       </p:grpSpPr>
+      <p:sp>
+        <p:nvSpPr>
+          <p:cNvPr id="4" name="TextBox 3">
+            <a:extLst>
+              <a:ext uri="{FF2B5EF4-FFF2-40B4-BE49-F238E27FC236}">
+                <a16:creationId xmlns:a16="http://schemas.microsoft.com/office/drawing/2014/main" id="{698E0008-9AB4-2A98-E8E5-B5D3D1A4C9B7}"/>
+              </a:ext>
+            </a:extLst>
+          </p:cNvPr>
+          <p:cNvSpPr txBox="1"/>
+          <p:nvPr/>
+        </p:nvSpPr>
+        <p:spPr>
+          <a:xfrm>
+            <a:off x="223306" y="2872200"/>
+            <a:ext cx="9838800" cy="1107996"/>
+          </a:xfrm>
+          <a:prstGeom prst="rect">
+            <a:avLst/>
+          </a:prstGeom>
+          <a:ln/>
+        </p:spPr>
+        <p:style>
+          <a:lnRef idx="0">
+            <a:schemeClr val="accent6"/>
+          </a:lnRef>
+          <a:fillRef idx="3">
+            <a:schemeClr val="accent6"/>
+          </a:fillRef>
+          <a:effectRef idx="3">
+            <a:schemeClr val="accent6"/>
+          </a:effectRef>
+          <a:fontRef idx="minor">
+            <a:schemeClr val="lt1"/>
+          </a:fontRef>
+        </p:style>
+        <p:txBody>
+          <a:bodyPr wrap="square" rtlCol="0">
+            <a:spAutoFit/>
+            <a:scene3d>
+              <a:camera prst="orthographicFront"/>
+              <a:lightRig rig="harsh" dir="t"/>
+            </a:scene3d>
+            <a:sp3d extrusionH="57150" prstMaterial="matte">
+              <a:bevelT w="63500" h="12700" prst="angle"/>
+              <a:contourClr>
+                <a:schemeClr val="bg1">
+                  <a:lumMod val="65000"/>
+                </a:schemeClr>
+              </a:contourClr>
+            </a:sp3d>
+          </a:bodyPr>
+          <a:lstStyle/>
+          <a:p>
+            <a:pPr algn="ctr"/>
+            <a:r>
+              <a:rPr lang="en-GB" sz="6600" b="1" dirty="0">
+                <a:ln/>
+                <a:pattFill prst="dkUpDiag">
+                  <a:fgClr>
+                    <a:schemeClr val="bg1">
+                      <a:lumMod val="50000"/>
+                    </a:schemeClr>
+                  </a:fgClr>
+                  <a:bgClr>
+                    <a:schemeClr val="tx1">
+                      <a:lumMod val="75000"/>
+                      <a:lumOff val="25000"/>
+                    </a:schemeClr>
+                  </a:bgClr>
+                </a:pattFill>
+                <a:effectLst>
+                  <a:outerShdw blurRad="38100" dist="19050" dir="2700000" algn="tl" rotWithShape="0">
+                    <a:schemeClr val="dk1">
+                      <a:lumMod val="50000"/>
+                      <a:alpha val="40000"/>
+                    </a:schemeClr>
+                  </a:outerShdw>
+                </a:effectLst>
+                <a:latin typeface="Patrick Hand" pitchFamily="2" charset="77"/>
+              </a:rPr>
+              <a:t>….</a:t>
+            </a:r>
+            <a:endParaRPr lang="en-GB" b="1" dirty="0">
+              <a:ln/>
+              <a:pattFill prst="dkUpDiag">
+                <a:fgClr>
+                  <a:schemeClr val="bg1">
+                    <a:lumMod val="50000"/>
+                  </a:schemeClr>
+                </a:fgClr>
+                <a:bgClr>
+                  <a:schemeClr val="tx1">
+                    <a:lumMod val="75000"/>
+                    <a:lumOff val="25000"/>
+                  </a:schemeClr>
+                </a:bgClr>
+              </a:pattFill>
+              <a:effectLst>
+                <a:outerShdw blurRad="38100" dist="19050" dir="2700000" algn="tl" rotWithShape="0">
+                  <a:schemeClr val="dk1">
+                    <a:lumMod val="50000"/>
+                    <a:alpha val="40000"/>
+                  </a:schemeClr>
+                </a:outerShdw>
+              </a:effectLst>
+              <a:latin typeface="Patrick Hand" pitchFamily="2" charset="77"/>
+            </a:endParaRPr>
+          </a:p>
+        </p:txBody>
+      </p:sp>
+      <p:pic>
+        <p:nvPicPr>
+          <p:cNvPr id="5" name="Picture 4">
+            <a:extLst>
+              <a:ext uri="{FF2B5EF4-FFF2-40B4-BE49-F238E27FC236}">
+                <a16:creationId xmlns:a16="http://schemas.microsoft.com/office/drawing/2014/main" id="{96D17B3F-D238-2B0B-EC89-5F7DF89B7F7F}"/>
+              </a:ext>
+            </a:extLst>
+          </p:cNvPr>
+          <p:cNvPicPr>
+            <a:picLocks noChangeAspect="1"/>
+          </p:cNvPicPr>
+          <p:nvPr/>
+        </p:nvPicPr>
+        <p:blipFill>
+          <a:blip r:embed="rId2"/>
+          <a:stretch>
+            <a:fillRect/>
+          </a:stretch>
+        </p:blipFill>
+        <p:spPr>
+          <a:xfrm>
+            <a:off x="264001" y="2906105"/>
+            <a:ext cx="1063167" cy="1063167"/>
+          </a:xfrm>
+          <a:prstGeom prst="rect">
+            <a:avLst/>
+          </a:prstGeom>
+        </p:spPr>
+      </p:pic>
+      <p:sp>
+        <p:nvSpPr>
+          <p:cNvPr id="7" name="TextBox 6">
+            <a:extLst>
+              <a:ext uri="{FF2B5EF4-FFF2-40B4-BE49-F238E27FC236}">
+                <a16:creationId xmlns:a16="http://schemas.microsoft.com/office/drawing/2014/main" id="{82A83D46-1034-6666-755A-5BB815E6D643}"/>
+              </a:ext>
+            </a:extLst>
+          </p:cNvPr>
+          <p:cNvSpPr txBox="1"/>
+          <p:nvPr/>
+        </p:nvSpPr>
+        <p:spPr>
+          <a:xfrm>
+            <a:off x="223306" y="11731083"/>
+            <a:ext cx="2176301" cy="707886"/>
+          </a:xfrm>
+          <a:prstGeom prst="rect">
+            <a:avLst/>
+          </a:prstGeom>
+          <a:noFill/>
+        </p:spPr>
+        <p:txBody>
+          <a:bodyPr wrap="none" rtlCol="0">
+            <a:spAutoFit/>
+          </a:bodyPr>
+          <a:lstStyle/>
+          <a:p>
+            <a:r>
+              <a:rPr lang="en-GB" sz="4000" b="1" dirty="0"/>
+              <a:t>Efficient:</a:t>
+            </a:r>
+            <a:r>
+              <a:rPr lang="en-GB" sz="4000" dirty="0"/>
+              <a:t> </a:t>
+            </a:r>
+            <a:endParaRPr lang="en-DE" sz="4000" dirty="0"/>
+          </a:p>
+        </p:txBody>
+      </p:sp>
+      <p:sp>
+        <p:nvSpPr>
+          <p:cNvPr id="11" name="TextBox 10">
+            <a:extLst>
+              <a:ext uri="{FF2B5EF4-FFF2-40B4-BE49-F238E27FC236}">
+                <a16:creationId xmlns:a16="http://schemas.microsoft.com/office/drawing/2014/main" id="{AE8CD719-0BE7-56F8-0136-ADB67AE57FA3}"/>
+              </a:ext>
+            </a:extLst>
+          </p:cNvPr>
+          <p:cNvSpPr txBox="1"/>
+          <p:nvPr/>
+        </p:nvSpPr>
+        <p:spPr>
+          <a:xfrm>
+            <a:off x="2369994" y="11731083"/>
+            <a:ext cx="7680579" cy="707886"/>
+          </a:xfrm>
+          <a:prstGeom prst="rect">
+            <a:avLst/>
+          </a:prstGeom>
+          <a:noFill/>
+        </p:spPr>
+        <p:txBody>
+          <a:bodyPr wrap="square" rtlCol="0">
+            <a:spAutoFit/>
+          </a:bodyPr>
+          <a:lstStyle/>
+          <a:p>
+            <a:r>
+              <a:rPr lang="en-GB" sz="4000" dirty="0">
+                <a:latin typeface="Patrick Hand" pitchFamily="2" charset="77"/>
+              </a:rPr>
+              <a:t>………..</a:t>
+            </a:r>
+            <a:endParaRPr lang="en-DE" sz="4000" dirty="0">
+              <a:latin typeface="Patrick Hand" pitchFamily="2" charset="77"/>
+            </a:endParaRPr>
+          </a:p>
+        </p:txBody>
+      </p:sp>
+      <p:sp>
+        <p:nvSpPr>
+          <p:cNvPr id="8" name="TextBox 7">
+            <a:extLst>
+              <a:ext uri="{FF2B5EF4-FFF2-40B4-BE49-F238E27FC236}">
+                <a16:creationId xmlns:a16="http://schemas.microsoft.com/office/drawing/2014/main" id="{13A83BAB-0D84-5CAA-431F-2D411BE8BAF3}"/>
+              </a:ext>
+            </a:extLst>
+          </p:cNvPr>
+          <p:cNvSpPr txBox="1"/>
+          <p:nvPr/>
+        </p:nvSpPr>
+        <p:spPr>
+          <a:xfrm>
+            <a:off x="223306" y="12814182"/>
+            <a:ext cx="2310120" cy="707886"/>
+          </a:xfrm>
+          <a:prstGeom prst="rect">
+            <a:avLst/>
+          </a:prstGeom>
+          <a:noFill/>
+        </p:spPr>
+        <p:txBody>
+          <a:bodyPr wrap="none" rtlCol="0">
+            <a:spAutoFit/>
+          </a:bodyPr>
+          <a:lstStyle/>
+          <a:p>
+            <a:r>
+              <a:rPr lang="en-GB" sz="4000" b="1" dirty="0"/>
+              <a:t>Pythonic: </a:t>
+            </a:r>
+            <a:endParaRPr lang="en-DE" sz="4000" b="1" dirty="0"/>
+          </a:p>
+        </p:txBody>
+      </p:sp>
+      <p:sp>
+        <p:nvSpPr>
+          <p:cNvPr id="12" name="TextBox 11">
+            <a:extLst>
+              <a:ext uri="{FF2B5EF4-FFF2-40B4-BE49-F238E27FC236}">
+                <a16:creationId xmlns:a16="http://schemas.microsoft.com/office/drawing/2014/main" id="{1739ABD9-2EA3-E049-8123-B75F32D53D91}"/>
+              </a:ext>
+            </a:extLst>
+          </p:cNvPr>
+          <p:cNvSpPr txBox="1"/>
+          <p:nvPr/>
+        </p:nvSpPr>
+        <p:spPr>
+          <a:xfrm>
+            <a:off x="2369994" y="12804706"/>
+            <a:ext cx="7915419" cy="707886"/>
+          </a:xfrm>
+          <a:prstGeom prst="rect">
+            <a:avLst/>
+          </a:prstGeom>
+          <a:noFill/>
+        </p:spPr>
+        <p:txBody>
+          <a:bodyPr wrap="square" rtlCol="0">
+            <a:spAutoFit/>
+          </a:bodyPr>
+          <a:lstStyle/>
+          <a:p>
+            <a:r>
+              <a:rPr lang="en-DE" sz="4000" dirty="0">
+                <a:latin typeface="Patrick Hand" pitchFamily="2" charset="77"/>
+              </a:rPr>
+              <a:t>……..</a:t>
+            </a:r>
+          </a:p>
+        </p:txBody>
+      </p:sp>
+      <p:sp>
+        <p:nvSpPr>
+          <p:cNvPr id="9" name="TextBox 8">
+            <a:extLst>
+              <a:ext uri="{FF2B5EF4-FFF2-40B4-BE49-F238E27FC236}">
+                <a16:creationId xmlns:a16="http://schemas.microsoft.com/office/drawing/2014/main" id="{934CE8A2-672C-BFB7-CF4D-C6A5A0BE0F35}"/>
+              </a:ext>
+            </a:extLst>
+          </p:cNvPr>
+          <p:cNvSpPr txBox="1"/>
+          <p:nvPr/>
+        </p:nvSpPr>
+        <p:spPr>
+          <a:xfrm>
+            <a:off x="223306" y="13897281"/>
+            <a:ext cx="1887055" cy="707886"/>
+          </a:xfrm>
+          <a:prstGeom prst="rect">
+            <a:avLst/>
+          </a:prstGeom>
+          <a:noFill/>
+        </p:spPr>
+        <p:txBody>
+          <a:bodyPr wrap="none" rtlCol="0">
+            <a:spAutoFit/>
+          </a:bodyPr>
+          <a:lstStyle/>
+          <a:p>
+            <a:r>
+              <a:rPr lang="en-GB" sz="4000" b="1" dirty="0"/>
+              <a:t>Simple: </a:t>
+            </a:r>
+            <a:endParaRPr lang="en-DE" sz="4000" b="1" dirty="0"/>
+          </a:p>
+        </p:txBody>
+      </p:sp>
+      <p:sp>
+        <p:nvSpPr>
+          <p:cNvPr id="13" name="TextBox 12">
+            <a:extLst>
+              <a:ext uri="{FF2B5EF4-FFF2-40B4-BE49-F238E27FC236}">
+                <a16:creationId xmlns:a16="http://schemas.microsoft.com/office/drawing/2014/main" id="{33A446CA-FACD-8141-96D9-0C45DC6001A8}"/>
+              </a:ext>
+            </a:extLst>
+          </p:cNvPr>
+          <p:cNvSpPr txBox="1"/>
+          <p:nvPr/>
+        </p:nvSpPr>
+        <p:spPr>
+          <a:xfrm>
+            <a:off x="2369994" y="13878330"/>
+            <a:ext cx="7543309" cy="707886"/>
+          </a:xfrm>
+          <a:prstGeom prst="rect">
+            <a:avLst/>
+          </a:prstGeom>
+          <a:noFill/>
+        </p:spPr>
+        <p:txBody>
+          <a:bodyPr wrap="square" rtlCol="0">
+            <a:spAutoFit/>
+          </a:bodyPr>
+          <a:lstStyle/>
+          <a:p>
+            <a:r>
+              <a:rPr lang="en-GB" sz="4000" dirty="0">
+                <a:latin typeface="Patrick Hand" pitchFamily="2" charset="77"/>
+              </a:rPr>
+              <a:t>………</a:t>
+            </a:r>
+            <a:endParaRPr lang="en-DE" sz="4000" dirty="0">
+              <a:latin typeface="Patrick Hand" pitchFamily="2" charset="77"/>
+            </a:endParaRPr>
+          </a:p>
+        </p:txBody>
+      </p:sp>
+      <p:cxnSp>
+        <p:nvCxnSpPr>
+          <p:cNvPr id="17" name="Straight Connector 16">
+            <a:extLst>
+              <a:ext uri="{FF2B5EF4-FFF2-40B4-BE49-F238E27FC236}">
+                <a16:creationId xmlns:a16="http://schemas.microsoft.com/office/drawing/2014/main" id="{B7368A16-FFD4-42E9-93DD-F095D0771DAC}"/>
+              </a:ext>
+            </a:extLst>
+          </p:cNvPr>
+          <p:cNvCxnSpPr>
+            <a:cxnSpLocks/>
+          </p:cNvCxnSpPr>
+          <p:nvPr/>
+        </p:nvCxnSpPr>
+        <p:spPr>
+          <a:xfrm>
+            <a:off x="223579" y="8410989"/>
+            <a:ext cx="9838255" cy="0"/>
+          </a:xfrm>
+          <a:prstGeom prst="line">
+            <a:avLst/>
+          </a:prstGeom>
+          <a:ln w="38100">
+            <a:solidFill>
+              <a:srgbClr val="FFC000"/>
+            </a:solidFill>
+            <a:headEnd type="none"/>
+            <a:tailEnd type="none" w="lg" len="lg"/>
+          </a:ln>
+        </p:spPr>
+        <p:style>
+          <a:lnRef idx="1">
+            <a:schemeClr val="accent1"/>
+          </a:lnRef>
+          <a:fillRef idx="0">
+            <a:schemeClr val="accent1"/>
+          </a:fillRef>
+          <a:effectRef idx="0">
+            <a:schemeClr val="accent1"/>
+          </a:effectRef>
+          <a:fontRef idx="minor">
+            <a:schemeClr val="tx1"/>
+          </a:fontRef>
+        </p:style>
+      </p:cxnSp>
+      <p:pic>
+        <p:nvPicPr>
+          <p:cNvPr id="18" name="Graphic 17" descr="Shield Tick with solid fill">
+            <a:extLst>
+              <a:ext uri="{FF2B5EF4-FFF2-40B4-BE49-F238E27FC236}">
+                <a16:creationId xmlns:a16="http://schemas.microsoft.com/office/drawing/2014/main" id="{EB4807D0-9F0F-5D16-75CA-7253269DE562}"/>
+              </a:ext>
+            </a:extLst>
+          </p:cNvPr>
+          <p:cNvPicPr>
+            <a:picLocks noChangeAspect="1"/>
+          </p:cNvPicPr>
+          <p:nvPr/>
+        </p:nvPicPr>
+        <p:blipFill>
+          <a:blip r:embed="rId3">
+            <a:extLst>
+              <a:ext uri="{96DAC541-7B7A-43D3-8B79-37D633B846F1}">
+                <asvg:svgBlip xmlns:asvg="http://schemas.microsoft.com/office/drawing/2016/SVG/main" r:embed="rId4"/>
+              </a:ext>
+            </a:extLst>
+          </a:blip>
+          <a:stretch>
+            <a:fillRect/>
+          </a:stretch>
+        </p:blipFill>
+        <p:spPr>
+          <a:xfrm>
+            <a:off x="7668075" y="8637940"/>
+            <a:ext cx="914400" cy="914400"/>
+          </a:xfrm>
+          <a:prstGeom prst="rect">
+            <a:avLst/>
+          </a:prstGeom>
+        </p:spPr>
+      </p:pic>
+      <p:pic>
+        <p:nvPicPr>
+          <p:cNvPr id="19" name="Graphic 18" descr="Close with solid fill">
+            <a:extLst>
+              <a:ext uri="{FF2B5EF4-FFF2-40B4-BE49-F238E27FC236}">
+                <a16:creationId xmlns:a16="http://schemas.microsoft.com/office/drawing/2014/main" id="{46AA1765-F8D0-1254-85C9-AEF33D4A37DD}"/>
+              </a:ext>
+            </a:extLst>
+          </p:cNvPr>
+          <p:cNvPicPr>
+            <a:picLocks noChangeAspect="1"/>
+          </p:cNvPicPr>
+          <p:nvPr/>
+        </p:nvPicPr>
+        <p:blipFill>
+          <a:blip r:embed="rId5">
+            <a:extLst>
+              <a:ext uri="{96DAC541-7B7A-43D3-8B79-37D633B846F1}">
+                <asvg:svgBlip xmlns:asvg="http://schemas.microsoft.com/office/drawing/2016/SVG/main" r:embed="rId6"/>
+              </a:ext>
+            </a:extLst>
+          </a:blip>
+          <a:stretch>
+            <a:fillRect/>
+          </a:stretch>
+        </p:blipFill>
+        <p:spPr>
+          <a:xfrm>
+            <a:off x="7668075" y="6560627"/>
+            <a:ext cx="914400" cy="914400"/>
+          </a:xfrm>
+          <a:prstGeom prst="rect">
+            <a:avLst/>
+          </a:prstGeom>
+        </p:spPr>
+      </p:pic>
+      <p:sp>
+        <p:nvSpPr>
+          <p:cNvPr id="25" name="TextBox 24">
+            <a:extLst>
+              <a:ext uri="{FF2B5EF4-FFF2-40B4-BE49-F238E27FC236}">
+                <a16:creationId xmlns:a16="http://schemas.microsoft.com/office/drawing/2014/main" id="{E90096C9-DC9C-60DF-715D-BEFC52B329EE}"/>
+              </a:ext>
+            </a:extLst>
+          </p:cNvPr>
+          <p:cNvSpPr txBox="1"/>
+          <p:nvPr/>
+        </p:nvSpPr>
+        <p:spPr>
+          <a:xfrm>
+            <a:off x="-7857400" y="2527667"/>
+            <a:ext cx="5089855" cy="830997"/>
+          </a:xfrm>
+          <a:prstGeom prst="rect">
+            <a:avLst/>
+          </a:prstGeom>
+        </p:spPr>
+        <p:style>
+          <a:lnRef idx="1">
+            <a:schemeClr val="accent2"/>
+          </a:lnRef>
+          <a:fillRef idx="2">
+            <a:schemeClr val="accent2"/>
+          </a:fillRef>
+          <a:effectRef idx="1">
+            <a:schemeClr val="accent2"/>
+          </a:effectRef>
+          <a:fontRef idx="minor">
+            <a:schemeClr val="dk1"/>
+          </a:fontRef>
+        </p:style>
+        <p:txBody>
+          <a:bodyPr wrap="none" rtlCol="0">
+            <a:spAutoFit/>
+          </a:bodyPr>
+          <a:lstStyle/>
+          <a:p>
+            <a:r>
+              <a:rPr lang="en-US" sz="4800" dirty="0">
+                <a:solidFill>
+                  <a:srgbClr val="FF0000"/>
+                </a:solidFill>
+                <a:latin typeface="Patrick Hand" pitchFamily="2" charset="77"/>
+              </a:rPr>
+              <a:t>py_017_zip_function</a:t>
+            </a:r>
+            <a:endParaRPr lang="en-DE" sz="4800" dirty="0">
+              <a:solidFill>
+                <a:srgbClr val="FF0000"/>
+              </a:solidFill>
+              <a:latin typeface="Patrick Hand" pitchFamily="2" charset="77"/>
+            </a:endParaRPr>
+          </a:p>
+        </p:txBody>
+      </p:sp>
     </p:spTree>
     <p:extLst>
       <p:ext uri="{BB962C8B-B14F-4D97-AF65-F5344CB8AC3E}">
-        <p14:creationId xmlns:p14="http://schemas.microsoft.com/office/powerpoint/2010/main" val="3355690493"/>
+        <p14:creationId xmlns:p14="http://schemas.microsoft.com/office/powerpoint/2010/main" val="65041932"/>
       </p:ext>
     </p:extLst>
   </p:cSld>
@@ -10614,6 +11211,36 @@
     <p:extLst>
       <p:ext uri="{BB962C8B-B14F-4D97-AF65-F5344CB8AC3E}">
         <p14:creationId xmlns:p14="http://schemas.microsoft.com/office/powerpoint/2010/main" val="3215186301"/>
+      </p:ext>
+    </p:extLst>
+  </p:cSld>
+  <p:clrMapOvr>
+    <a:masterClrMapping/>
+  </p:clrMapOvr>
+</p:sld>
+</file>
+
+<file path=ppt/slides/slide20.xml><?xml version="1.0" encoding="utf-8"?>
+<p:sld xmlns:a="http://schemas.openxmlformats.org/drawingml/2006/main" xmlns:r="http://schemas.openxmlformats.org/officeDocument/2006/relationships" xmlns:p="http://schemas.openxmlformats.org/presentationml/2006/main">
+  <p:cSld>
+    <p:spTree>
+      <p:nvGrpSpPr>
+        <p:cNvPr id="1" name=""/>
+        <p:cNvGrpSpPr/>
+        <p:nvPr/>
+      </p:nvGrpSpPr>
+      <p:grpSpPr>
+        <a:xfrm>
+          <a:off x="0" y="0"/>
+          <a:ext cx="0" cy="0"/>
+          <a:chOff x="0" y="0"/>
+          <a:chExt cx="0" cy="0"/>
+        </a:xfrm>
+      </p:grpSpPr>
+    </p:spTree>
+    <p:extLst>
+      <p:ext uri="{BB962C8B-B14F-4D97-AF65-F5344CB8AC3E}">
+        <p14:creationId xmlns:p14="http://schemas.microsoft.com/office/powerpoint/2010/main" val="3355690493"/>
       </p:ext>
     </p:extLst>
   </p:cSld>

</xml_diff>

<commit_message>
feat: created video 018 , 019, 020
</commit_message>
<xml_diff>
--- a/assets/get-ready.pptx
+++ b/assets/get-ready.pptx
@@ -5,7 +5,7 @@
     <p:sldMasterId id="2147483732" r:id="rId1"/>
   </p:sldMasterIdLst>
   <p:notesMasterIdLst>
-    <p:notesMasterId r:id="rId22"/>
+    <p:notesMasterId r:id="rId25"/>
   </p:notesMasterIdLst>
   <p:sldIdLst>
     <p:sldId id="263" r:id="rId2"/>
@@ -27,7 +27,10 @@
     <p:sldId id="290" r:id="rId18"/>
     <p:sldId id="291" r:id="rId19"/>
     <p:sldId id="292" r:id="rId20"/>
-    <p:sldId id="282" r:id="rId21"/>
+    <p:sldId id="293" r:id="rId21"/>
+    <p:sldId id="294" r:id="rId22"/>
+    <p:sldId id="295" r:id="rId23"/>
+    <p:sldId id="282" r:id="rId24"/>
   </p:sldIdLst>
   <p:sldSz cx="10285413" cy="18288000"/>
   <p:notesSz cx="6858000" cy="9144000"/>
@@ -388,6 +391,76 @@
 Are you still using % or .format() to handle strings in Python? It’s time to upgrade! 🐍✨
 f-Strings are not just more readable; they are also faster because they're evaluated
 #Python #CleanCode #ProgrammingTips #fstrings #Python3 #CodeWithEbrahim #CodingLife</a:t>
+        </a:r>
+      </a:p>
+    </p188:txBody>
+  </p188:cm>
+</p188:cmLst>
+</file>
+
+<file path=ppt/comments/modernComment_124_3E0760C.xml><?xml version="1.0" encoding="utf-8"?>
+<p188:cmLst xmlns:a="http://schemas.openxmlformats.org/drawingml/2006/main" xmlns:r="http://schemas.openxmlformats.org/officeDocument/2006/relationships" xmlns:p188="http://schemas.microsoft.com/office/powerpoint/2018/8/main">
+  <p188:cm id="{088181D5-5BED-2047-99D7-3799AF364966}" authorId="{8860045D-B334-310D-0A4E-9E20AA0B149E}" created="2026-01-05T02:39:46.343">
+    <pc:sldMkLst xmlns:pc="http://schemas.microsoft.com/office/powerpoint/2013/main/command">
+      <pc:docMk/>
+      <pc:sldMk cId="65041932" sldId="292"/>
+    </pc:sldMkLst>
+    <p188:txBody>
+      <a:bodyPr/>
+      <a:lstStyle/>
+      <a:p>
+        <a:r>
+          <a:rPr lang="en-DE"/>
+          <a:t>Stop writing unnecessary "if" checks! 🐍✨
+Using defaultdict from the collections module makes your code cleaner and prevents the famous KeyError. It automatically initializes keys with a default value (like an empty list).
+#PythonTips #CleanCode #PythonProgramming #CodeWithEbrahim #SoftwareDevelopment #Python3</a:t>
+        </a:r>
+      </a:p>
+    </p188:txBody>
+  </p188:cm>
+</p188:cmLst>
+</file>
+
+<file path=ppt/comments/modernComment_125_E21438E9.xml><?xml version="1.0" encoding="utf-8"?>
+<p188:cmLst xmlns:a="http://schemas.openxmlformats.org/drawingml/2006/main" xmlns:r="http://schemas.openxmlformats.org/officeDocument/2006/relationships" xmlns:p188="http://schemas.microsoft.com/office/powerpoint/2018/8/main">
+  <p188:cm id="{1D4420A9-55BE-024F-A9FE-476F72618FC0}" authorId="{8860045D-B334-310D-0A4E-9E20AA0B149E}" created="2026-01-05T03:19:53.551">
+    <pc:sldMkLst xmlns:pc="http://schemas.microsoft.com/office/powerpoint/2013/main/command">
+      <pc:docMk/>
+      <pc:sldMk cId="3792976105" sldId="293"/>
+    </pc:sldMkLst>
+    <p188:txBody>
+      <a:bodyPr/>
+      <a:lstStyle/>
+      <a:p>
+        <a:r>
+          <a:rPr lang="en-DE"/>
+          <a:t>Did you know Python can return multiple values at once? 🤯🐍
+In many languages, you need a class or an array to return more than one value. In Python, you just use a comma! It’s called "Tuple Unpacking" and it makes your
+#PythonTips #CleanCode #ProgrammingLife #CodeWithEbrahim #PythonHacks #BackendDev</a:t>
+        </a:r>
+      </a:p>
+    </p188:txBody>
+  </p188:cm>
+</p188:cmLst>
+</file>
+
+<file path=ppt/comments/modernComment_126_9DA2AD4E.xml><?xml version="1.0" encoding="utf-8"?>
+<p188:cmLst xmlns:a="http://schemas.openxmlformats.org/drawingml/2006/main" xmlns:r="http://schemas.openxmlformats.org/officeDocument/2006/relationships" xmlns:p188="http://schemas.microsoft.com/office/powerpoint/2018/8/main">
+  <p188:cm id="{538865AF-136D-2642-923A-35928BA76FED}" authorId="{8860045D-B334-310D-0A4E-9E20AA0B149E}" created="2026-01-05T04:08:30.372">
+    <pc:sldMkLst xmlns:pc="http://schemas.microsoft.com/office/powerpoint/2013/main/command">
+      <pc:docMk/>
+      <pc:sldMk cId="2644684110" sldId="294"/>
+    </pc:sldMkLst>
+    <p188:txBody>
+      <a:bodyPr/>
+      <a:lstStyle/>
+      <a:p>
+        <a:r>
+          <a:rPr lang="en-DE"/>
+          <a:t>Stop crashing your app with KeyErrors! 🛡️🐍
+Tired of seeing KeyError in your logs? Accessing dictionary values with [] is risky because if the key is missing, your code breaks.
+The .get() method is your best friend. It allows you to provide a default value so your program keeps running smoothly no matter what.
+#PythonTips #CleanCode #ErrorHandling #PythonDeveloper #ProgrammingLife #CodeWithEbrahim</a:t>
         </a:r>
       </a:p>
     </p188:txBody>
@@ -10380,9 +10453,9 @@
   <p:cSld>
     <p:bg>
       <p:bgPr>
-        <a:pattFill prst="pct20">
+        <a:pattFill prst="solidDmnd">
           <a:fgClr>
-            <a:srgbClr val="FFC000"/>
+            <a:schemeClr val="bg2"/>
           </a:fgClr>
           <a:bgClr>
             <a:schemeClr val="bg1"/>
@@ -10411,6 +10484,37 @@
           <a:chExt cx="0" cy="0"/>
         </a:xfrm>
       </p:grpSpPr>
+      <p:pic>
+        <p:nvPicPr>
+          <p:cNvPr id="2" name="Picture 1">
+            <a:extLst>
+              <a:ext uri="{FF2B5EF4-FFF2-40B4-BE49-F238E27FC236}">
+                <a16:creationId xmlns:a16="http://schemas.microsoft.com/office/drawing/2014/main" id="{3CA573BE-E226-78A3-47CC-38072E91706A}"/>
+              </a:ext>
+            </a:extLst>
+          </p:cNvPr>
+          <p:cNvPicPr>
+            <a:picLocks noChangeAspect="1"/>
+          </p:cNvPicPr>
+          <p:nvPr/>
+        </p:nvPicPr>
+        <p:blipFill rotWithShape="1">
+          <a:blip r:embed="rId3"/>
+          <a:srcRect l="19389" t="20603" r="10992" b="13377"/>
+          <a:stretch>
+            <a:fillRect/>
+          </a:stretch>
+        </p:blipFill>
+        <p:spPr>
+          <a:xfrm>
+            <a:off x="225526" y="4234393"/>
+            <a:ext cx="9834360" cy="8254377"/>
+          </a:xfrm>
+          <a:prstGeom prst="rect">
+            <a:avLst/>
+          </a:prstGeom>
+        </p:spPr>
+      </p:pic>
       <p:sp>
         <p:nvSpPr>
           <p:cNvPr id="4" name="TextBox 3">
@@ -10425,8 +10529,8 @@
         </p:nvSpPr>
         <p:spPr>
           <a:xfrm>
-            <a:off x="223306" y="2872200"/>
-            <a:ext cx="9838800" cy="1107996"/>
+            <a:off x="225526" y="2872199"/>
+            <a:ext cx="9838800" cy="1121395"/>
           </a:xfrm>
           <a:prstGeom prst="rect">
             <a:avLst/>
@@ -10434,22 +10538,22 @@
           <a:ln/>
         </p:spPr>
         <p:style>
-          <a:lnRef idx="0">
-            <a:schemeClr val="accent6"/>
+          <a:lnRef idx="1">
+            <a:schemeClr val="accent2"/>
           </a:lnRef>
-          <a:fillRef idx="3">
-            <a:schemeClr val="accent6"/>
+          <a:fillRef idx="2">
+            <a:schemeClr val="accent2"/>
           </a:fillRef>
-          <a:effectRef idx="3">
-            <a:schemeClr val="accent6"/>
+          <a:effectRef idx="1">
+            <a:schemeClr val="accent2"/>
           </a:effectRef>
           <a:fontRef idx="minor">
-            <a:schemeClr val="lt1"/>
+            <a:schemeClr val="dk1"/>
           </a:fontRef>
         </p:style>
         <p:txBody>
-          <a:bodyPr wrap="square" rtlCol="0">
-            <a:spAutoFit/>
+          <a:bodyPr wrap="none" rtlCol="0">
+            <a:noAutofit/>
             <a:scene3d>
               <a:camera prst="orthographicFront"/>
               <a:lightRig rig="harsh" dir="t"/>
@@ -10465,59 +10569,71 @@
           </a:bodyPr>
           <a:lstStyle/>
           <a:p>
-            <a:pPr algn="ctr"/>
-            <a:r>
-              <a:rPr lang="en-GB" sz="6600" b="1" dirty="0">
-                <a:ln/>
-                <a:pattFill prst="dkUpDiag">
-                  <a:fgClr>
-                    <a:schemeClr val="bg1">
-                      <a:lumMod val="50000"/>
-                    </a:schemeClr>
-                  </a:fgClr>
-                  <a:bgClr>
-                    <a:schemeClr val="tx1">
-                      <a:lumMod val="75000"/>
-                      <a:lumOff val="25000"/>
-                    </a:schemeClr>
-                  </a:bgClr>
-                </a:pattFill>
+            <a:pPr marL="0" algn="ctr" defTabSz="457200" rtl="0" eaLnBrk="1" latinLnBrk="0" hangingPunct="1"/>
+            <a:r>
+              <a:rPr lang="en-US" sz="5400" b="1" dirty="0" err="1">
+                <a:ln w="0"/>
+                <a:solidFill>
+                  <a:schemeClr val="tx1"/>
+                </a:solidFill>
                 <a:effectLst>
                   <a:outerShdw blurRad="38100" dist="19050" dir="2700000" algn="tl" rotWithShape="0">
                     <a:schemeClr val="dk1">
-                      <a:lumMod val="50000"/>
                       <a:alpha val="40000"/>
                     </a:schemeClr>
                   </a:outerShdw>
                 </a:effectLst>
-                <a:latin typeface="Patrick Hand" pitchFamily="2" charset="77"/>
+                <a:latin typeface="+mj-lt"/>
               </a:rPr>
-              <a:t>….</a:t>
-            </a:r>
-            <a:endParaRPr lang="en-GB" b="1" dirty="0">
-              <a:ln/>
-              <a:pattFill prst="dkUpDiag">
-                <a:fgClr>
-                  <a:schemeClr val="bg1">
-                    <a:lumMod val="50000"/>
-                  </a:schemeClr>
-                </a:fgClr>
-                <a:bgClr>
-                  <a:schemeClr val="tx1">
-                    <a:lumMod val="75000"/>
-                    <a:lumOff val="25000"/>
-                  </a:schemeClr>
-                </a:bgClr>
-              </a:pattFill>
+              <a:t>defaultdict</a:t>
+            </a:r>
+            <a:r>
+              <a:rPr lang="en-US" sz="5400" b="1" dirty="0">
+                <a:ln w="0"/>
+                <a:solidFill>
+                  <a:schemeClr val="tx1"/>
+                </a:solidFill>
+                <a:effectLst>
+                  <a:outerShdw blurRad="38100" dist="19050" dir="2700000" algn="tl" rotWithShape="0">
+                    <a:schemeClr val="dk1">
+                      <a:alpha val="40000"/>
+                    </a:schemeClr>
+                  </a:outerShdw>
+                </a:effectLst>
+                <a:latin typeface="+mj-lt"/>
+              </a:rPr>
+              <a:t> vs standard </a:t>
+            </a:r>
+            <a:r>
+              <a:rPr lang="en-US" sz="5400" b="1" dirty="0" err="1">
+                <a:ln w="0"/>
+                <a:solidFill>
+                  <a:schemeClr val="tx1"/>
+                </a:solidFill>
+                <a:effectLst>
+                  <a:outerShdw blurRad="38100" dist="19050" dir="2700000" algn="tl" rotWithShape="0">
+                    <a:schemeClr val="dk1">
+                      <a:alpha val="40000"/>
+                    </a:schemeClr>
+                  </a:outerShdw>
+                </a:effectLst>
+                <a:latin typeface="+mj-lt"/>
+              </a:rPr>
+              <a:t>Dict</a:t>
+            </a:r>
+            <a:endParaRPr lang="en-GB" sz="1400" b="1" dirty="0">
+              <a:ln w="0"/>
+              <a:solidFill>
+                <a:schemeClr val="tx1"/>
+              </a:solidFill>
               <a:effectLst>
                 <a:outerShdw blurRad="38100" dist="19050" dir="2700000" algn="tl" rotWithShape="0">
                   <a:schemeClr val="dk1">
-                    <a:lumMod val="50000"/>
                     <a:alpha val="40000"/>
                   </a:schemeClr>
                 </a:outerShdw>
               </a:effectLst>
-              <a:latin typeface="Patrick Hand" pitchFamily="2" charset="77"/>
+              <a:latin typeface="+mj-lt"/>
             </a:endParaRPr>
           </a:p>
         </p:txBody>
@@ -10537,7 +10653,7 @@
           <p:nvPr/>
         </p:nvPicPr>
         <p:blipFill>
-          <a:blip r:embed="rId2"/>
+          <a:blip r:embed="rId4"/>
           <a:stretch>
             <a:fillRect/>
           </a:stretch>
@@ -10566,8 +10682,8 @@
         </p:nvSpPr>
         <p:spPr>
           <a:xfrm>
-            <a:off x="223306" y="11731083"/>
-            <a:ext cx="2176301" cy="707886"/>
+            <a:off x="3239076" y="12729563"/>
+            <a:ext cx="3807261" cy="830997"/>
           </a:xfrm>
           <a:prstGeom prst="rect">
             <a:avLst/>
@@ -10581,14 +10697,14 @@
           <a:lstStyle/>
           <a:p>
             <a:r>
-              <a:rPr lang="en-GB" sz="4000" b="1" dirty="0"/>
-              <a:t>Efficient:</a:t>
-            </a:r>
-            <a:r>
-              <a:rPr lang="en-GB" sz="4000" dirty="0"/>
+              <a:rPr lang="en-GB" sz="4800" b="1" dirty="0"/>
+              <a:t>Elegant Logic:</a:t>
+            </a:r>
+            <a:r>
+              <a:rPr lang="en-GB" sz="4800" dirty="0"/>
               <a:t> </a:t>
             </a:r>
-            <a:endParaRPr lang="en-DE" sz="4000" dirty="0"/>
+            <a:endParaRPr lang="en-DE" sz="4800" dirty="0"/>
           </a:p>
         </p:txBody>
       </p:sp>
@@ -10606,8 +10722,8 @@
         </p:nvSpPr>
         <p:spPr>
           <a:xfrm>
-            <a:off x="2369994" y="11731083"/>
-            <a:ext cx="7680579" cy="707886"/>
+            <a:off x="245874" y="13606053"/>
+            <a:ext cx="9793665" cy="1938992"/>
           </a:xfrm>
           <a:prstGeom prst="rect">
             <a:avLst/>
@@ -10620,162 +10736,14 @@
           </a:bodyPr>
           <a:lstStyle/>
           <a:p>
-            <a:r>
-              <a:rPr lang="en-GB" sz="4000" dirty="0">
+            <a:pPr algn="ctr"/>
+            <a:r>
+              <a:rPr lang="en-GB" sz="6000" dirty="0">
                 <a:latin typeface="Patrick Hand" pitchFamily="2" charset="77"/>
               </a:rPr>
-              <a:t>………..</a:t>
-            </a:r>
-            <a:endParaRPr lang="en-DE" sz="4000" dirty="0">
-              <a:latin typeface="Patrick Hand" pitchFamily="2" charset="77"/>
-            </a:endParaRPr>
-          </a:p>
-        </p:txBody>
-      </p:sp>
-      <p:sp>
-        <p:nvSpPr>
-          <p:cNvPr id="8" name="TextBox 7">
-            <a:extLst>
-              <a:ext uri="{FF2B5EF4-FFF2-40B4-BE49-F238E27FC236}">
-                <a16:creationId xmlns:a16="http://schemas.microsoft.com/office/drawing/2014/main" id="{13A83BAB-0D84-5CAA-431F-2D411BE8BAF3}"/>
-              </a:ext>
-            </a:extLst>
-          </p:cNvPr>
-          <p:cNvSpPr txBox="1"/>
-          <p:nvPr/>
-        </p:nvSpPr>
-        <p:spPr>
-          <a:xfrm>
-            <a:off x="223306" y="12814182"/>
-            <a:ext cx="2310120" cy="707886"/>
-          </a:xfrm>
-          <a:prstGeom prst="rect">
-            <a:avLst/>
-          </a:prstGeom>
-          <a:noFill/>
-        </p:spPr>
-        <p:txBody>
-          <a:bodyPr wrap="none" rtlCol="0">
-            <a:spAutoFit/>
-          </a:bodyPr>
-          <a:lstStyle/>
-          <a:p>
-            <a:r>
-              <a:rPr lang="en-GB" sz="4000" b="1" dirty="0"/>
-              <a:t>Pythonic: </a:t>
-            </a:r>
-            <a:endParaRPr lang="en-DE" sz="4000" b="1" dirty="0"/>
-          </a:p>
-        </p:txBody>
-      </p:sp>
-      <p:sp>
-        <p:nvSpPr>
-          <p:cNvPr id="12" name="TextBox 11">
-            <a:extLst>
-              <a:ext uri="{FF2B5EF4-FFF2-40B4-BE49-F238E27FC236}">
-                <a16:creationId xmlns:a16="http://schemas.microsoft.com/office/drawing/2014/main" id="{1739ABD9-2EA3-E049-8123-B75F32D53D91}"/>
-              </a:ext>
-            </a:extLst>
-          </p:cNvPr>
-          <p:cNvSpPr txBox="1"/>
-          <p:nvPr/>
-        </p:nvSpPr>
-        <p:spPr>
-          <a:xfrm>
-            <a:off x="2369994" y="12804706"/>
-            <a:ext cx="7915419" cy="707886"/>
-          </a:xfrm>
-          <a:prstGeom prst="rect">
-            <a:avLst/>
-          </a:prstGeom>
-          <a:noFill/>
-        </p:spPr>
-        <p:txBody>
-          <a:bodyPr wrap="square" rtlCol="0">
-            <a:spAutoFit/>
-          </a:bodyPr>
-          <a:lstStyle/>
-          <a:p>
-            <a:r>
-              <a:rPr lang="en-DE" sz="4000" dirty="0">
-                <a:latin typeface="Patrick Hand" pitchFamily="2" charset="77"/>
-              </a:rPr>
-              <a:t>……..</a:t>
-            </a:r>
-          </a:p>
-        </p:txBody>
-      </p:sp>
-      <p:sp>
-        <p:nvSpPr>
-          <p:cNvPr id="9" name="TextBox 8">
-            <a:extLst>
-              <a:ext uri="{FF2B5EF4-FFF2-40B4-BE49-F238E27FC236}">
-                <a16:creationId xmlns:a16="http://schemas.microsoft.com/office/drawing/2014/main" id="{934CE8A2-672C-BFB7-CF4D-C6A5A0BE0F35}"/>
-              </a:ext>
-            </a:extLst>
-          </p:cNvPr>
-          <p:cNvSpPr txBox="1"/>
-          <p:nvPr/>
-        </p:nvSpPr>
-        <p:spPr>
-          <a:xfrm>
-            <a:off x="223306" y="13897281"/>
-            <a:ext cx="1887055" cy="707886"/>
-          </a:xfrm>
-          <a:prstGeom prst="rect">
-            <a:avLst/>
-          </a:prstGeom>
-          <a:noFill/>
-        </p:spPr>
-        <p:txBody>
-          <a:bodyPr wrap="none" rtlCol="0">
-            <a:spAutoFit/>
-          </a:bodyPr>
-          <a:lstStyle/>
-          <a:p>
-            <a:r>
-              <a:rPr lang="en-GB" sz="4000" b="1" dirty="0"/>
-              <a:t>Simple: </a:t>
-            </a:r>
-            <a:endParaRPr lang="en-DE" sz="4000" b="1" dirty="0"/>
-          </a:p>
-        </p:txBody>
-      </p:sp>
-      <p:sp>
-        <p:nvSpPr>
-          <p:cNvPr id="13" name="TextBox 12">
-            <a:extLst>
-              <a:ext uri="{FF2B5EF4-FFF2-40B4-BE49-F238E27FC236}">
-                <a16:creationId xmlns:a16="http://schemas.microsoft.com/office/drawing/2014/main" id="{33A446CA-FACD-8141-96D9-0C45DC6001A8}"/>
-              </a:ext>
-            </a:extLst>
-          </p:cNvPr>
-          <p:cNvSpPr txBox="1"/>
-          <p:nvPr/>
-        </p:nvSpPr>
-        <p:spPr>
-          <a:xfrm>
-            <a:off x="2369994" y="13878330"/>
-            <a:ext cx="7543309" cy="707886"/>
-          </a:xfrm>
-          <a:prstGeom prst="rect">
-            <a:avLst/>
-          </a:prstGeom>
-          <a:noFill/>
-        </p:spPr>
-        <p:txBody>
-          <a:bodyPr wrap="square" rtlCol="0">
-            <a:spAutoFit/>
-          </a:bodyPr>
-          <a:lstStyle/>
-          <a:p>
-            <a:r>
-              <a:rPr lang="en-GB" sz="4000" dirty="0">
-                <a:latin typeface="Patrick Hand" pitchFamily="2" charset="77"/>
-              </a:rPr>
-              <a:t>………</a:t>
-            </a:r>
-            <a:endParaRPr lang="en-DE" sz="4000" dirty="0">
+              <a:t>Automatically handle missing keys without manual checks</a:t>
+            </a:r>
+            <a:endParaRPr lang="en-DE" sz="6000" dirty="0">
               <a:latin typeface="Patrick Hand" pitchFamily="2" charset="77"/>
             </a:endParaRPr>
           </a:p>
@@ -10797,7 +10765,7 @@
         </p:nvCxnSpPr>
         <p:spPr>
           <a:xfrm>
-            <a:off x="223579" y="8410989"/>
+            <a:off x="223579" y="8194422"/>
             <a:ext cx="9838255" cy="0"/>
           </a:xfrm>
           <a:prstGeom prst="line">
@@ -10805,7 +10773,7 @@
           </a:prstGeom>
           <a:ln w="38100">
             <a:solidFill>
-              <a:srgbClr val="FFC000"/>
+              <a:schemeClr val="bg1"/>
             </a:solidFill>
             <a:headEnd type="none"/>
             <a:tailEnd type="none" w="lg" len="lg"/>
@@ -10841,10 +10809,10 @@
           <p:nvPr/>
         </p:nvPicPr>
         <p:blipFill>
-          <a:blip r:embed="rId3">
+          <a:blip r:embed="rId5">
             <a:extLst>
               <a:ext uri="{96DAC541-7B7A-43D3-8B79-37D633B846F1}">
-                <asvg:svgBlip xmlns:asvg="http://schemas.microsoft.com/office/drawing/2016/SVG/main" r:embed="rId4"/>
+                <asvg:svgBlip xmlns:asvg="http://schemas.microsoft.com/office/drawing/2016/SVG/main" r:embed="rId6"/>
               </a:ext>
             </a:extLst>
           </a:blip>
@@ -10854,7 +10822,7 @@
         </p:blipFill>
         <p:spPr>
           <a:xfrm>
-            <a:off x="7668075" y="8637940"/>
+            <a:off x="6801805" y="9383896"/>
             <a:ext cx="914400" cy="914400"/>
           </a:xfrm>
           <a:prstGeom prst="rect">
@@ -10877,10 +10845,10 @@
           <p:nvPr/>
         </p:nvPicPr>
         <p:blipFill>
-          <a:blip r:embed="rId5">
+          <a:blip r:embed="rId7">
             <a:extLst>
               <a:ext uri="{96DAC541-7B7A-43D3-8B79-37D633B846F1}">
-                <asvg:svgBlip xmlns:asvg="http://schemas.microsoft.com/office/drawing/2016/SVG/main" r:embed="rId6"/>
+                <asvg:svgBlip xmlns:asvg="http://schemas.microsoft.com/office/drawing/2016/SVG/main" r:embed="rId8"/>
               </a:ext>
             </a:extLst>
           </a:blip>
@@ -10890,7 +10858,7 @@
         </p:blipFill>
         <p:spPr>
           <a:xfrm>
-            <a:off x="7668075" y="6560627"/>
+            <a:off x="6801805" y="5044653"/>
             <a:ext cx="914400" cy="914400"/>
           </a:xfrm>
           <a:prstGeom prst="rect">
@@ -10913,7 +10881,7 @@
         <p:spPr>
           <a:xfrm>
             <a:off x="-7857400" y="2527667"/>
-            <a:ext cx="5089855" cy="830997"/>
+            <a:ext cx="6328977" cy="830997"/>
           </a:xfrm>
           <a:prstGeom prst="rect">
             <a:avLst/>
@@ -10946,7 +10914,7 @@
                 </a:solidFill>
                 <a:latin typeface="Patrick Hand" pitchFamily="2" charset="77"/>
               </a:rPr>
-              <a:t>py_017_zip_function</a:t>
+              <a:t>py_018_default_dictionary</a:t>
             </a:r>
             <a:endParaRPr lang="en-DE" sz="4800" dirty="0">
               <a:solidFill>
@@ -10967,6 +10935,11 @@
   <p:clrMapOvr>
     <a:masterClrMapping/>
   </p:clrMapOvr>
+  <p:extLst>
+    <p:ext uri="{6950BFC3-D8DA-4A85-94F7-54DA5524770B}">
+      <p188:commentRel xmlns:p188="http://schemas.microsoft.com/office/powerpoint/2018/8/main" r:id="rId2"/>
+    </p:ext>
+  </p:extLst>
 </p:sld>
 </file>
 
@@ -11221,6 +11194,1471 @@
 </file>
 
 <file path=ppt/slides/slide20.xml><?xml version="1.0" encoding="utf-8"?>
+<p:sld xmlns:a="http://schemas.openxmlformats.org/drawingml/2006/main" xmlns:r="http://schemas.openxmlformats.org/officeDocument/2006/relationships" xmlns:p="http://schemas.openxmlformats.org/presentationml/2006/main">
+  <p:cSld>
+    <p:bg>
+      <p:bgPr>
+        <a:pattFill prst="dotDmnd">
+          <a:fgClr>
+            <a:srgbClr val="00B0F0"/>
+          </a:fgClr>
+          <a:bgClr>
+            <a:schemeClr val="bg1"/>
+          </a:bgClr>
+        </a:pattFill>
+        <a:effectLst/>
+      </p:bgPr>
+    </p:bg>
+    <p:spTree>
+      <p:nvGrpSpPr>
+        <p:cNvPr id="1" name="">
+          <a:extLst>
+            <a:ext uri="{FF2B5EF4-FFF2-40B4-BE49-F238E27FC236}">
+              <a16:creationId xmlns:a16="http://schemas.microsoft.com/office/drawing/2014/main" id="{F24D53D7-C554-1761-5DCC-AC6EB34EA650}"/>
+            </a:ext>
+          </a:extLst>
+        </p:cNvPr>
+        <p:cNvGrpSpPr/>
+        <p:nvPr/>
+      </p:nvGrpSpPr>
+      <p:grpSpPr>
+        <a:xfrm>
+          <a:off x="0" y="0"/>
+          <a:ext cx="0" cy="0"/>
+          <a:chOff x="0" y="0"/>
+          <a:chExt cx="0" cy="0"/>
+        </a:xfrm>
+      </p:grpSpPr>
+      <p:grpSp>
+        <p:nvGrpSpPr>
+          <p:cNvPr id="6" name="Group 5">
+            <a:extLst>
+              <a:ext uri="{FF2B5EF4-FFF2-40B4-BE49-F238E27FC236}">
+                <a16:creationId xmlns:a16="http://schemas.microsoft.com/office/drawing/2014/main" id="{D2100239-D8B1-E60E-72B5-37811A07A7D1}"/>
+              </a:ext>
+            </a:extLst>
+          </p:cNvPr>
+          <p:cNvGrpSpPr/>
+          <p:nvPr/>
+        </p:nvGrpSpPr>
+        <p:grpSpPr>
+          <a:xfrm>
+            <a:off x="223307" y="2872200"/>
+            <a:ext cx="9838799" cy="1219682"/>
+            <a:chOff x="223307" y="2872200"/>
+            <a:chExt cx="9838799" cy="1219682"/>
+          </a:xfrm>
+        </p:grpSpPr>
+        <p:sp>
+          <p:nvSpPr>
+            <p:cNvPr id="4" name="TextBox 3">
+              <a:extLst>
+                <a:ext uri="{FF2B5EF4-FFF2-40B4-BE49-F238E27FC236}">
+                  <a16:creationId xmlns:a16="http://schemas.microsoft.com/office/drawing/2014/main" id="{40A32D35-09AC-080F-F4E8-3A489B3C72CF}"/>
+                </a:ext>
+              </a:extLst>
+            </p:cNvPr>
+            <p:cNvSpPr txBox="1"/>
+            <p:nvPr/>
+          </p:nvSpPr>
+          <p:spPr>
+            <a:xfrm>
+              <a:off x="223307" y="2872200"/>
+              <a:ext cx="9838799" cy="1219682"/>
+            </a:xfrm>
+            <a:prstGeom prst="rect">
+              <a:avLst/>
+            </a:prstGeom>
+            <a:ln/>
+          </p:spPr>
+          <p:style>
+            <a:lnRef idx="2">
+              <a:schemeClr val="accent1">
+                <a:shade val="15000"/>
+              </a:schemeClr>
+            </a:lnRef>
+            <a:fillRef idx="1">
+              <a:schemeClr val="accent1"/>
+            </a:fillRef>
+            <a:effectRef idx="0">
+              <a:schemeClr val="accent1"/>
+            </a:effectRef>
+            <a:fontRef idx="minor">
+              <a:schemeClr val="lt1"/>
+            </a:fontRef>
+          </p:style>
+          <p:txBody>
+            <a:bodyPr wrap="none" rtlCol="0">
+              <a:noAutofit/>
+            </a:bodyPr>
+            <a:lstStyle/>
+            <a:p>
+              <a:pPr marL="0" algn="ctr" defTabSz="457200" rtl="0" eaLnBrk="1" latinLnBrk="0" hangingPunct="1"/>
+              <a:r>
+                <a:rPr lang="en-US" sz="7200" b="1" dirty="0">
+                  <a:ln w="10160">
+                    <a:solidFill>
+                      <a:schemeClr val="accent5"/>
+                    </a:solidFill>
+                    <a:prstDash val="solid"/>
+                  </a:ln>
+                  <a:solidFill>
+                    <a:srgbClr val="FFFFFF"/>
+                  </a:solidFill>
+                  <a:effectLst>
+                    <a:outerShdw blurRad="38100" dist="22860" dir="5400000" algn="tl" rotWithShape="0">
+                      <a:srgbClr val="000000">
+                        <a:alpha val="30000"/>
+                      </a:srgbClr>
+                    </a:outerShdw>
+                  </a:effectLst>
+                  <a:latin typeface="Patrick Hand" pitchFamily="2" charset="77"/>
+                </a:rPr>
+                <a:t>Multiple Return Value</a:t>
+              </a:r>
+              <a:endParaRPr lang="en-GB" sz="2000" b="1" dirty="0">
+                <a:ln w="10160">
+                  <a:solidFill>
+                    <a:schemeClr val="accent5"/>
+                  </a:solidFill>
+                  <a:prstDash val="solid"/>
+                </a:ln>
+                <a:solidFill>
+                  <a:srgbClr val="FFFFFF"/>
+                </a:solidFill>
+                <a:effectLst>
+                  <a:outerShdw blurRad="38100" dist="22860" dir="5400000" algn="tl" rotWithShape="0">
+                    <a:srgbClr val="000000">
+                      <a:alpha val="30000"/>
+                    </a:srgbClr>
+                  </a:outerShdw>
+                </a:effectLst>
+                <a:latin typeface="Patrick Hand" pitchFamily="2" charset="77"/>
+              </a:endParaRPr>
+            </a:p>
+          </p:txBody>
+        </p:sp>
+        <p:pic>
+          <p:nvPicPr>
+            <p:cNvPr id="5" name="Picture 4">
+              <a:extLst>
+                <a:ext uri="{FF2B5EF4-FFF2-40B4-BE49-F238E27FC236}">
+                  <a16:creationId xmlns:a16="http://schemas.microsoft.com/office/drawing/2014/main" id="{D2FF48D3-DFF0-E642-BAD8-3023BF00E2F0}"/>
+                </a:ext>
+              </a:extLst>
+            </p:cNvPr>
+            <p:cNvPicPr>
+              <a:picLocks noChangeAspect="1"/>
+            </p:cNvPicPr>
+            <p:nvPr/>
+          </p:nvPicPr>
+          <p:blipFill>
+            <a:blip r:embed="rId3"/>
+            <a:stretch>
+              <a:fillRect/>
+            </a:stretch>
+          </p:blipFill>
+          <p:spPr>
+            <a:xfrm>
+              <a:off x="304696" y="2978294"/>
+              <a:ext cx="1063167" cy="1063167"/>
+            </a:xfrm>
+            <a:prstGeom prst="rect">
+              <a:avLst/>
+            </a:prstGeom>
+            <a:ln w="19050">
+              <a:solidFill>
+                <a:schemeClr val="bg1"/>
+              </a:solidFill>
+            </a:ln>
+          </p:spPr>
+        </p:pic>
+      </p:grpSp>
+      <p:sp>
+        <p:nvSpPr>
+          <p:cNvPr id="8" name="TextBox 7">
+            <a:extLst>
+              <a:ext uri="{FF2B5EF4-FFF2-40B4-BE49-F238E27FC236}">
+                <a16:creationId xmlns:a16="http://schemas.microsoft.com/office/drawing/2014/main" id="{AEE03D9B-1535-30F4-8FCF-17698FBE3FB4}"/>
+              </a:ext>
+            </a:extLst>
+          </p:cNvPr>
+          <p:cNvSpPr txBox="1"/>
+          <p:nvPr/>
+        </p:nvSpPr>
+        <p:spPr>
+          <a:xfrm>
+            <a:off x="2203568" y="9710039"/>
+            <a:ext cx="5878276" cy="923330"/>
+          </a:xfrm>
+          <a:prstGeom prst="rect">
+            <a:avLst/>
+          </a:prstGeom>
+          <a:noFill/>
+        </p:spPr>
+        <p:txBody>
+          <a:bodyPr wrap="none" rtlCol="0">
+            <a:spAutoFit/>
+          </a:bodyPr>
+          <a:lstStyle/>
+          <a:p>
+            <a:r>
+              <a:rPr lang="en-GB" sz="5400" b="1" dirty="0"/>
+              <a:t>Simple &amp; Powerful: </a:t>
+            </a:r>
+            <a:endParaRPr lang="en-DE" sz="5400" b="1" dirty="0"/>
+          </a:p>
+        </p:txBody>
+      </p:sp>
+      <p:sp>
+        <p:nvSpPr>
+          <p:cNvPr id="13" name="TextBox 12">
+            <a:extLst>
+              <a:ext uri="{FF2B5EF4-FFF2-40B4-BE49-F238E27FC236}">
+                <a16:creationId xmlns:a16="http://schemas.microsoft.com/office/drawing/2014/main" id="{D7D543BA-0420-574A-E215-D1B9F98B2DBB}"/>
+              </a:ext>
+            </a:extLst>
+          </p:cNvPr>
+          <p:cNvSpPr txBox="1"/>
+          <p:nvPr/>
+        </p:nvSpPr>
+        <p:spPr>
+          <a:xfrm>
+            <a:off x="318055" y="10774187"/>
+            <a:ext cx="9649302" cy="1938992"/>
+          </a:xfrm>
+          <a:prstGeom prst="rect">
+            <a:avLst/>
+          </a:prstGeom>
+          <a:noFill/>
+        </p:spPr>
+        <p:txBody>
+          <a:bodyPr wrap="square" rtlCol="0">
+            <a:spAutoFit/>
+          </a:bodyPr>
+          <a:lstStyle/>
+          <a:p>
+            <a:pPr algn="ctr"/>
+            <a:r>
+              <a:rPr lang="en-GB" sz="6000" dirty="0">
+                <a:latin typeface="Patrick Hand" pitchFamily="2" charset="77"/>
+              </a:rPr>
+              <a:t>Return and unpack multiple results in one line</a:t>
+            </a:r>
+            <a:endParaRPr lang="en-DE" sz="6000" dirty="0">
+              <a:latin typeface="Patrick Hand" pitchFamily="2" charset="77"/>
+            </a:endParaRPr>
+          </a:p>
+        </p:txBody>
+      </p:sp>
+      <p:sp>
+        <p:nvSpPr>
+          <p:cNvPr id="25" name="TextBox 24">
+            <a:extLst>
+              <a:ext uri="{FF2B5EF4-FFF2-40B4-BE49-F238E27FC236}">
+                <a16:creationId xmlns:a16="http://schemas.microsoft.com/office/drawing/2014/main" id="{828DCDEF-BA59-D7CF-8D96-C9D844B20FCB}"/>
+              </a:ext>
+            </a:extLst>
+          </p:cNvPr>
+          <p:cNvSpPr txBox="1"/>
+          <p:nvPr/>
+        </p:nvSpPr>
+        <p:spPr>
+          <a:xfrm>
+            <a:off x="-7857400" y="2527667"/>
+            <a:ext cx="7287572" cy="830997"/>
+          </a:xfrm>
+          <a:prstGeom prst="rect">
+            <a:avLst/>
+          </a:prstGeom>
+        </p:spPr>
+        <p:style>
+          <a:lnRef idx="1">
+            <a:schemeClr val="accent2"/>
+          </a:lnRef>
+          <a:fillRef idx="2">
+            <a:schemeClr val="accent2"/>
+          </a:fillRef>
+          <a:effectRef idx="1">
+            <a:schemeClr val="accent2"/>
+          </a:effectRef>
+          <a:fontRef idx="minor">
+            <a:schemeClr val="dk1"/>
+          </a:fontRef>
+        </p:style>
+        <p:txBody>
+          <a:bodyPr wrap="none" rtlCol="0">
+            <a:spAutoFit/>
+          </a:bodyPr>
+          <a:lstStyle/>
+          <a:p>
+            <a:r>
+              <a:rPr lang="en-US" sz="4800" dirty="0">
+                <a:solidFill>
+                  <a:srgbClr val="FF0000"/>
+                </a:solidFill>
+                <a:latin typeface="Patrick Hand" pitchFamily="2" charset="77"/>
+              </a:rPr>
+              <a:t>py_019_multiple_return_value</a:t>
+            </a:r>
+            <a:endParaRPr lang="en-DE" sz="4800" dirty="0">
+              <a:solidFill>
+                <a:srgbClr val="FF0000"/>
+              </a:solidFill>
+              <a:latin typeface="Patrick Hand" pitchFamily="2" charset="77"/>
+            </a:endParaRPr>
+          </a:p>
+        </p:txBody>
+      </p:sp>
+      <p:pic>
+        <p:nvPicPr>
+          <p:cNvPr id="2" name="Picture 1">
+            <a:extLst>
+              <a:ext uri="{FF2B5EF4-FFF2-40B4-BE49-F238E27FC236}">
+                <a16:creationId xmlns:a16="http://schemas.microsoft.com/office/drawing/2014/main" id="{49FE6B99-D46C-A40A-EACB-0A47DA17B4E4}"/>
+              </a:ext>
+            </a:extLst>
+          </p:cNvPr>
+          <p:cNvPicPr>
+            <a:picLocks noChangeAspect="1"/>
+          </p:cNvPicPr>
+          <p:nvPr/>
+        </p:nvPicPr>
+        <p:blipFill rotWithShape="1">
+          <a:blip r:embed="rId4"/>
+          <a:srcRect l="16588" t="29466" r="10502" b="16686"/>
+          <a:stretch>
+            <a:fillRect/>
+          </a:stretch>
+        </p:blipFill>
+        <p:spPr>
+          <a:xfrm>
+            <a:off x="223306" y="4448144"/>
+            <a:ext cx="9838800" cy="4672609"/>
+          </a:xfrm>
+          <a:prstGeom prst="rect">
+            <a:avLst/>
+          </a:prstGeom>
+        </p:spPr>
+      </p:pic>
+    </p:spTree>
+    <p:extLst>
+      <p:ext uri="{BB962C8B-B14F-4D97-AF65-F5344CB8AC3E}">
+        <p14:creationId xmlns:p14="http://schemas.microsoft.com/office/powerpoint/2010/main" val="3792976105"/>
+      </p:ext>
+    </p:extLst>
+  </p:cSld>
+  <p:clrMapOvr>
+    <a:masterClrMapping/>
+  </p:clrMapOvr>
+  <p:extLst>
+    <p:ext uri="{6950BFC3-D8DA-4A85-94F7-54DA5524770B}">
+      <p188:commentRel xmlns:p188="http://schemas.microsoft.com/office/powerpoint/2018/8/main" r:id="rId2"/>
+    </p:ext>
+  </p:extLst>
+</p:sld>
+</file>
+
+<file path=ppt/slides/slide21.xml><?xml version="1.0" encoding="utf-8"?>
+<p:sld xmlns:a="http://schemas.openxmlformats.org/drawingml/2006/main" xmlns:r="http://schemas.openxmlformats.org/officeDocument/2006/relationships" xmlns:p="http://schemas.openxmlformats.org/presentationml/2006/main">
+  <p:cSld>
+    <p:bg>
+      <p:bgPr>
+        <a:pattFill prst="pct20">
+          <a:fgClr>
+            <a:srgbClr val="FFC000"/>
+          </a:fgClr>
+          <a:bgClr>
+            <a:schemeClr val="bg1"/>
+          </a:bgClr>
+        </a:pattFill>
+        <a:effectLst/>
+      </p:bgPr>
+    </p:bg>
+    <p:spTree>
+      <p:nvGrpSpPr>
+        <p:cNvPr id="1" name="">
+          <a:extLst>
+            <a:ext uri="{FF2B5EF4-FFF2-40B4-BE49-F238E27FC236}">
+              <a16:creationId xmlns:a16="http://schemas.microsoft.com/office/drawing/2014/main" id="{9485E1F7-CF23-F6C8-A9F3-B052EC490A9C}"/>
+            </a:ext>
+          </a:extLst>
+        </p:cNvPr>
+        <p:cNvGrpSpPr/>
+        <p:nvPr/>
+      </p:nvGrpSpPr>
+      <p:grpSpPr>
+        <a:xfrm>
+          <a:off x="0" y="0"/>
+          <a:ext cx="0" cy="0"/>
+          <a:chOff x="0" y="0"/>
+          <a:chExt cx="0" cy="0"/>
+        </a:xfrm>
+      </p:grpSpPr>
+      <p:pic>
+        <p:nvPicPr>
+          <p:cNvPr id="2" name="Picture 1">
+            <a:extLst>
+              <a:ext uri="{FF2B5EF4-FFF2-40B4-BE49-F238E27FC236}">
+                <a16:creationId xmlns:a16="http://schemas.microsoft.com/office/drawing/2014/main" id="{89F12D99-136F-A09F-9684-837C02B708BA}"/>
+              </a:ext>
+            </a:extLst>
+          </p:cNvPr>
+          <p:cNvPicPr>
+            <a:picLocks noChangeAspect="1"/>
+          </p:cNvPicPr>
+          <p:nvPr/>
+        </p:nvPicPr>
+        <p:blipFill rotWithShape="1">
+          <a:blip r:embed="rId3"/>
+          <a:srcRect l="20644" t="25292" r="12123" b="18354"/>
+          <a:stretch>
+            <a:fillRect/>
+          </a:stretch>
+        </p:blipFill>
+        <p:spPr>
+          <a:xfrm>
+            <a:off x="223306" y="4607791"/>
+            <a:ext cx="9838800" cy="7095194"/>
+          </a:xfrm>
+          <a:prstGeom prst="rect">
+            <a:avLst/>
+          </a:prstGeom>
+        </p:spPr>
+      </p:pic>
+      <p:sp>
+        <p:nvSpPr>
+          <p:cNvPr id="4" name="TextBox 3">
+            <a:extLst>
+              <a:ext uri="{FF2B5EF4-FFF2-40B4-BE49-F238E27FC236}">
+                <a16:creationId xmlns:a16="http://schemas.microsoft.com/office/drawing/2014/main" id="{BD2AAB60-408C-1685-06B6-CEFFA4819386}"/>
+              </a:ext>
+            </a:extLst>
+          </p:cNvPr>
+          <p:cNvSpPr txBox="1"/>
+          <p:nvPr/>
+        </p:nvSpPr>
+        <p:spPr>
+          <a:xfrm>
+            <a:off x="223306" y="2872199"/>
+            <a:ext cx="9838800" cy="1433029"/>
+          </a:xfrm>
+          <a:prstGeom prst="rect">
+            <a:avLst/>
+          </a:prstGeom>
+          <a:gradFill flip="none" rotWithShape="1">
+            <a:gsLst>
+              <a:gs pos="0">
+                <a:schemeClr val="accent2">
+                  <a:lumMod val="67000"/>
+                </a:schemeClr>
+              </a:gs>
+              <a:gs pos="48000">
+                <a:schemeClr val="accent2">
+                  <a:lumMod val="97000"/>
+                  <a:lumOff val="3000"/>
+                </a:schemeClr>
+              </a:gs>
+              <a:gs pos="100000">
+                <a:schemeClr val="accent2">
+                  <a:lumMod val="60000"/>
+                  <a:lumOff val="40000"/>
+                </a:schemeClr>
+              </a:gs>
+            </a:gsLst>
+            <a:lin ang="16200000" scaled="1"/>
+            <a:tileRect/>
+          </a:gradFill>
+          <a:ln>
+            <a:noFill/>
+          </a:ln>
+        </p:spPr>
+        <p:style>
+          <a:lnRef idx="0">
+            <a:scrgbClr r="0" g="0" b="0"/>
+          </a:lnRef>
+          <a:fillRef idx="0">
+            <a:scrgbClr r="0" g="0" b="0"/>
+          </a:fillRef>
+          <a:effectRef idx="0">
+            <a:scrgbClr r="0" g="0" b="0"/>
+          </a:effectRef>
+          <a:fontRef idx="minor">
+            <a:schemeClr val="lt1"/>
+          </a:fontRef>
+        </p:style>
+        <p:txBody>
+          <a:bodyPr wrap="square" rtlCol="0">
+            <a:noAutofit/>
+          </a:bodyPr>
+          <a:lstStyle/>
+          <a:p>
+            <a:pPr marL="0" algn="ctr" defTabSz="457200" rtl="0" eaLnBrk="1" latinLnBrk="0" hangingPunct="1"/>
+            <a:r>
+              <a:rPr lang="en-US" sz="6600" b="1" spc="50" dirty="0">
+                <a:ln w="0"/>
+                <a:solidFill>
+                  <a:schemeClr val="bg2"/>
+                </a:solidFill>
+                <a:effectLst>
+                  <a:innerShdw blurRad="63500" dist="50800" dir="13500000">
+                    <a:srgbClr val="000000">
+                      <a:alpha val="50000"/>
+                    </a:srgbClr>
+                  </a:innerShdw>
+                </a:effectLst>
+                <a:latin typeface="Patrick Hand" pitchFamily="2" charset="77"/>
+              </a:rPr>
+              <a:t>Avoid </a:t>
+            </a:r>
+            <a:r>
+              <a:rPr lang="en-US" sz="6600" b="1" spc="50" dirty="0" err="1">
+                <a:ln w="0"/>
+                <a:solidFill>
+                  <a:schemeClr val="bg2"/>
+                </a:solidFill>
+                <a:effectLst>
+                  <a:innerShdw blurRad="63500" dist="50800" dir="13500000">
+                    <a:srgbClr val="000000">
+                      <a:alpha val="50000"/>
+                    </a:srgbClr>
+                  </a:innerShdw>
+                </a:effectLst>
+                <a:latin typeface="Patrick Hand" pitchFamily="2" charset="77"/>
+              </a:rPr>
+              <a:t>KeyError</a:t>
+            </a:r>
+            <a:r>
+              <a:rPr lang="en-US" sz="6600" b="1" spc="50" dirty="0">
+                <a:ln w="0"/>
+                <a:solidFill>
+                  <a:schemeClr val="bg2"/>
+                </a:solidFill>
+                <a:effectLst>
+                  <a:innerShdw blurRad="63500" dist="50800" dir="13500000">
+                    <a:srgbClr val="000000">
+                      <a:alpha val="50000"/>
+                    </a:srgbClr>
+                  </a:innerShdw>
+                </a:effectLst>
+                <a:latin typeface="Patrick Hand" pitchFamily="2" charset="77"/>
+              </a:rPr>
+              <a:t> with .get</a:t>
+            </a:r>
+            <a:endParaRPr lang="en-GB" b="1" spc="50" dirty="0">
+              <a:ln w="0"/>
+              <a:solidFill>
+                <a:schemeClr val="bg2"/>
+              </a:solidFill>
+              <a:effectLst>
+                <a:innerShdw blurRad="63500" dist="50800" dir="13500000">
+                  <a:srgbClr val="000000">
+                    <a:alpha val="50000"/>
+                  </a:srgbClr>
+                </a:innerShdw>
+              </a:effectLst>
+              <a:latin typeface="Patrick Hand" pitchFamily="2" charset="77"/>
+            </a:endParaRPr>
+          </a:p>
+        </p:txBody>
+      </p:sp>
+      <p:pic>
+        <p:nvPicPr>
+          <p:cNvPr id="5" name="Picture 4">
+            <a:extLst>
+              <a:ext uri="{FF2B5EF4-FFF2-40B4-BE49-F238E27FC236}">
+                <a16:creationId xmlns:a16="http://schemas.microsoft.com/office/drawing/2014/main" id="{B5CAB263-ACE3-34CD-7C70-2104F2C312BA}"/>
+              </a:ext>
+            </a:extLst>
+          </p:cNvPr>
+          <p:cNvPicPr>
+            <a:picLocks noChangeAspect="1"/>
+          </p:cNvPicPr>
+          <p:nvPr/>
+        </p:nvPicPr>
+        <p:blipFill>
+          <a:blip r:embed="rId4"/>
+          <a:stretch>
+            <a:fillRect/>
+          </a:stretch>
+        </p:blipFill>
+        <p:spPr>
+          <a:xfrm>
+            <a:off x="264001" y="3026420"/>
+            <a:ext cx="1063167" cy="1063167"/>
+          </a:xfrm>
+          <a:prstGeom prst="rect">
+            <a:avLst/>
+          </a:prstGeom>
+        </p:spPr>
+      </p:pic>
+      <p:sp>
+        <p:nvSpPr>
+          <p:cNvPr id="9" name="TextBox 8">
+            <a:extLst>
+              <a:ext uri="{FF2B5EF4-FFF2-40B4-BE49-F238E27FC236}">
+                <a16:creationId xmlns:a16="http://schemas.microsoft.com/office/drawing/2014/main" id="{0A7AC106-07E4-D068-1578-18FAC0C9E102}"/>
+              </a:ext>
+            </a:extLst>
+          </p:cNvPr>
+          <p:cNvSpPr txBox="1"/>
+          <p:nvPr/>
+        </p:nvSpPr>
+        <p:spPr>
+          <a:xfrm>
+            <a:off x="3238114" y="12005547"/>
+            <a:ext cx="3809184" cy="923330"/>
+          </a:xfrm>
+          <a:prstGeom prst="rect">
+            <a:avLst/>
+          </a:prstGeom>
+          <a:noFill/>
+        </p:spPr>
+        <p:txBody>
+          <a:bodyPr wrap="none" rtlCol="0">
+            <a:spAutoFit/>
+          </a:bodyPr>
+          <a:lstStyle/>
+          <a:p>
+            <a:r>
+              <a:rPr lang="en-GB" sz="5400" b="1" dirty="0"/>
+              <a:t>Safe Access: </a:t>
+            </a:r>
+            <a:endParaRPr lang="en-DE" sz="5400" b="1" dirty="0"/>
+          </a:p>
+        </p:txBody>
+      </p:sp>
+      <p:sp>
+        <p:nvSpPr>
+          <p:cNvPr id="13" name="TextBox 12">
+            <a:extLst>
+              <a:ext uri="{FF2B5EF4-FFF2-40B4-BE49-F238E27FC236}">
+                <a16:creationId xmlns:a16="http://schemas.microsoft.com/office/drawing/2014/main" id="{9FD6638E-EA6F-32B1-4BFA-0CBD50D4D970}"/>
+              </a:ext>
+            </a:extLst>
+          </p:cNvPr>
+          <p:cNvSpPr txBox="1"/>
+          <p:nvPr/>
+        </p:nvSpPr>
+        <p:spPr>
+          <a:xfrm>
+            <a:off x="1371052" y="13146897"/>
+            <a:ext cx="7543309" cy="1938992"/>
+          </a:xfrm>
+          <a:prstGeom prst="rect">
+            <a:avLst/>
+          </a:prstGeom>
+          <a:noFill/>
+        </p:spPr>
+        <p:txBody>
+          <a:bodyPr wrap="square" rtlCol="0">
+            <a:spAutoFit/>
+          </a:bodyPr>
+          <a:lstStyle/>
+          <a:p>
+            <a:pPr algn="ctr"/>
+            <a:r>
+              <a:rPr lang="en-GB" sz="6000" dirty="0">
+                <a:latin typeface="Patrick Hand" pitchFamily="2" charset="77"/>
+              </a:rPr>
+              <a:t>Provide a default value if the key doesn’t exist</a:t>
+            </a:r>
+            <a:endParaRPr lang="en-DE" sz="6000" dirty="0">
+              <a:latin typeface="Patrick Hand" pitchFamily="2" charset="77"/>
+            </a:endParaRPr>
+          </a:p>
+        </p:txBody>
+      </p:sp>
+      <p:cxnSp>
+        <p:nvCxnSpPr>
+          <p:cNvPr id="17" name="Straight Connector 16">
+            <a:extLst>
+              <a:ext uri="{FF2B5EF4-FFF2-40B4-BE49-F238E27FC236}">
+                <a16:creationId xmlns:a16="http://schemas.microsoft.com/office/drawing/2014/main" id="{51D7181F-DFC0-6417-899B-A5C5B0470C4D}"/>
+              </a:ext>
+            </a:extLst>
+          </p:cNvPr>
+          <p:cNvCxnSpPr>
+            <a:cxnSpLocks/>
+          </p:cNvCxnSpPr>
+          <p:nvPr/>
+        </p:nvCxnSpPr>
+        <p:spPr>
+          <a:xfrm>
+            <a:off x="223579" y="8410989"/>
+            <a:ext cx="9838255" cy="0"/>
+          </a:xfrm>
+          <a:prstGeom prst="line">
+            <a:avLst/>
+          </a:prstGeom>
+          <a:ln w="38100">
+            <a:solidFill>
+              <a:schemeClr val="bg1"/>
+            </a:solidFill>
+            <a:headEnd type="none"/>
+            <a:tailEnd type="none" w="lg" len="lg"/>
+          </a:ln>
+        </p:spPr>
+        <p:style>
+          <a:lnRef idx="1">
+            <a:schemeClr val="accent1"/>
+          </a:lnRef>
+          <a:fillRef idx="0">
+            <a:schemeClr val="accent1"/>
+          </a:fillRef>
+          <a:effectRef idx="0">
+            <a:schemeClr val="accent1"/>
+          </a:effectRef>
+          <a:fontRef idx="minor">
+            <a:schemeClr val="tx1"/>
+          </a:fontRef>
+        </p:style>
+      </p:cxnSp>
+      <p:pic>
+        <p:nvPicPr>
+          <p:cNvPr id="18" name="Graphic 17" descr="Shield Tick with solid fill">
+            <a:extLst>
+              <a:ext uri="{FF2B5EF4-FFF2-40B4-BE49-F238E27FC236}">
+                <a16:creationId xmlns:a16="http://schemas.microsoft.com/office/drawing/2014/main" id="{7AD552ED-7D07-BDEF-9B15-300D0F875E19}"/>
+              </a:ext>
+            </a:extLst>
+          </p:cNvPr>
+          <p:cNvPicPr>
+            <a:picLocks noChangeAspect="1"/>
+          </p:cNvPicPr>
+          <p:nvPr/>
+        </p:nvPicPr>
+        <p:blipFill>
+          <a:blip r:embed="rId5">
+            <a:extLst>
+              <a:ext uri="{96DAC541-7B7A-43D3-8B79-37D633B846F1}">
+                <asvg:svgBlip xmlns:asvg="http://schemas.microsoft.com/office/drawing/2016/SVG/main" r:embed="rId6"/>
+              </a:ext>
+            </a:extLst>
+          </a:blip>
+          <a:stretch>
+            <a:fillRect/>
+          </a:stretch>
+        </p:blipFill>
+        <p:spPr>
+          <a:xfrm>
+            <a:off x="7018372" y="9576401"/>
+            <a:ext cx="914400" cy="914400"/>
+          </a:xfrm>
+          <a:prstGeom prst="rect">
+            <a:avLst/>
+          </a:prstGeom>
+        </p:spPr>
+      </p:pic>
+      <p:pic>
+        <p:nvPicPr>
+          <p:cNvPr id="19" name="Graphic 18" descr="Close with solid fill">
+            <a:extLst>
+              <a:ext uri="{FF2B5EF4-FFF2-40B4-BE49-F238E27FC236}">
+                <a16:creationId xmlns:a16="http://schemas.microsoft.com/office/drawing/2014/main" id="{EB24EDD7-6205-82C4-2AD7-44A069C74F39}"/>
+              </a:ext>
+            </a:extLst>
+          </p:cNvPr>
+          <p:cNvPicPr>
+            <a:picLocks noChangeAspect="1"/>
+          </p:cNvPicPr>
+          <p:nvPr/>
+        </p:nvPicPr>
+        <p:blipFill>
+          <a:blip r:embed="rId7">
+            <a:extLst>
+              <a:ext uri="{96DAC541-7B7A-43D3-8B79-37D633B846F1}">
+                <asvg:svgBlip xmlns:asvg="http://schemas.microsoft.com/office/drawing/2016/SVG/main" r:embed="rId8"/>
+              </a:ext>
+            </a:extLst>
+          </a:blip>
+          <a:stretch>
+            <a:fillRect/>
+          </a:stretch>
+        </p:blipFill>
+        <p:spPr>
+          <a:xfrm>
+            <a:off x="7018372" y="7162202"/>
+            <a:ext cx="914400" cy="914400"/>
+          </a:xfrm>
+          <a:prstGeom prst="rect">
+            <a:avLst/>
+          </a:prstGeom>
+        </p:spPr>
+      </p:pic>
+      <p:sp>
+        <p:nvSpPr>
+          <p:cNvPr id="25" name="TextBox 24">
+            <a:extLst>
+              <a:ext uri="{FF2B5EF4-FFF2-40B4-BE49-F238E27FC236}">
+                <a16:creationId xmlns:a16="http://schemas.microsoft.com/office/drawing/2014/main" id="{BD6816A8-8951-E4B8-DD67-E6D1C9D37E78}"/>
+              </a:ext>
+            </a:extLst>
+          </p:cNvPr>
+          <p:cNvSpPr txBox="1"/>
+          <p:nvPr/>
+        </p:nvSpPr>
+        <p:spPr>
+          <a:xfrm>
+            <a:off x="-8470937" y="2490606"/>
+            <a:ext cx="8082662" cy="830997"/>
+          </a:xfrm>
+          <a:prstGeom prst="rect">
+            <a:avLst/>
+          </a:prstGeom>
+        </p:spPr>
+        <p:style>
+          <a:lnRef idx="1">
+            <a:schemeClr val="accent2"/>
+          </a:lnRef>
+          <a:fillRef idx="2">
+            <a:schemeClr val="accent2"/>
+          </a:fillRef>
+          <a:effectRef idx="1">
+            <a:schemeClr val="accent2"/>
+          </a:effectRef>
+          <a:fontRef idx="minor">
+            <a:schemeClr val="dk1"/>
+          </a:fontRef>
+        </p:style>
+        <p:txBody>
+          <a:bodyPr wrap="none" rtlCol="0">
+            <a:spAutoFit/>
+          </a:bodyPr>
+          <a:lstStyle/>
+          <a:p>
+            <a:r>
+              <a:rPr lang="en-US" sz="4800" dirty="0">
+                <a:solidFill>
+                  <a:srgbClr val="FF0000"/>
+                </a:solidFill>
+                <a:latin typeface="Patrick Hand" pitchFamily="2" charset="77"/>
+              </a:rPr>
+              <a:t>py_20_avoid_key_error_with_get</a:t>
+            </a:r>
+            <a:endParaRPr lang="en-DE" sz="4800" dirty="0">
+              <a:solidFill>
+                <a:srgbClr val="FF0000"/>
+              </a:solidFill>
+              <a:latin typeface="Patrick Hand" pitchFamily="2" charset="77"/>
+            </a:endParaRPr>
+          </a:p>
+        </p:txBody>
+      </p:sp>
+    </p:spTree>
+    <p:extLst>
+      <p:ext uri="{BB962C8B-B14F-4D97-AF65-F5344CB8AC3E}">
+        <p14:creationId xmlns:p14="http://schemas.microsoft.com/office/powerpoint/2010/main" val="2644684110"/>
+      </p:ext>
+    </p:extLst>
+  </p:cSld>
+  <p:clrMapOvr>
+    <a:masterClrMapping/>
+  </p:clrMapOvr>
+  <p:extLst>
+    <p:ext uri="{6950BFC3-D8DA-4A85-94F7-54DA5524770B}">
+      <p188:commentRel xmlns:p188="http://schemas.microsoft.com/office/powerpoint/2018/8/main" r:id="rId2"/>
+    </p:ext>
+  </p:extLst>
+</p:sld>
+</file>
+
+<file path=ppt/slides/slide22.xml><?xml version="1.0" encoding="utf-8"?>
+<p:sld xmlns:a="http://schemas.openxmlformats.org/drawingml/2006/main" xmlns:r="http://schemas.openxmlformats.org/officeDocument/2006/relationships" xmlns:p="http://schemas.openxmlformats.org/presentationml/2006/main">
+  <p:cSld>
+    <p:bg>
+      <p:bgPr>
+        <a:pattFill prst="pct20">
+          <a:fgClr>
+            <a:srgbClr val="FFC000"/>
+          </a:fgClr>
+          <a:bgClr>
+            <a:schemeClr val="bg1"/>
+          </a:bgClr>
+        </a:pattFill>
+        <a:effectLst/>
+      </p:bgPr>
+    </p:bg>
+    <p:spTree>
+      <p:nvGrpSpPr>
+        <p:cNvPr id="1" name="">
+          <a:extLst>
+            <a:ext uri="{FF2B5EF4-FFF2-40B4-BE49-F238E27FC236}">
+              <a16:creationId xmlns:a16="http://schemas.microsoft.com/office/drawing/2014/main" id="{09CDAF59-CBD9-461F-8E68-1D30AF0E66DD}"/>
+            </a:ext>
+          </a:extLst>
+        </p:cNvPr>
+        <p:cNvGrpSpPr/>
+        <p:nvPr/>
+      </p:nvGrpSpPr>
+      <p:grpSpPr>
+        <a:xfrm>
+          <a:off x="0" y="0"/>
+          <a:ext cx="0" cy="0"/>
+          <a:chOff x="0" y="0"/>
+          <a:chExt cx="0" cy="0"/>
+        </a:xfrm>
+      </p:grpSpPr>
+      <p:sp>
+        <p:nvSpPr>
+          <p:cNvPr id="4" name="TextBox 3">
+            <a:extLst>
+              <a:ext uri="{FF2B5EF4-FFF2-40B4-BE49-F238E27FC236}">
+                <a16:creationId xmlns:a16="http://schemas.microsoft.com/office/drawing/2014/main" id="{0BD72BD2-F9FE-4317-F9A1-80663D519C8C}"/>
+              </a:ext>
+            </a:extLst>
+          </p:cNvPr>
+          <p:cNvSpPr txBox="1"/>
+          <p:nvPr/>
+        </p:nvSpPr>
+        <p:spPr>
+          <a:xfrm>
+            <a:off x="223306" y="2872200"/>
+            <a:ext cx="9838800" cy="1107996"/>
+          </a:xfrm>
+          <a:prstGeom prst="rect">
+            <a:avLst/>
+          </a:prstGeom>
+          <a:ln/>
+        </p:spPr>
+        <p:style>
+          <a:lnRef idx="0">
+            <a:schemeClr val="accent6"/>
+          </a:lnRef>
+          <a:fillRef idx="3">
+            <a:schemeClr val="accent6"/>
+          </a:fillRef>
+          <a:effectRef idx="3">
+            <a:schemeClr val="accent6"/>
+          </a:effectRef>
+          <a:fontRef idx="minor">
+            <a:schemeClr val="lt1"/>
+          </a:fontRef>
+        </p:style>
+        <p:txBody>
+          <a:bodyPr wrap="square" rtlCol="0">
+            <a:spAutoFit/>
+            <a:scene3d>
+              <a:camera prst="orthographicFront"/>
+              <a:lightRig rig="harsh" dir="t"/>
+            </a:scene3d>
+            <a:sp3d extrusionH="57150" prstMaterial="matte">
+              <a:bevelT w="63500" h="12700" prst="angle"/>
+              <a:contourClr>
+                <a:schemeClr val="bg1">
+                  <a:lumMod val="65000"/>
+                </a:schemeClr>
+              </a:contourClr>
+            </a:sp3d>
+          </a:bodyPr>
+          <a:lstStyle/>
+          <a:p>
+            <a:pPr algn="ctr"/>
+            <a:r>
+              <a:rPr lang="en-GB" sz="6600" b="1" dirty="0">
+                <a:ln/>
+                <a:pattFill prst="dkUpDiag">
+                  <a:fgClr>
+                    <a:schemeClr val="bg1">
+                      <a:lumMod val="50000"/>
+                    </a:schemeClr>
+                  </a:fgClr>
+                  <a:bgClr>
+                    <a:schemeClr val="tx1">
+                      <a:lumMod val="75000"/>
+                      <a:lumOff val="25000"/>
+                    </a:schemeClr>
+                  </a:bgClr>
+                </a:pattFill>
+                <a:effectLst>
+                  <a:outerShdw blurRad="38100" dist="19050" dir="2700000" algn="tl" rotWithShape="0">
+                    <a:schemeClr val="dk1">
+                      <a:lumMod val="50000"/>
+                      <a:alpha val="40000"/>
+                    </a:schemeClr>
+                  </a:outerShdw>
+                </a:effectLst>
+                <a:latin typeface="Patrick Hand" pitchFamily="2" charset="77"/>
+              </a:rPr>
+              <a:t>….</a:t>
+            </a:r>
+            <a:endParaRPr lang="en-GB" b="1" dirty="0">
+              <a:ln/>
+              <a:pattFill prst="dkUpDiag">
+                <a:fgClr>
+                  <a:schemeClr val="bg1">
+                    <a:lumMod val="50000"/>
+                  </a:schemeClr>
+                </a:fgClr>
+                <a:bgClr>
+                  <a:schemeClr val="tx1">
+                    <a:lumMod val="75000"/>
+                    <a:lumOff val="25000"/>
+                  </a:schemeClr>
+                </a:bgClr>
+              </a:pattFill>
+              <a:effectLst>
+                <a:outerShdw blurRad="38100" dist="19050" dir="2700000" algn="tl" rotWithShape="0">
+                  <a:schemeClr val="dk1">
+                    <a:lumMod val="50000"/>
+                    <a:alpha val="40000"/>
+                  </a:schemeClr>
+                </a:outerShdw>
+              </a:effectLst>
+              <a:latin typeface="Patrick Hand" pitchFamily="2" charset="77"/>
+            </a:endParaRPr>
+          </a:p>
+        </p:txBody>
+      </p:sp>
+      <p:pic>
+        <p:nvPicPr>
+          <p:cNvPr id="5" name="Picture 4">
+            <a:extLst>
+              <a:ext uri="{FF2B5EF4-FFF2-40B4-BE49-F238E27FC236}">
+                <a16:creationId xmlns:a16="http://schemas.microsoft.com/office/drawing/2014/main" id="{1D2A5AEC-AF19-F148-8F15-C689B6EDDAF2}"/>
+              </a:ext>
+            </a:extLst>
+          </p:cNvPr>
+          <p:cNvPicPr>
+            <a:picLocks noChangeAspect="1"/>
+          </p:cNvPicPr>
+          <p:nvPr/>
+        </p:nvPicPr>
+        <p:blipFill>
+          <a:blip r:embed="rId2"/>
+          <a:stretch>
+            <a:fillRect/>
+          </a:stretch>
+        </p:blipFill>
+        <p:spPr>
+          <a:xfrm>
+            <a:off x="264001" y="2906105"/>
+            <a:ext cx="1063167" cy="1063167"/>
+          </a:xfrm>
+          <a:prstGeom prst="rect">
+            <a:avLst/>
+          </a:prstGeom>
+        </p:spPr>
+      </p:pic>
+      <p:sp>
+        <p:nvSpPr>
+          <p:cNvPr id="7" name="TextBox 6">
+            <a:extLst>
+              <a:ext uri="{FF2B5EF4-FFF2-40B4-BE49-F238E27FC236}">
+                <a16:creationId xmlns:a16="http://schemas.microsoft.com/office/drawing/2014/main" id="{0A18E55B-B532-AF6F-765F-25C886D37DFB}"/>
+              </a:ext>
+            </a:extLst>
+          </p:cNvPr>
+          <p:cNvSpPr txBox="1"/>
+          <p:nvPr/>
+        </p:nvSpPr>
+        <p:spPr>
+          <a:xfrm>
+            <a:off x="223306" y="11731083"/>
+            <a:ext cx="2176301" cy="707886"/>
+          </a:xfrm>
+          <a:prstGeom prst="rect">
+            <a:avLst/>
+          </a:prstGeom>
+          <a:noFill/>
+        </p:spPr>
+        <p:txBody>
+          <a:bodyPr wrap="none" rtlCol="0">
+            <a:spAutoFit/>
+          </a:bodyPr>
+          <a:lstStyle/>
+          <a:p>
+            <a:r>
+              <a:rPr lang="en-GB" sz="4000" b="1" dirty="0"/>
+              <a:t>Efficient:</a:t>
+            </a:r>
+            <a:r>
+              <a:rPr lang="en-GB" sz="4000" dirty="0"/>
+              <a:t> </a:t>
+            </a:r>
+            <a:endParaRPr lang="en-DE" sz="4000" dirty="0"/>
+          </a:p>
+        </p:txBody>
+      </p:sp>
+      <p:sp>
+        <p:nvSpPr>
+          <p:cNvPr id="11" name="TextBox 10">
+            <a:extLst>
+              <a:ext uri="{FF2B5EF4-FFF2-40B4-BE49-F238E27FC236}">
+                <a16:creationId xmlns:a16="http://schemas.microsoft.com/office/drawing/2014/main" id="{36272884-833E-D842-26A5-003D209E8E30}"/>
+              </a:ext>
+            </a:extLst>
+          </p:cNvPr>
+          <p:cNvSpPr txBox="1"/>
+          <p:nvPr/>
+        </p:nvSpPr>
+        <p:spPr>
+          <a:xfrm>
+            <a:off x="2369994" y="11731083"/>
+            <a:ext cx="7680579" cy="707886"/>
+          </a:xfrm>
+          <a:prstGeom prst="rect">
+            <a:avLst/>
+          </a:prstGeom>
+          <a:noFill/>
+        </p:spPr>
+        <p:txBody>
+          <a:bodyPr wrap="square" rtlCol="0">
+            <a:spAutoFit/>
+          </a:bodyPr>
+          <a:lstStyle/>
+          <a:p>
+            <a:r>
+              <a:rPr lang="en-GB" sz="4000" dirty="0">
+                <a:latin typeface="Patrick Hand" pitchFamily="2" charset="77"/>
+              </a:rPr>
+              <a:t>………..</a:t>
+            </a:r>
+            <a:endParaRPr lang="en-DE" sz="4000" dirty="0">
+              <a:latin typeface="Patrick Hand" pitchFamily="2" charset="77"/>
+            </a:endParaRPr>
+          </a:p>
+        </p:txBody>
+      </p:sp>
+      <p:sp>
+        <p:nvSpPr>
+          <p:cNvPr id="8" name="TextBox 7">
+            <a:extLst>
+              <a:ext uri="{FF2B5EF4-FFF2-40B4-BE49-F238E27FC236}">
+                <a16:creationId xmlns:a16="http://schemas.microsoft.com/office/drawing/2014/main" id="{462A35DE-94FD-DA6A-9C0C-451383C4CF07}"/>
+              </a:ext>
+            </a:extLst>
+          </p:cNvPr>
+          <p:cNvSpPr txBox="1"/>
+          <p:nvPr/>
+        </p:nvSpPr>
+        <p:spPr>
+          <a:xfrm>
+            <a:off x="223306" y="12814182"/>
+            <a:ext cx="2310120" cy="707886"/>
+          </a:xfrm>
+          <a:prstGeom prst="rect">
+            <a:avLst/>
+          </a:prstGeom>
+          <a:noFill/>
+        </p:spPr>
+        <p:txBody>
+          <a:bodyPr wrap="none" rtlCol="0">
+            <a:spAutoFit/>
+          </a:bodyPr>
+          <a:lstStyle/>
+          <a:p>
+            <a:r>
+              <a:rPr lang="en-GB" sz="4000" b="1" dirty="0"/>
+              <a:t>Pythonic: </a:t>
+            </a:r>
+            <a:endParaRPr lang="en-DE" sz="4000" b="1" dirty="0"/>
+          </a:p>
+        </p:txBody>
+      </p:sp>
+      <p:sp>
+        <p:nvSpPr>
+          <p:cNvPr id="12" name="TextBox 11">
+            <a:extLst>
+              <a:ext uri="{FF2B5EF4-FFF2-40B4-BE49-F238E27FC236}">
+                <a16:creationId xmlns:a16="http://schemas.microsoft.com/office/drawing/2014/main" id="{7AF0B9C8-9A25-A1E6-E704-0816B2E60005}"/>
+              </a:ext>
+            </a:extLst>
+          </p:cNvPr>
+          <p:cNvSpPr txBox="1"/>
+          <p:nvPr/>
+        </p:nvSpPr>
+        <p:spPr>
+          <a:xfrm>
+            <a:off x="2369994" y="12804706"/>
+            <a:ext cx="7915419" cy="707886"/>
+          </a:xfrm>
+          <a:prstGeom prst="rect">
+            <a:avLst/>
+          </a:prstGeom>
+          <a:noFill/>
+        </p:spPr>
+        <p:txBody>
+          <a:bodyPr wrap="square" rtlCol="0">
+            <a:spAutoFit/>
+          </a:bodyPr>
+          <a:lstStyle/>
+          <a:p>
+            <a:r>
+              <a:rPr lang="en-DE" sz="4000" dirty="0">
+                <a:latin typeface="Patrick Hand" pitchFamily="2" charset="77"/>
+              </a:rPr>
+              <a:t>……..</a:t>
+            </a:r>
+          </a:p>
+        </p:txBody>
+      </p:sp>
+      <p:sp>
+        <p:nvSpPr>
+          <p:cNvPr id="9" name="TextBox 8">
+            <a:extLst>
+              <a:ext uri="{FF2B5EF4-FFF2-40B4-BE49-F238E27FC236}">
+                <a16:creationId xmlns:a16="http://schemas.microsoft.com/office/drawing/2014/main" id="{434FF65A-91EF-5586-737F-A3BD67B5A3CE}"/>
+              </a:ext>
+            </a:extLst>
+          </p:cNvPr>
+          <p:cNvSpPr txBox="1"/>
+          <p:nvPr/>
+        </p:nvSpPr>
+        <p:spPr>
+          <a:xfrm>
+            <a:off x="223306" y="13897281"/>
+            <a:ext cx="1887055" cy="707886"/>
+          </a:xfrm>
+          <a:prstGeom prst="rect">
+            <a:avLst/>
+          </a:prstGeom>
+          <a:noFill/>
+        </p:spPr>
+        <p:txBody>
+          <a:bodyPr wrap="none" rtlCol="0">
+            <a:spAutoFit/>
+          </a:bodyPr>
+          <a:lstStyle/>
+          <a:p>
+            <a:r>
+              <a:rPr lang="en-GB" sz="4000" b="1" dirty="0"/>
+              <a:t>Simple: </a:t>
+            </a:r>
+            <a:endParaRPr lang="en-DE" sz="4000" b="1" dirty="0"/>
+          </a:p>
+        </p:txBody>
+      </p:sp>
+      <p:sp>
+        <p:nvSpPr>
+          <p:cNvPr id="13" name="TextBox 12">
+            <a:extLst>
+              <a:ext uri="{FF2B5EF4-FFF2-40B4-BE49-F238E27FC236}">
+                <a16:creationId xmlns:a16="http://schemas.microsoft.com/office/drawing/2014/main" id="{0648EFF2-E0D8-F8FF-C123-6FC2CA55A51E}"/>
+              </a:ext>
+            </a:extLst>
+          </p:cNvPr>
+          <p:cNvSpPr txBox="1"/>
+          <p:nvPr/>
+        </p:nvSpPr>
+        <p:spPr>
+          <a:xfrm>
+            <a:off x="2369994" y="13878330"/>
+            <a:ext cx="7543309" cy="707886"/>
+          </a:xfrm>
+          <a:prstGeom prst="rect">
+            <a:avLst/>
+          </a:prstGeom>
+          <a:noFill/>
+        </p:spPr>
+        <p:txBody>
+          <a:bodyPr wrap="square" rtlCol="0">
+            <a:spAutoFit/>
+          </a:bodyPr>
+          <a:lstStyle/>
+          <a:p>
+            <a:r>
+              <a:rPr lang="en-GB" sz="4000" dirty="0">
+                <a:latin typeface="Patrick Hand" pitchFamily="2" charset="77"/>
+              </a:rPr>
+              <a:t>………</a:t>
+            </a:r>
+            <a:endParaRPr lang="en-DE" sz="4000" dirty="0">
+              <a:latin typeface="Patrick Hand" pitchFamily="2" charset="77"/>
+            </a:endParaRPr>
+          </a:p>
+        </p:txBody>
+      </p:sp>
+      <p:cxnSp>
+        <p:nvCxnSpPr>
+          <p:cNvPr id="17" name="Straight Connector 16">
+            <a:extLst>
+              <a:ext uri="{FF2B5EF4-FFF2-40B4-BE49-F238E27FC236}">
+                <a16:creationId xmlns:a16="http://schemas.microsoft.com/office/drawing/2014/main" id="{D0A40FC9-EB41-92D7-9BF1-68A99D969FEA}"/>
+              </a:ext>
+            </a:extLst>
+          </p:cNvPr>
+          <p:cNvCxnSpPr>
+            <a:cxnSpLocks/>
+          </p:cNvCxnSpPr>
+          <p:nvPr/>
+        </p:nvCxnSpPr>
+        <p:spPr>
+          <a:xfrm>
+            <a:off x="223579" y="8410989"/>
+            <a:ext cx="9838255" cy="0"/>
+          </a:xfrm>
+          <a:prstGeom prst="line">
+            <a:avLst/>
+          </a:prstGeom>
+          <a:ln w="38100">
+            <a:solidFill>
+              <a:srgbClr val="FFC000"/>
+            </a:solidFill>
+            <a:headEnd type="none"/>
+            <a:tailEnd type="none" w="lg" len="lg"/>
+          </a:ln>
+        </p:spPr>
+        <p:style>
+          <a:lnRef idx="1">
+            <a:schemeClr val="accent1"/>
+          </a:lnRef>
+          <a:fillRef idx="0">
+            <a:schemeClr val="accent1"/>
+          </a:fillRef>
+          <a:effectRef idx="0">
+            <a:schemeClr val="accent1"/>
+          </a:effectRef>
+          <a:fontRef idx="minor">
+            <a:schemeClr val="tx1"/>
+          </a:fontRef>
+        </p:style>
+      </p:cxnSp>
+      <p:pic>
+        <p:nvPicPr>
+          <p:cNvPr id="18" name="Graphic 17" descr="Shield Tick with solid fill">
+            <a:extLst>
+              <a:ext uri="{FF2B5EF4-FFF2-40B4-BE49-F238E27FC236}">
+                <a16:creationId xmlns:a16="http://schemas.microsoft.com/office/drawing/2014/main" id="{93BD8A54-8101-3B75-6B1B-76E7C2D74E0A}"/>
+              </a:ext>
+            </a:extLst>
+          </p:cNvPr>
+          <p:cNvPicPr>
+            <a:picLocks noChangeAspect="1"/>
+          </p:cNvPicPr>
+          <p:nvPr/>
+        </p:nvPicPr>
+        <p:blipFill>
+          <a:blip r:embed="rId3">
+            <a:extLst>
+              <a:ext uri="{96DAC541-7B7A-43D3-8B79-37D633B846F1}">
+                <asvg:svgBlip xmlns:asvg="http://schemas.microsoft.com/office/drawing/2016/SVG/main" r:embed="rId4"/>
+              </a:ext>
+            </a:extLst>
+          </a:blip>
+          <a:stretch>
+            <a:fillRect/>
+          </a:stretch>
+        </p:blipFill>
+        <p:spPr>
+          <a:xfrm>
+            <a:off x="7668075" y="8637940"/>
+            <a:ext cx="914400" cy="914400"/>
+          </a:xfrm>
+          <a:prstGeom prst="rect">
+            <a:avLst/>
+          </a:prstGeom>
+        </p:spPr>
+      </p:pic>
+      <p:pic>
+        <p:nvPicPr>
+          <p:cNvPr id="19" name="Graphic 18" descr="Close with solid fill">
+            <a:extLst>
+              <a:ext uri="{FF2B5EF4-FFF2-40B4-BE49-F238E27FC236}">
+                <a16:creationId xmlns:a16="http://schemas.microsoft.com/office/drawing/2014/main" id="{65627446-F864-EA8D-71CE-ABA0926A7A6C}"/>
+              </a:ext>
+            </a:extLst>
+          </p:cNvPr>
+          <p:cNvPicPr>
+            <a:picLocks noChangeAspect="1"/>
+          </p:cNvPicPr>
+          <p:nvPr/>
+        </p:nvPicPr>
+        <p:blipFill>
+          <a:blip r:embed="rId5">
+            <a:extLst>
+              <a:ext uri="{96DAC541-7B7A-43D3-8B79-37D633B846F1}">
+                <asvg:svgBlip xmlns:asvg="http://schemas.microsoft.com/office/drawing/2016/SVG/main" r:embed="rId6"/>
+              </a:ext>
+            </a:extLst>
+          </a:blip>
+          <a:stretch>
+            <a:fillRect/>
+          </a:stretch>
+        </p:blipFill>
+        <p:spPr>
+          <a:xfrm>
+            <a:off x="7668075" y="6560627"/>
+            <a:ext cx="914400" cy="914400"/>
+          </a:xfrm>
+          <a:prstGeom prst="rect">
+            <a:avLst/>
+          </a:prstGeom>
+        </p:spPr>
+      </p:pic>
+      <p:sp>
+        <p:nvSpPr>
+          <p:cNvPr id="25" name="TextBox 24">
+            <a:extLst>
+              <a:ext uri="{FF2B5EF4-FFF2-40B4-BE49-F238E27FC236}">
+                <a16:creationId xmlns:a16="http://schemas.microsoft.com/office/drawing/2014/main" id="{884C6B1D-A820-F177-EC23-1C1DB33A59BE}"/>
+              </a:ext>
+            </a:extLst>
+          </p:cNvPr>
+          <p:cNvSpPr txBox="1"/>
+          <p:nvPr/>
+        </p:nvSpPr>
+        <p:spPr>
+          <a:xfrm>
+            <a:off x="-7857400" y="2527667"/>
+            <a:ext cx="5089855" cy="830997"/>
+          </a:xfrm>
+          <a:prstGeom prst="rect">
+            <a:avLst/>
+          </a:prstGeom>
+        </p:spPr>
+        <p:style>
+          <a:lnRef idx="1">
+            <a:schemeClr val="accent2"/>
+          </a:lnRef>
+          <a:fillRef idx="2">
+            <a:schemeClr val="accent2"/>
+          </a:fillRef>
+          <a:effectRef idx="1">
+            <a:schemeClr val="accent2"/>
+          </a:effectRef>
+          <a:fontRef idx="minor">
+            <a:schemeClr val="dk1"/>
+          </a:fontRef>
+        </p:style>
+        <p:txBody>
+          <a:bodyPr wrap="none" rtlCol="0">
+            <a:spAutoFit/>
+          </a:bodyPr>
+          <a:lstStyle/>
+          <a:p>
+            <a:r>
+              <a:rPr lang="en-US" sz="4800" dirty="0">
+                <a:solidFill>
+                  <a:srgbClr val="FF0000"/>
+                </a:solidFill>
+                <a:latin typeface="Patrick Hand" pitchFamily="2" charset="77"/>
+              </a:rPr>
+              <a:t>py_017_zip_function</a:t>
+            </a:r>
+            <a:endParaRPr lang="en-DE" sz="4800" dirty="0">
+              <a:solidFill>
+                <a:srgbClr val="FF0000"/>
+              </a:solidFill>
+              <a:latin typeface="Patrick Hand" pitchFamily="2" charset="77"/>
+            </a:endParaRPr>
+          </a:p>
+        </p:txBody>
+      </p:sp>
+    </p:spTree>
+    <p:extLst>
+      <p:ext uri="{BB962C8B-B14F-4D97-AF65-F5344CB8AC3E}">
+        <p14:creationId xmlns:p14="http://schemas.microsoft.com/office/powerpoint/2010/main" val="1183855825"/>
+      </p:ext>
+    </p:extLst>
+  </p:cSld>
+  <p:clrMapOvr>
+    <a:masterClrMapping/>
+  </p:clrMapOvr>
+</p:sld>
+</file>
+
+<file path=ppt/slides/slide23.xml><?xml version="1.0" encoding="utf-8"?>
 <p:sld xmlns:a="http://schemas.openxmlformats.org/drawingml/2006/main" xmlns:r="http://schemas.openxmlformats.org/officeDocument/2006/relationships" xmlns:p="http://schemas.openxmlformats.org/presentationml/2006/main">
   <p:cSld>
     <p:spTree>

</xml_diff>

<commit_message>
feat: added typescript folder to project
</commit_message>
<xml_diff>
--- a/assets/get-ready.pptx
+++ b/assets/get-ready.pptx
@@ -29,7 +29,7 @@
     <p:sldId id="292" r:id="rId20"/>
     <p:sldId id="293" r:id="rId21"/>
     <p:sldId id="294" r:id="rId22"/>
-    <p:sldId id="295" r:id="rId23"/>
+    <p:sldId id="296" r:id="rId23"/>
     <p:sldId id="282" r:id="rId24"/>
   </p:sldIdLst>
   <p:sldSz cx="10285413" cy="18288000"/>
@@ -12084,7 +12084,7 @@
         <p:cNvPr id="1" name="">
           <a:extLst>
             <a:ext uri="{FF2B5EF4-FFF2-40B4-BE49-F238E27FC236}">
-              <a16:creationId xmlns:a16="http://schemas.microsoft.com/office/drawing/2014/main" id="{09CDAF59-CBD9-461F-8E68-1D30AF0E66DD}"/>
+              <a16:creationId xmlns:a16="http://schemas.microsoft.com/office/drawing/2014/main" id="{656F2E0E-FFBE-6249-EF00-B6BD98726155}"/>
             </a:ext>
           </a:extLst>
         </p:cNvPr>
@@ -12104,7 +12104,7 @@
           <p:cNvPr id="4" name="TextBox 3">
             <a:extLst>
               <a:ext uri="{FF2B5EF4-FFF2-40B4-BE49-F238E27FC236}">
-                <a16:creationId xmlns:a16="http://schemas.microsoft.com/office/drawing/2014/main" id="{0BD72BD2-F9FE-4317-F9A1-80663D519C8C}"/>
+                <a16:creationId xmlns:a16="http://schemas.microsoft.com/office/drawing/2014/main" id="{93411C09-F441-2209-3B70-426112066B8E}"/>
               </a:ext>
             </a:extLst>
           </p:cNvPr>
@@ -12154,6 +12154,34 @@
           <a:lstStyle/>
           <a:p>
             <a:pPr algn="ctr"/>
+            <a:r>
+              <a:rPr lang="en-GB" sz="6600" b="1">
+                <a:ln/>
+                <a:pattFill prst="dkUpDiag">
+                  <a:fgClr>
+                    <a:schemeClr val="bg1">
+                      <a:lumMod val="50000"/>
+                    </a:schemeClr>
+                  </a:fgClr>
+                  <a:bgClr>
+                    <a:schemeClr val="tx1">
+                      <a:lumMod val="75000"/>
+                      <a:lumOff val="25000"/>
+                    </a:schemeClr>
+                  </a:bgClr>
+                </a:pattFill>
+                <a:effectLst>
+                  <a:outerShdw blurRad="38100" dist="19050" dir="2700000" algn="tl" rotWithShape="0">
+                    <a:schemeClr val="dk1">
+                      <a:lumMod val="50000"/>
+                      <a:alpha val="40000"/>
+                    </a:schemeClr>
+                  </a:outerShdw>
+                </a:effectLst>
+                <a:latin typeface="Patrick Hand" pitchFamily="2" charset="77"/>
+              </a:rPr>
+              <a:t>Stop Nested </a:t>
+            </a:r>
             <a:r>
               <a:rPr lang="en-GB" sz="6600" b="1" dirty="0">
                 <a:ln/>
@@ -12180,7 +12208,7 @@
                 </a:effectLst>
                 <a:latin typeface="Patrick Hand" pitchFamily="2" charset="77"/>
               </a:rPr>
-              <a:t>….</a:t>
+              <a:t>if Checks</a:t>
             </a:r>
             <a:endParaRPr lang="en-GB" b="1" dirty="0">
               <a:ln/>
@@ -12210,42 +12238,12 @@
           </a:p>
         </p:txBody>
       </p:sp>
-      <p:pic>
-        <p:nvPicPr>
-          <p:cNvPr id="5" name="Picture 4">
-            <a:extLst>
-              <a:ext uri="{FF2B5EF4-FFF2-40B4-BE49-F238E27FC236}">
-                <a16:creationId xmlns:a16="http://schemas.microsoft.com/office/drawing/2014/main" id="{1D2A5AEC-AF19-F148-8F15-C689B6EDDAF2}"/>
-              </a:ext>
-            </a:extLst>
-          </p:cNvPr>
-          <p:cNvPicPr>
-            <a:picLocks noChangeAspect="1"/>
-          </p:cNvPicPr>
-          <p:nvPr/>
-        </p:nvPicPr>
-        <p:blipFill>
-          <a:blip r:embed="rId2"/>
-          <a:stretch>
-            <a:fillRect/>
-          </a:stretch>
-        </p:blipFill>
-        <p:spPr>
-          <a:xfrm>
-            <a:off x="264001" y="2906105"/>
-            <a:ext cx="1063167" cy="1063167"/>
-          </a:xfrm>
-          <a:prstGeom prst="rect">
-            <a:avLst/>
-          </a:prstGeom>
-        </p:spPr>
-      </p:pic>
       <p:sp>
         <p:nvSpPr>
           <p:cNvPr id="7" name="TextBox 6">
             <a:extLst>
               <a:ext uri="{FF2B5EF4-FFF2-40B4-BE49-F238E27FC236}">
-                <a16:creationId xmlns:a16="http://schemas.microsoft.com/office/drawing/2014/main" id="{0A18E55B-B532-AF6F-765F-25C886D37DFB}"/>
+                <a16:creationId xmlns:a16="http://schemas.microsoft.com/office/drawing/2014/main" id="{346C60D0-D359-69C0-00FA-EC87FC35499F}"/>
               </a:ext>
             </a:extLst>
           </p:cNvPr>
@@ -12285,7 +12283,7 @@
           <p:cNvPr id="11" name="TextBox 10">
             <a:extLst>
               <a:ext uri="{FF2B5EF4-FFF2-40B4-BE49-F238E27FC236}">
-                <a16:creationId xmlns:a16="http://schemas.microsoft.com/office/drawing/2014/main" id="{36272884-833E-D842-26A5-003D209E8E30}"/>
+                <a16:creationId xmlns:a16="http://schemas.microsoft.com/office/drawing/2014/main" id="{501C8498-EE36-53B4-1193-AA2A804F528F}"/>
               </a:ext>
             </a:extLst>
           </p:cNvPr>
@@ -12325,7 +12323,7 @@
           <p:cNvPr id="8" name="TextBox 7">
             <a:extLst>
               <a:ext uri="{FF2B5EF4-FFF2-40B4-BE49-F238E27FC236}">
-                <a16:creationId xmlns:a16="http://schemas.microsoft.com/office/drawing/2014/main" id="{462A35DE-94FD-DA6A-9C0C-451383C4CF07}"/>
+                <a16:creationId xmlns:a16="http://schemas.microsoft.com/office/drawing/2014/main" id="{02929DF9-28B4-596B-3779-93529974DF88}"/>
               </a:ext>
             </a:extLst>
           </p:cNvPr>
@@ -12361,7 +12359,7 @@
           <p:cNvPr id="12" name="TextBox 11">
             <a:extLst>
               <a:ext uri="{FF2B5EF4-FFF2-40B4-BE49-F238E27FC236}">
-                <a16:creationId xmlns:a16="http://schemas.microsoft.com/office/drawing/2014/main" id="{7AF0B9C8-9A25-A1E6-E704-0816B2E60005}"/>
+                <a16:creationId xmlns:a16="http://schemas.microsoft.com/office/drawing/2014/main" id="{1C649C31-2CD1-18A3-E76B-70269778036A}"/>
               </a:ext>
             </a:extLst>
           </p:cNvPr>
@@ -12398,7 +12396,7 @@
           <p:cNvPr id="9" name="TextBox 8">
             <a:extLst>
               <a:ext uri="{FF2B5EF4-FFF2-40B4-BE49-F238E27FC236}">
-                <a16:creationId xmlns:a16="http://schemas.microsoft.com/office/drawing/2014/main" id="{434FF65A-91EF-5586-737F-A3BD67B5A3CE}"/>
+                <a16:creationId xmlns:a16="http://schemas.microsoft.com/office/drawing/2014/main" id="{0E7FCD4B-6C45-596C-9773-16C560746D2A}"/>
               </a:ext>
             </a:extLst>
           </p:cNvPr>
@@ -12434,7 +12432,7 @@
           <p:cNvPr id="13" name="TextBox 12">
             <a:extLst>
               <a:ext uri="{FF2B5EF4-FFF2-40B4-BE49-F238E27FC236}">
-                <a16:creationId xmlns:a16="http://schemas.microsoft.com/office/drawing/2014/main" id="{0648EFF2-E0D8-F8FF-C123-6FC2CA55A51E}"/>
+                <a16:creationId xmlns:a16="http://schemas.microsoft.com/office/drawing/2014/main" id="{2FE2217F-C2F1-2F4F-83A7-73EBD6CE883E}"/>
               </a:ext>
             </a:extLst>
           </p:cNvPr>
@@ -12474,7 +12472,7 @@
           <p:cNvPr id="17" name="Straight Connector 16">
             <a:extLst>
               <a:ext uri="{FF2B5EF4-FFF2-40B4-BE49-F238E27FC236}">
-                <a16:creationId xmlns:a16="http://schemas.microsoft.com/office/drawing/2014/main" id="{D0A40FC9-EB41-92D7-9BF1-68A99D969FEA}"/>
+                <a16:creationId xmlns:a16="http://schemas.microsoft.com/office/drawing/2014/main" id="{9AB62778-ADFC-8F9C-FB2F-C6552796C562}"/>
               </a:ext>
             </a:extLst>
           </p:cNvPr>
@@ -12519,7 +12517,7 @@
           <p:cNvPr id="18" name="Graphic 17" descr="Shield Tick with solid fill">
             <a:extLst>
               <a:ext uri="{FF2B5EF4-FFF2-40B4-BE49-F238E27FC236}">
-                <a16:creationId xmlns:a16="http://schemas.microsoft.com/office/drawing/2014/main" id="{93BD8A54-8101-3B75-6B1B-76E7C2D74E0A}"/>
+                <a16:creationId xmlns:a16="http://schemas.microsoft.com/office/drawing/2014/main" id="{7D45EB65-7112-0EB0-9B6E-C9CD15F47E6A}"/>
               </a:ext>
             </a:extLst>
           </p:cNvPr>
@@ -12529,10 +12527,10 @@
           <p:nvPr/>
         </p:nvPicPr>
         <p:blipFill>
-          <a:blip r:embed="rId3">
+          <a:blip r:embed="rId2">
             <a:extLst>
               <a:ext uri="{96DAC541-7B7A-43D3-8B79-37D633B846F1}">
-                <asvg:svgBlip xmlns:asvg="http://schemas.microsoft.com/office/drawing/2016/SVG/main" r:embed="rId4"/>
+                <asvg:svgBlip xmlns:asvg="http://schemas.microsoft.com/office/drawing/2016/SVG/main" r:embed="rId3"/>
               </a:ext>
             </a:extLst>
           </a:blip>
@@ -12555,7 +12553,7 @@
           <p:cNvPr id="19" name="Graphic 18" descr="Close with solid fill">
             <a:extLst>
               <a:ext uri="{FF2B5EF4-FFF2-40B4-BE49-F238E27FC236}">
-                <a16:creationId xmlns:a16="http://schemas.microsoft.com/office/drawing/2014/main" id="{65627446-F864-EA8D-71CE-ABA0926A7A6C}"/>
+                <a16:creationId xmlns:a16="http://schemas.microsoft.com/office/drawing/2014/main" id="{E309D260-B766-F1FF-6112-14AF040E356A}"/>
               </a:ext>
             </a:extLst>
           </p:cNvPr>
@@ -12565,10 +12563,10 @@
           <p:nvPr/>
         </p:nvPicPr>
         <p:blipFill>
-          <a:blip r:embed="rId5">
+          <a:blip r:embed="rId4">
             <a:extLst>
               <a:ext uri="{96DAC541-7B7A-43D3-8B79-37D633B846F1}">
-                <asvg:svgBlip xmlns:asvg="http://schemas.microsoft.com/office/drawing/2016/SVG/main" r:embed="rId6"/>
+                <asvg:svgBlip xmlns:asvg="http://schemas.microsoft.com/office/drawing/2016/SVG/main" r:embed="rId5"/>
               </a:ext>
             </a:extLst>
           </a:blip>
@@ -12591,7 +12589,7 @@
           <p:cNvPr id="25" name="TextBox 24">
             <a:extLst>
               <a:ext uri="{FF2B5EF4-FFF2-40B4-BE49-F238E27FC236}">
-                <a16:creationId xmlns:a16="http://schemas.microsoft.com/office/drawing/2014/main" id="{884C6B1D-A820-F177-EC23-1C1DB33A59BE}"/>
+                <a16:creationId xmlns:a16="http://schemas.microsoft.com/office/drawing/2014/main" id="{51D39732-5649-870D-B280-D7B7125EB72F}"/>
               </a:ext>
             </a:extLst>
           </p:cNvPr>
@@ -12601,7 +12599,7 @@
         <p:spPr>
           <a:xfrm>
             <a:off x="-7857400" y="2527667"/>
-            <a:ext cx="5089855" cy="830997"/>
+            <a:ext cx="6101350" cy="830997"/>
           </a:xfrm>
           <a:prstGeom prst="rect">
             <a:avLst/>
@@ -12634,7 +12632,7 @@
                 </a:solidFill>
                 <a:latin typeface="Patrick Hand" pitchFamily="2" charset="77"/>
               </a:rPr>
-              <a:t>py_017_zip_function</a:t>
+              <a:t>ts_001_optional_chaining</a:t>
             </a:r>
             <a:endParaRPr lang="en-DE" sz="4800" dirty="0">
               <a:solidFill>
@@ -12645,10 +12643,40 @@
           </a:p>
         </p:txBody>
       </p:sp>
+      <p:pic>
+        <p:nvPicPr>
+          <p:cNvPr id="3" name="Picture 2">
+            <a:extLst>
+              <a:ext uri="{FF2B5EF4-FFF2-40B4-BE49-F238E27FC236}">
+                <a16:creationId xmlns:a16="http://schemas.microsoft.com/office/drawing/2014/main" id="{632B8096-E902-961A-15A8-93FEB8CB072D}"/>
+              </a:ext>
+            </a:extLst>
+          </p:cNvPr>
+          <p:cNvPicPr>
+            <a:picLocks noChangeAspect="1"/>
+          </p:cNvPicPr>
+          <p:nvPr/>
+        </p:nvPicPr>
+        <p:blipFill>
+          <a:blip r:embed="rId6"/>
+          <a:stretch>
+            <a:fillRect/>
+          </a:stretch>
+        </p:blipFill>
+        <p:spPr>
+          <a:xfrm>
+            <a:off x="215612" y="2918196"/>
+            <a:ext cx="1062000" cy="1062000"/>
+          </a:xfrm>
+          <a:prstGeom prst="rect">
+            <a:avLst/>
+          </a:prstGeom>
+        </p:spPr>
+      </p:pic>
     </p:spTree>
     <p:extLst>
       <p:ext uri="{BB962C8B-B14F-4D97-AF65-F5344CB8AC3E}">
-        <p14:creationId xmlns:p14="http://schemas.microsoft.com/office/powerpoint/2010/main" val="1183855825"/>
+        <p14:creationId xmlns:p14="http://schemas.microsoft.com/office/powerpoint/2010/main" val="765848037"/>
       </p:ext>
     </p:extLst>
   </p:cSld>

</xml_diff>